<commit_message>
update the power generation of the real world simulation.
</commit_message>
<xml_diff>
--- a/designDoc/designDoc.pptx
+++ b/designDoc/designDoc.pptx
@@ -7,6 +7,7 @@
   <p:sldIdLst>
     <p:sldId id="256" r:id="rId2"/>
     <p:sldId id="257" r:id="rId3"/>
+    <p:sldId id="258" r:id="rId4"/>
   </p:sldIdLst>
   <p:sldSz cx="12192000" cy="6858000"/>
   <p:notesSz cx="6858000" cy="9144000"/>
@@ -262,7 +263,7 @@
           <a:p>
             <a:fld id="{DAB0784D-3A10-485A-BA3A-AF2134252110}" type="datetimeFigureOut">
               <a:rPr lang="en-SG" smtClean="0"/>
-              <a:t>17/4/2024</a:t>
+              <a:t>3/9/2024</a:t>
             </a:fld>
             <a:endParaRPr lang="en-SG"/>
           </a:p>
@@ -462,7 +463,7 @@
           <a:p>
             <a:fld id="{DAB0784D-3A10-485A-BA3A-AF2134252110}" type="datetimeFigureOut">
               <a:rPr lang="en-SG" smtClean="0"/>
-              <a:t>17/4/2024</a:t>
+              <a:t>3/9/2024</a:t>
             </a:fld>
             <a:endParaRPr lang="en-SG"/>
           </a:p>
@@ -672,7 +673,7 @@
           <a:p>
             <a:fld id="{DAB0784D-3A10-485A-BA3A-AF2134252110}" type="datetimeFigureOut">
               <a:rPr lang="en-SG" smtClean="0"/>
-              <a:t>17/4/2024</a:t>
+              <a:t>3/9/2024</a:t>
             </a:fld>
             <a:endParaRPr lang="en-SG"/>
           </a:p>
@@ -872,7 +873,7 @@
           <a:p>
             <a:fld id="{DAB0784D-3A10-485A-BA3A-AF2134252110}" type="datetimeFigureOut">
               <a:rPr lang="en-SG" smtClean="0"/>
-              <a:t>17/4/2024</a:t>
+              <a:t>3/9/2024</a:t>
             </a:fld>
             <a:endParaRPr lang="en-SG"/>
           </a:p>
@@ -1148,7 +1149,7 @@
           <a:p>
             <a:fld id="{DAB0784D-3A10-485A-BA3A-AF2134252110}" type="datetimeFigureOut">
               <a:rPr lang="en-SG" smtClean="0"/>
-              <a:t>17/4/2024</a:t>
+              <a:t>3/9/2024</a:t>
             </a:fld>
             <a:endParaRPr lang="en-SG"/>
           </a:p>
@@ -1416,7 +1417,7 @@
           <a:p>
             <a:fld id="{DAB0784D-3A10-485A-BA3A-AF2134252110}" type="datetimeFigureOut">
               <a:rPr lang="en-SG" smtClean="0"/>
-              <a:t>17/4/2024</a:t>
+              <a:t>3/9/2024</a:t>
             </a:fld>
             <a:endParaRPr lang="en-SG"/>
           </a:p>
@@ -1831,7 +1832,7 @@
           <a:p>
             <a:fld id="{DAB0784D-3A10-485A-BA3A-AF2134252110}" type="datetimeFigureOut">
               <a:rPr lang="en-SG" smtClean="0"/>
-              <a:t>17/4/2024</a:t>
+              <a:t>3/9/2024</a:t>
             </a:fld>
             <a:endParaRPr lang="en-SG"/>
           </a:p>
@@ -1973,7 +1974,7 @@
           <a:p>
             <a:fld id="{DAB0784D-3A10-485A-BA3A-AF2134252110}" type="datetimeFigureOut">
               <a:rPr lang="en-SG" smtClean="0"/>
-              <a:t>17/4/2024</a:t>
+              <a:t>3/9/2024</a:t>
             </a:fld>
             <a:endParaRPr lang="en-SG"/>
           </a:p>
@@ -2086,7 +2087,7 @@
           <a:p>
             <a:fld id="{DAB0784D-3A10-485A-BA3A-AF2134252110}" type="datetimeFigureOut">
               <a:rPr lang="en-SG" smtClean="0"/>
-              <a:t>17/4/2024</a:t>
+              <a:t>3/9/2024</a:t>
             </a:fld>
             <a:endParaRPr lang="en-SG"/>
           </a:p>
@@ -2399,7 +2400,7 @@
           <a:p>
             <a:fld id="{DAB0784D-3A10-485A-BA3A-AF2134252110}" type="datetimeFigureOut">
               <a:rPr lang="en-SG" smtClean="0"/>
-              <a:t>17/4/2024</a:t>
+              <a:t>3/9/2024</a:t>
             </a:fld>
             <a:endParaRPr lang="en-SG"/>
           </a:p>
@@ -2688,7 +2689,7 @@
           <a:p>
             <a:fld id="{DAB0784D-3A10-485A-BA3A-AF2134252110}" type="datetimeFigureOut">
               <a:rPr lang="en-SG" smtClean="0"/>
-              <a:t>17/4/2024</a:t>
+              <a:t>3/9/2024</a:t>
             </a:fld>
             <a:endParaRPr lang="en-SG"/>
           </a:p>
@@ -2931,7 +2932,7 @@
           <a:p>
             <a:fld id="{DAB0784D-3A10-485A-BA3A-AF2134252110}" type="datetimeFigureOut">
               <a:rPr lang="en-SG" smtClean="0"/>
-              <a:t>17/4/2024</a:t>
+              <a:t>3/9/2024</a:t>
             </a:fld>
             <a:endParaRPr lang="en-SG"/>
           </a:p>
@@ -13771,6 +13772,325 @@
     <p:extLst>
       <p:ext uri="{BB962C8B-B14F-4D97-AF65-F5344CB8AC3E}">
         <p14:creationId xmlns:p14="http://schemas.microsoft.com/office/powerpoint/2010/main" val="3586541459"/>
+      </p:ext>
+    </p:extLst>
+  </p:cSld>
+  <p:clrMapOvr>
+    <a:masterClrMapping/>
+  </p:clrMapOvr>
+</p:sld>
+</file>
+
+<file path=ppt/slides/slide3.xml><?xml version="1.0" encoding="utf-8"?>
+<p:sld xmlns:a="http://schemas.openxmlformats.org/drawingml/2006/main" xmlns:r="http://schemas.openxmlformats.org/officeDocument/2006/relationships" xmlns:p="http://schemas.openxmlformats.org/presentationml/2006/main">
+  <p:cSld>
+    <p:spTree>
+      <p:nvGrpSpPr>
+        <p:cNvPr id="1" name=""/>
+        <p:cNvGrpSpPr/>
+        <p:nvPr/>
+      </p:nvGrpSpPr>
+      <p:grpSpPr>
+        <a:xfrm>
+          <a:off x="0" y="0"/>
+          <a:ext cx="0" cy="0"/>
+          <a:chOff x="0" y="0"/>
+          <a:chExt cx="0" cy="0"/>
+        </a:xfrm>
+      </p:grpSpPr>
+      <p:pic>
+        <p:nvPicPr>
+          <p:cNvPr id="1026" name="Picture 2" descr="Electric tower, electric transmission, electricity tower, power tower, transmission  tower icon - Download on Iconfinder">
+            <a:extLst>
+              <a:ext uri="{FF2B5EF4-FFF2-40B4-BE49-F238E27FC236}">
+                <a16:creationId xmlns:a16="http://schemas.microsoft.com/office/drawing/2014/main" id="{72A1D150-1D01-6953-2362-0D23D5F2EC15}"/>
+              </a:ext>
+            </a:extLst>
+          </p:cNvPr>
+          <p:cNvPicPr>
+            <a:picLocks noChangeAspect="1" noChangeArrowheads="1"/>
+          </p:cNvPicPr>
+          <p:nvPr/>
+        </p:nvPicPr>
+        <p:blipFill>
+          <a:blip r:embed="rId2">
+            <a:extLst>
+              <a:ext uri="{28A0092B-C50C-407E-A947-70E740481C1C}">
+                <a14:useLocalDpi xmlns:a14="http://schemas.microsoft.com/office/drawing/2010/main" val="0"/>
+              </a:ext>
+            </a:extLst>
+          </a:blip>
+          <a:srcRect/>
+          <a:stretch>
+            <a:fillRect/>
+          </a:stretch>
+        </p:blipFill>
+        <p:spPr bwMode="auto">
+          <a:xfrm>
+            <a:off x="1626741" y="1103612"/>
+            <a:ext cx="1797977" cy="1797977"/>
+          </a:xfrm>
+          <a:prstGeom prst="rect">
+            <a:avLst/>
+          </a:prstGeom>
+          <a:noFill/>
+          <a:extLst>
+            <a:ext uri="{909E8E84-426E-40DD-AFC4-6F175D3DCCD1}">
+              <a14:hiddenFill xmlns:a14="http://schemas.microsoft.com/office/drawing/2010/main">
+                <a:solidFill>
+                  <a:srgbClr val="FFFFFF"/>
+                </a:solidFill>
+              </a14:hiddenFill>
+            </a:ext>
+          </a:extLst>
+        </p:spPr>
+      </p:pic>
+      <p:pic>
+        <p:nvPicPr>
+          <p:cNvPr id="4" name="Picture 2" descr="Electric tower, electric transmission, electricity tower, power tower, transmission  tower icon - Download on Iconfinder">
+            <a:extLst>
+              <a:ext uri="{FF2B5EF4-FFF2-40B4-BE49-F238E27FC236}">
+                <a16:creationId xmlns:a16="http://schemas.microsoft.com/office/drawing/2014/main" id="{AA39C55E-8537-678E-B4FE-C1697269AF69}"/>
+              </a:ext>
+            </a:extLst>
+          </p:cNvPr>
+          <p:cNvPicPr>
+            <a:picLocks noChangeAspect="1" noChangeArrowheads="1"/>
+          </p:cNvPicPr>
+          <p:nvPr/>
+        </p:nvPicPr>
+        <p:blipFill>
+          <a:blip r:embed="rId2">
+            <a:extLst>
+              <a:ext uri="{28A0092B-C50C-407E-A947-70E740481C1C}">
+                <a14:useLocalDpi xmlns:a14="http://schemas.microsoft.com/office/drawing/2010/main" val="0"/>
+              </a:ext>
+            </a:extLst>
+          </a:blip>
+          <a:srcRect/>
+          <a:stretch>
+            <a:fillRect/>
+          </a:stretch>
+        </p:blipFill>
+        <p:spPr bwMode="auto">
+          <a:xfrm>
+            <a:off x="4332269" y="1103614"/>
+            <a:ext cx="1797977" cy="1797977"/>
+          </a:xfrm>
+          <a:prstGeom prst="rect">
+            <a:avLst/>
+          </a:prstGeom>
+          <a:noFill/>
+          <a:extLst>
+            <a:ext uri="{909E8E84-426E-40DD-AFC4-6F175D3DCCD1}">
+              <a14:hiddenFill xmlns:a14="http://schemas.microsoft.com/office/drawing/2010/main">
+                <a:solidFill>
+                  <a:srgbClr val="FFFFFF"/>
+                </a:solidFill>
+              </a14:hiddenFill>
+            </a:ext>
+          </a:extLst>
+        </p:spPr>
+      </p:pic>
+      <p:pic>
+        <p:nvPicPr>
+          <p:cNvPr id="5" name="Picture 2" descr="Electric tower, electric transmission, electricity tower, power tower, transmission  tower icon - Download on Iconfinder">
+            <a:extLst>
+              <a:ext uri="{FF2B5EF4-FFF2-40B4-BE49-F238E27FC236}">
+                <a16:creationId xmlns:a16="http://schemas.microsoft.com/office/drawing/2014/main" id="{36288537-0FB7-D44C-7FC3-863FFD8A9A19}"/>
+              </a:ext>
+            </a:extLst>
+          </p:cNvPr>
+          <p:cNvPicPr>
+            <a:picLocks noChangeAspect="1" noChangeArrowheads="1"/>
+          </p:cNvPicPr>
+          <p:nvPr/>
+        </p:nvPicPr>
+        <p:blipFill>
+          <a:blip r:embed="rId2">
+            <a:extLst>
+              <a:ext uri="{28A0092B-C50C-407E-A947-70E740481C1C}">
+                <a14:useLocalDpi xmlns:a14="http://schemas.microsoft.com/office/drawing/2010/main" val="0"/>
+              </a:ext>
+            </a:extLst>
+          </a:blip>
+          <a:srcRect/>
+          <a:stretch>
+            <a:fillRect/>
+          </a:stretch>
+        </p:blipFill>
+        <p:spPr bwMode="auto">
+          <a:xfrm>
+            <a:off x="7181635" y="1103613"/>
+            <a:ext cx="1797977" cy="1797977"/>
+          </a:xfrm>
+          <a:prstGeom prst="rect">
+            <a:avLst/>
+          </a:prstGeom>
+          <a:noFill/>
+          <a:extLst>
+            <a:ext uri="{909E8E84-426E-40DD-AFC4-6F175D3DCCD1}">
+              <a14:hiddenFill xmlns:a14="http://schemas.microsoft.com/office/drawing/2010/main">
+                <a:solidFill>
+                  <a:srgbClr val="FFFFFF"/>
+                </a:solidFill>
+              </a14:hiddenFill>
+            </a:ext>
+          </a:extLst>
+        </p:spPr>
+      </p:pic>
+      <p:cxnSp>
+        <p:nvCxnSpPr>
+          <p:cNvPr id="7" name="Straight Connector 6">
+            <a:extLst>
+              <a:ext uri="{FF2B5EF4-FFF2-40B4-BE49-F238E27FC236}">
+                <a16:creationId xmlns:a16="http://schemas.microsoft.com/office/drawing/2014/main" id="{EA52B3CA-C062-BE5E-96B5-DE011F31B68C}"/>
+              </a:ext>
+            </a:extLst>
+          </p:cNvPr>
+          <p:cNvCxnSpPr/>
+          <p:nvPr/>
+        </p:nvCxnSpPr>
+        <p:spPr>
+          <a:xfrm>
+            <a:off x="2239766" y="1479479"/>
+            <a:ext cx="2671281" cy="0"/>
+          </a:xfrm>
+          <a:prstGeom prst="line">
+            <a:avLst/>
+          </a:prstGeom>
+        </p:spPr>
+        <p:style>
+          <a:lnRef idx="2">
+            <a:schemeClr val="accent1"/>
+          </a:lnRef>
+          <a:fillRef idx="0">
+            <a:schemeClr val="accent1"/>
+          </a:fillRef>
+          <a:effectRef idx="1">
+            <a:schemeClr val="accent1"/>
+          </a:effectRef>
+          <a:fontRef idx="minor">
+            <a:schemeClr val="tx1"/>
+          </a:fontRef>
+        </p:style>
+      </p:cxnSp>
+      <p:cxnSp>
+        <p:nvCxnSpPr>
+          <p:cNvPr id="8" name="Straight Connector 7">
+            <a:extLst>
+              <a:ext uri="{FF2B5EF4-FFF2-40B4-BE49-F238E27FC236}">
+                <a16:creationId xmlns:a16="http://schemas.microsoft.com/office/drawing/2014/main" id="{7069D987-1185-952F-2356-8B5D23F1610A}"/>
+              </a:ext>
+            </a:extLst>
+          </p:cNvPr>
+          <p:cNvCxnSpPr>
+            <a:cxnSpLocks/>
+          </p:cNvCxnSpPr>
+          <p:nvPr/>
+        </p:nvCxnSpPr>
+        <p:spPr>
+          <a:xfrm>
+            <a:off x="5012077" y="1479479"/>
+            <a:ext cx="2734638" cy="0"/>
+          </a:xfrm>
+          <a:prstGeom prst="line">
+            <a:avLst/>
+          </a:prstGeom>
+        </p:spPr>
+        <p:style>
+          <a:lnRef idx="2">
+            <a:schemeClr val="accent1"/>
+          </a:lnRef>
+          <a:fillRef idx="0">
+            <a:schemeClr val="accent1"/>
+          </a:fillRef>
+          <a:effectRef idx="1">
+            <a:schemeClr val="accent1"/>
+          </a:effectRef>
+          <a:fontRef idx="minor">
+            <a:schemeClr val="tx1"/>
+          </a:fontRef>
+        </p:style>
+      </p:cxnSp>
+      <p:cxnSp>
+        <p:nvCxnSpPr>
+          <p:cNvPr id="10" name="Straight Connector 9">
+            <a:extLst>
+              <a:ext uri="{FF2B5EF4-FFF2-40B4-BE49-F238E27FC236}">
+                <a16:creationId xmlns:a16="http://schemas.microsoft.com/office/drawing/2014/main" id="{27161306-ACE0-48A7-6924-7FA755B787F4}"/>
+              </a:ext>
+            </a:extLst>
+          </p:cNvPr>
+          <p:cNvCxnSpPr/>
+          <p:nvPr/>
+        </p:nvCxnSpPr>
+        <p:spPr>
+          <a:xfrm>
+            <a:off x="2741487" y="1816814"/>
+            <a:ext cx="2671281" cy="0"/>
+          </a:xfrm>
+          <a:prstGeom prst="line">
+            <a:avLst/>
+          </a:prstGeom>
+        </p:spPr>
+        <p:style>
+          <a:lnRef idx="2">
+            <a:schemeClr val="accent1"/>
+          </a:lnRef>
+          <a:fillRef idx="0">
+            <a:schemeClr val="accent1"/>
+          </a:fillRef>
+          <a:effectRef idx="1">
+            <a:schemeClr val="accent1"/>
+          </a:effectRef>
+          <a:fontRef idx="minor">
+            <a:schemeClr val="tx1"/>
+          </a:fontRef>
+        </p:style>
+      </p:cxnSp>
+      <p:cxnSp>
+        <p:nvCxnSpPr>
+          <p:cNvPr id="11" name="Straight Connector 10">
+            <a:extLst>
+              <a:ext uri="{FF2B5EF4-FFF2-40B4-BE49-F238E27FC236}">
+                <a16:creationId xmlns:a16="http://schemas.microsoft.com/office/drawing/2014/main" id="{239EEFEE-404B-36AD-AC7E-A6C91659B8DD}"/>
+              </a:ext>
+            </a:extLst>
+          </p:cNvPr>
+          <p:cNvCxnSpPr>
+            <a:cxnSpLocks/>
+          </p:cNvCxnSpPr>
+          <p:nvPr/>
+        </p:nvCxnSpPr>
+        <p:spPr>
+          <a:xfrm>
+            <a:off x="5546332" y="1813390"/>
+            <a:ext cx="2765461" cy="0"/>
+          </a:xfrm>
+          <a:prstGeom prst="line">
+            <a:avLst/>
+          </a:prstGeom>
+        </p:spPr>
+        <p:style>
+          <a:lnRef idx="2">
+            <a:schemeClr val="accent1"/>
+          </a:lnRef>
+          <a:fillRef idx="0">
+            <a:schemeClr val="accent1"/>
+          </a:fillRef>
+          <a:effectRef idx="1">
+            <a:schemeClr val="accent1"/>
+          </a:effectRef>
+          <a:fontRef idx="minor">
+            <a:schemeClr val="tx1"/>
+          </a:fontRef>
+        </p:style>
+      </p:cxnSp>
+    </p:spTree>
+    <p:extLst>
+      <p:ext uri="{BB962C8B-B14F-4D97-AF65-F5344CB8AC3E}">
+        <p14:creationId xmlns:p14="http://schemas.microsoft.com/office/powerpoint/2010/main" val="366476725"/>
       </p:ext>
     </p:extLst>
   </p:cSld>

</xml_diff>

<commit_message>
Added the transmission and load in the physical world simulation.
</commit_message>
<xml_diff>
--- a/designDoc/designDoc.pptx
+++ b/designDoc/designDoc.pptx
@@ -263,7 +263,7 @@
           <a:p>
             <a:fld id="{DAB0784D-3A10-485A-BA3A-AF2134252110}" type="datetimeFigureOut">
               <a:rPr lang="en-SG" smtClean="0"/>
-              <a:t>3/9/2024</a:t>
+              <a:t>4/9/2024</a:t>
             </a:fld>
             <a:endParaRPr lang="en-SG"/>
           </a:p>
@@ -463,7 +463,7 @@
           <a:p>
             <a:fld id="{DAB0784D-3A10-485A-BA3A-AF2134252110}" type="datetimeFigureOut">
               <a:rPr lang="en-SG" smtClean="0"/>
-              <a:t>3/9/2024</a:t>
+              <a:t>4/9/2024</a:t>
             </a:fld>
             <a:endParaRPr lang="en-SG"/>
           </a:p>
@@ -673,7 +673,7 @@
           <a:p>
             <a:fld id="{DAB0784D-3A10-485A-BA3A-AF2134252110}" type="datetimeFigureOut">
               <a:rPr lang="en-SG" smtClean="0"/>
-              <a:t>3/9/2024</a:t>
+              <a:t>4/9/2024</a:t>
             </a:fld>
             <a:endParaRPr lang="en-SG"/>
           </a:p>
@@ -873,7 +873,7 @@
           <a:p>
             <a:fld id="{DAB0784D-3A10-485A-BA3A-AF2134252110}" type="datetimeFigureOut">
               <a:rPr lang="en-SG" smtClean="0"/>
-              <a:t>3/9/2024</a:t>
+              <a:t>4/9/2024</a:t>
             </a:fld>
             <a:endParaRPr lang="en-SG"/>
           </a:p>
@@ -1149,7 +1149,7 @@
           <a:p>
             <a:fld id="{DAB0784D-3A10-485A-BA3A-AF2134252110}" type="datetimeFigureOut">
               <a:rPr lang="en-SG" smtClean="0"/>
-              <a:t>3/9/2024</a:t>
+              <a:t>4/9/2024</a:t>
             </a:fld>
             <a:endParaRPr lang="en-SG"/>
           </a:p>
@@ -1417,7 +1417,7 @@
           <a:p>
             <a:fld id="{DAB0784D-3A10-485A-BA3A-AF2134252110}" type="datetimeFigureOut">
               <a:rPr lang="en-SG" smtClean="0"/>
-              <a:t>3/9/2024</a:t>
+              <a:t>4/9/2024</a:t>
             </a:fld>
             <a:endParaRPr lang="en-SG"/>
           </a:p>
@@ -1832,7 +1832,7 @@
           <a:p>
             <a:fld id="{DAB0784D-3A10-485A-BA3A-AF2134252110}" type="datetimeFigureOut">
               <a:rPr lang="en-SG" smtClean="0"/>
-              <a:t>3/9/2024</a:t>
+              <a:t>4/9/2024</a:t>
             </a:fld>
             <a:endParaRPr lang="en-SG"/>
           </a:p>
@@ -1974,7 +1974,7 @@
           <a:p>
             <a:fld id="{DAB0784D-3A10-485A-BA3A-AF2134252110}" type="datetimeFigureOut">
               <a:rPr lang="en-SG" smtClean="0"/>
-              <a:t>3/9/2024</a:t>
+              <a:t>4/9/2024</a:t>
             </a:fld>
             <a:endParaRPr lang="en-SG"/>
           </a:p>
@@ -2087,7 +2087,7 @@
           <a:p>
             <a:fld id="{DAB0784D-3A10-485A-BA3A-AF2134252110}" type="datetimeFigureOut">
               <a:rPr lang="en-SG" smtClean="0"/>
-              <a:t>3/9/2024</a:t>
+              <a:t>4/9/2024</a:t>
             </a:fld>
             <a:endParaRPr lang="en-SG"/>
           </a:p>
@@ -2400,7 +2400,7 @@
           <a:p>
             <a:fld id="{DAB0784D-3A10-485A-BA3A-AF2134252110}" type="datetimeFigureOut">
               <a:rPr lang="en-SG" smtClean="0"/>
-              <a:t>3/9/2024</a:t>
+              <a:t>4/9/2024</a:t>
             </a:fld>
             <a:endParaRPr lang="en-SG"/>
           </a:p>
@@ -2689,7 +2689,7 @@
           <a:p>
             <a:fld id="{DAB0784D-3A10-485A-BA3A-AF2134252110}" type="datetimeFigureOut">
               <a:rPr lang="en-SG" smtClean="0"/>
-              <a:t>3/9/2024</a:t>
+              <a:t>4/9/2024</a:t>
             </a:fld>
             <a:endParaRPr lang="en-SG"/>
           </a:p>
@@ -2932,7 +2932,7 @@
           <a:p>
             <a:fld id="{DAB0784D-3A10-485A-BA3A-AF2134252110}" type="datetimeFigureOut">
               <a:rPr lang="en-SG" smtClean="0"/>
-              <a:t>3/9/2024</a:t>
+              <a:t>4/9/2024</a:t>
             </a:fld>
             <a:endParaRPr lang="en-SG"/>
           </a:p>
@@ -13827,7 +13827,7 @@
         </p:blipFill>
         <p:spPr bwMode="auto">
           <a:xfrm>
-            <a:off x="1626741" y="1103612"/>
+            <a:off x="1631880" y="1175533"/>
             <a:ext cx="1797977" cy="1797977"/>
           </a:xfrm>
           <a:prstGeom prst="rect">
@@ -13874,7 +13874,7 @@
         </p:blipFill>
         <p:spPr bwMode="auto">
           <a:xfrm>
-            <a:off x="4332269" y="1103614"/>
+            <a:off x="3774043" y="1175534"/>
             <a:ext cx="1797977" cy="1797977"/>
           </a:xfrm>
           <a:prstGeom prst="rect">
@@ -13921,7 +13921,7 @@
         </p:blipFill>
         <p:spPr bwMode="auto">
           <a:xfrm>
-            <a:off x="7181635" y="1103613"/>
+            <a:off x="6169630" y="1175534"/>
             <a:ext cx="1797977" cy="1797977"/>
           </a:xfrm>
           <a:prstGeom prst="rect">
@@ -13948,13 +13948,15 @@
               </a:ext>
             </a:extLst>
           </p:cNvPr>
-          <p:cNvCxnSpPr/>
+          <p:cNvCxnSpPr>
+            <a:cxnSpLocks/>
+          </p:cNvCxnSpPr>
           <p:nvPr/>
         </p:nvCxnSpPr>
         <p:spPr>
           <a:xfrm>
             <a:off x="2239766" y="1479479"/>
-            <a:ext cx="2671281" cy="0"/>
+            <a:ext cx="2106203" cy="0"/>
           </a:xfrm>
           <a:prstGeom prst="line">
             <a:avLst/>
@@ -13991,8 +13993,8 @@
         </p:nvCxnSpPr>
         <p:spPr>
           <a:xfrm>
-            <a:off x="5012077" y="1479479"/>
-            <a:ext cx="2734638" cy="0"/>
+            <a:off x="4673031" y="1479479"/>
+            <a:ext cx="2077090" cy="0"/>
           </a:xfrm>
           <a:prstGeom prst="line">
             <a:avLst/>
@@ -14022,13 +14024,15 @@
               </a:ext>
             </a:extLst>
           </p:cNvPr>
-          <p:cNvCxnSpPr/>
+          <p:cNvCxnSpPr>
+            <a:cxnSpLocks/>
+          </p:cNvCxnSpPr>
           <p:nvPr/>
         </p:nvCxnSpPr>
         <p:spPr>
           <a:xfrm>
             <a:off x="2741487" y="1816814"/>
-            <a:ext cx="2671281" cy="0"/>
+            <a:ext cx="2128464" cy="0"/>
           </a:xfrm>
           <a:prstGeom prst="line">
             <a:avLst/>
@@ -14065,8 +14069,131 @@
         </p:nvCxnSpPr>
         <p:spPr>
           <a:xfrm>
-            <a:off x="5546332" y="1813390"/>
-            <a:ext cx="2765461" cy="0"/>
+            <a:off x="4869951" y="1816814"/>
+            <a:ext cx="2404152" cy="0"/>
+          </a:xfrm>
+          <a:prstGeom prst="line">
+            <a:avLst/>
+          </a:prstGeom>
+        </p:spPr>
+        <p:style>
+          <a:lnRef idx="2">
+            <a:schemeClr val="accent1"/>
+          </a:lnRef>
+          <a:fillRef idx="0">
+            <a:schemeClr val="accent1"/>
+          </a:fillRef>
+          <a:effectRef idx="1">
+            <a:schemeClr val="accent1"/>
+          </a:effectRef>
+          <a:fontRef idx="minor">
+            <a:schemeClr val="tx1"/>
+          </a:fontRef>
+        </p:style>
+      </p:cxnSp>
+      <p:pic>
+        <p:nvPicPr>
+          <p:cNvPr id="2" name="Picture 2" descr="Electric tower, electric transmission, electricity tower, power tower, transmission  tower icon - Download on Iconfinder">
+            <a:extLst>
+              <a:ext uri="{FF2B5EF4-FFF2-40B4-BE49-F238E27FC236}">
+                <a16:creationId xmlns:a16="http://schemas.microsoft.com/office/drawing/2014/main" id="{1B2B22FB-6E14-F063-6774-A7E0BFD7797B}"/>
+              </a:ext>
+            </a:extLst>
+          </p:cNvPr>
+          <p:cNvPicPr>
+            <a:picLocks noChangeAspect="1" noChangeArrowheads="1"/>
+          </p:cNvPicPr>
+          <p:nvPr/>
+        </p:nvPicPr>
+        <p:blipFill>
+          <a:blip r:embed="rId2">
+            <a:extLst>
+              <a:ext uri="{28A0092B-C50C-407E-A947-70E740481C1C}">
+                <a14:useLocalDpi xmlns:a14="http://schemas.microsoft.com/office/drawing/2010/main" val="0"/>
+              </a:ext>
+            </a:extLst>
+          </a:blip>
+          <a:srcRect/>
+          <a:stretch>
+            <a:fillRect/>
+          </a:stretch>
+        </p:blipFill>
+        <p:spPr bwMode="auto">
+          <a:xfrm>
+            <a:off x="8620015" y="1175533"/>
+            <a:ext cx="1797977" cy="1797977"/>
+          </a:xfrm>
+          <a:prstGeom prst="rect">
+            <a:avLst/>
+          </a:prstGeom>
+          <a:noFill/>
+          <a:extLst>
+            <a:ext uri="{909E8E84-426E-40DD-AFC4-6F175D3DCCD1}">
+              <a14:hiddenFill xmlns:a14="http://schemas.microsoft.com/office/drawing/2010/main">
+                <a:solidFill>
+                  <a:srgbClr val="FFFFFF"/>
+                </a:solidFill>
+              </a14:hiddenFill>
+            </a:ext>
+          </a:extLst>
+        </p:spPr>
+      </p:pic>
+      <p:cxnSp>
+        <p:nvCxnSpPr>
+          <p:cNvPr id="13" name="Straight Connector 12">
+            <a:extLst>
+              <a:ext uri="{FF2B5EF4-FFF2-40B4-BE49-F238E27FC236}">
+                <a16:creationId xmlns:a16="http://schemas.microsoft.com/office/drawing/2014/main" id="{D3ED1138-54D2-F832-42F5-4BEE322B8D3D}"/>
+              </a:ext>
+            </a:extLst>
+          </p:cNvPr>
+          <p:cNvCxnSpPr>
+            <a:cxnSpLocks/>
+          </p:cNvCxnSpPr>
+          <p:nvPr/>
+        </p:nvCxnSpPr>
+        <p:spPr>
+          <a:xfrm>
+            <a:off x="7167939" y="1467493"/>
+            <a:ext cx="2077090" cy="0"/>
+          </a:xfrm>
+          <a:prstGeom prst="line">
+            <a:avLst/>
+          </a:prstGeom>
+        </p:spPr>
+        <p:style>
+          <a:lnRef idx="2">
+            <a:schemeClr val="accent1"/>
+          </a:lnRef>
+          <a:fillRef idx="0">
+            <a:schemeClr val="accent1"/>
+          </a:fillRef>
+          <a:effectRef idx="1">
+            <a:schemeClr val="accent1"/>
+          </a:effectRef>
+          <a:fontRef idx="minor">
+            <a:schemeClr val="tx1"/>
+          </a:fontRef>
+        </p:style>
+      </p:cxnSp>
+      <p:cxnSp>
+        <p:nvCxnSpPr>
+          <p:cNvPr id="14" name="Straight Connector 13">
+            <a:extLst>
+              <a:ext uri="{FF2B5EF4-FFF2-40B4-BE49-F238E27FC236}">
+                <a16:creationId xmlns:a16="http://schemas.microsoft.com/office/drawing/2014/main" id="{39A5A865-7820-9CF8-57E6-881392BF90B7}"/>
+              </a:ext>
+            </a:extLst>
+          </p:cNvPr>
+          <p:cNvCxnSpPr>
+            <a:cxnSpLocks/>
+          </p:cNvCxnSpPr>
+          <p:nvPr/>
+        </p:nvCxnSpPr>
+        <p:spPr>
+          <a:xfrm>
+            <a:off x="7274103" y="1816814"/>
+            <a:ext cx="2424701" cy="0"/>
           </a:xfrm>
           <a:prstGeom prst="line">
             <a:avLst/>

</xml_diff>

<commit_message>
update the readme introduction.
</commit_message>
<xml_diff>
--- a/designDoc/designDoc.pptx
+++ b/designDoc/designDoc.pptx
@@ -200,7 +200,7 @@
           <a:p>
             <a:fld id="{60A58DA9-13FF-4A44-80CD-EC4A25FA80B4}" type="datetimeFigureOut">
               <a:rPr lang="en-SG" smtClean="0"/>
-              <a:t>19/9/2024</a:t>
+              <a:t>20/9/2024</a:t>
             </a:fld>
             <a:endParaRPr lang="en-SG"/>
           </a:p>
@@ -468,6 +468,90 @@
 </p:notesMaster>
 </file>
 
+<file path=ppt/notesSlides/notesSlide1.xml><?xml version="1.0" encoding="utf-8"?>
+<p:notes xmlns:a="http://schemas.openxmlformats.org/drawingml/2006/main" xmlns:r="http://schemas.openxmlformats.org/officeDocument/2006/relationships" xmlns:p="http://schemas.openxmlformats.org/presentationml/2006/main">
+  <p:cSld>
+    <p:spTree>
+      <p:nvGrpSpPr>
+        <p:cNvPr id="1" name=""/>
+        <p:cNvGrpSpPr/>
+        <p:nvPr/>
+      </p:nvGrpSpPr>
+      <p:grpSpPr>
+        <a:xfrm>
+          <a:off x="0" y="0"/>
+          <a:ext cx="0" cy="0"/>
+          <a:chOff x="0" y="0"/>
+          <a:chExt cx="0" cy="0"/>
+        </a:xfrm>
+      </p:grpSpPr>
+      <p:sp>
+        <p:nvSpPr>
+          <p:cNvPr id="2" name="Slide Image Placeholder 1"/>
+          <p:cNvSpPr>
+            <a:spLocks noGrp="1" noRot="1" noChangeAspect="1"/>
+          </p:cNvSpPr>
+          <p:nvPr>
+            <p:ph type="sldImg"/>
+          </p:nvPr>
+        </p:nvSpPr>
+        <p:spPr/>
+      </p:sp>
+      <p:sp>
+        <p:nvSpPr>
+          <p:cNvPr id="3" name="Notes Placeholder 2"/>
+          <p:cNvSpPr>
+            <a:spLocks noGrp="1"/>
+          </p:cNvSpPr>
+          <p:nvPr>
+            <p:ph type="body" idx="1"/>
+          </p:nvPr>
+        </p:nvSpPr>
+        <p:spPr/>
+        <p:txBody>
+          <a:bodyPr/>
+          <a:lstStyle/>
+          <a:p>
+            <a:endParaRPr lang="en-SG" dirty="0"/>
+          </a:p>
+        </p:txBody>
+      </p:sp>
+      <p:sp>
+        <p:nvSpPr>
+          <p:cNvPr id="4" name="Slide Number Placeholder 3"/>
+          <p:cNvSpPr>
+            <a:spLocks noGrp="1"/>
+          </p:cNvSpPr>
+          <p:nvPr>
+            <p:ph type="sldNum" sz="quarter" idx="5"/>
+          </p:nvPr>
+        </p:nvSpPr>
+        <p:spPr/>
+        <p:txBody>
+          <a:bodyPr/>
+          <a:lstStyle/>
+          <a:p>
+            <a:fld id="{2F8A4C87-30FF-4E0D-9FFA-CCB73B1DE919}" type="slidenum">
+              <a:rPr lang="en-SG" smtClean="0"/>
+              <a:t>3</a:t>
+            </a:fld>
+            <a:endParaRPr lang="en-SG"/>
+          </a:p>
+        </p:txBody>
+      </p:sp>
+    </p:spTree>
+    <p:extLst>
+      <p:ext uri="{BB962C8B-B14F-4D97-AF65-F5344CB8AC3E}">
+        <p14:creationId xmlns:p14="http://schemas.microsoft.com/office/powerpoint/2010/main" val="123029687"/>
+      </p:ext>
+    </p:extLst>
+  </p:cSld>
+  <p:clrMapOvr>
+    <a:masterClrMapping/>
+  </p:clrMapOvr>
+</p:notes>
+</file>
+
 <file path=ppt/slideLayouts/slideLayout1.xml><?xml version="1.0" encoding="utf-8"?>
 <p:sldLayout xmlns:a="http://schemas.openxmlformats.org/drawingml/2006/main" xmlns:r="http://schemas.openxmlformats.org/officeDocument/2006/relationships" xmlns:p="http://schemas.openxmlformats.org/presentationml/2006/main" type="title" preserve="1">
   <p:cSld name="Title Slide">
@@ -617,7 +701,7 @@
           <a:p>
             <a:fld id="{DAB0784D-3A10-485A-BA3A-AF2134252110}" type="datetimeFigureOut">
               <a:rPr lang="en-SG" smtClean="0"/>
-              <a:t>19/9/2024</a:t>
+              <a:t>20/9/2024</a:t>
             </a:fld>
             <a:endParaRPr lang="en-SG"/>
           </a:p>
@@ -817,7 +901,7 @@
           <a:p>
             <a:fld id="{DAB0784D-3A10-485A-BA3A-AF2134252110}" type="datetimeFigureOut">
               <a:rPr lang="en-SG" smtClean="0"/>
-              <a:t>19/9/2024</a:t>
+              <a:t>20/9/2024</a:t>
             </a:fld>
             <a:endParaRPr lang="en-SG"/>
           </a:p>
@@ -1027,7 +1111,7 @@
           <a:p>
             <a:fld id="{DAB0784D-3A10-485A-BA3A-AF2134252110}" type="datetimeFigureOut">
               <a:rPr lang="en-SG" smtClean="0"/>
-              <a:t>19/9/2024</a:t>
+              <a:t>20/9/2024</a:t>
             </a:fld>
             <a:endParaRPr lang="en-SG"/>
           </a:p>
@@ -1227,7 +1311,7 @@
           <a:p>
             <a:fld id="{DAB0784D-3A10-485A-BA3A-AF2134252110}" type="datetimeFigureOut">
               <a:rPr lang="en-SG" smtClean="0"/>
-              <a:t>19/9/2024</a:t>
+              <a:t>20/9/2024</a:t>
             </a:fld>
             <a:endParaRPr lang="en-SG"/>
           </a:p>
@@ -1503,7 +1587,7 @@
           <a:p>
             <a:fld id="{DAB0784D-3A10-485A-BA3A-AF2134252110}" type="datetimeFigureOut">
               <a:rPr lang="en-SG" smtClean="0"/>
-              <a:t>19/9/2024</a:t>
+              <a:t>20/9/2024</a:t>
             </a:fld>
             <a:endParaRPr lang="en-SG"/>
           </a:p>
@@ -1771,7 +1855,7 @@
           <a:p>
             <a:fld id="{DAB0784D-3A10-485A-BA3A-AF2134252110}" type="datetimeFigureOut">
               <a:rPr lang="en-SG" smtClean="0"/>
-              <a:t>19/9/2024</a:t>
+              <a:t>20/9/2024</a:t>
             </a:fld>
             <a:endParaRPr lang="en-SG"/>
           </a:p>
@@ -2186,7 +2270,7 @@
           <a:p>
             <a:fld id="{DAB0784D-3A10-485A-BA3A-AF2134252110}" type="datetimeFigureOut">
               <a:rPr lang="en-SG" smtClean="0"/>
-              <a:t>19/9/2024</a:t>
+              <a:t>20/9/2024</a:t>
             </a:fld>
             <a:endParaRPr lang="en-SG"/>
           </a:p>
@@ -2328,7 +2412,7 @@
           <a:p>
             <a:fld id="{DAB0784D-3A10-485A-BA3A-AF2134252110}" type="datetimeFigureOut">
               <a:rPr lang="en-SG" smtClean="0"/>
-              <a:t>19/9/2024</a:t>
+              <a:t>20/9/2024</a:t>
             </a:fld>
             <a:endParaRPr lang="en-SG"/>
           </a:p>
@@ -2441,7 +2525,7 @@
           <a:p>
             <a:fld id="{DAB0784D-3A10-485A-BA3A-AF2134252110}" type="datetimeFigureOut">
               <a:rPr lang="en-SG" smtClean="0"/>
-              <a:t>19/9/2024</a:t>
+              <a:t>20/9/2024</a:t>
             </a:fld>
             <a:endParaRPr lang="en-SG"/>
           </a:p>
@@ -2754,7 +2838,7 @@
           <a:p>
             <a:fld id="{DAB0784D-3A10-485A-BA3A-AF2134252110}" type="datetimeFigureOut">
               <a:rPr lang="en-SG" smtClean="0"/>
-              <a:t>19/9/2024</a:t>
+              <a:t>20/9/2024</a:t>
             </a:fld>
             <a:endParaRPr lang="en-SG"/>
           </a:p>
@@ -3043,7 +3127,7 @@
           <a:p>
             <a:fld id="{DAB0784D-3A10-485A-BA3A-AF2134252110}" type="datetimeFigureOut">
               <a:rPr lang="en-SG" smtClean="0"/>
-              <a:t>19/9/2024</a:t>
+              <a:t>20/9/2024</a:t>
             </a:fld>
             <a:endParaRPr lang="en-SG"/>
           </a:p>
@@ -3286,7 +3370,7 @@
           <a:p>
             <a:fld id="{DAB0784D-3A10-485A-BA3A-AF2134252110}" type="datetimeFigureOut">
               <a:rPr lang="en-SG" smtClean="0"/>
-              <a:t>19/9/2024</a:t>
+              <a:t>20/9/2024</a:t>
             </a:fld>
             <a:endParaRPr lang="en-SG"/>
           </a:p>
@@ -14166,8 +14250,8 @@
         </p:nvSpPr>
         <p:spPr>
           <a:xfrm>
-            <a:off x="638175" y="382615"/>
-            <a:ext cx="9763125" cy="5770535"/>
+            <a:off x="638175" y="577378"/>
+            <a:ext cx="9763125" cy="5446843"/>
           </a:xfrm>
           <a:prstGeom prst="rect">
             <a:avLst/>
@@ -14247,8 +14331,8 @@
         </p:nvSpPr>
         <p:spPr>
           <a:xfrm>
-            <a:off x="805597" y="4450198"/>
-            <a:ext cx="5987089" cy="1407293"/>
+            <a:off x="848795" y="4450198"/>
+            <a:ext cx="5943891" cy="1407293"/>
           </a:xfrm>
           <a:prstGeom prst="roundRect">
             <a:avLst/>
@@ -14328,8 +14412,8 @@
         </p:nvSpPr>
         <p:spPr>
           <a:xfrm>
-            <a:off x="848795" y="4517779"/>
-            <a:ext cx="1205965" cy="830997"/>
+            <a:off x="900075" y="4529006"/>
+            <a:ext cx="1205965" cy="1384995"/>
           </a:xfrm>
           <a:prstGeom prst="rect">
             <a:avLst/>
@@ -14360,7 +14444,7 @@
               <a:defRPr/>
             </a:pPr>
             <a:r>
-              <a:rPr kumimoji="0" lang="en-US" sz="1200" b="1" i="0" u="none" strike="noStrike" kern="1200" cap="none" spc="0" normalizeH="0" baseline="0" noProof="0" dirty="0">
+              <a:rPr kumimoji="0" lang="en-US" sz="1400" b="1" i="0" u="none" strike="noStrike" kern="1200" cap="none" spc="0" normalizeH="0" baseline="0" noProof="0" dirty="0">
                 <a:ln>
                   <a:noFill/>
                 </a:ln>
@@ -14394,22 +14478,19 @@
               <a:tabLst/>
               <a:defRPr/>
             </a:pPr>
-            <a:r>
-              <a:rPr kumimoji="0" lang="en-US" sz="1200" b="0" i="0" u="none" strike="noStrike" kern="1200" cap="none" spc="0" normalizeH="0" baseline="0" noProof="0" dirty="0">
-                <a:ln>
-                  <a:noFill/>
-                </a:ln>
-                <a:solidFill>
-                  <a:prstClr val="white"/>
-                </a:solidFill>
-                <a:effectLst/>
-                <a:uLnTx/>
-                <a:uFillTx/>
-                <a:ea typeface="+mn-ea"/>
-                <a:cs typeface="+mn-cs"/>
-              </a:rPr>
-              <a:t>Physical Process</a:t>
-            </a:r>
+            <a:endParaRPr kumimoji="0" lang="en-US" sz="1400" b="1" i="0" u="none" strike="noStrike" kern="1200" cap="none" spc="0" normalizeH="0" baseline="0" noProof="0" dirty="0">
+              <a:ln>
+                <a:noFill/>
+              </a:ln>
+              <a:solidFill>
+                <a:prstClr val="white"/>
+              </a:solidFill>
+              <a:effectLst/>
+              <a:uLnTx/>
+              <a:uFillTx/>
+              <a:ea typeface="+mn-ea"/>
+              <a:cs typeface="+mn-cs"/>
+            </a:endParaRPr>
           </a:p>
           <a:p>
             <a:pPr marL="0" marR="0" lvl="0" indent="0" algn="l" defTabSz="914400" rtl="0" eaLnBrk="1" fontAlgn="auto" latinLnBrk="0" hangingPunct="1">
@@ -14430,7 +14511,7 @@
               <a:defRPr/>
             </a:pPr>
             <a:r>
-              <a:rPr kumimoji="0" lang="en-US" sz="1200" b="0" i="0" u="none" strike="noStrike" kern="1200" cap="none" spc="0" normalizeH="0" baseline="0" noProof="0" dirty="0">
+              <a:rPr kumimoji="0" lang="en-US" sz="1400" b="0" i="0" u="none" strike="noStrike" kern="1200" cap="none" spc="0" normalizeH="0" baseline="0" noProof="0" dirty="0">
                 <a:ln>
                   <a:noFill/>
                 </a:ln>
@@ -14443,9 +14524,79 @@
                 <a:ea typeface="+mn-ea"/>
                 <a:cs typeface="+mn-cs"/>
               </a:rPr>
-              <a:t>Field I/O device </a:t>
-            </a:r>
-            <a:endParaRPr kumimoji="0" lang="en-SG" sz="1200" b="0" i="0" u="none" strike="noStrike" kern="1200" cap="none" spc="0" normalizeH="0" baseline="0" noProof="0" dirty="0">
+              <a:t>Physical Process</a:t>
+            </a:r>
+          </a:p>
+          <a:p>
+            <a:pPr marL="0" marR="0" lvl="0" indent="0" algn="l" defTabSz="914400" rtl="0" eaLnBrk="1" fontAlgn="auto" latinLnBrk="0" hangingPunct="1">
+              <a:lnSpc>
+                <a:spcPct val="100000"/>
+              </a:lnSpc>
+              <a:spcBef>
+                <a:spcPts val="0"/>
+              </a:spcBef>
+              <a:spcAft>
+                <a:spcPts val="0"/>
+              </a:spcAft>
+              <a:buClrTx/>
+              <a:buSzTx/>
+              <a:buFontTx/>
+              <a:buNone/>
+              <a:tabLst/>
+              <a:defRPr/>
+            </a:pPr>
+            <a:r>
+              <a:rPr kumimoji="0" lang="en-US" sz="1400" b="0" i="0" u="none" strike="noStrike" kern="1200" cap="none" spc="0" normalizeH="0" baseline="0" noProof="0" dirty="0">
+                <a:ln>
+                  <a:noFill/>
+                </a:ln>
+                <a:solidFill>
+                  <a:prstClr val="white"/>
+                </a:solidFill>
+                <a:effectLst/>
+                <a:uLnTx/>
+                <a:uFillTx/>
+                <a:ea typeface="+mn-ea"/>
+                <a:cs typeface="+mn-cs"/>
+              </a:rPr>
+              <a:t>Field I/O </a:t>
+            </a:r>
+          </a:p>
+          <a:p>
+            <a:pPr marL="0" marR="0" lvl="0" indent="0" algn="l" defTabSz="914400" rtl="0" eaLnBrk="1" fontAlgn="auto" latinLnBrk="0" hangingPunct="1">
+              <a:lnSpc>
+                <a:spcPct val="100000"/>
+              </a:lnSpc>
+              <a:spcBef>
+                <a:spcPts val="0"/>
+              </a:spcBef>
+              <a:spcAft>
+                <a:spcPts val="0"/>
+              </a:spcAft>
+              <a:buClrTx/>
+              <a:buSzTx/>
+              <a:buFontTx/>
+              <a:buNone/>
+              <a:tabLst/>
+              <a:defRPr/>
+            </a:pPr>
+            <a:r>
+              <a:rPr kumimoji="0" lang="en-US" sz="1400" b="0" i="0" u="none" strike="noStrike" kern="1200" cap="none" spc="0" normalizeH="0" baseline="0" noProof="0" dirty="0">
+                <a:ln>
+                  <a:noFill/>
+                </a:ln>
+                <a:solidFill>
+                  <a:prstClr val="white"/>
+                </a:solidFill>
+                <a:effectLst/>
+                <a:uLnTx/>
+                <a:uFillTx/>
+                <a:ea typeface="+mn-ea"/>
+                <a:cs typeface="+mn-cs"/>
+              </a:rPr>
+              <a:t>device </a:t>
+            </a:r>
+            <a:endParaRPr kumimoji="0" lang="en-SG" sz="1400" b="0" i="0" u="none" strike="noStrike" kern="1200" cap="none" spc="0" normalizeH="0" baseline="0" noProof="0" dirty="0">
               <a:ln>
                 <a:noFill/>
               </a:ln>
@@ -15228,7 +15379,7 @@
           <p:nvPr/>
         </p:nvPicPr>
         <p:blipFill>
-          <a:blip r:embed="rId2"/>
+          <a:blip r:embed="rId3"/>
           <a:stretch>
             <a:fillRect/>
           </a:stretch>
@@ -15263,7 +15414,7 @@
           <p:nvPr/>
         </p:nvPicPr>
         <p:blipFill>
-          <a:blip r:embed="rId3">
+          <a:blip r:embed="rId4">
             <a:extLst>
               <a:ext uri="{28A0092B-C50C-407E-A947-70E740481C1C}">
                 <a14:useLocalDpi xmlns:a14="http://schemas.microsoft.com/office/drawing/2010/main" val="0"/>
@@ -15477,7 +15628,7 @@
           <p:nvPr/>
         </p:nvPicPr>
         <p:blipFill>
-          <a:blip r:embed="rId3">
+          <a:blip r:embed="rId4">
             <a:extLst>
               <a:ext uri="{28A0092B-C50C-407E-A947-70E740481C1C}">
                 <a14:useLocalDpi xmlns:a14="http://schemas.microsoft.com/office/drawing/2010/main" val="0"/>
@@ -15817,7 +15968,7 @@
           <p:nvPr/>
         </p:nvPicPr>
         <p:blipFill>
-          <a:blip r:embed="rId2"/>
+          <a:blip r:embed="rId3"/>
           <a:stretch>
             <a:fillRect/>
           </a:stretch>
@@ -16053,7 +16204,7 @@
           <p:nvPr/>
         </p:nvPicPr>
         <p:blipFill>
-          <a:blip r:embed="rId2"/>
+          <a:blip r:embed="rId3"/>
           <a:stretch>
             <a:fillRect/>
           </a:stretch>
@@ -16088,7 +16239,7 @@
           <p:nvPr/>
         </p:nvPicPr>
         <p:blipFill>
-          <a:blip r:embed="rId3">
+          <a:blip r:embed="rId4">
             <a:extLst>
               <a:ext uri="{28A0092B-C50C-407E-A947-70E740481C1C}">
                 <a14:useLocalDpi xmlns:a14="http://schemas.microsoft.com/office/drawing/2010/main" val="0"/>
@@ -17151,13 +17302,13 @@
           <p:nvPr/>
         </p:nvPicPr>
         <p:blipFill>
-          <a:blip r:embed="rId4">
+          <a:blip r:embed="rId5">
             <a:extLst>
               <a:ext uri="{28A0092B-C50C-407E-A947-70E740481C1C}">
                 <a14:useLocalDpi xmlns:a14="http://schemas.microsoft.com/office/drawing/2010/main" val="0"/>
               </a:ext>
               <a:ext uri="{96DAC541-7B7A-43D3-8B79-37D633B846F1}">
-                <asvg:svgBlip xmlns:asvg="http://schemas.microsoft.com/office/drawing/2016/SVG/main" r:embed="rId5"/>
+                <asvg:svgBlip xmlns:asvg="http://schemas.microsoft.com/office/drawing/2016/SVG/main" r:embed="rId6"/>
               </a:ext>
             </a:extLst>
           </a:blip>
@@ -17167,7 +17318,7 @@
         </p:blipFill>
         <p:spPr>
           <a:xfrm>
-            <a:off x="7327188" y="2679881"/>
+            <a:off x="7327188" y="2731251"/>
             <a:ext cx="488553" cy="477935"/>
           </a:xfrm>
           <a:prstGeom prst="rect">
@@ -17190,13 +17341,13 @@
           <p:nvPr/>
         </p:nvPicPr>
         <p:blipFill>
-          <a:blip r:embed="rId4">
+          <a:blip r:embed="rId5">
             <a:extLst>
               <a:ext uri="{28A0092B-C50C-407E-A947-70E740481C1C}">
                 <a14:useLocalDpi xmlns:a14="http://schemas.microsoft.com/office/drawing/2010/main" val="0"/>
               </a:ext>
               <a:ext uri="{96DAC541-7B7A-43D3-8B79-37D633B846F1}">
-                <asvg:svgBlip xmlns:asvg="http://schemas.microsoft.com/office/drawing/2016/SVG/main" r:embed="rId5"/>
+                <asvg:svgBlip xmlns:asvg="http://schemas.microsoft.com/office/drawing/2016/SVG/main" r:embed="rId6"/>
               </a:ext>
             </a:extLst>
           </a:blip>
@@ -17206,7 +17357,7 @@
         </p:blipFill>
         <p:spPr>
           <a:xfrm>
-            <a:off x="7376078" y="3259781"/>
+            <a:off x="7376078" y="3311151"/>
             <a:ext cx="440455" cy="430882"/>
           </a:xfrm>
           <a:prstGeom prst="rect">
@@ -17225,13 +17376,12 @@
           </p:cNvPr>
           <p:cNvCxnSpPr>
             <a:cxnSpLocks/>
-            <a:endCxn id="99" idx="1"/>
           </p:cNvCxnSpPr>
           <p:nvPr/>
         </p:nvCxnSpPr>
         <p:spPr>
           <a:xfrm flipV="1">
-            <a:off x="6786056" y="2918849"/>
+            <a:off x="6786056" y="2970219"/>
             <a:ext cx="541132" cy="221872"/>
           </a:xfrm>
           <a:prstGeom prst="bentConnector3">
@@ -17276,7 +17426,7 @@
         </p:nvCxnSpPr>
         <p:spPr>
           <a:xfrm>
-            <a:off x="6786056" y="3140721"/>
+            <a:off x="6786056" y="3192091"/>
             <a:ext cx="590022" cy="334501"/>
           </a:xfrm>
           <a:prstGeom prst="bentConnector3">
@@ -17320,7 +17470,7 @@
         </p:nvSpPr>
         <p:spPr>
           <a:xfrm>
-            <a:off x="7752411" y="2671055"/>
+            <a:off x="7844877" y="2753247"/>
             <a:ext cx="791136" cy="430887"/>
           </a:xfrm>
           <a:prstGeom prst="rect">
@@ -17399,7 +17549,7 @@
         </p:nvSpPr>
         <p:spPr>
           <a:xfrm>
-            <a:off x="7794342" y="3235337"/>
+            <a:off x="7794342" y="3286707"/>
             <a:ext cx="791136" cy="430887"/>
           </a:xfrm>
           <a:prstGeom prst="rect">
@@ -17560,7 +17710,7 @@
         <p:spPr>
           <a:xfrm>
             <a:off x="933927" y="1468391"/>
-            <a:ext cx="1391555" cy="830997"/>
+            <a:ext cx="1391555" cy="1169551"/>
           </a:xfrm>
           <a:prstGeom prst="rect">
             <a:avLst/>
@@ -17591,7 +17741,7 @@
               <a:defRPr/>
             </a:pPr>
             <a:r>
-              <a:rPr kumimoji="0" lang="en-US" sz="1200" b="1" i="0" u="none" strike="noStrike" kern="1200" cap="none" spc="0" normalizeH="0" baseline="0" noProof="0" dirty="0">
+              <a:rPr kumimoji="0" lang="en-US" sz="1400" b="1" i="0" u="none" strike="noStrike" kern="1200" cap="none" spc="0" normalizeH="0" baseline="0" noProof="0" dirty="0">
                 <a:ln>
                   <a:noFill/>
                 </a:ln>
@@ -17625,91 +17775,20 @@
               <a:tabLst/>
               <a:defRPr/>
             </a:pPr>
-            <a:r>
-              <a:rPr kumimoji="0" lang="en-US" sz="1200" b="0" i="0" u="none" strike="noStrike" kern="1200" cap="none" spc="0" normalizeH="0" baseline="0" noProof="0" dirty="0">
-                <a:ln>
-                  <a:noFill/>
-                </a:ln>
-                <a:solidFill>
-                  <a:prstClr val="white"/>
-                </a:solidFill>
-                <a:effectLst/>
-                <a:uLnTx/>
-                <a:uFillTx/>
-                <a:ea typeface="+mn-ea"/>
-                <a:cs typeface="+mn-cs"/>
-              </a:rPr>
-              <a:t>Control Center (HQ) Processing LAN</a:t>
-            </a:r>
-          </a:p>
-        </p:txBody>
-      </p:sp>
-      <p:pic>
-        <p:nvPicPr>
-          <p:cNvPr id="107" name="Graphic 106" descr="Computer with solid fill">
-            <a:extLst>
-              <a:ext uri="{FF2B5EF4-FFF2-40B4-BE49-F238E27FC236}">
-                <a16:creationId xmlns:a16="http://schemas.microsoft.com/office/drawing/2014/main" id="{176CD590-AD4D-91FE-D42B-B9E8B761427B}"/>
-              </a:ext>
-            </a:extLst>
-          </p:cNvPr>
-          <p:cNvPicPr>
-            <a:picLocks noChangeAspect="1"/>
-          </p:cNvPicPr>
-          <p:nvPr/>
-        </p:nvPicPr>
-        <p:blipFill>
-          <a:blip r:embed="rId6">
-            <a:extLst>
-              <a:ext uri="{28A0092B-C50C-407E-A947-70E740481C1C}">
-                <a14:useLocalDpi xmlns:a14="http://schemas.microsoft.com/office/drawing/2010/main" val="0"/>
-              </a:ext>
-              <a:ext uri="{96DAC541-7B7A-43D3-8B79-37D633B846F1}">
-                <asvg:svgBlip xmlns:asvg="http://schemas.microsoft.com/office/drawing/2016/SVG/main" r:embed="rId7"/>
-              </a:ext>
-            </a:extLst>
-          </a:blip>
-          <a:stretch>
-            <a:fillRect/>
-          </a:stretch>
-        </p:blipFill>
-        <p:spPr>
-          <a:xfrm>
-            <a:off x="2717403" y="1748925"/>
-            <a:ext cx="446421" cy="446421"/>
-          </a:xfrm>
-          <a:prstGeom prst="rect">
-            <a:avLst/>
-          </a:prstGeom>
-        </p:spPr>
-      </p:pic>
-      <p:sp>
-        <p:nvSpPr>
-          <p:cNvPr id="108" name="TextBox 107">
-            <a:extLst>
-              <a:ext uri="{FF2B5EF4-FFF2-40B4-BE49-F238E27FC236}">
-                <a16:creationId xmlns:a16="http://schemas.microsoft.com/office/drawing/2014/main" id="{1C4B1BDC-599C-FA24-757F-794E867C1E84}"/>
-              </a:ext>
-            </a:extLst>
-          </p:cNvPr>
-          <p:cNvSpPr txBox="1"/>
-          <p:nvPr/>
-        </p:nvSpPr>
-        <p:spPr>
-          <a:xfrm>
-            <a:off x="930914" y="3056082"/>
-            <a:ext cx="969647" cy="830997"/>
-          </a:xfrm>
-          <a:prstGeom prst="rect">
-            <a:avLst/>
-          </a:prstGeom>
-          <a:noFill/>
-        </p:spPr>
-        <p:txBody>
-          <a:bodyPr wrap="square" rtlCol="0">
-            <a:spAutoFit/>
-          </a:bodyPr>
-          <a:lstStyle/>
+            <a:endParaRPr kumimoji="0" lang="en-US" sz="1400" b="1" i="0" u="none" strike="noStrike" kern="1200" cap="none" spc="0" normalizeH="0" baseline="0" noProof="0" dirty="0">
+              <a:ln>
+                <a:noFill/>
+              </a:ln>
+              <a:solidFill>
+                <a:prstClr val="white"/>
+              </a:solidFill>
+              <a:effectLst/>
+              <a:uLnTx/>
+              <a:uFillTx/>
+              <a:ea typeface="+mn-ea"/>
+              <a:cs typeface="+mn-cs"/>
+            </a:endParaRPr>
+          </a:p>
           <a:p>
             <a:pPr marL="0" marR="0" lvl="0" indent="0" algn="l" defTabSz="914400" rtl="0" eaLnBrk="1" fontAlgn="auto" latinLnBrk="0" hangingPunct="1">
               <a:lnSpc>
@@ -17729,12 +17808,12 @@
               <a:defRPr/>
             </a:pPr>
             <a:r>
-              <a:rPr kumimoji="0" lang="en-US" sz="1200" b="1" i="0" u="none" strike="noStrike" kern="1200" cap="none" spc="0" normalizeH="0" baseline="0" noProof="0" dirty="0">
+              <a:rPr kumimoji="0" lang="en-US" sz="1400" b="0" i="0" u="none" strike="noStrike" kern="1200" cap="none" spc="0" normalizeH="0" baseline="0" noProof="0" dirty="0">
                 <a:ln>
                   <a:noFill/>
                 </a:ln>
                 <a:solidFill>
-                  <a:prstClr val="black"/>
+                  <a:prstClr val="white"/>
                 </a:solidFill>
                 <a:effectLst/>
                 <a:uLnTx/>
@@ -17742,7 +17821,7 @@
                 <a:ea typeface="+mn-ea"/>
                 <a:cs typeface="+mn-cs"/>
               </a:rPr>
-              <a:t>Level 1</a:t>
+              <a:t>Power Grid</a:t>
             </a:r>
           </a:p>
           <a:p>
@@ -17764,12 +17843,12 @@
               <a:defRPr/>
             </a:pPr>
             <a:r>
-              <a:rPr kumimoji="0" lang="en-US" sz="1200" b="0" i="0" u="none" strike="noStrike" kern="1200" cap="none" spc="0" normalizeH="0" baseline="0" noProof="0" dirty="0">
+              <a:rPr kumimoji="0" lang="en-US" sz="1400" b="0" i="0" u="none" strike="noStrike" kern="1200" cap="none" spc="0" normalizeH="0" baseline="0" noProof="0" dirty="0">
                 <a:ln>
                   <a:noFill/>
                 </a:ln>
                 <a:solidFill>
-                  <a:prstClr val="black"/>
+                  <a:prstClr val="white"/>
                 </a:solidFill>
                 <a:effectLst/>
                 <a:uLnTx/>
@@ -17777,30 +17856,17 @@
                 <a:ea typeface="+mn-ea"/>
                 <a:cs typeface="+mn-cs"/>
               </a:rPr>
-              <a:t>OT System Controller LAN </a:t>
-            </a:r>
-            <a:endParaRPr kumimoji="0" lang="en-SG" sz="1200" b="0" i="0" u="none" strike="noStrike" kern="1200" cap="none" spc="0" normalizeH="0" baseline="0" noProof="0" dirty="0">
-              <a:ln>
-                <a:noFill/>
-              </a:ln>
-              <a:solidFill>
-                <a:prstClr val="black"/>
-              </a:solidFill>
-              <a:effectLst/>
-              <a:uLnTx/>
-              <a:uFillTx/>
-              <a:ea typeface="+mn-ea"/>
-              <a:cs typeface="+mn-cs"/>
-            </a:endParaRPr>
+              <a:t>Control Center Processing LAN</a:t>
+            </a:r>
           </a:p>
         </p:txBody>
       </p:sp>
       <p:pic>
         <p:nvPicPr>
-          <p:cNvPr id="109" name="Graphic 108" descr="Full Brick Wall with solid fill">
-            <a:extLst>
-              <a:ext uri="{FF2B5EF4-FFF2-40B4-BE49-F238E27FC236}">
-                <a16:creationId xmlns:a16="http://schemas.microsoft.com/office/drawing/2014/main" id="{A2D85CA5-5D9D-00D0-2555-23901893EE1D}"/>
+          <p:cNvPr id="107" name="Graphic 106" descr="Computer with solid fill">
+            <a:extLst>
+              <a:ext uri="{FF2B5EF4-FFF2-40B4-BE49-F238E27FC236}">
+                <a16:creationId xmlns:a16="http://schemas.microsoft.com/office/drawing/2014/main" id="{176CD590-AD4D-91FE-D42B-B9E8B761427B}"/>
               </a:ext>
             </a:extLst>
           </p:cNvPr>
@@ -17810,13 +17876,13 @@
           <p:nvPr/>
         </p:nvPicPr>
         <p:blipFill>
-          <a:blip r:embed="rId8">
+          <a:blip r:embed="rId7">
             <a:extLst>
               <a:ext uri="{28A0092B-C50C-407E-A947-70E740481C1C}">
                 <a14:useLocalDpi xmlns:a14="http://schemas.microsoft.com/office/drawing/2010/main" val="0"/>
               </a:ext>
               <a:ext uri="{96DAC541-7B7A-43D3-8B79-37D633B846F1}">
-                <asvg:svgBlip xmlns:asvg="http://schemas.microsoft.com/office/drawing/2016/SVG/main" r:embed="rId9"/>
+                <asvg:svgBlip xmlns:asvg="http://schemas.microsoft.com/office/drawing/2016/SVG/main" r:embed="rId8"/>
               </a:ext>
             </a:extLst>
           </a:blip>
@@ -17826,102 +17892,20 @@
         </p:blipFill>
         <p:spPr>
           <a:xfrm>
-            <a:off x="2682867" y="1316993"/>
-            <a:ext cx="418359" cy="418359"/>
+            <a:off x="2717403" y="1810569"/>
+            <a:ext cx="446421" cy="446421"/>
           </a:xfrm>
           <a:prstGeom prst="rect">
             <a:avLst/>
           </a:prstGeom>
         </p:spPr>
       </p:pic>
-      <p:cxnSp>
-        <p:nvCxnSpPr>
-          <p:cNvPr id="110" name="Straight Connector 109">
-            <a:extLst>
-              <a:ext uri="{FF2B5EF4-FFF2-40B4-BE49-F238E27FC236}">
-                <a16:creationId xmlns:a16="http://schemas.microsoft.com/office/drawing/2014/main" id="{6E3F3224-64F6-0050-1324-4185109B9959}"/>
-              </a:ext>
-            </a:extLst>
-          </p:cNvPr>
-          <p:cNvCxnSpPr>
-            <a:cxnSpLocks/>
-          </p:cNvCxnSpPr>
-          <p:nvPr/>
-        </p:nvCxnSpPr>
-        <p:spPr>
-          <a:xfrm>
-            <a:off x="2892046" y="1559198"/>
-            <a:ext cx="0" cy="281333"/>
-          </a:xfrm>
-          <a:prstGeom prst="line">
-            <a:avLst/>
-          </a:prstGeom>
-          <a:ln w="19050">
-            <a:solidFill>
-              <a:schemeClr val="bg1"/>
-            </a:solidFill>
-          </a:ln>
-        </p:spPr>
-        <p:style>
-          <a:lnRef idx="1">
-            <a:schemeClr val="accent1"/>
-          </a:lnRef>
-          <a:fillRef idx="0">
-            <a:schemeClr val="accent1"/>
-          </a:fillRef>
-          <a:effectRef idx="0">
-            <a:schemeClr val="accent1"/>
-          </a:effectRef>
-          <a:fontRef idx="minor">
-            <a:schemeClr val="tx1"/>
-          </a:fontRef>
-        </p:style>
-      </p:cxnSp>
-      <p:pic>
-        <p:nvPicPr>
-          <p:cNvPr id="112" name="Graphic 111" descr="Ui Ux with solid fill">
-            <a:extLst>
-              <a:ext uri="{FF2B5EF4-FFF2-40B4-BE49-F238E27FC236}">
-                <a16:creationId xmlns:a16="http://schemas.microsoft.com/office/drawing/2014/main" id="{D53CA239-57C0-5F8E-9EEE-3B6DDEE5FD07}"/>
-              </a:ext>
-            </a:extLst>
-          </p:cNvPr>
-          <p:cNvPicPr>
-            <a:picLocks noChangeAspect="1"/>
-          </p:cNvPicPr>
-          <p:nvPr/>
-        </p:nvPicPr>
-        <p:blipFill>
-          <a:blip r:embed="rId10">
-            <a:extLst>
-              <a:ext uri="{28A0092B-C50C-407E-A947-70E740481C1C}">
-                <a14:useLocalDpi xmlns:a14="http://schemas.microsoft.com/office/drawing/2010/main" val="0"/>
-              </a:ext>
-              <a:ext uri="{96DAC541-7B7A-43D3-8B79-37D633B846F1}">
-                <asvg:svgBlip xmlns:asvg="http://schemas.microsoft.com/office/drawing/2016/SVG/main" r:embed="rId11"/>
-              </a:ext>
-            </a:extLst>
-          </a:blip>
-          <a:stretch>
-            <a:fillRect/>
-          </a:stretch>
-        </p:blipFill>
-        <p:spPr>
-          <a:xfrm>
-            <a:off x="3603249" y="2084886"/>
-            <a:ext cx="446421" cy="446421"/>
-          </a:xfrm>
-          <a:prstGeom prst="rect">
-            <a:avLst/>
-          </a:prstGeom>
-        </p:spPr>
-      </p:pic>
-      <p:sp>
-        <p:nvSpPr>
-          <p:cNvPr id="113" name="TextBox 112">
-            <a:extLst>
-              <a:ext uri="{FF2B5EF4-FFF2-40B4-BE49-F238E27FC236}">
-                <a16:creationId xmlns:a16="http://schemas.microsoft.com/office/drawing/2014/main" id="{28730F84-BBD4-A6FE-9744-D9C77144E6C7}"/>
+      <p:sp>
+        <p:nvSpPr>
+          <p:cNvPr id="108" name="TextBox 107">
+            <a:extLst>
+              <a:ext uri="{FF2B5EF4-FFF2-40B4-BE49-F238E27FC236}">
+                <a16:creationId xmlns:a16="http://schemas.microsoft.com/office/drawing/2014/main" id="{1C4B1BDC-599C-FA24-757F-794E867C1E84}"/>
               </a:ext>
             </a:extLst>
           </p:cNvPr>
@@ -17930,8 +17914,8 @@
         </p:nvSpPr>
         <p:spPr>
           <a:xfrm>
-            <a:off x="3398862" y="1674544"/>
-            <a:ext cx="1213472" cy="430887"/>
+            <a:off x="930914" y="3056082"/>
+            <a:ext cx="1043848" cy="1169551"/>
           </a:xfrm>
           <a:prstGeom prst="rect">
             <a:avLst/>
@@ -17962,91 +17946,22 @@
               <a:defRPr/>
             </a:pPr>
             <a:r>
-              <a:rPr kumimoji="0" lang="en-SG" sz="1100" b="0" i="0" u="none" strike="noStrike" kern="1200" cap="none" spc="0" normalizeH="0" baseline="0" noProof="0" dirty="0">
+              <a:rPr kumimoji="0" lang="en-US" sz="1400" b="1" i="0" u="none" strike="noStrike" kern="1200" cap="none" spc="0" normalizeH="0" baseline="0" noProof="0" dirty="0">
                 <a:ln>
                   <a:noFill/>
                 </a:ln>
                 <a:solidFill>
-                  <a:prstClr val="white"/>
+                  <a:prstClr val="black"/>
                 </a:solidFill>
                 <a:effectLst/>
                 <a:uLnTx/>
                 <a:uFillTx/>
-                <a:latin typeface="Calibri" panose="020F0502020204030204"/>
                 <a:ea typeface="+mn-ea"/>
                 <a:cs typeface="+mn-cs"/>
               </a:rPr>
-              <a:t>Power System control HMI</a:t>
-            </a:r>
-          </a:p>
-        </p:txBody>
-      </p:sp>
-      <p:pic>
-        <p:nvPicPr>
-          <p:cNvPr id="114" name="Graphic 113" descr="Ui Ux with solid fill">
-            <a:extLst>
-              <a:ext uri="{FF2B5EF4-FFF2-40B4-BE49-F238E27FC236}">
-                <a16:creationId xmlns:a16="http://schemas.microsoft.com/office/drawing/2014/main" id="{22B3D35C-B1CE-55E7-276D-AE59422859A0}"/>
-              </a:ext>
-            </a:extLst>
-          </p:cNvPr>
-          <p:cNvPicPr>
-            <a:picLocks noChangeAspect="1"/>
-          </p:cNvPicPr>
-          <p:nvPr/>
-        </p:nvPicPr>
-        <p:blipFill>
-          <a:blip r:embed="rId10">
-            <a:extLst>
-              <a:ext uri="{28A0092B-C50C-407E-A947-70E740481C1C}">
-                <a14:useLocalDpi xmlns:a14="http://schemas.microsoft.com/office/drawing/2010/main" val="0"/>
-              </a:ext>
-              <a:ext uri="{96DAC541-7B7A-43D3-8B79-37D633B846F1}">
-                <asvg:svgBlip xmlns:asvg="http://schemas.microsoft.com/office/drawing/2016/SVG/main" r:embed="rId11"/>
-              </a:ext>
-            </a:extLst>
-          </a:blip>
-          <a:stretch>
-            <a:fillRect/>
-          </a:stretch>
-        </p:blipFill>
-        <p:spPr>
-          <a:xfrm>
-            <a:off x="4613449" y="2078326"/>
-            <a:ext cx="446421" cy="446421"/>
-          </a:xfrm>
-          <a:prstGeom prst="rect">
-            <a:avLst/>
-          </a:prstGeom>
-        </p:spPr>
-      </p:pic>
-      <p:sp>
-        <p:nvSpPr>
-          <p:cNvPr id="115" name="TextBox 114">
-            <a:extLst>
-              <a:ext uri="{FF2B5EF4-FFF2-40B4-BE49-F238E27FC236}">
-                <a16:creationId xmlns:a16="http://schemas.microsoft.com/office/drawing/2014/main" id="{6E1618EE-2587-3530-D605-1B42412F0103}"/>
-              </a:ext>
-            </a:extLst>
-          </p:cNvPr>
-          <p:cNvSpPr txBox="1"/>
-          <p:nvPr/>
-        </p:nvSpPr>
-        <p:spPr>
-          <a:xfrm>
-            <a:off x="4336691" y="1668445"/>
-            <a:ext cx="1213472" cy="430887"/>
-          </a:xfrm>
-          <a:prstGeom prst="rect">
-            <a:avLst/>
-          </a:prstGeom>
-          <a:noFill/>
-        </p:spPr>
-        <p:txBody>
-          <a:bodyPr wrap="square" rtlCol="0">
-            <a:spAutoFit/>
-          </a:bodyPr>
-          <a:lstStyle/>
+              <a:t>Level 1</a:t>
+            </a:r>
+          </a:p>
           <a:p>
             <a:pPr marL="0" marR="0" lvl="0" indent="0" algn="l" defTabSz="914400" rtl="0" eaLnBrk="1" fontAlgn="auto" latinLnBrk="0" hangingPunct="1">
               <a:lnSpc>
@@ -18065,92 +17980,20 @@
               <a:tabLst/>
               <a:defRPr/>
             </a:pPr>
-            <a:r>
-              <a:rPr kumimoji="0" lang="en-SG" sz="1100" b="0" i="0" u="none" strike="noStrike" kern="1200" cap="none" spc="0" normalizeH="0" baseline="0" noProof="0" dirty="0">
-                <a:ln>
-                  <a:noFill/>
-                </a:ln>
-                <a:solidFill>
-                  <a:prstClr val="white"/>
-                </a:solidFill>
-                <a:effectLst/>
-                <a:uLnTx/>
-                <a:uFillTx/>
-                <a:latin typeface="Calibri" panose="020F0502020204030204"/>
-                <a:ea typeface="+mn-ea"/>
-                <a:cs typeface="+mn-cs"/>
-              </a:rPr>
-              <a:t>Power System Monitor HMI</a:t>
-            </a:r>
-          </a:p>
-        </p:txBody>
-      </p:sp>
-      <p:pic>
-        <p:nvPicPr>
-          <p:cNvPr id="116" name="Graphic 115" descr="Computer with solid fill">
-            <a:extLst>
-              <a:ext uri="{FF2B5EF4-FFF2-40B4-BE49-F238E27FC236}">
-                <a16:creationId xmlns:a16="http://schemas.microsoft.com/office/drawing/2014/main" id="{BB73D3B8-B5E9-D594-1D9A-D82064B6BA07}"/>
-              </a:ext>
-            </a:extLst>
-          </p:cNvPr>
-          <p:cNvPicPr>
-            <a:picLocks noChangeAspect="1"/>
-          </p:cNvPicPr>
-          <p:nvPr/>
-        </p:nvPicPr>
-        <p:blipFill>
-          <a:blip r:embed="rId6">
-            <a:extLst>
-              <a:ext uri="{28A0092B-C50C-407E-A947-70E740481C1C}">
-                <a14:useLocalDpi xmlns:a14="http://schemas.microsoft.com/office/drawing/2010/main" val="0"/>
-              </a:ext>
-              <a:ext uri="{96DAC541-7B7A-43D3-8B79-37D633B846F1}">
-                <asvg:svgBlip xmlns:asvg="http://schemas.microsoft.com/office/drawing/2016/SVG/main" r:embed="rId7"/>
-              </a:ext>
-            </a:extLst>
-          </a:blip>
-          <a:stretch>
-            <a:fillRect/>
-          </a:stretch>
-        </p:blipFill>
-        <p:spPr>
-          <a:xfrm>
-            <a:off x="5678573" y="2078326"/>
-            <a:ext cx="481208" cy="481208"/>
-          </a:xfrm>
-          <a:prstGeom prst="rect">
-            <a:avLst/>
-          </a:prstGeom>
-        </p:spPr>
-      </p:pic>
-      <p:sp>
-        <p:nvSpPr>
-          <p:cNvPr id="117" name="TextBox 116">
-            <a:extLst>
-              <a:ext uri="{FF2B5EF4-FFF2-40B4-BE49-F238E27FC236}">
-                <a16:creationId xmlns:a16="http://schemas.microsoft.com/office/drawing/2014/main" id="{9E2CAC69-AD71-7E77-6798-1746BED56387}"/>
-              </a:ext>
-            </a:extLst>
-          </p:cNvPr>
-          <p:cNvSpPr txBox="1"/>
-          <p:nvPr/>
-        </p:nvSpPr>
-        <p:spPr>
-          <a:xfrm>
-            <a:off x="5491475" y="1687408"/>
-            <a:ext cx="1211730" cy="430887"/>
-          </a:xfrm>
-          <a:prstGeom prst="rect">
-            <a:avLst/>
-          </a:prstGeom>
-          <a:noFill/>
-        </p:spPr>
-        <p:txBody>
-          <a:bodyPr wrap="square" rtlCol="0">
-            <a:spAutoFit/>
-          </a:bodyPr>
-          <a:lstStyle/>
+            <a:endParaRPr kumimoji="0" lang="en-US" sz="1400" b="1" i="0" u="none" strike="noStrike" kern="1200" cap="none" spc="0" normalizeH="0" baseline="0" noProof="0" dirty="0">
+              <a:ln>
+                <a:noFill/>
+              </a:ln>
+              <a:solidFill>
+                <a:prstClr val="black"/>
+              </a:solidFill>
+              <a:effectLst/>
+              <a:uLnTx/>
+              <a:uFillTx/>
+              <a:ea typeface="+mn-ea"/>
+              <a:cs typeface="+mn-cs"/>
+            </a:endParaRPr>
+          </a:p>
           <a:p>
             <a:pPr marL="0" marR="0" lvl="0" indent="0" algn="l" defTabSz="914400" rtl="0" eaLnBrk="1" fontAlgn="auto" latinLnBrk="0" hangingPunct="1">
               <a:lnSpc>
@@ -18170,6 +18013,412 @@
               <a:defRPr/>
             </a:pPr>
             <a:r>
+              <a:rPr kumimoji="0" lang="en-US" sz="1400" b="0" i="0" u="none" strike="noStrike" kern="1200" cap="none" spc="0" normalizeH="0" baseline="0" noProof="0" dirty="0">
+                <a:ln>
+                  <a:noFill/>
+                </a:ln>
+                <a:solidFill>
+                  <a:prstClr val="black"/>
+                </a:solidFill>
+                <a:effectLst/>
+                <a:uLnTx/>
+                <a:uFillTx/>
+                <a:ea typeface="+mn-ea"/>
+                <a:cs typeface="+mn-cs"/>
+              </a:rPr>
+              <a:t>OT System Controller LAN </a:t>
+            </a:r>
+            <a:endParaRPr kumimoji="0" lang="en-SG" sz="1400" b="0" i="0" u="none" strike="noStrike" kern="1200" cap="none" spc="0" normalizeH="0" baseline="0" noProof="0" dirty="0">
+              <a:ln>
+                <a:noFill/>
+              </a:ln>
+              <a:solidFill>
+                <a:prstClr val="black"/>
+              </a:solidFill>
+              <a:effectLst/>
+              <a:uLnTx/>
+              <a:uFillTx/>
+              <a:ea typeface="+mn-ea"/>
+              <a:cs typeface="+mn-cs"/>
+            </a:endParaRPr>
+          </a:p>
+        </p:txBody>
+      </p:sp>
+      <p:pic>
+        <p:nvPicPr>
+          <p:cNvPr id="109" name="Graphic 108" descr="Full Brick Wall with solid fill">
+            <a:extLst>
+              <a:ext uri="{FF2B5EF4-FFF2-40B4-BE49-F238E27FC236}">
+                <a16:creationId xmlns:a16="http://schemas.microsoft.com/office/drawing/2014/main" id="{A2D85CA5-5D9D-00D0-2555-23901893EE1D}"/>
+              </a:ext>
+            </a:extLst>
+          </p:cNvPr>
+          <p:cNvPicPr>
+            <a:picLocks noChangeAspect="1"/>
+          </p:cNvPicPr>
+          <p:nvPr/>
+        </p:nvPicPr>
+        <p:blipFill>
+          <a:blip r:embed="rId9">
+            <a:extLst>
+              <a:ext uri="{28A0092B-C50C-407E-A947-70E740481C1C}">
+                <a14:useLocalDpi xmlns:a14="http://schemas.microsoft.com/office/drawing/2010/main" val="0"/>
+              </a:ext>
+              <a:ext uri="{96DAC541-7B7A-43D3-8B79-37D633B846F1}">
+                <asvg:svgBlip xmlns:asvg="http://schemas.microsoft.com/office/drawing/2016/SVG/main" r:embed="rId10"/>
+              </a:ext>
+            </a:extLst>
+          </a:blip>
+          <a:stretch>
+            <a:fillRect/>
+          </a:stretch>
+        </p:blipFill>
+        <p:spPr>
+          <a:xfrm>
+            <a:off x="2682867" y="1378637"/>
+            <a:ext cx="418359" cy="418359"/>
+          </a:xfrm>
+          <a:prstGeom prst="rect">
+            <a:avLst/>
+          </a:prstGeom>
+        </p:spPr>
+      </p:pic>
+      <p:cxnSp>
+        <p:nvCxnSpPr>
+          <p:cNvPr id="110" name="Straight Connector 109">
+            <a:extLst>
+              <a:ext uri="{FF2B5EF4-FFF2-40B4-BE49-F238E27FC236}">
+                <a16:creationId xmlns:a16="http://schemas.microsoft.com/office/drawing/2014/main" id="{6E3F3224-64F6-0050-1324-4185109B9959}"/>
+              </a:ext>
+            </a:extLst>
+          </p:cNvPr>
+          <p:cNvCxnSpPr>
+            <a:cxnSpLocks/>
+          </p:cNvCxnSpPr>
+          <p:nvPr/>
+        </p:nvCxnSpPr>
+        <p:spPr>
+          <a:xfrm>
+            <a:off x="2892046" y="1620842"/>
+            <a:ext cx="0" cy="281333"/>
+          </a:xfrm>
+          <a:prstGeom prst="line">
+            <a:avLst/>
+          </a:prstGeom>
+          <a:ln w="19050">
+            <a:solidFill>
+              <a:schemeClr val="bg1"/>
+            </a:solidFill>
+          </a:ln>
+        </p:spPr>
+        <p:style>
+          <a:lnRef idx="1">
+            <a:schemeClr val="accent1"/>
+          </a:lnRef>
+          <a:fillRef idx="0">
+            <a:schemeClr val="accent1"/>
+          </a:fillRef>
+          <a:effectRef idx="0">
+            <a:schemeClr val="accent1"/>
+          </a:effectRef>
+          <a:fontRef idx="minor">
+            <a:schemeClr val="tx1"/>
+          </a:fontRef>
+        </p:style>
+      </p:cxnSp>
+      <p:pic>
+        <p:nvPicPr>
+          <p:cNvPr id="112" name="Graphic 111" descr="Ui Ux with solid fill">
+            <a:extLst>
+              <a:ext uri="{FF2B5EF4-FFF2-40B4-BE49-F238E27FC236}">
+                <a16:creationId xmlns:a16="http://schemas.microsoft.com/office/drawing/2014/main" id="{D53CA239-57C0-5F8E-9EEE-3B6DDEE5FD07}"/>
+              </a:ext>
+            </a:extLst>
+          </p:cNvPr>
+          <p:cNvPicPr>
+            <a:picLocks noChangeAspect="1"/>
+          </p:cNvPicPr>
+          <p:nvPr/>
+        </p:nvPicPr>
+        <p:blipFill>
+          <a:blip r:embed="rId11">
+            <a:extLst>
+              <a:ext uri="{28A0092B-C50C-407E-A947-70E740481C1C}">
+                <a14:useLocalDpi xmlns:a14="http://schemas.microsoft.com/office/drawing/2010/main" val="0"/>
+              </a:ext>
+              <a:ext uri="{96DAC541-7B7A-43D3-8B79-37D633B846F1}">
+                <asvg:svgBlip xmlns:asvg="http://schemas.microsoft.com/office/drawing/2016/SVG/main" r:embed="rId12"/>
+              </a:ext>
+            </a:extLst>
+          </a:blip>
+          <a:stretch>
+            <a:fillRect/>
+          </a:stretch>
+        </p:blipFill>
+        <p:spPr>
+          <a:xfrm>
+            <a:off x="3603249" y="2146530"/>
+            <a:ext cx="446421" cy="446421"/>
+          </a:xfrm>
+          <a:prstGeom prst="rect">
+            <a:avLst/>
+          </a:prstGeom>
+        </p:spPr>
+      </p:pic>
+      <p:sp>
+        <p:nvSpPr>
+          <p:cNvPr id="113" name="TextBox 112">
+            <a:extLst>
+              <a:ext uri="{FF2B5EF4-FFF2-40B4-BE49-F238E27FC236}">
+                <a16:creationId xmlns:a16="http://schemas.microsoft.com/office/drawing/2014/main" id="{28730F84-BBD4-A6FE-9744-D9C77144E6C7}"/>
+              </a:ext>
+            </a:extLst>
+          </p:cNvPr>
+          <p:cNvSpPr txBox="1"/>
+          <p:nvPr/>
+        </p:nvSpPr>
+        <p:spPr>
+          <a:xfrm>
+            <a:off x="3398862" y="1736188"/>
+            <a:ext cx="1213472" cy="430887"/>
+          </a:xfrm>
+          <a:prstGeom prst="rect">
+            <a:avLst/>
+          </a:prstGeom>
+          <a:noFill/>
+        </p:spPr>
+        <p:txBody>
+          <a:bodyPr wrap="square" rtlCol="0">
+            <a:spAutoFit/>
+          </a:bodyPr>
+          <a:lstStyle/>
+          <a:p>
+            <a:pPr marL="0" marR="0" lvl="0" indent="0" algn="l" defTabSz="914400" rtl="0" eaLnBrk="1" fontAlgn="auto" latinLnBrk="0" hangingPunct="1">
+              <a:lnSpc>
+                <a:spcPct val="100000"/>
+              </a:lnSpc>
+              <a:spcBef>
+                <a:spcPts val="0"/>
+              </a:spcBef>
+              <a:spcAft>
+                <a:spcPts val="0"/>
+              </a:spcAft>
+              <a:buClrTx/>
+              <a:buSzTx/>
+              <a:buFontTx/>
+              <a:buNone/>
+              <a:tabLst/>
+              <a:defRPr/>
+            </a:pPr>
+            <a:r>
+              <a:rPr kumimoji="0" lang="en-SG" sz="1100" b="0" i="0" u="none" strike="noStrike" kern="1200" cap="none" spc="0" normalizeH="0" baseline="0" noProof="0" dirty="0">
+                <a:ln>
+                  <a:noFill/>
+                </a:ln>
+                <a:solidFill>
+                  <a:prstClr val="white"/>
+                </a:solidFill>
+                <a:effectLst/>
+                <a:uLnTx/>
+                <a:uFillTx/>
+                <a:latin typeface="Calibri" panose="020F0502020204030204"/>
+                <a:ea typeface="+mn-ea"/>
+                <a:cs typeface="+mn-cs"/>
+              </a:rPr>
+              <a:t>Power System control HMI</a:t>
+            </a:r>
+          </a:p>
+        </p:txBody>
+      </p:sp>
+      <p:pic>
+        <p:nvPicPr>
+          <p:cNvPr id="114" name="Graphic 113" descr="Ui Ux with solid fill">
+            <a:extLst>
+              <a:ext uri="{FF2B5EF4-FFF2-40B4-BE49-F238E27FC236}">
+                <a16:creationId xmlns:a16="http://schemas.microsoft.com/office/drawing/2014/main" id="{22B3D35C-B1CE-55E7-276D-AE59422859A0}"/>
+              </a:ext>
+            </a:extLst>
+          </p:cNvPr>
+          <p:cNvPicPr>
+            <a:picLocks noChangeAspect="1"/>
+          </p:cNvPicPr>
+          <p:nvPr/>
+        </p:nvPicPr>
+        <p:blipFill>
+          <a:blip r:embed="rId11">
+            <a:extLst>
+              <a:ext uri="{28A0092B-C50C-407E-A947-70E740481C1C}">
+                <a14:useLocalDpi xmlns:a14="http://schemas.microsoft.com/office/drawing/2010/main" val="0"/>
+              </a:ext>
+              <a:ext uri="{96DAC541-7B7A-43D3-8B79-37D633B846F1}">
+                <asvg:svgBlip xmlns:asvg="http://schemas.microsoft.com/office/drawing/2016/SVG/main" r:embed="rId12"/>
+              </a:ext>
+            </a:extLst>
+          </a:blip>
+          <a:stretch>
+            <a:fillRect/>
+          </a:stretch>
+        </p:blipFill>
+        <p:spPr>
+          <a:xfrm>
+            <a:off x="4613449" y="2139970"/>
+            <a:ext cx="446421" cy="446421"/>
+          </a:xfrm>
+          <a:prstGeom prst="rect">
+            <a:avLst/>
+          </a:prstGeom>
+        </p:spPr>
+      </p:pic>
+      <p:sp>
+        <p:nvSpPr>
+          <p:cNvPr id="115" name="TextBox 114">
+            <a:extLst>
+              <a:ext uri="{FF2B5EF4-FFF2-40B4-BE49-F238E27FC236}">
+                <a16:creationId xmlns:a16="http://schemas.microsoft.com/office/drawing/2014/main" id="{6E1618EE-2587-3530-D605-1B42412F0103}"/>
+              </a:ext>
+            </a:extLst>
+          </p:cNvPr>
+          <p:cNvSpPr txBox="1"/>
+          <p:nvPr/>
+        </p:nvSpPr>
+        <p:spPr>
+          <a:xfrm>
+            <a:off x="4336691" y="1730089"/>
+            <a:ext cx="1213472" cy="430887"/>
+          </a:xfrm>
+          <a:prstGeom prst="rect">
+            <a:avLst/>
+          </a:prstGeom>
+          <a:noFill/>
+        </p:spPr>
+        <p:txBody>
+          <a:bodyPr wrap="square" rtlCol="0">
+            <a:spAutoFit/>
+          </a:bodyPr>
+          <a:lstStyle/>
+          <a:p>
+            <a:pPr marL="0" marR="0" lvl="0" indent="0" algn="l" defTabSz="914400" rtl="0" eaLnBrk="1" fontAlgn="auto" latinLnBrk="0" hangingPunct="1">
+              <a:lnSpc>
+                <a:spcPct val="100000"/>
+              </a:lnSpc>
+              <a:spcBef>
+                <a:spcPts val="0"/>
+              </a:spcBef>
+              <a:spcAft>
+                <a:spcPts val="0"/>
+              </a:spcAft>
+              <a:buClrTx/>
+              <a:buSzTx/>
+              <a:buFontTx/>
+              <a:buNone/>
+              <a:tabLst/>
+              <a:defRPr/>
+            </a:pPr>
+            <a:r>
+              <a:rPr kumimoji="0" lang="en-SG" sz="1100" b="0" i="0" u="none" strike="noStrike" kern="1200" cap="none" spc="0" normalizeH="0" baseline="0" noProof="0" dirty="0">
+                <a:ln>
+                  <a:noFill/>
+                </a:ln>
+                <a:solidFill>
+                  <a:prstClr val="white"/>
+                </a:solidFill>
+                <a:effectLst/>
+                <a:uLnTx/>
+                <a:uFillTx/>
+                <a:latin typeface="Calibri" panose="020F0502020204030204"/>
+                <a:ea typeface="+mn-ea"/>
+                <a:cs typeface="+mn-cs"/>
+              </a:rPr>
+              <a:t>Power System Monitor HMI</a:t>
+            </a:r>
+          </a:p>
+        </p:txBody>
+      </p:sp>
+      <p:pic>
+        <p:nvPicPr>
+          <p:cNvPr id="116" name="Graphic 115" descr="Computer with solid fill">
+            <a:extLst>
+              <a:ext uri="{FF2B5EF4-FFF2-40B4-BE49-F238E27FC236}">
+                <a16:creationId xmlns:a16="http://schemas.microsoft.com/office/drawing/2014/main" id="{BB73D3B8-B5E9-D594-1D9A-D82064B6BA07}"/>
+              </a:ext>
+            </a:extLst>
+          </p:cNvPr>
+          <p:cNvPicPr>
+            <a:picLocks noChangeAspect="1"/>
+          </p:cNvPicPr>
+          <p:nvPr/>
+        </p:nvPicPr>
+        <p:blipFill>
+          <a:blip r:embed="rId7">
+            <a:extLst>
+              <a:ext uri="{28A0092B-C50C-407E-A947-70E740481C1C}">
+                <a14:useLocalDpi xmlns:a14="http://schemas.microsoft.com/office/drawing/2010/main" val="0"/>
+              </a:ext>
+              <a:ext uri="{96DAC541-7B7A-43D3-8B79-37D633B846F1}">
+                <asvg:svgBlip xmlns:asvg="http://schemas.microsoft.com/office/drawing/2016/SVG/main" r:embed="rId8"/>
+              </a:ext>
+            </a:extLst>
+          </a:blip>
+          <a:stretch>
+            <a:fillRect/>
+          </a:stretch>
+        </p:blipFill>
+        <p:spPr>
+          <a:xfrm>
+            <a:off x="5678573" y="2139970"/>
+            <a:ext cx="481208" cy="481208"/>
+          </a:xfrm>
+          <a:prstGeom prst="rect">
+            <a:avLst/>
+          </a:prstGeom>
+        </p:spPr>
+      </p:pic>
+      <p:sp>
+        <p:nvSpPr>
+          <p:cNvPr id="117" name="TextBox 116">
+            <a:extLst>
+              <a:ext uri="{FF2B5EF4-FFF2-40B4-BE49-F238E27FC236}">
+                <a16:creationId xmlns:a16="http://schemas.microsoft.com/office/drawing/2014/main" id="{9E2CAC69-AD71-7E77-6798-1746BED56387}"/>
+              </a:ext>
+            </a:extLst>
+          </p:cNvPr>
+          <p:cNvSpPr txBox="1"/>
+          <p:nvPr/>
+        </p:nvSpPr>
+        <p:spPr>
+          <a:xfrm>
+            <a:off x="5491475" y="1749052"/>
+            <a:ext cx="1211730" cy="430887"/>
+          </a:xfrm>
+          <a:prstGeom prst="rect">
+            <a:avLst/>
+          </a:prstGeom>
+          <a:noFill/>
+        </p:spPr>
+        <p:txBody>
+          <a:bodyPr wrap="square" rtlCol="0">
+            <a:spAutoFit/>
+          </a:bodyPr>
+          <a:lstStyle/>
+          <a:p>
+            <a:pPr marL="0" marR="0" lvl="0" indent="0" algn="l" defTabSz="914400" rtl="0" eaLnBrk="1" fontAlgn="auto" latinLnBrk="0" hangingPunct="1">
+              <a:lnSpc>
+                <a:spcPct val="100000"/>
+              </a:lnSpc>
+              <a:spcBef>
+                <a:spcPts val="0"/>
+              </a:spcBef>
+              <a:spcAft>
+                <a:spcPts val="0"/>
+              </a:spcAft>
+              <a:buClrTx/>
+              <a:buSzTx/>
+              <a:buFontTx/>
+              <a:buNone/>
+              <a:tabLst/>
+              <a:defRPr/>
+            </a:pPr>
+            <a:r>
               <a:rPr kumimoji="0" lang="en-US" sz="1100" b="0" i="0" u="none" strike="noStrike" kern="1200" cap="none" spc="0" normalizeH="0" baseline="0" noProof="0" dirty="0">
                 <a:ln>
                   <a:noFill/>
@@ -18221,8 +18470,8 @@
         </p:nvCxnSpPr>
         <p:spPr>
           <a:xfrm rot="5400000" flipH="1" flipV="1">
-            <a:off x="2546306" y="2275513"/>
-            <a:ext cx="1024360" cy="1535948"/>
+            <a:off x="2577128" y="2306335"/>
+            <a:ext cx="962716" cy="1535948"/>
           </a:xfrm>
           <a:prstGeom prst="bentConnector3">
             <a:avLst>
@@ -18270,8 +18519,8 @@
         </p:nvCxnSpPr>
         <p:spPr>
           <a:xfrm rot="16200000" flipV="1">
-            <a:off x="3376641" y="2981127"/>
-            <a:ext cx="1016575" cy="116935"/>
+            <a:off x="3407463" y="3011949"/>
+            <a:ext cx="954931" cy="116935"/>
           </a:xfrm>
           <a:prstGeom prst="bentConnector3">
             <a:avLst>
@@ -18319,8 +18568,8 @@
         </p:nvCxnSpPr>
         <p:spPr>
           <a:xfrm rot="16200000" flipV="1">
-            <a:off x="4578339" y="1779428"/>
-            <a:ext cx="994006" cy="2497763"/>
+            <a:off x="4609161" y="1810250"/>
+            <a:ext cx="932362" cy="2497763"/>
           </a:xfrm>
           <a:prstGeom prst="bentConnector3">
             <a:avLst>
@@ -18367,13 +18616,13 @@
         </p:nvCxnSpPr>
         <p:spPr>
           <a:xfrm rot="5400000" flipH="1" flipV="1">
-            <a:off x="2951459" y="2473592"/>
-            <a:ext cx="1263706" cy="932716"/>
+            <a:off x="2982281" y="2504414"/>
+            <a:ext cx="1202062" cy="932716"/>
           </a:xfrm>
           <a:prstGeom prst="bentConnector4">
             <a:avLst>
-              <a:gd name="adj1" fmla="val 34284"/>
-              <a:gd name="adj2" fmla="val 117040"/>
+              <a:gd name="adj1" fmla="val 35685"/>
+              <a:gd name="adj2" fmla="val 124509"/>
             </a:avLst>
           </a:prstGeom>
           <a:ln>
@@ -18410,17 +18659,20 @@
             </a:extLst>
           </p:cNvPr>
           <p:cNvCxnSpPr>
+            <a:cxnSpLocks/>
             <a:endCxn id="48" idx="0"/>
           </p:cNvCxnSpPr>
           <p:nvPr/>
         </p:nvCxnSpPr>
         <p:spPr>
-          <a:xfrm>
-            <a:off x="4158337" y="3140721"/>
-            <a:ext cx="500167" cy="414945"/>
-          </a:xfrm>
-          <a:prstGeom prst="bentConnector2">
-            <a:avLst/>
+          <a:xfrm rot="16200000" flipH="1">
+            <a:off x="4259069" y="3156230"/>
+            <a:ext cx="414945" cy="383926"/>
+          </a:xfrm>
+          <a:prstGeom prst="bentConnector3">
+            <a:avLst>
+              <a:gd name="adj1" fmla="val 2956"/>
+            </a:avLst>
           </a:prstGeom>
           <a:ln>
             <a:solidFill>
@@ -18507,7 +18759,7 @@
         </p:nvCxnSpPr>
         <p:spPr>
           <a:xfrm>
-            <a:off x="2892046" y="2105431"/>
+            <a:off x="2892046" y="2167075"/>
             <a:ext cx="0" cy="272009"/>
           </a:xfrm>
           <a:prstGeom prst="line">
@@ -18550,7 +18802,7 @@
         </p:nvCxnSpPr>
         <p:spPr>
           <a:xfrm>
-            <a:off x="2892046" y="2377440"/>
+            <a:off x="2892046" y="2439084"/>
             <a:ext cx="718164" cy="0"/>
           </a:xfrm>
           <a:prstGeom prst="line">
@@ -18593,7 +18845,7 @@
         </p:nvCxnSpPr>
         <p:spPr>
           <a:xfrm>
-            <a:off x="3041799" y="1550489"/>
+            <a:off x="3041799" y="1612133"/>
             <a:ext cx="2449676" cy="8709"/>
           </a:xfrm>
           <a:prstGeom prst="line">
@@ -18636,7 +18888,7 @@
         </p:nvCxnSpPr>
         <p:spPr>
           <a:xfrm>
-            <a:off x="4351765" y="1661790"/>
+            <a:off x="4351765" y="1723434"/>
             <a:ext cx="0" cy="657140"/>
           </a:xfrm>
           <a:prstGeom prst="line">
@@ -18680,7 +18932,7 @@
         </p:nvCxnSpPr>
         <p:spPr>
           <a:xfrm>
-            <a:off x="4351765" y="2299388"/>
+            <a:off x="4351765" y="2361032"/>
             <a:ext cx="261684" cy="2149"/>
           </a:xfrm>
           <a:prstGeom prst="line">
@@ -18723,7 +18975,7 @@
         </p:nvCxnSpPr>
         <p:spPr>
           <a:xfrm>
-            <a:off x="5491475" y="1559197"/>
+            <a:off x="5491475" y="1620841"/>
             <a:ext cx="0" cy="748899"/>
           </a:xfrm>
           <a:prstGeom prst="line">
@@ -18766,7 +19018,7 @@
         </p:nvCxnSpPr>
         <p:spPr>
           <a:xfrm>
-            <a:off x="5337231" y="1412332"/>
+            <a:off x="5337231" y="1473976"/>
             <a:ext cx="0" cy="1147202"/>
           </a:xfrm>
           <a:prstGeom prst="line">
@@ -18810,7 +19062,7 @@
         </p:nvCxnSpPr>
         <p:spPr>
           <a:xfrm>
-            <a:off x="5496975" y="2296898"/>
+            <a:off x="5496975" y="2358542"/>
             <a:ext cx="168489" cy="2149"/>
           </a:xfrm>
           <a:prstGeom prst="line">
@@ -18853,7 +19105,7 @@
         </p:nvCxnSpPr>
         <p:spPr>
           <a:xfrm>
-            <a:off x="3144035" y="1972135"/>
+            <a:off x="3144035" y="2033779"/>
             <a:ext cx="133455" cy="0"/>
           </a:xfrm>
           <a:prstGeom prst="line">
@@ -18896,7 +19148,7 @@
         </p:nvCxnSpPr>
         <p:spPr>
           <a:xfrm>
-            <a:off x="3266743" y="1651027"/>
+            <a:off x="3266743" y="1712671"/>
             <a:ext cx="0" cy="325586"/>
           </a:xfrm>
           <a:prstGeom prst="line">
@@ -18939,7 +19191,7 @@
         </p:nvCxnSpPr>
         <p:spPr>
           <a:xfrm>
-            <a:off x="3277490" y="1651027"/>
+            <a:off x="3277490" y="1712671"/>
             <a:ext cx="1087385" cy="0"/>
           </a:xfrm>
           <a:prstGeom prst="line">
@@ -18980,7 +19232,7 @@
         </p:nvSpPr>
         <p:spPr>
           <a:xfrm>
-            <a:off x="876731" y="577378"/>
+            <a:off x="848795" y="680686"/>
             <a:ext cx="5662481" cy="646331"/>
           </a:xfrm>
           <a:prstGeom prst="rect">
@@ -19114,7 +19366,33 @@
                 <a:ea typeface="+mn-ea"/>
                 <a:cs typeface="+mn-cs"/>
               </a:rPr>
-              <a:t>Mini Power System Cyber Security Test Platform</a:t>
+              <a:t>Mini OT</a:t>
+            </a:r>
+            <a:r>
+              <a:rPr lang="en-US" b="1" dirty="0">
+                <a:solidFill>
+                  <a:prstClr val="white"/>
+                </a:solidFill>
+                <a:latin typeface="Calibri" panose="020F0502020204030204"/>
+              </a:rPr>
+              <a:t>-</a:t>
+            </a:r>
+            <a:r>
+              <a:rPr kumimoji="0" lang="en-US" sz="1800" b="1" i="0" u="none" strike="noStrike" kern="1200" cap="none" spc="0" normalizeH="0" baseline="0" noProof="0" dirty="0">
+                <a:ln>
+                  <a:noFill/>
+                </a:ln>
+                <a:solidFill>
+                  <a:prstClr val="white"/>
+                </a:solidFill>
+                <a:effectLst/>
+                <a:uLnTx/>
+                <a:uFillTx/>
+                <a:latin typeface="Calibri" panose="020F0502020204030204"/>
+                <a:ea typeface="+mn-ea"/>
+                <a:cs typeface="+mn-cs"/>
+              </a:rPr>
+              <a:t>Power-System Cyber Security Test Platform</a:t>
             </a:r>
           </a:p>
         </p:txBody>
@@ -19134,7 +19412,7 @@
           <p:nvPr/>
         </p:nvPicPr>
         <p:blipFill>
-          <a:blip r:embed="rId12"/>
+          <a:blip r:embed="rId13"/>
           <a:stretch>
             <a:fillRect/>
           </a:stretch>
@@ -19170,7 +19448,7 @@
         </p:nvSpPr>
         <p:spPr>
           <a:xfrm>
-            <a:off x="7018022" y="3732726"/>
+            <a:off x="7011998" y="3762250"/>
             <a:ext cx="2752995" cy="261610"/>
           </a:xfrm>
           <a:prstGeom prst="rect">
@@ -19294,13 +19572,13 @@
           <p:nvPr/>
         </p:nvPicPr>
         <p:blipFill>
-          <a:blip r:embed="rId4">
+          <a:blip r:embed="rId5">
             <a:extLst>
               <a:ext uri="{28A0092B-C50C-407E-A947-70E740481C1C}">
                 <a14:useLocalDpi xmlns:a14="http://schemas.microsoft.com/office/drawing/2010/main" val="0"/>
               </a:ext>
               <a:ext uri="{96DAC541-7B7A-43D3-8B79-37D633B846F1}">
-                <asvg:svgBlip xmlns:asvg="http://schemas.microsoft.com/office/drawing/2016/SVG/main" r:embed="rId5"/>
+                <asvg:svgBlip xmlns:asvg="http://schemas.microsoft.com/office/drawing/2016/SVG/main" r:embed="rId6"/>
               </a:ext>
             </a:extLst>
           </a:blip>
@@ -19310,7 +19588,7 @@
         </p:blipFill>
         <p:spPr>
           <a:xfrm>
-            <a:off x="8585478" y="3231505"/>
+            <a:off x="8585478" y="3282875"/>
             <a:ext cx="440455" cy="430882"/>
           </a:xfrm>
           <a:prstGeom prst="rect">
@@ -19332,8 +19610,8 @@
         </p:nvSpPr>
         <p:spPr>
           <a:xfrm>
-            <a:off x="9037967" y="3213556"/>
-            <a:ext cx="791136" cy="430887"/>
+            <a:off x="9037967" y="3264926"/>
+            <a:ext cx="977516" cy="430887"/>
           </a:xfrm>
           <a:prstGeom prst="rect">
             <a:avLst/>
@@ -19364,6 +19642,15 @@
               <a:defRPr/>
             </a:pPr>
             <a:r>
+              <a:rPr lang="en-US" sz="1100" b="1" dirty="0">
+                <a:solidFill>
+                  <a:srgbClr val="F4C54F"/>
+                </a:solidFill>
+                <a:latin typeface="Calibri" panose="020F0502020204030204"/>
+              </a:rPr>
+              <a:t>Electrical </a:t>
+            </a:r>
+            <a:r>
               <a:rPr kumimoji="0" lang="en-US" sz="1100" b="1" i="0" u="none" strike="noStrike" kern="1200" cap="none" spc="0" normalizeH="0" baseline="0" noProof="0" dirty="0">
                 <a:ln>
                   <a:noFill/>
@@ -19448,14 +19735,14 @@
           <p:nvPr/>
         </p:nvPicPr>
         <p:blipFill>
-          <a:blip r:embed="rId13"/>
+          <a:blip r:embed="rId14"/>
           <a:stretch>
             <a:fillRect/>
           </a:stretch>
         </p:blipFill>
         <p:spPr>
           <a:xfrm>
-            <a:off x="7040255" y="833779"/>
+            <a:off x="7040255" y="864601"/>
             <a:ext cx="3197017" cy="1830292"/>
           </a:xfrm>
           <a:prstGeom prst="rect">
@@ -19589,6 +19876,405 @@
           </a:fontRef>
         </p:style>
       </p:cxnSp>
+      <p:sp>
+        <p:nvSpPr>
+          <p:cNvPr id="2" name="TextBox 1">
+            <a:extLst>
+              <a:ext uri="{FF2B5EF4-FFF2-40B4-BE49-F238E27FC236}">
+                <a16:creationId xmlns:a16="http://schemas.microsoft.com/office/drawing/2014/main" id="{2ED120C1-30E4-4A67-9A4E-1C88386F8115}"/>
+              </a:ext>
+            </a:extLst>
+          </p:cNvPr>
+          <p:cNvSpPr txBox="1"/>
+          <p:nvPr/>
+        </p:nvSpPr>
+        <p:spPr>
+          <a:xfrm>
+            <a:off x="3017436" y="2652779"/>
+            <a:ext cx="943086" cy="276999"/>
+          </a:xfrm>
+          <a:prstGeom prst="rect">
+            <a:avLst/>
+          </a:prstGeom>
+          <a:noFill/>
+        </p:spPr>
+        <p:txBody>
+          <a:bodyPr wrap="square" rtlCol="0">
+            <a:spAutoFit/>
+          </a:bodyPr>
+          <a:lstStyle/>
+          <a:p>
+            <a:r>
+              <a:rPr lang="en-US" sz="1200" b="1" dirty="0">
+                <a:solidFill>
+                  <a:srgbClr val="FF0000"/>
+                </a:solidFill>
+              </a:rPr>
+              <a:t>Modbus </a:t>
+            </a:r>
+            <a:endParaRPr lang="en-SG" sz="1200" b="1" dirty="0">
+              <a:solidFill>
+                <a:srgbClr val="FF0000"/>
+              </a:solidFill>
+            </a:endParaRPr>
+          </a:p>
+        </p:txBody>
+      </p:sp>
+      <p:sp>
+        <p:nvSpPr>
+          <p:cNvPr id="3" name="TextBox 2">
+            <a:extLst>
+              <a:ext uri="{FF2B5EF4-FFF2-40B4-BE49-F238E27FC236}">
+                <a16:creationId xmlns:a16="http://schemas.microsoft.com/office/drawing/2014/main" id="{A86DB5B8-F781-231C-D53E-325A505C1E72}"/>
+              </a:ext>
+            </a:extLst>
+          </p:cNvPr>
+          <p:cNvSpPr txBox="1"/>
+          <p:nvPr/>
+        </p:nvSpPr>
+        <p:spPr>
+          <a:xfrm>
+            <a:off x="4298168" y="2660204"/>
+            <a:ext cx="943086" cy="276999"/>
+          </a:xfrm>
+          <a:prstGeom prst="rect">
+            <a:avLst/>
+          </a:prstGeom>
+          <a:noFill/>
+        </p:spPr>
+        <p:txBody>
+          <a:bodyPr wrap="square" rtlCol="0">
+            <a:spAutoFit/>
+          </a:bodyPr>
+          <a:lstStyle/>
+          <a:p>
+            <a:r>
+              <a:rPr lang="en-US" sz="1200" b="1" dirty="0">
+                <a:solidFill>
+                  <a:srgbClr val="92D050"/>
+                </a:solidFill>
+              </a:rPr>
+              <a:t>S7Comm</a:t>
+            </a:r>
+            <a:r>
+              <a:rPr lang="en-US" sz="1200" b="1" dirty="0">
+                <a:solidFill>
+                  <a:srgbClr val="FF0000"/>
+                </a:solidFill>
+              </a:rPr>
+              <a:t>  </a:t>
+            </a:r>
+            <a:endParaRPr lang="en-SG" sz="1200" b="1" dirty="0">
+              <a:solidFill>
+                <a:srgbClr val="FF0000"/>
+              </a:solidFill>
+            </a:endParaRPr>
+          </a:p>
+        </p:txBody>
+      </p:sp>
+      <p:cxnSp>
+        <p:nvCxnSpPr>
+          <p:cNvPr id="24" name="Straight Arrow Connector 23">
+            <a:extLst>
+              <a:ext uri="{FF2B5EF4-FFF2-40B4-BE49-F238E27FC236}">
+                <a16:creationId xmlns:a16="http://schemas.microsoft.com/office/drawing/2014/main" id="{4E3C9B96-6012-8A73-20F5-174EDE1C9D2D}"/>
+              </a:ext>
+            </a:extLst>
+          </p:cNvPr>
+          <p:cNvCxnSpPr>
+            <a:cxnSpLocks/>
+          </p:cNvCxnSpPr>
+          <p:nvPr/>
+        </p:nvCxnSpPr>
+        <p:spPr>
+          <a:xfrm>
+            <a:off x="2392440" y="4046776"/>
+            <a:ext cx="0" cy="540283"/>
+          </a:xfrm>
+          <a:prstGeom prst="straightConnector1">
+            <a:avLst/>
+          </a:prstGeom>
+          <a:ln>
+            <a:solidFill>
+              <a:schemeClr val="tx2">
+                <a:lumMod val="75000"/>
+                <a:lumOff val="25000"/>
+              </a:schemeClr>
+            </a:solidFill>
+            <a:tailEnd type="triangle"/>
+          </a:ln>
+        </p:spPr>
+        <p:style>
+          <a:lnRef idx="2">
+            <a:schemeClr val="accent1"/>
+          </a:lnRef>
+          <a:fillRef idx="0">
+            <a:schemeClr val="accent1"/>
+          </a:fillRef>
+          <a:effectRef idx="1">
+            <a:schemeClr val="accent1"/>
+          </a:effectRef>
+          <a:fontRef idx="minor">
+            <a:schemeClr val="tx1"/>
+          </a:fontRef>
+        </p:style>
+      </p:cxnSp>
+      <p:cxnSp>
+        <p:nvCxnSpPr>
+          <p:cNvPr id="31" name="Straight Arrow Connector 30">
+            <a:extLst>
+              <a:ext uri="{FF2B5EF4-FFF2-40B4-BE49-F238E27FC236}">
+                <a16:creationId xmlns:a16="http://schemas.microsoft.com/office/drawing/2014/main" id="{0D438C33-36E4-45F3-A911-9CEC9C5BC170}"/>
+              </a:ext>
+            </a:extLst>
+          </p:cNvPr>
+          <p:cNvCxnSpPr>
+            <a:cxnSpLocks/>
+          </p:cNvCxnSpPr>
+          <p:nvPr/>
+        </p:nvCxnSpPr>
+        <p:spPr>
+          <a:xfrm>
+            <a:off x="4049670" y="4046775"/>
+            <a:ext cx="0" cy="540283"/>
+          </a:xfrm>
+          <a:prstGeom prst="straightConnector1">
+            <a:avLst/>
+          </a:prstGeom>
+          <a:ln>
+            <a:solidFill>
+              <a:schemeClr val="tx2">
+                <a:lumMod val="75000"/>
+                <a:lumOff val="25000"/>
+              </a:schemeClr>
+            </a:solidFill>
+            <a:tailEnd type="triangle"/>
+          </a:ln>
+        </p:spPr>
+        <p:style>
+          <a:lnRef idx="2">
+            <a:schemeClr val="accent1"/>
+          </a:lnRef>
+          <a:fillRef idx="0">
+            <a:schemeClr val="accent1"/>
+          </a:fillRef>
+          <a:effectRef idx="1">
+            <a:schemeClr val="accent1"/>
+          </a:effectRef>
+          <a:fontRef idx="minor">
+            <a:schemeClr val="tx1"/>
+          </a:fontRef>
+        </p:style>
+      </p:cxnSp>
+      <p:cxnSp>
+        <p:nvCxnSpPr>
+          <p:cNvPr id="33" name="Straight Arrow Connector 32">
+            <a:extLst>
+              <a:ext uri="{FF2B5EF4-FFF2-40B4-BE49-F238E27FC236}">
+                <a16:creationId xmlns:a16="http://schemas.microsoft.com/office/drawing/2014/main" id="{F7B12F0C-DFD8-1D1F-8F04-45597095462A}"/>
+              </a:ext>
+            </a:extLst>
+          </p:cNvPr>
+          <p:cNvCxnSpPr>
+            <a:cxnSpLocks/>
+          </p:cNvCxnSpPr>
+          <p:nvPr/>
+        </p:nvCxnSpPr>
+        <p:spPr>
+          <a:xfrm>
+            <a:off x="6180329" y="4046775"/>
+            <a:ext cx="0" cy="540283"/>
+          </a:xfrm>
+          <a:prstGeom prst="straightConnector1">
+            <a:avLst/>
+          </a:prstGeom>
+          <a:ln>
+            <a:solidFill>
+              <a:schemeClr val="tx2">
+                <a:lumMod val="75000"/>
+                <a:lumOff val="25000"/>
+              </a:schemeClr>
+            </a:solidFill>
+            <a:tailEnd type="triangle"/>
+          </a:ln>
+        </p:spPr>
+        <p:style>
+          <a:lnRef idx="2">
+            <a:schemeClr val="accent1"/>
+          </a:lnRef>
+          <a:fillRef idx="0">
+            <a:schemeClr val="accent1"/>
+          </a:fillRef>
+          <a:effectRef idx="1">
+            <a:schemeClr val="accent1"/>
+          </a:effectRef>
+          <a:fontRef idx="minor">
+            <a:schemeClr val="tx1"/>
+          </a:fontRef>
+        </p:style>
+      </p:cxnSp>
+      <p:pic>
+        <p:nvPicPr>
+          <p:cNvPr id="38" name="Graphic 37" descr="Web design with solid fill">
+            <a:extLst>
+              <a:ext uri="{FF2B5EF4-FFF2-40B4-BE49-F238E27FC236}">
+                <a16:creationId xmlns:a16="http://schemas.microsoft.com/office/drawing/2014/main" id="{2EDAE1AE-43C2-1B7B-C1AB-D652FCCB938B}"/>
+              </a:ext>
+            </a:extLst>
+          </p:cNvPr>
+          <p:cNvPicPr>
+            <a:picLocks noChangeAspect="1"/>
+          </p:cNvPicPr>
+          <p:nvPr/>
+        </p:nvPicPr>
+        <p:blipFill>
+          <a:blip r:embed="rId5">
+            <a:extLst>
+              <a:ext uri="{28A0092B-C50C-407E-A947-70E740481C1C}">
+                <a14:useLocalDpi xmlns:a14="http://schemas.microsoft.com/office/drawing/2010/main" val="0"/>
+              </a:ext>
+              <a:ext uri="{96DAC541-7B7A-43D3-8B79-37D633B846F1}">
+                <asvg:svgBlip xmlns:asvg="http://schemas.microsoft.com/office/drawing/2016/SVG/main" r:embed="rId6"/>
+              </a:ext>
+            </a:extLst>
+          </a:blip>
+          <a:stretch>
+            <a:fillRect/>
+          </a:stretch>
+        </p:blipFill>
+        <p:spPr>
+          <a:xfrm>
+            <a:off x="8594927" y="2777499"/>
+            <a:ext cx="440455" cy="430882"/>
+          </a:xfrm>
+          <a:prstGeom prst="rect">
+            <a:avLst/>
+          </a:prstGeom>
+        </p:spPr>
+      </p:pic>
+      <p:sp>
+        <p:nvSpPr>
+          <p:cNvPr id="39" name="TextBox 38">
+            <a:extLst>
+              <a:ext uri="{FF2B5EF4-FFF2-40B4-BE49-F238E27FC236}">
+                <a16:creationId xmlns:a16="http://schemas.microsoft.com/office/drawing/2014/main" id="{DC8B9CB8-A83F-7261-AAC5-2A78F32E8259}"/>
+              </a:ext>
+            </a:extLst>
+          </p:cNvPr>
+          <p:cNvSpPr txBox="1"/>
+          <p:nvPr/>
+        </p:nvSpPr>
+        <p:spPr>
+          <a:xfrm>
+            <a:off x="9056259" y="2769585"/>
+            <a:ext cx="977516" cy="430887"/>
+          </a:xfrm>
+          <a:prstGeom prst="rect">
+            <a:avLst/>
+          </a:prstGeom>
+          <a:noFill/>
+        </p:spPr>
+        <p:txBody>
+          <a:bodyPr wrap="square" rtlCol="0">
+            <a:spAutoFit/>
+          </a:bodyPr>
+          <a:lstStyle/>
+          <a:p>
+            <a:pPr marL="0" marR="0" lvl="0" indent="0" algn="l" defTabSz="914400" rtl="0" eaLnBrk="1" fontAlgn="auto" latinLnBrk="0" hangingPunct="1">
+              <a:lnSpc>
+                <a:spcPct val="100000"/>
+              </a:lnSpc>
+              <a:spcBef>
+                <a:spcPts val="0"/>
+              </a:spcBef>
+              <a:spcAft>
+                <a:spcPts val="0"/>
+              </a:spcAft>
+              <a:buClrTx/>
+              <a:buSzTx/>
+              <a:buFontTx/>
+              <a:buNone/>
+              <a:tabLst/>
+              <a:defRPr/>
+            </a:pPr>
+            <a:r>
+              <a:rPr kumimoji="0" lang="en-US" sz="1100" b="1" i="0" u="none" strike="noStrike" kern="1200" cap="none" spc="0" normalizeH="0" baseline="0" noProof="0" dirty="0">
+                <a:ln>
+                  <a:noFill/>
+                </a:ln>
+                <a:solidFill>
+                  <a:srgbClr val="F4C54F"/>
+                </a:solidFill>
+                <a:effectLst/>
+                <a:uLnTx/>
+                <a:uFillTx/>
+                <a:latin typeface="Calibri" panose="020F0502020204030204"/>
+                <a:ea typeface="+mn-ea"/>
+                <a:cs typeface="+mn-cs"/>
+              </a:rPr>
+              <a:t>Power Link Interface </a:t>
+            </a:r>
+            <a:endParaRPr kumimoji="0" lang="en-SG" sz="1100" b="1" i="0" u="none" strike="noStrike" kern="1200" cap="none" spc="0" normalizeH="0" baseline="0" noProof="0" dirty="0">
+              <a:ln>
+                <a:noFill/>
+              </a:ln>
+              <a:solidFill>
+                <a:srgbClr val="F4C54F"/>
+              </a:solidFill>
+              <a:effectLst/>
+              <a:uLnTx/>
+              <a:uFillTx/>
+              <a:latin typeface="Calibri" panose="020F0502020204030204"/>
+              <a:ea typeface="+mn-ea"/>
+              <a:cs typeface="+mn-cs"/>
+            </a:endParaRPr>
+          </a:p>
+        </p:txBody>
+      </p:sp>
+      <p:sp>
+        <p:nvSpPr>
+          <p:cNvPr id="21" name="TextBox 20">
+            <a:extLst>
+              <a:ext uri="{FF2B5EF4-FFF2-40B4-BE49-F238E27FC236}">
+                <a16:creationId xmlns:a16="http://schemas.microsoft.com/office/drawing/2014/main" id="{D2DF0F18-07B2-BDEF-7CEB-31E7C71DD3A0}"/>
+              </a:ext>
+            </a:extLst>
+          </p:cNvPr>
+          <p:cNvSpPr txBox="1"/>
+          <p:nvPr/>
+        </p:nvSpPr>
+        <p:spPr>
+          <a:xfrm>
+            <a:off x="2585908" y="4222898"/>
+            <a:ext cx="2198527" cy="276999"/>
+          </a:xfrm>
+          <a:prstGeom prst="rect">
+            <a:avLst/>
+          </a:prstGeom>
+          <a:noFill/>
+        </p:spPr>
+        <p:txBody>
+          <a:bodyPr wrap="square" rtlCol="0">
+            <a:spAutoFit/>
+          </a:bodyPr>
+          <a:lstStyle/>
+          <a:p>
+            <a:r>
+              <a:rPr lang="en-US" sz="1200" b="1" dirty="0">
+                <a:solidFill>
+                  <a:srgbClr val="00B0F0"/>
+                </a:solidFill>
+              </a:rPr>
+              <a:t>Simulated Electrical signal    </a:t>
+            </a:r>
+            <a:endParaRPr lang="en-SG" sz="1200" b="1" dirty="0">
+              <a:solidFill>
+                <a:srgbClr val="00B0F0"/>
+              </a:solidFill>
+            </a:endParaRPr>
+          </a:p>
+        </p:txBody>
+      </p:sp>
     </p:spTree>
     <p:extLst>
       <p:ext uri="{BB962C8B-B14F-4D97-AF65-F5344CB8AC3E}">

</xml_diff>

<commit_message>
update the animation of the physical world simulation and the design document.
</commit_message>
<xml_diff>
--- a/designDoc/designDoc.pptx
+++ b/designDoc/designDoc.pptx
@@ -5,13 +5,14 @@
     <p:sldMasterId id="2147483648" r:id="rId1"/>
   </p:sldMasterIdLst>
   <p:notesMasterIdLst>
-    <p:notesMasterId r:id="rId6"/>
+    <p:notesMasterId r:id="rId7"/>
   </p:notesMasterIdLst>
   <p:sldIdLst>
     <p:sldId id="256" r:id="rId2"/>
     <p:sldId id="257" r:id="rId3"/>
     <p:sldId id="259" r:id="rId4"/>
     <p:sldId id="258" r:id="rId5"/>
+    <p:sldId id="260" r:id="rId6"/>
   </p:sldIdLst>
   <p:sldSz cx="12192000" cy="6858000"/>
   <p:notesSz cx="6858000" cy="9144000"/>
@@ -200,7 +201,7 @@
           <a:p>
             <a:fld id="{60A58DA9-13FF-4A44-80CD-EC4A25FA80B4}" type="datetimeFigureOut">
               <a:rPr lang="en-SG" smtClean="0"/>
-              <a:t>20/9/2024</a:t>
+              <a:t>10/10/2024</a:t>
             </a:fld>
             <a:endParaRPr lang="en-SG"/>
           </a:p>
@@ -701,7 +702,7 @@
           <a:p>
             <a:fld id="{DAB0784D-3A10-485A-BA3A-AF2134252110}" type="datetimeFigureOut">
               <a:rPr lang="en-SG" smtClean="0"/>
-              <a:t>20/9/2024</a:t>
+              <a:t>10/10/2024</a:t>
             </a:fld>
             <a:endParaRPr lang="en-SG"/>
           </a:p>
@@ -901,7 +902,7 @@
           <a:p>
             <a:fld id="{DAB0784D-3A10-485A-BA3A-AF2134252110}" type="datetimeFigureOut">
               <a:rPr lang="en-SG" smtClean="0"/>
-              <a:t>20/9/2024</a:t>
+              <a:t>10/10/2024</a:t>
             </a:fld>
             <a:endParaRPr lang="en-SG"/>
           </a:p>
@@ -1111,7 +1112,7 @@
           <a:p>
             <a:fld id="{DAB0784D-3A10-485A-BA3A-AF2134252110}" type="datetimeFigureOut">
               <a:rPr lang="en-SG" smtClean="0"/>
-              <a:t>20/9/2024</a:t>
+              <a:t>10/10/2024</a:t>
             </a:fld>
             <a:endParaRPr lang="en-SG"/>
           </a:p>
@@ -1311,7 +1312,7 @@
           <a:p>
             <a:fld id="{DAB0784D-3A10-485A-BA3A-AF2134252110}" type="datetimeFigureOut">
               <a:rPr lang="en-SG" smtClean="0"/>
-              <a:t>20/9/2024</a:t>
+              <a:t>10/10/2024</a:t>
             </a:fld>
             <a:endParaRPr lang="en-SG"/>
           </a:p>
@@ -1587,7 +1588,7 @@
           <a:p>
             <a:fld id="{DAB0784D-3A10-485A-BA3A-AF2134252110}" type="datetimeFigureOut">
               <a:rPr lang="en-SG" smtClean="0"/>
-              <a:t>20/9/2024</a:t>
+              <a:t>10/10/2024</a:t>
             </a:fld>
             <a:endParaRPr lang="en-SG"/>
           </a:p>
@@ -1855,7 +1856,7 @@
           <a:p>
             <a:fld id="{DAB0784D-3A10-485A-BA3A-AF2134252110}" type="datetimeFigureOut">
               <a:rPr lang="en-SG" smtClean="0"/>
-              <a:t>20/9/2024</a:t>
+              <a:t>10/10/2024</a:t>
             </a:fld>
             <a:endParaRPr lang="en-SG"/>
           </a:p>
@@ -2270,7 +2271,7 @@
           <a:p>
             <a:fld id="{DAB0784D-3A10-485A-BA3A-AF2134252110}" type="datetimeFigureOut">
               <a:rPr lang="en-SG" smtClean="0"/>
-              <a:t>20/9/2024</a:t>
+              <a:t>10/10/2024</a:t>
             </a:fld>
             <a:endParaRPr lang="en-SG"/>
           </a:p>
@@ -2412,7 +2413,7 @@
           <a:p>
             <a:fld id="{DAB0784D-3A10-485A-BA3A-AF2134252110}" type="datetimeFigureOut">
               <a:rPr lang="en-SG" smtClean="0"/>
-              <a:t>20/9/2024</a:t>
+              <a:t>10/10/2024</a:t>
             </a:fld>
             <a:endParaRPr lang="en-SG"/>
           </a:p>
@@ -2525,7 +2526,7 @@
           <a:p>
             <a:fld id="{DAB0784D-3A10-485A-BA3A-AF2134252110}" type="datetimeFigureOut">
               <a:rPr lang="en-SG" smtClean="0"/>
-              <a:t>20/9/2024</a:t>
+              <a:t>10/10/2024</a:t>
             </a:fld>
             <a:endParaRPr lang="en-SG"/>
           </a:p>
@@ -2838,7 +2839,7 @@
           <a:p>
             <a:fld id="{DAB0784D-3A10-485A-BA3A-AF2134252110}" type="datetimeFigureOut">
               <a:rPr lang="en-SG" smtClean="0"/>
-              <a:t>20/9/2024</a:t>
+              <a:t>10/10/2024</a:t>
             </a:fld>
             <a:endParaRPr lang="en-SG"/>
           </a:p>
@@ -3127,7 +3128,7 @@
           <a:p>
             <a:fld id="{DAB0784D-3A10-485A-BA3A-AF2134252110}" type="datetimeFigureOut">
               <a:rPr lang="en-SG" smtClean="0"/>
-              <a:t>20/9/2024</a:t>
+              <a:t>10/10/2024</a:t>
             </a:fld>
             <a:endParaRPr lang="en-SG"/>
           </a:p>
@@ -3370,7 +3371,7 @@
           <a:p>
             <a:fld id="{DAB0784D-3A10-485A-BA3A-AF2134252110}" type="datetimeFigureOut">
               <a:rPr lang="en-SG" smtClean="0"/>
-              <a:t>20/9/2024</a:t>
+              <a:t>10/10/2024</a:t>
             </a:fld>
             <a:endParaRPr lang="en-SG"/>
           </a:p>
@@ -20721,10 +20722,2206 @@
           </a:fontRef>
         </p:style>
       </p:cxnSp>
+      <p:pic>
+        <p:nvPicPr>
+          <p:cNvPr id="6" name="Picture 5" descr="A building with solar panels&#10;&#10;Description automatically generated">
+            <a:extLst>
+              <a:ext uri="{FF2B5EF4-FFF2-40B4-BE49-F238E27FC236}">
+                <a16:creationId xmlns:a16="http://schemas.microsoft.com/office/drawing/2014/main" id="{5EA7424C-DF1A-F3EC-854E-AAC1D6004C86}"/>
+              </a:ext>
+            </a:extLst>
+          </p:cNvPr>
+          <p:cNvPicPr>
+            <a:picLocks noChangeAspect="1"/>
+          </p:cNvPicPr>
+          <p:nvPr/>
+        </p:nvPicPr>
+        <p:blipFill>
+          <a:blip r:embed="rId3">
+            <a:extLst>
+              <a:ext uri="{28A0092B-C50C-407E-A947-70E740481C1C}">
+                <a14:useLocalDpi xmlns:a14="http://schemas.microsoft.com/office/drawing/2010/main" val="0"/>
+              </a:ext>
+            </a:extLst>
+          </a:blip>
+          <a:stretch>
+            <a:fillRect/>
+          </a:stretch>
+        </p:blipFill>
+        <p:spPr>
+          <a:xfrm>
+            <a:off x="2340486" y="4168259"/>
+            <a:ext cx="1904762" cy="1904762"/>
+          </a:xfrm>
+          <a:prstGeom prst="rect">
+            <a:avLst/>
+          </a:prstGeom>
+          <a:ln w="3175">
+            <a:solidFill>
+              <a:schemeClr val="tx1"/>
+            </a:solidFill>
+          </a:ln>
+        </p:spPr>
+      </p:pic>
+      <p:pic>
+        <p:nvPicPr>
+          <p:cNvPr id="12" name="Graphic 11" descr="Dim (Medium Sun) with solid fill">
+            <a:extLst>
+              <a:ext uri="{FF2B5EF4-FFF2-40B4-BE49-F238E27FC236}">
+                <a16:creationId xmlns:a16="http://schemas.microsoft.com/office/drawing/2014/main" id="{D8241FD5-1E79-215F-79E5-155C2ABFC6C3}"/>
+              </a:ext>
+            </a:extLst>
+          </p:cNvPr>
+          <p:cNvPicPr>
+            <a:picLocks noChangeAspect="1"/>
+          </p:cNvPicPr>
+          <p:nvPr/>
+        </p:nvPicPr>
+        <p:blipFill>
+          <a:blip r:embed="rId4">
+            <a:extLst>
+              <a:ext uri="{96DAC541-7B7A-43D3-8B79-37D633B846F1}">
+                <asvg:svgBlip xmlns:asvg="http://schemas.microsoft.com/office/drawing/2016/SVG/main" r:embed="rId5"/>
+              </a:ext>
+            </a:extLst>
+          </a:blip>
+          <a:stretch>
+            <a:fillRect/>
+          </a:stretch>
+        </p:blipFill>
+        <p:spPr>
+          <a:xfrm>
+            <a:off x="2512184" y="4168258"/>
+            <a:ext cx="458606" cy="458606"/>
+          </a:xfrm>
+          <a:prstGeom prst="rect">
+            <a:avLst/>
+          </a:prstGeom>
+        </p:spPr>
+      </p:pic>
+      <p:sp>
+        <p:nvSpPr>
+          <p:cNvPr id="15" name="Arrow: Down 14">
+            <a:extLst>
+              <a:ext uri="{FF2B5EF4-FFF2-40B4-BE49-F238E27FC236}">
+                <a16:creationId xmlns:a16="http://schemas.microsoft.com/office/drawing/2014/main" id="{8075F47A-E1DB-1121-91CA-DE2858865024}"/>
+              </a:ext>
+            </a:extLst>
+          </p:cNvPr>
+          <p:cNvSpPr/>
+          <p:nvPr/>
+        </p:nvSpPr>
+        <p:spPr>
+          <a:xfrm>
+            <a:off x="2709453" y="4739738"/>
+            <a:ext cx="158676" cy="292608"/>
+          </a:xfrm>
+          <a:prstGeom prst="downArrow">
+            <a:avLst/>
+          </a:prstGeom>
+          <a:solidFill>
+            <a:schemeClr val="accent2"/>
+          </a:solidFill>
+        </p:spPr>
+        <p:style>
+          <a:lnRef idx="2">
+            <a:schemeClr val="accent1">
+              <a:shade val="15000"/>
+            </a:schemeClr>
+          </a:lnRef>
+          <a:fillRef idx="1">
+            <a:schemeClr val="accent1"/>
+          </a:fillRef>
+          <a:effectRef idx="0">
+            <a:schemeClr val="accent1"/>
+          </a:effectRef>
+          <a:fontRef idx="minor">
+            <a:schemeClr val="lt1"/>
+          </a:fontRef>
+        </p:style>
+        <p:txBody>
+          <a:bodyPr rtlCol="0" anchor="ctr"/>
+          <a:lstStyle/>
+          <a:p>
+            <a:pPr algn="ctr"/>
+            <a:endParaRPr lang="en-SG"/>
+          </a:p>
+        </p:txBody>
+      </p:sp>
+      <p:sp>
+        <p:nvSpPr>
+          <p:cNvPr id="16" name="Arrow: Down 15">
+            <a:extLst>
+              <a:ext uri="{FF2B5EF4-FFF2-40B4-BE49-F238E27FC236}">
+                <a16:creationId xmlns:a16="http://schemas.microsoft.com/office/drawing/2014/main" id="{0AE9A053-456B-7D93-989E-093899B4B55E}"/>
+              </a:ext>
+            </a:extLst>
+          </p:cNvPr>
+          <p:cNvSpPr/>
+          <p:nvPr/>
+        </p:nvSpPr>
+        <p:spPr>
+          <a:xfrm>
+            <a:off x="3237095" y="5032346"/>
+            <a:ext cx="158676" cy="292608"/>
+          </a:xfrm>
+          <a:prstGeom prst="downArrow">
+            <a:avLst/>
+          </a:prstGeom>
+          <a:solidFill>
+            <a:schemeClr val="accent2"/>
+          </a:solidFill>
+        </p:spPr>
+        <p:style>
+          <a:lnRef idx="2">
+            <a:schemeClr val="accent1">
+              <a:shade val="15000"/>
+            </a:schemeClr>
+          </a:lnRef>
+          <a:fillRef idx="1">
+            <a:schemeClr val="accent1"/>
+          </a:fillRef>
+          <a:effectRef idx="0">
+            <a:schemeClr val="accent1"/>
+          </a:effectRef>
+          <a:fontRef idx="minor">
+            <a:schemeClr val="lt1"/>
+          </a:fontRef>
+        </p:style>
+        <p:txBody>
+          <a:bodyPr rtlCol="0" anchor="ctr"/>
+          <a:lstStyle/>
+          <a:p>
+            <a:pPr algn="ctr"/>
+            <a:endParaRPr lang="en-SG"/>
+          </a:p>
+        </p:txBody>
+      </p:sp>
+      <p:pic>
+        <p:nvPicPr>
+          <p:cNvPr id="17" name="Picture 16" descr="A building with solar panels&#10;&#10;Description automatically generated">
+            <a:extLst>
+              <a:ext uri="{FF2B5EF4-FFF2-40B4-BE49-F238E27FC236}">
+                <a16:creationId xmlns:a16="http://schemas.microsoft.com/office/drawing/2014/main" id="{F21289F8-E9C0-F8D3-E1B8-2BE308B4504B}"/>
+              </a:ext>
+            </a:extLst>
+          </p:cNvPr>
+          <p:cNvPicPr>
+            <a:picLocks noChangeAspect="1"/>
+          </p:cNvPicPr>
+          <p:nvPr/>
+        </p:nvPicPr>
+        <p:blipFill>
+          <a:blip r:embed="rId3">
+            <a:extLst>
+              <a:ext uri="{28A0092B-C50C-407E-A947-70E740481C1C}">
+                <a14:useLocalDpi xmlns:a14="http://schemas.microsoft.com/office/drawing/2010/main" val="0"/>
+              </a:ext>
+            </a:extLst>
+          </a:blip>
+          <a:stretch>
+            <a:fillRect/>
+          </a:stretch>
+        </p:blipFill>
+        <p:spPr>
+          <a:xfrm>
+            <a:off x="4751454" y="4168259"/>
+            <a:ext cx="1904762" cy="1904762"/>
+          </a:xfrm>
+          <a:prstGeom prst="rect">
+            <a:avLst/>
+          </a:prstGeom>
+          <a:ln w="3175">
+            <a:solidFill>
+              <a:schemeClr val="tx1"/>
+            </a:solidFill>
+          </a:ln>
+        </p:spPr>
+      </p:pic>
+      <p:pic>
+        <p:nvPicPr>
+          <p:cNvPr id="18" name="Graphic 17" descr="Dim (Medium Sun) with solid fill">
+            <a:extLst>
+              <a:ext uri="{FF2B5EF4-FFF2-40B4-BE49-F238E27FC236}">
+                <a16:creationId xmlns:a16="http://schemas.microsoft.com/office/drawing/2014/main" id="{18ACF099-6205-09F8-CC2B-4900AA134423}"/>
+              </a:ext>
+            </a:extLst>
+          </p:cNvPr>
+          <p:cNvPicPr>
+            <a:picLocks noChangeAspect="1"/>
+          </p:cNvPicPr>
+          <p:nvPr/>
+        </p:nvPicPr>
+        <p:blipFill>
+          <a:blip r:embed="rId4">
+            <a:extLst>
+              <a:ext uri="{96DAC541-7B7A-43D3-8B79-37D633B846F1}">
+                <asvg:svgBlip xmlns:asvg="http://schemas.microsoft.com/office/drawing/2016/SVG/main" r:embed="rId5"/>
+              </a:ext>
+            </a:extLst>
+          </a:blip>
+          <a:stretch>
+            <a:fillRect/>
+          </a:stretch>
+        </p:blipFill>
+        <p:spPr>
+          <a:xfrm>
+            <a:off x="4923152" y="4168258"/>
+            <a:ext cx="458606" cy="458606"/>
+          </a:xfrm>
+          <a:prstGeom prst="rect">
+            <a:avLst/>
+          </a:prstGeom>
+        </p:spPr>
+      </p:pic>
+      <p:sp>
+        <p:nvSpPr>
+          <p:cNvPr id="19" name="Arrow: Down 18">
+            <a:extLst>
+              <a:ext uri="{FF2B5EF4-FFF2-40B4-BE49-F238E27FC236}">
+                <a16:creationId xmlns:a16="http://schemas.microsoft.com/office/drawing/2014/main" id="{E7E3D744-F0C0-F07B-DE39-5BC2DE2E775D}"/>
+              </a:ext>
+            </a:extLst>
+          </p:cNvPr>
+          <p:cNvSpPr/>
+          <p:nvPr/>
+        </p:nvSpPr>
+        <p:spPr>
+          <a:xfrm>
+            <a:off x="5396853" y="4911030"/>
+            <a:ext cx="158676" cy="292608"/>
+          </a:xfrm>
+          <a:prstGeom prst="downArrow">
+            <a:avLst/>
+          </a:prstGeom>
+          <a:solidFill>
+            <a:schemeClr val="accent2"/>
+          </a:solidFill>
+        </p:spPr>
+        <p:style>
+          <a:lnRef idx="2">
+            <a:schemeClr val="accent1">
+              <a:shade val="15000"/>
+            </a:schemeClr>
+          </a:lnRef>
+          <a:fillRef idx="1">
+            <a:schemeClr val="accent1"/>
+          </a:fillRef>
+          <a:effectRef idx="0">
+            <a:schemeClr val="accent1"/>
+          </a:effectRef>
+          <a:fontRef idx="minor">
+            <a:schemeClr val="lt1"/>
+          </a:fontRef>
+        </p:style>
+        <p:txBody>
+          <a:bodyPr rtlCol="0" anchor="ctr"/>
+          <a:lstStyle/>
+          <a:p>
+            <a:pPr algn="ctr"/>
+            <a:endParaRPr lang="en-SG"/>
+          </a:p>
+        </p:txBody>
+      </p:sp>
+      <p:sp>
+        <p:nvSpPr>
+          <p:cNvPr id="20" name="Arrow: Down 19">
+            <a:extLst>
+              <a:ext uri="{FF2B5EF4-FFF2-40B4-BE49-F238E27FC236}">
+                <a16:creationId xmlns:a16="http://schemas.microsoft.com/office/drawing/2014/main" id="{27A04CC5-468D-B233-B989-44699188293C}"/>
+              </a:ext>
+            </a:extLst>
+          </p:cNvPr>
+          <p:cNvSpPr/>
+          <p:nvPr/>
+        </p:nvSpPr>
+        <p:spPr>
+          <a:xfrm>
+            <a:off x="5937324" y="5148072"/>
+            <a:ext cx="158676" cy="292608"/>
+          </a:xfrm>
+          <a:prstGeom prst="downArrow">
+            <a:avLst/>
+          </a:prstGeom>
+          <a:solidFill>
+            <a:schemeClr val="accent2"/>
+          </a:solidFill>
+        </p:spPr>
+        <p:style>
+          <a:lnRef idx="2">
+            <a:schemeClr val="accent1">
+              <a:shade val="15000"/>
+            </a:schemeClr>
+          </a:lnRef>
+          <a:fillRef idx="1">
+            <a:schemeClr val="accent1"/>
+          </a:fillRef>
+          <a:effectRef idx="0">
+            <a:schemeClr val="accent1"/>
+          </a:effectRef>
+          <a:fontRef idx="minor">
+            <a:schemeClr val="lt1"/>
+          </a:fontRef>
+        </p:style>
+        <p:txBody>
+          <a:bodyPr rtlCol="0" anchor="ctr"/>
+          <a:lstStyle/>
+          <a:p>
+            <a:pPr algn="ctr"/>
+            <a:endParaRPr lang="en-SG"/>
+          </a:p>
+        </p:txBody>
+      </p:sp>
+      <p:pic>
+        <p:nvPicPr>
+          <p:cNvPr id="24" name="Graphic 23" descr="High voltage with solid fill">
+            <a:extLst>
+              <a:ext uri="{FF2B5EF4-FFF2-40B4-BE49-F238E27FC236}">
+                <a16:creationId xmlns:a16="http://schemas.microsoft.com/office/drawing/2014/main" id="{96489947-DC70-D329-00F5-9040630416DB}"/>
+              </a:ext>
+            </a:extLst>
+          </p:cNvPr>
+          <p:cNvPicPr>
+            <a:picLocks noChangeAspect="1"/>
+          </p:cNvPicPr>
+          <p:nvPr/>
+        </p:nvPicPr>
+        <p:blipFill>
+          <a:blip r:embed="rId6">
+            <a:extLst>
+              <a:ext uri="{96DAC541-7B7A-43D3-8B79-37D633B846F1}">
+                <asvg:svgBlip xmlns:asvg="http://schemas.microsoft.com/office/drawing/2016/SVG/main" r:embed="rId7"/>
+              </a:ext>
+            </a:extLst>
+          </a:blip>
+          <a:stretch>
+            <a:fillRect/>
+          </a:stretch>
+        </p:blipFill>
+        <p:spPr>
+          <a:xfrm>
+            <a:off x="3828907" y="4195691"/>
+            <a:ext cx="363145" cy="363145"/>
+          </a:xfrm>
+          <a:prstGeom prst="rect">
+            <a:avLst/>
+          </a:prstGeom>
+        </p:spPr>
+      </p:pic>
+      <p:pic>
+        <p:nvPicPr>
+          <p:cNvPr id="26" name="Graphic 25" descr="High voltage with solid fill">
+            <a:extLst>
+              <a:ext uri="{FF2B5EF4-FFF2-40B4-BE49-F238E27FC236}">
+                <a16:creationId xmlns:a16="http://schemas.microsoft.com/office/drawing/2014/main" id="{AFA1F019-4D2B-139F-9757-E14EFAD131FB}"/>
+              </a:ext>
+            </a:extLst>
+          </p:cNvPr>
+          <p:cNvPicPr>
+            <a:picLocks noChangeAspect="1"/>
+          </p:cNvPicPr>
+          <p:nvPr/>
+        </p:nvPicPr>
+        <p:blipFill>
+          <a:blip r:embed="rId8">
+            <a:extLst>
+              <a:ext uri="{96DAC541-7B7A-43D3-8B79-37D633B846F1}">
+                <asvg:svgBlip xmlns:asvg="http://schemas.microsoft.com/office/drawing/2016/SVG/main" r:embed="rId9"/>
+              </a:ext>
+            </a:extLst>
+          </a:blip>
+          <a:stretch>
+            <a:fillRect/>
+          </a:stretch>
+        </p:blipFill>
+        <p:spPr>
+          <a:xfrm>
+            <a:off x="6293071" y="4168258"/>
+            <a:ext cx="363145" cy="363145"/>
+          </a:xfrm>
+          <a:prstGeom prst="rect">
+            <a:avLst/>
+          </a:prstGeom>
+        </p:spPr>
+      </p:pic>
     </p:spTree>
     <p:extLst>
       <p:ext uri="{BB962C8B-B14F-4D97-AF65-F5344CB8AC3E}">
         <p14:creationId xmlns:p14="http://schemas.microsoft.com/office/powerpoint/2010/main" val="366476725"/>
+      </p:ext>
+    </p:extLst>
+  </p:cSld>
+  <p:clrMapOvr>
+    <a:masterClrMapping/>
+  </p:clrMapOvr>
+</p:sld>
+</file>
+
+<file path=ppt/slides/slide5.xml><?xml version="1.0" encoding="utf-8"?>
+<p:sld xmlns:a="http://schemas.openxmlformats.org/drawingml/2006/main" xmlns:r="http://schemas.openxmlformats.org/officeDocument/2006/relationships" xmlns:p="http://schemas.openxmlformats.org/presentationml/2006/main">
+  <p:cSld>
+    <p:spTree>
+      <p:nvGrpSpPr>
+        <p:cNvPr id="1" name=""/>
+        <p:cNvGrpSpPr/>
+        <p:nvPr/>
+      </p:nvGrpSpPr>
+      <p:grpSpPr>
+        <a:xfrm>
+          <a:off x="0" y="0"/>
+          <a:ext cx="0" cy="0"/>
+          <a:chOff x="0" y="0"/>
+          <a:chExt cx="0" cy="0"/>
+        </a:xfrm>
+      </p:grpSpPr>
+      <p:pic>
+        <p:nvPicPr>
+          <p:cNvPr id="76" name="Picture 75" descr="A black and white drawing of a water pump&#10;&#10;Description automatically generated">
+            <a:extLst>
+              <a:ext uri="{FF2B5EF4-FFF2-40B4-BE49-F238E27FC236}">
+                <a16:creationId xmlns:a16="http://schemas.microsoft.com/office/drawing/2014/main" id="{055802C1-8874-070E-CDC1-E477F50364BD}"/>
+              </a:ext>
+            </a:extLst>
+          </p:cNvPr>
+          <p:cNvPicPr>
+            <a:picLocks noChangeAspect="1"/>
+          </p:cNvPicPr>
+          <p:nvPr/>
+        </p:nvPicPr>
+        <p:blipFill>
+          <a:blip r:embed="rId2">
+            <a:extLst>
+              <a:ext uri="{28A0092B-C50C-407E-A947-70E740481C1C}">
+                <a14:useLocalDpi xmlns:a14="http://schemas.microsoft.com/office/drawing/2010/main" val="0"/>
+              </a:ext>
+            </a:extLst>
+          </a:blip>
+          <a:stretch>
+            <a:fillRect/>
+          </a:stretch>
+        </p:blipFill>
+        <p:spPr>
+          <a:xfrm>
+            <a:off x="8094156" y="3188606"/>
+            <a:ext cx="628845" cy="628845"/>
+          </a:xfrm>
+          <a:prstGeom prst="rect">
+            <a:avLst/>
+          </a:prstGeom>
+          <a:ln w="3175">
+            <a:solidFill>
+              <a:schemeClr val="tx1"/>
+            </a:solidFill>
+          </a:ln>
+        </p:spPr>
+      </p:pic>
+      <p:pic>
+        <p:nvPicPr>
+          <p:cNvPr id="5" name="Picture 4" descr="A group of windmills on a green field&#10;&#10;Description automatically generated">
+            <a:extLst>
+              <a:ext uri="{FF2B5EF4-FFF2-40B4-BE49-F238E27FC236}">
+                <a16:creationId xmlns:a16="http://schemas.microsoft.com/office/drawing/2014/main" id="{103E8A81-3C40-4F6B-7876-59B3201A1042}"/>
+              </a:ext>
+            </a:extLst>
+          </p:cNvPr>
+          <p:cNvPicPr>
+            <a:picLocks noChangeAspect="1"/>
+          </p:cNvPicPr>
+          <p:nvPr/>
+        </p:nvPicPr>
+        <p:blipFill>
+          <a:blip r:embed="rId3">
+            <a:extLst>
+              <a:ext uri="{28A0092B-C50C-407E-A947-70E740481C1C}">
+                <a14:useLocalDpi xmlns:a14="http://schemas.microsoft.com/office/drawing/2010/main" val="0"/>
+              </a:ext>
+            </a:extLst>
+          </a:blip>
+          <a:stretch>
+            <a:fillRect/>
+          </a:stretch>
+        </p:blipFill>
+        <p:spPr>
+          <a:xfrm>
+            <a:off x="657834" y="619081"/>
+            <a:ext cx="1904762" cy="1904762"/>
+          </a:xfrm>
+          <a:prstGeom prst="rect">
+            <a:avLst/>
+          </a:prstGeom>
+          <a:ln w="3175">
+            <a:solidFill>
+              <a:schemeClr val="tx1"/>
+            </a:solidFill>
+          </a:ln>
+        </p:spPr>
+      </p:pic>
+      <p:pic>
+        <p:nvPicPr>
+          <p:cNvPr id="7" name="Graphic 6" descr="Windy with solid fill">
+            <a:extLst>
+              <a:ext uri="{FF2B5EF4-FFF2-40B4-BE49-F238E27FC236}">
+                <a16:creationId xmlns:a16="http://schemas.microsoft.com/office/drawing/2014/main" id="{A15FCF8A-BEAD-CC13-3390-384F856EB21E}"/>
+              </a:ext>
+            </a:extLst>
+          </p:cNvPr>
+          <p:cNvPicPr>
+            <a:picLocks noChangeAspect="1"/>
+          </p:cNvPicPr>
+          <p:nvPr/>
+        </p:nvPicPr>
+        <p:blipFill>
+          <a:blip r:embed="rId4">
+            <a:extLst>
+              <a:ext uri="{96DAC541-7B7A-43D3-8B79-37D633B846F1}">
+                <asvg:svgBlip xmlns:asvg="http://schemas.microsoft.com/office/drawing/2016/SVG/main" r:embed="rId5"/>
+              </a:ext>
+            </a:extLst>
+          </a:blip>
+          <a:stretch>
+            <a:fillRect/>
+          </a:stretch>
+        </p:blipFill>
+        <p:spPr>
+          <a:xfrm>
+            <a:off x="720448" y="657316"/>
+            <a:ext cx="342122" cy="342122"/>
+          </a:xfrm>
+          <a:prstGeom prst="rect">
+            <a:avLst/>
+          </a:prstGeom>
+        </p:spPr>
+      </p:pic>
+      <p:pic>
+        <p:nvPicPr>
+          <p:cNvPr id="8" name="Graphic 7" descr="Windy with solid fill">
+            <a:extLst>
+              <a:ext uri="{FF2B5EF4-FFF2-40B4-BE49-F238E27FC236}">
+                <a16:creationId xmlns:a16="http://schemas.microsoft.com/office/drawing/2014/main" id="{4AB16B17-0CF2-3739-3510-0DC98DB15079}"/>
+              </a:ext>
+            </a:extLst>
+          </p:cNvPr>
+          <p:cNvPicPr>
+            <a:picLocks noChangeAspect="1"/>
+          </p:cNvPicPr>
+          <p:nvPr/>
+        </p:nvPicPr>
+        <p:blipFill>
+          <a:blip r:embed="rId6">
+            <a:extLst>
+              <a:ext uri="{96DAC541-7B7A-43D3-8B79-37D633B846F1}">
+                <asvg:svgBlip xmlns:asvg="http://schemas.microsoft.com/office/drawing/2016/SVG/main" r:embed="rId7"/>
+              </a:ext>
+            </a:extLst>
+          </a:blip>
+          <a:stretch>
+            <a:fillRect/>
+          </a:stretch>
+        </p:blipFill>
+        <p:spPr>
+          <a:xfrm>
+            <a:off x="1439154" y="1795726"/>
+            <a:ext cx="342122" cy="342122"/>
+          </a:xfrm>
+          <a:prstGeom prst="rect">
+            <a:avLst/>
+          </a:prstGeom>
+        </p:spPr>
+      </p:pic>
+      <p:pic>
+        <p:nvPicPr>
+          <p:cNvPr id="24" name="Graphic 23" descr="Arrow circle outline">
+            <a:extLst>
+              <a:ext uri="{FF2B5EF4-FFF2-40B4-BE49-F238E27FC236}">
+                <a16:creationId xmlns:a16="http://schemas.microsoft.com/office/drawing/2014/main" id="{69A1DD3B-1429-5095-97E9-E24FC3D1C916}"/>
+              </a:ext>
+            </a:extLst>
+          </p:cNvPr>
+          <p:cNvPicPr>
+            <a:picLocks noChangeAspect="1"/>
+          </p:cNvPicPr>
+          <p:nvPr/>
+        </p:nvPicPr>
+        <p:blipFill>
+          <a:blip r:embed="rId8">
+            <a:extLst>
+              <a:ext uri="{96DAC541-7B7A-43D3-8B79-37D633B846F1}">
+                <asvg:svgBlip xmlns:asvg="http://schemas.microsoft.com/office/drawing/2016/SVG/main" r:embed="rId9"/>
+              </a:ext>
+            </a:extLst>
+          </a:blip>
+          <a:stretch>
+            <a:fillRect/>
+          </a:stretch>
+        </p:blipFill>
+        <p:spPr>
+          <a:xfrm>
+            <a:off x="1062570" y="1179576"/>
+            <a:ext cx="584718" cy="914400"/>
+          </a:xfrm>
+          <a:prstGeom prst="rect">
+            <a:avLst/>
+          </a:prstGeom>
+        </p:spPr>
+      </p:pic>
+      <p:pic>
+        <p:nvPicPr>
+          <p:cNvPr id="25" name="Graphic 24" descr="Arrow circle outline">
+            <a:extLst>
+              <a:ext uri="{FF2B5EF4-FFF2-40B4-BE49-F238E27FC236}">
+                <a16:creationId xmlns:a16="http://schemas.microsoft.com/office/drawing/2014/main" id="{66756638-6BBF-53EC-3318-56C044F2A57F}"/>
+              </a:ext>
+            </a:extLst>
+          </p:cNvPr>
+          <p:cNvPicPr>
+            <a:picLocks noChangeAspect="1"/>
+          </p:cNvPicPr>
+          <p:nvPr/>
+        </p:nvPicPr>
+        <p:blipFill>
+          <a:blip r:embed="rId10">
+            <a:extLst>
+              <a:ext uri="{96DAC541-7B7A-43D3-8B79-37D633B846F1}">
+                <asvg:svgBlip xmlns:asvg="http://schemas.microsoft.com/office/drawing/2016/SVG/main" r:embed="rId11"/>
+              </a:ext>
+            </a:extLst>
+          </a:blip>
+          <a:stretch>
+            <a:fillRect/>
+          </a:stretch>
+        </p:blipFill>
+        <p:spPr>
+          <a:xfrm>
+            <a:off x="678913" y="774138"/>
+            <a:ext cx="676016" cy="914400"/>
+          </a:xfrm>
+          <a:prstGeom prst="rect">
+            <a:avLst/>
+          </a:prstGeom>
+        </p:spPr>
+      </p:pic>
+      <p:pic>
+        <p:nvPicPr>
+          <p:cNvPr id="26" name="Picture 25" descr="A group of windmills on a green field&#10;&#10;Description automatically generated">
+            <a:extLst>
+              <a:ext uri="{FF2B5EF4-FFF2-40B4-BE49-F238E27FC236}">
+                <a16:creationId xmlns:a16="http://schemas.microsoft.com/office/drawing/2014/main" id="{A6E354BC-A315-FED2-6095-ADD05A428348}"/>
+              </a:ext>
+            </a:extLst>
+          </p:cNvPr>
+          <p:cNvPicPr>
+            <a:picLocks noChangeAspect="1"/>
+          </p:cNvPicPr>
+          <p:nvPr/>
+        </p:nvPicPr>
+        <p:blipFill>
+          <a:blip r:embed="rId3">
+            <a:extLst>
+              <a:ext uri="{28A0092B-C50C-407E-A947-70E740481C1C}">
+                <a14:useLocalDpi xmlns:a14="http://schemas.microsoft.com/office/drawing/2010/main" val="0"/>
+              </a:ext>
+            </a:extLst>
+          </a:blip>
+          <a:stretch>
+            <a:fillRect/>
+          </a:stretch>
+        </p:blipFill>
+        <p:spPr>
+          <a:xfrm>
+            <a:off x="3031340" y="619081"/>
+            <a:ext cx="1904762" cy="1904762"/>
+          </a:xfrm>
+          <a:prstGeom prst="rect">
+            <a:avLst/>
+          </a:prstGeom>
+          <a:ln w="3175">
+            <a:solidFill>
+              <a:schemeClr val="tx1"/>
+            </a:solidFill>
+          </a:ln>
+        </p:spPr>
+      </p:pic>
+      <p:pic>
+        <p:nvPicPr>
+          <p:cNvPr id="27" name="Graphic 26" descr="Windy with solid fill">
+            <a:extLst>
+              <a:ext uri="{FF2B5EF4-FFF2-40B4-BE49-F238E27FC236}">
+                <a16:creationId xmlns:a16="http://schemas.microsoft.com/office/drawing/2014/main" id="{84F6E1CA-88F2-5610-C9A0-82E1049B29C7}"/>
+              </a:ext>
+            </a:extLst>
+          </p:cNvPr>
+          <p:cNvPicPr>
+            <a:picLocks noChangeAspect="1"/>
+          </p:cNvPicPr>
+          <p:nvPr/>
+        </p:nvPicPr>
+        <p:blipFill>
+          <a:blip r:embed="rId4">
+            <a:extLst>
+              <a:ext uri="{96DAC541-7B7A-43D3-8B79-37D633B846F1}">
+                <asvg:svgBlip xmlns:asvg="http://schemas.microsoft.com/office/drawing/2016/SVG/main" r:embed="rId5"/>
+              </a:ext>
+            </a:extLst>
+          </a:blip>
+          <a:stretch>
+            <a:fillRect/>
+          </a:stretch>
+        </p:blipFill>
+        <p:spPr>
+          <a:xfrm>
+            <a:off x="4076168" y="657316"/>
+            <a:ext cx="342122" cy="342122"/>
+          </a:xfrm>
+          <a:prstGeom prst="rect">
+            <a:avLst/>
+          </a:prstGeom>
+        </p:spPr>
+      </p:pic>
+      <p:pic>
+        <p:nvPicPr>
+          <p:cNvPr id="28" name="Graphic 27" descr="Windy with solid fill">
+            <a:extLst>
+              <a:ext uri="{FF2B5EF4-FFF2-40B4-BE49-F238E27FC236}">
+                <a16:creationId xmlns:a16="http://schemas.microsoft.com/office/drawing/2014/main" id="{54D761D0-8337-CE6D-4C1B-818430B6E540}"/>
+              </a:ext>
+            </a:extLst>
+          </p:cNvPr>
+          <p:cNvPicPr>
+            <a:picLocks noChangeAspect="1"/>
+          </p:cNvPicPr>
+          <p:nvPr/>
+        </p:nvPicPr>
+        <p:blipFill>
+          <a:blip r:embed="rId6">
+            <a:extLst>
+              <a:ext uri="{96DAC541-7B7A-43D3-8B79-37D633B846F1}">
+                <asvg:svgBlip xmlns:asvg="http://schemas.microsoft.com/office/drawing/2016/SVG/main" r:embed="rId7"/>
+              </a:ext>
+            </a:extLst>
+          </a:blip>
+          <a:stretch>
+            <a:fillRect/>
+          </a:stretch>
+        </p:blipFill>
+        <p:spPr>
+          <a:xfrm>
+            <a:off x="4438370" y="1769600"/>
+            <a:ext cx="342122" cy="342122"/>
+          </a:xfrm>
+          <a:prstGeom prst="rect">
+            <a:avLst/>
+          </a:prstGeom>
+        </p:spPr>
+      </p:pic>
+      <p:pic>
+        <p:nvPicPr>
+          <p:cNvPr id="29" name="Graphic 28" descr="Arrow circle outline">
+            <a:extLst>
+              <a:ext uri="{FF2B5EF4-FFF2-40B4-BE49-F238E27FC236}">
+                <a16:creationId xmlns:a16="http://schemas.microsoft.com/office/drawing/2014/main" id="{5634BE16-9156-061F-6AE4-2FB7BE147A6D}"/>
+              </a:ext>
+            </a:extLst>
+          </p:cNvPr>
+          <p:cNvPicPr>
+            <a:picLocks noChangeAspect="1"/>
+          </p:cNvPicPr>
+          <p:nvPr/>
+        </p:nvPicPr>
+        <p:blipFill>
+          <a:blip r:embed="rId8">
+            <a:extLst>
+              <a:ext uri="{96DAC541-7B7A-43D3-8B79-37D633B846F1}">
+                <asvg:svgBlip xmlns:asvg="http://schemas.microsoft.com/office/drawing/2016/SVG/main" r:embed="rId9"/>
+              </a:ext>
+            </a:extLst>
+          </a:blip>
+          <a:stretch>
+            <a:fillRect/>
+          </a:stretch>
+        </p:blipFill>
+        <p:spPr>
+          <a:xfrm>
+            <a:off x="3960672" y="1245988"/>
+            <a:ext cx="584718" cy="914400"/>
+          </a:xfrm>
+          <a:prstGeom prst="rect">
+            <a:avLst/>
+          </a:prstGeom>
+        </p:spPr>
+      </p:pic>
+      <p:pic>
+        <p:nvPicPr>
+          <p:cNvPr id="30" name="Graphic 29" descr="Arrow circle outline">
+            <a:extLst>
+              <a:ext uri="{FF2B5EF4-FFF2-40B4-BE49-F238E27FC236}">
+                <a16:creationId xmlns:a16="http://schemas.microsoft.com/office/drawing/2014/main" id="{D888694F-1F54-8496-C886-C8D260A5B5B0}"/>
+              </a:ext>
+            </a:extLst>
+          </p:cNvPr>
+          <p:cNvPicPr>
+            <a:picLocks noChangeAspect="1"/>
+          </p:cNvPicPr>
+          <p:nvPr/>
+        </p:nvPicPr>
+        <p:blipFill>
+          <a:blip r:embed="rId10">
+            <a:extLst>
+              <a:ext uri="{96DAC541-7B7A-43D3-8B79-37D633B846F1}">
+                <asvg:svgBlip xmlns:asvg="http://schemas.microsoft.com/office/drawing/2016/SVG/main" r:embed="rId11"/>
+              </a:ext>
+            </a:extLst>
+          </a:blip>
+          <a:stretch>
+            <a:fillRect/>
+          </a:stretch>
+        </p:blipFill>
+        <p:spPr>
+          <a:xfrm>
+            <a:off x="4140440" y="722376"/>
+            <a:ext cx="676016" cy="914400"/>
+          </a:xfrm>
+          <a:prstGeom prst="rect">
+            <a:avLst/>
+          </a:prstGeom>
+        </p:spPr>
+      </p:pic>
+      <p:pic>
+        <p:nvPicPr>
+          <p:cNvPr id="31" name="Graphic 30" descr="Windy with solid fill">
+            <a:extLst>
+              <a:ext uri="{FF2B5EF4-FFF2-40B4-BE49-F238E27FC236}">
+                <a16:creationId xmlns:a16="http://schemas.microsoft.com/office/drawing/2014/main" id="{D008220D-60FB-F110-53EE-F74B7844C087}"/>
+              </a:ext>
+            </a:extLst>
+          </p:cNvPr>
+          <p:cNvPicPr>
+            <a:picLocks noChangeAspect="1"/>
+          </p:cNvPicPr>
+          <p:nvPr/>
+        </p:nvPicPr>
+        <p:blipFill>
+          <a:blip r:embed="rId6">
+            <a:extLst>
+              <a:ext uri="{96DAC541-7B7A-43D3-8B79-37D633B846F1}">
+                <asvg:svgBlip xmlns:asvg="http://schemas.microsoft.com/office/drawing/2016/SVG/main" r:embed="rId7"/>
+              </a:ext>
+            </a:extLst>
+          </a:blip>
+          <a:stretch>
+            <a:fillRect/>
+          </a:stretch>
+        </p:blipFill>
+        <p:spPr>
+          <a:xfrm>
+            <a:off x="3118326" y="1803022"/>
+            <a:ext cx="342122" cy="342122"/>
+          </a:xfrm>
+          <a:prstGeom prst="rect">
+            <a:avLst/>
+          </a:prstGeom>
+        </p:spPr>
+      </p:pic>
+      <p:pic>
+        <p:nvPicPr>
+          <p:cNvPr id="33" name="Graphic 32" descr="Line arrow: Rotate left outline">
+            <a:extLst>
+              <a:ext uri="{FF2B5EF4-FFF2-40B4-BE49-F238E27FC236}">
+                <a16:creationId xmlns:a16="http://schemas.microsoft.com/office/drawing/2014/main" id="{B8038DE0-8E0C-B925-3AFC-0C1E77B96500}"/>
+              </a:ext>
+            </a:extLst>
+          </p:cNvPr>
+          <p:cNvPicPr>
+            <a:picLocks noChangeAspect="1"/>
+          </p:cNvPicPr>
+          <p:nvPr/>
+        </p:nvPicPr>
+        <p:blipFill>
+          <a:blip r:embed="rId12">
+            <a:extLst>
+              <a:ext uri="{96DAC541-7B7A-43D3-8B79-37D633B846F1}">
+                <asvg:svgBlip xmlns:asvg="http://schemas.microsoft.com/office/drawing/2016/SVG/main" r:embed="rId13"/>
+              </a:ext>
+            </a:extLst>
+          </a:blip>
+          <a:stretch>
+            <a:fillRect/>
+          </a:stretch>
+        </p:blipFill>
+        <p:spPr>
+          <a:xfrm>
+            <a:off x="1344863" y="655490"/>
+            <a:ext cx="436413" cy="465675"/>
+          </a:xfrm>
+          <a:prstGeom prst="rect">
+            <a:avLst/>
+          </a:prstGeom>
+        </p:spPr>
+      </p:pic>
+      <p:pic>
+        <p:nvPicPr>
+          <p:cNvPr id="35" name="Graphic 34" descr="Line arrow: Rotate left outline">
+            <a:extLst>
+              <a:ext uri="{FF2B5EF4-FFF2-40B4-BE49-F238E27FC236}">
+                <a16:creationId xmlns:a16="http://schemas.microsoft.com/office/drawing/2014/main" id="{A126182D-E899-459A-A54E-591959B61934}"/>
+              </a:ext>
+            </a:extLst>
+          </p:cNvPr>
+          <p:cNvPicPr>
+            <a:picLocks noChangeAspect="1"/>
+          </p:cNvPicPr>
+          <p:nvPr/>
+        </p:nvPicPr>
+        <p:blipFill>
+          <a:blip r:embed="rId12">
+            <a:extLst>
+              <a:ext uri="{96DAC541-7B7A-43D3-8B79-37D633B846F1}">
+                <asvg:svgBlip xmlns:asvg="http://schemas.microsoft.com/office/drawing/2016/SVG/main" r:embed="rId13"/>
+              </a:ext>
+            </a:extLst>
+          </a:blip>
+          <a:stretch>
+            <a:fillRect/>
+          </a:stretch>
+        </p:blipFill>
+        <p:spPr>
+          <a:xfrm rot="10800000">
+            <a:off x="3738315" y="946738"/>
+            <a:ext cx="436413" cy="465675"/>
+          </a:xfrm>
+          <a:prstGeom prst="rect">
+            <a:avLst/>
+          </a:prstGeom>
+        </p:spPr>
+      </p:pic>
+      <p:pic>
+        <p:nvPicPr>
+          <p:cNvPr id="37" name="Picture 36" descr="A wire tower with wires connected to each other&#10;&#10;Description automatically generated with medium confidence">
+            <a:extLst>
+              <a:ext uri="{FF2B5EF4-FFF2-40B4-BE49-F238E27FC236}">
+                <a16:creationId xmlns:a16="http://schemas.microsoft.com/office/drawing/2014/main" id="{53DB7D6A-E2B2-8633-DA7C-8671DFBAB0D7}"/>
+              </a:ext>
+            </a:extLst>
+          </p:cNvPr>
+          <p:cNvPicPr>
+            <a:picLocks noChangeAspect="1"/>
+          </p:cNvPicPr>
+          <p:nvPr/>
+        </p:nvPicPr>
+        <p:blipFill>
+          <a:blip r:embed="rId14">
+            <a:extLst>
+              <a:ext uri="{28A0092B-C50C-407E-A947-70E740481C1C}">
+                <a14:useLocalDpi xmlns:a14="http://schemas.microsoft.com/office/drawing/2010/main" val="0"/>
+              </a:ext>
+            </a:extLst>
+          </a:blip>
+          <a:stretch>
+            <a:fillRect/>
+          </a:stretch>
+        </p:blipFill>
+        <p:spPr>
+          <a:xfrm>
+            <a:off x="1283297" y="3198404"/>
+            <a:ext cx="5714286" cy="1238095"/>
+          </a:xfrm>
+          <a:prstGeom prst="rect">
+            <a:avLst/>
+          </a:prstGeom>
+          <a:ln w="3175">
+            <a:solidFill>
+              <a:schemeClr val="tx1"/>
+            </a:solidFill>
+          </a:ln>
+        </p:spPr>
+      </p:pic>
+      <p:sp>
+        <p:nvSpPr>
+          <p:cNvPr id="38" name="Arrow: Left 37">
+            <a:extLst>
+              <a:ext uri="{FF2B5EF4-FFF2-40B4-BE49-F238E27FC236}">
+                <a16:creationId xmlns:a16="http://schemas.microsoft.com/office/drawing/2014/main" id="{8005ADB1-85FF-46F0-608F-EDFB784806AC}"/>
+              </a:ext>
+            </a:extLst>
+          </p:cNvPr>
+          <p:cNvSpPr/>
+          <p:nvPr/>
+        </p:nvSpPr>
+        <p:spPr>
+          <a:xfrm rot="10800000">
+            <a:off x="2343140" y="3511296"/>
+            <a:ext cx="409204" cy="100584"/>
+          </a:xfrm>
+          <a:prstGeom prst="leftArrow">
+            <a:avLst/>
+          </a:prstGeom>
+        </p:spPr>
+        <p:style>
+          <a:lnRef idx="2">
+            <a:schemeClr val="accent6">
+              <a:shade val="15000"/>
+            </a:schemeClr>
+          </a:lnRef>
+          <a:fillRef idx="1">
+            <a:schemeClr val="accent6"/>
+          </a:fillRef>
+          <a:effectRef idx="0">
+            <a:schemeClr val="accent6"/>
+          </a:effectRef>
+          <a:fontRef idx="minor">
+            <a:schemeClr val="lt1"/>
+          </a:fontRef>
+        </p:style>
+        <p:txBody>
+          <a:bodyPr rtlCol="0" anchor="ctr"/>
+          <a:lstStyle/>
+          <a:p>
+            <a:pPr algn="ctr"/>
+            <a:endParaRPr lang="en-SG"/>
+          </a:p>
+        </p:txBody>
+      </p:sp>
+      <p:pic>
+        <p:nvPicPr>
+          <p:cNvPr id="39" name="Graphic 38" descr="High voltage with solid fill">
+            <a:extLst>
+              <a:ext uri="{FF2B5EF4-FFF2-40B4-BE49-F238E27FC236}">
+                <a16:creationId xmlns:a16="http://schemas.microsoft.com/office/drawing/2014/main" id="{E8CB0771-C5A8-2EF7-1F57-EB8E08F7668B}"/>
+              </a:ext>
+            </a:extLst>
+          </p:cNvPr>
+          <p:cNvPicPr>
+            <a:picLocks noChangeAspect="1"/>
+          </p:cNvPicPr>
+          <p:nvPr/>
+        </p:nvPicPr>
+        <p:blipFill>
+          <a:blip r:embed="rId15">
+            <a:extLst>
+              <a:ext uri="{96DAC541-7B7A-43D3-8B79-37D633B846F1}">
+                <asvg:svgBlip xmlns:asvg="http://schemas.microsoft.com/office/drawing/2016/SVG/main" r:embed="rId16"/>
+              </a:ext>
+            </a:extLst>
+          </a:blip>
+          <a:stretch>
+            <a:fillRect/>
+          </a:stretch>
+        </p:blipFill>
+        <p:spPr>
+          <a:xfrm>
+            <a:off x="6693874" y="3207587"/>
+            <a:ext cx="303709" cy="303709"/>
+          </a:xfrm>
+          <a:prstGeom prst="rect">
+            <a:avLst/>
+          </a:prstGeom>
+        </p:spPr>
+      </p:pic>
+      <p:pic>
+        <p:nvPicPr>
+          <p:cNvPr id="40" name="Graphic 39" descr="High voltage with solid fill">
+            <a:extLst>
+              <a:ext uri="{FF2B5EF4-FFF2-40B4-BE49-F238E27FC236}">
+                <a16:creationId xmlns:a16="http://schemas.microsoft.com/office/drawing/2014/main" id="{08139FDD-4FB9-97FE-FD8F-467B93BA02C3}"/>
+              </a:ext>
+            </a:extLst>
+          </p:cNvPr>
+          <p:cNvPicPr>
+            <a:picLocks noChangeAspect="1"/>
+          </p:cNvPicPr>
+          <p:nvPr/>
+        </p:nvPicPr>
+        <p:blipFill>
+          <a:blip r:embed="rId17">
+            <a:extLst>
+              <a:ext uri="{96DAC541-7B7A-43D3-8B79-37D633B846F1}">
+                <asvg:svgBlip xmlns:asvg="http://schemas.microsoft.com/office/drawing/2016/SVG/main" r:embed="rId18"/>
+              </a:ext>
+            </a:extLst>
+          </a:blip>
+          <a:stretch>
+            <a:fillRect/>
+          </a:stretch>
+        </p:blipFill>
+        <p:spPr>
+          <a:xfrm>
+            <a:off x="1297921" y="3207587"/>
+            <a:ext cx="303709" cy="303709"/>
+          </a:xfrm>
+          <a:prstGeom prst="rect">
+            <a:avLst/>
+          </a:prstGeom>
+        </p:spPr>
+      </p:pic>
+      <p:sp>
+        <p:nvSpPr>
+          <p:cNvPr id="43" name="Arrow: Left 42">
+            <a:extLst>
+              <a:ext uri="{FF2B5EF4-FFF2-40B4-BE49-F238E27FC236}">
+                <a16:creationId xmlns:a16="http://schemas.microsoft.com/office/drawing/2014/main" id="{3440ACC0-0194-FADC-0730-3DCF963951D3}"/>
+              </a:ext>
+            </a:extLst>
+          </p:cNvPr>
+          <p:cNvSpPr/>
+          <p:nvPr/>
+        </p:nvSpPr>
+        <p:spPr>
+          <a:xfrm rot="10800000">
+            <a:off x="5449052" y="3511296"/>
+            <a:ext cx="409204" cy="100584"/>
+          </a:xfrm>
+          <a:prstGeom prst="leftArrow">
+            <a:avLst/>
+          </a:prstGeom>
+        </p:spPr>
+        <p:style>
+          <a:lnRef idx="2">
+            <a:schemeClr val="accent6">
+              <a:shade val="15000"/>
+            </a:schemeClr>
+          </a:lnRef>
+          <a:fillRef idx="1">
+            <a:schemeClr val="accent6"/>
+          </a:fillRef>
+          <a:effectRef idx="0">
+            <a:schemeClr val="accent6"/>
+          </a:effectRef>
+          <a:fontRef idx="minor">
+            <a:schemeClr val="lt1"/>
+          </a:fontRef>
+        </p:style>
+        <p:txBody>
+          <a:bodyPr rtlCol="0" anchor="ctr"/>
+          <a:lstStyle/>
+          <a:p>
+            <a:pPr algn="ctr"/>
+            <a:endParaRPr lang="en-SG"/>
+          </a:p>
+        </p:txBody>
+      </p:sp>
+      <p:sp>
+        <p:nvSpPr>
+          <p:cNvPr id="44" name="Arrow: Left 43">
+            <a:extLst>
+              <a:ext uri="{FF2B5EF4-FFF2-40B4-BE49-F238E27FC236}">
+                <a16:creationId xmlns:a16="http://schemas.microsoft.com/office/drawing/2014/main" id="{A77F41A5-2748-4AA3-2E55-394A10E4E2A1}"/>
+              </a:ext>
+            </a:extLst>
+          </p:cNvPr>
+          <p:cNvSpPr/>
+          <p:nvPr/>
+        </p:nvSpPr>
+        <p:spPr>
+          <a:xfrm rot="10800000">
+            <a:off x="3838025" y="3511297"/>
+            <a:ext cx="409204" cy="100584"/>
+          </a:xfrm>
+          <a:prstGeom prst="leftArrow">
+            <a:avLst/>
+          </a:prstGeom>
+          <a:solidFill>
+            <a:schemeClr val="accent1">
+              <a:lumMod val="60000"/>
+              <a:lumOff val="40000"/>
+            </a:schemeClr>
+          </a:solidFill>
+        </p:spPr>
+        <p:style>
+          <a:lnRef idx="2">
+            <a:schemeClr val="accent6">
+              <a:shade val="15000"/>
+            </a:schemeClr>
+          </a:lnRef>
+          <a:fillRef idx="1">
+            <a:schemeClr val="accent6"/>
+          </a:fillRef>
+          <a:effectRef idx="0">
+            <a:schemeClr val="accent6"/>
+          </a:effectRef>
+          <a:fontRef idx="minor">
+            <a:schemeClr val="lt1"/>
+          </a:fontRef>
+        </p:style>
+        <p:txBody>
+          <a:bodyPr rtlCol="0" anchor="ctr"/>
+          <a:lstStyle/>
+          <a:p>
+            <a:pPr algn="ctr"/>
+            <a:endParaRPr lang="en-SG"/>
+          </a:p>
+        </p:txBody>
+      </p:sp>
+      <p:pic>
+        <p:nvPicPr>
+          <p:cNvPr id="45" name="Picture 44" descr="A wire tower with wires connected to each other&#10;&#10;Description automatically generated with medium confidence">
+            <a:extLst>
+              <a:ext uri="{FF2B5EF4-FFF2-40B4-BE49-F238E27FC236}">
+                <a16:creationId xmlns:a16="http://schemas.microsoft.com/office/drawing/2014/main" id="{F78C87B4-A83E-E645-AF57-BA2FDCBECCC6}"/>
+              </a:ext>
+            </a:extLst>
+          </p:cNvPr>
+          <p:cNvPicPr>
+            <a:picLocks noChangeAspect="1"/>
+          </p:cNvPicPr>
+          <p:nvPr/>
+        </p:nvPicPr>
+        <p:blipFill>
+          <a:blip r:embed="rId14">
+            <a:extLst>
+              <a:ext uri="{28A0092B-C50C-407E-A947-70E740481C1C}">
+                <a14:useLocalDpi xmlns:a14="http://schemas.microsoft.com/office/drawing/2010/main" val="0"/>
+              </a:ext>
+            </a:extLst>
+          </a:blip>
+          <a:stretch>
+            <a:fillRect/>
+          </a:stretch>
+        </p:blipFill>
+        <p:spPr>
+          <a:xfrm>
+            <a:off x="1283297" y="4860953"/>
+            <a:ext cx="5714286" cy="1238095"/>
+          </a:xfrm>
+          <a:prstGeom prst="rect">
+            <a:avLst/>
+          </a:prstGeom>
+          <a:ln w="3175">
+            <a:solidFill>
+              <a:schemeClr val="tx1"/>
+            </a:solidFill>
+          </a:ln>
+        </p:spPr>
+      </p:pic>
+      <p:sp>
+        <p:nvSpPr>
+          <p:cNvPr id="46" name="Arrow: Left 45">
+            <a:extLst>
+              <a:ext uri="{FF2B5EF4-FFF2-40B4-BE49-F238E27FC236}">
+                <a16:creationId xmlns:a16="http://schemas.microsoft.com/office/drawing/2014/main" id="{7965A904-166A-DE0E-891F-46822D272DF0}"/>
+              </a:ext>
+            </a:extLst>
+          </p:cNvPr>
+          <p:cNvSpPr/>
+          <p:nvPr/>
+        </p:nvSpPr>
+        <p:spPr>
+          <a:xfrm rot="10800000">
+            <a:off x="2343140" y="5173845"/>
+            <a:ext cx="409204" cy="100584"/>
+          </a:xfrm>
+          <a:prstGeom prst="leftArrow">
+            <a:avLst/>
+          </a:prstGeom>
+          <a:solidFill>
+            <a:schemeClr val="accent1">
+              <a:lumMod val="60000"/>
+              <a:lumOff val="40000"/>
+            </a:schemeClr>
+          </a:solidFill>
+        </p:spPr>
+        <p:style>
+          <a:lnRef idx="2">
+            <a:schemeClr val="accent6">
+              <a:shade val="15000"/>
+            </a:schemeClr>
+          </a:lnRef>
+          <a:fillRef idx="1">
+            <a:schemeClr val="accent6"/>
+          </a:fillRef>
+          <a:effectRef idx="0">
+            <a:schemeClr val="accent6"/>
+          </a:effectRef>
+          <a:fontRef idx="minor">
+            <a:schemeClr val="lt1"/>
+          </a:fontRef>
+        </p:style>
+        <p:txBody>
+          <a:bodyPr rtlCol="0" anchor="ctr"/>
+          <a:lstStyle/>
+          <a:p>
+            <a:pPr algn="ctr"/>
+            <a:endParaRPr lang="en-SG"/>
+          </a:p>
+        </p:txBody>
+      </p:sp>
+      <p:pic>
+        <p:nvPicPr>
+          <p:cNvPr id="47" name="Graphic 46" descr="High voltage with solid fill">
+            <a:extLst>
+              <a:ext uri="{FF2B5EF4-FFF2-40B4-BE49-F238E27FC236}">
+                <a16:creationId xmlns:a16="http://schemas.microsoft.com/office/drawing/2014/main" id="{25640BE5-B65E-BCDF-B7D8-61D41341E4EB}"/>
+              </a:ext>
+            </a:extLst>
+          </p:cNvPr>
+          <p:cNvPicPr>
+            <a:picLocks noChangeAspect="1"/>
+          </p:cNvPicPr>
+          <p:nvPr/>
+        </p:nvPicPr>
+        <p:blipFill>
+          <a:blip r:embed="rId17">
+            <a:extLst>
+              <a:ext uri="{96DAC541-7B7A-43D3-8B79-37D633B846F1}">
+                <asvg:svgBlip xmlns:asvg="http://schemas.microsoft.com/office/drawing/2016/SVG/main" r:embed="rId18"/>
+              </a:ext>
+            </a:extLst>
+          </a:blip>
+          <a:stretch>
+            <a:fillRect/>
+          </a:stretch>
+        </p:blipFill>
+        <p:spPr>
+          <a:xfrm>
+            <a:off x="6693874" y="4870136"/>
+            <a:ext cx="303709" cy="303709"/>
+          </a:xfrm>
+          <a:prstGeom prst="rect">
+            <a:avLst/>
+          </a:prstGeom>
+        </p:spPr>
+      </p:pic>
+      <p:pic>
+        <p:nvPicPr>
+          <p:cNvPr id="48" name="Graphic 47" descr="High voltage with solid fill">
+            <a:extLst>
+              <a:ext uri="{FF2B5EF4-FFF2-40B4-BE49-F238E27FC236}">
+                <a16:creationId xmlns:a16="http://schemas.microsoft.com/office/drawing/2014/main" id="{26DB5B80-E6D9-3A59-FC42-5B86991E3EF1}"/>
+              </a:ext>
+            </a:extLst>
+          </p:cNvPr>
+          <p:cNvPicPr>
+            <a:picLocks noChangeAspect="1"/>
+          </p:cNvPicPr>
+          <p:nvPr/>
+        </p:nvPicPr>
+        <p:blipFill>
+          <a:blip r:embed="rId15">
+            <a:extLst>
+              <a:ext uri="{96DAC541-7B7A-43D3-8B79-37D633B846F1}">
+                <asvg:svgBlip xmlns:asvg="http://schemas.microsoft.com/office/drawing/2016/SVG/main" r:embed="rId16"/>
+              </a:ext>
+            </a:extLst>
+          </a:blip>
+          <a:stretch>
+            <a:fillRect/>
+          </a:stretch>
+        </p:blipFill>
+        <p:spPr>
+          <a:xfrm>
+            <a:off x="1297921" y="4870136"/>
+            <a:ext cx="303709" cy="303709"/>
+          </a:xfrm>
+          <a:prstGeom prst="rect">
+            <a:avLst/>
+          </a:prstGeom>
+        </p:spPr>
+      </p:pic>
+      <p:sp>
+        <p:nvSpPr>
+          <p:cNvPr id="49" name="Arrow: Left 48">
+            <a:extLst>
+              <a:ext uri="{FF2B5EF4-FFF2-40B4-BE49-F238E27FC236}">
+                <a16:creationId xmlns:a16="http://schemas.microsoft.com/office/drawing/2014/main" id="{5D6FDDFD-35A5-3A0C-B575-D99A950D1CFE}"/>
+              </a:ext>
+            </a:extLst>
+          </p:cNvPr>
+          <p:cNvSpPr/>
+          <p:nvPr/>
+        </p:nvSpPr>
+        <p:spPr>
+          <a:xfrm rot="10800000">
+            <a:off x="5449052" y="5173845"/>
+            <a:ext cx="409204" cy="100584"/>
+          </a:xfrm>
+          <a:prstGeom prst="leftArrow">
+            <a:avLst/>
+          </a:prstGeom>
+          <a:solidFill>
+            <a:schemeClr val="accent1">
+              <a:lumMod val="60000"/>
+              <a:lumOff val="40000"/>
+            </a:schemeClr>
+          </a:solidFill>
+        </p:spPr>
+        <p:style>
+          <a:lnRef idx="2">
+            <a:schemeClr val="accent6">
+              <a:shade val="15000"/>
+            </a:schemeClr>
+          </a:lnRef>
+          <a:fillRef idx="1">
+            <a:schemeClr val="accent6"/>
+          </a:fillRef>
+          <a:effectRef idx="0">
+            <a:schemeClr val="accent6"/>
+          </a:effectRef>
+          <a:fontRef idx="minor">
+            <a:schemeClr val="lt1"/>
+          </a:fontRef>
+        </p:style>
+        <p:txBody>
+          <a:bodyPr rtlCol="0" anchor="ctr"/>
+          <a:lstStyle/>
+          <a:p>
+            <a:pPr algn="ctr"/>
+            <a:endParaRPr lang="en-SG"/>
+          </a:p>
+        </p:txBody>
+      </p:sp>
+      <p:sp>
+        <p:nvSpPr>
+          <p:cNvPr id="50" name="Arrow: Left 49">
+            <a:extLst>
+              <a:ext uri="{FF2B5EF4-FFF2-40B4-BE49-F238E27FC236}">
+                <a16:creationId xmlns:a16="http://schemas.microsoft.com/office/drawing/2014/main" id="{B2BE382C-C702-65B1-1BCF-3B834888EBEE}"/>
+              </a:ext>
+            </a:extLst>
+          </p:cNvPr>
+          <p:cNvSpPr/>
+          <p:nvPr/>
+        </p:nvSpPr>
+        <p:spPr>
+          <a:xfrm rot="10800000">
+            <a:off x="3838025" y="5173846"/>
+            <a:ext cx="409204" cy="100584"/>
+          </a:xfrm>
+          <a:prstGeom prst="leftArrow">
+            <a:avLst/>
+          </a:prstGeom>
+          <a:solidFill>
+            <a:srgbClr val="00B050"/>
+          </a:solidFill>
+        </p:spPr>
+        <p:style>
+          <a:lnRef idx="2">
+            <a:schemeClr val="accent6">
+              <a:shade val="15000"/>
+            </a:schemeClr>
+          </a:lnRef>
+          <a:fillRef idx="1">
+            <a:schemeClr val="accent6"/>
+          </a:fillRef>
+          <a:effectRef idx="0">
+            <a:schemeClr val="accent6"/>
+          </a:effectRef>
+          <a:fontRef idx="minor">
+            <a:schemeClr val="lt1"/>
+          </a:fontRef>
+        </p:style>
+        <p:txBody>
+          <a:bodyPr rtlCol="0" anchor="ctr"/>
+          <a:lstStyle/>
+          <a:p>
+            <a:pPr algn="ctr"/>
+            <a:endParaRPr lang="en-SG"/>
+          </a:p>
+        </p:txBody>
+      </p:sp>
+      <p:pic>
+        <p:nvPicPr>
+          <p:cNvPr id="52" name="Picture 51" descr="A black and white circular object with a circular object in the middle&#10;&#10;Description automatically generated">
+            <a:extLst>
+              <a:ext uri="{FF2B5EF4-FFF2-40B4-BE49-F238E27FC236}">
+                <a16:creationId xmlns:a16="http://schemas.microsoft.com/office/drawing/2014/main" id="{AE5777D2-9F32-E138-E210-1B8B6BCE0117}"/>
+              </a:ext>
+            </a:extLst>
+          </p:cNvPr>
+          <p:cNvPicPr>
+            <a:picLocks noChangeAspect="1"/>
+          </p:cNvPicPr>
+          <p:nvPr/>
+        </p:nvPicPr>
+        <p:blipFill>
+          <a:blip r:embed="rId19">
+            <a:extLst>
+              <a:ext uri="{28A0092B-C50C-407E-A947-70E740481C1C}">
+                <a14:useLocalDpi xmlns:a14="http://schemas.microsoft.com/office/drawing/2010/main" val="0"/>
+              </a:ext>
+            </a:extLst>
+          </a:blip>
+          <a:stretch>
+            <a:fillRect/>
+          </a:stretch>
+        </p:blipFill>
+        <p:spPr>
+          <a:xfrm>
+            <a:off x="7856946" y="919996"/>
+            <a:ext cx="609601" cy="609601"/>
+          </a:xfrm>
+          <a:prstGeom prst="rect">
+            <a:avLst/>
+          </a:prstGeom>
+          <a:ln w="3175">
+            <a:solidFill>
+              <a:schemeClr val="tx1"/>
+            </a:solidFill>
+          </a:ln>
+        </p:spPr>
+      </p:pic>
+      <p:pic>
+        <p:nvPicPr>
+          <p:cNvPr id="54" name="Graphic 53" descr="Arrow circle with solid fill">
+            <a:extLst>
+              <a:ext uri="{FF2B5EF4-FFF2-40B4-BE49-F238E27FC236}">
+                <a16:creationId xmlns:a16="http://schemas.microsoft.com/office/drawing/2014/main" id="{95D3D0E4-20D8-FB92-A651-CADB9EDE5685}"/>
+              </a:ext>
+            </a:extLst>
+          </p:cNvPr>
+          <p:cNvPicPr>
+            <a:picLocks noChangeAspect="1"/>
+          </p:cNvPicPr>
+          <p:nvPr/>
+        </p:nvPicPr>
+        <p:blipFill>
+          <a:blip r:embed="rId20">
+            <a:extLst>
+              <a:ext uri="{96DAC541-7B7A-43D3-8B79-37D633B846F1}">
+                <asvg:svgBlip xmlns:asvg="http://schemas.microsoft.com/office/drawing/2016/SVG/main" r:embed="rId21"/>
+              </a:ext>
+            </a:extLst>
+          </a:blip>
+          <a:stretch>
+            <a:fillRect/>
+          </a:stretch>
+        </p:blipFill>
+        <p:spPr>
+          <a:xfrm>
+            <a:off x="7847801" y="926537"/>
+            <a:ext cx="609601" cy="609601"/>
+          </a:xfrm>
+          <a:prstGeom prst="rect">
+            <a:avLst/>
+          </a:prstGeom>
+        </p:spPr>
+      </p:pic>
+      <p:pic>
+        <p:nvPicPr>
+          <p:cNvPr id="55" name="Picture 54" descr="A black and white circular object with a circular object in the middle&#10;&#10;Description automatically generated">
+            <a:extLst>
+              <a:ext uri="{FF2B5EF4-FFF2-40B4-BE49-F238E27FC236}">
+                <a16:creationId xmlns:a16="http://schemas.microsoft.com/office/drawing/2014/main" id="{08E3AEAB-0309-85FA-A275-4D51129A411A}"/>
+              </a:ext>
+            </a:extLst>
+          </p:cNvPr>
+          <p:cNvPicPr>
+            <a:picLocks noChangeAspect="1"/>
+          </p:cNvPicPr>
+          <p:nvPr/>
+        </p:nvPicPr>
+        <p:blipFill>
+          <a:blip r:embed="rId19">
+            <a:extLst>
+              <a:ext uri="{28A0092B-C50C-407E-A947-70E740481C1C}">
+                <a14:useLocalDpi xmlns:a14="http://schemas.microsoft.com/office/drawing/2010/main" val="0"/>
+              </a:ext>
+            </a:extLst>
+          </a:blip>
+          <a:stretch>
+            <a:fillRect/>
+          </a:stretch>
+        </p:blipFill>
+        <p:spPr>
+          <a:xfrm>
+            <a:off x="9160660" y="903249"/>
+            <a:ext cx="609601" cy="609601"/>
+          </a:xfrm>
+          <a:prstGeom prst="rect">
+            <a:avLst/>
+          </a:prstGeom>
+          <a:ln w="3175">
+            <a:solidFill>
+              <a:schemeClr val="tx1"/>
+            </a:solidFill>
+          </a:ln>
+        </p:spPr>
+      </p:pic>
+      <p:pic>
+        <p:nvPicPr>
+          <p:cNvPr id="56" name="Graphic 55" descr="Arrow circle with solid fill">
+            <a:extLst>
+              <a:ext uri="{FF2B5EF4-FFF2-40B4-BE49-F238E27FC236}">
+                <a16:creationId xmlns:a16="http://schemas.microsoft.com/office/drawing/2014/main" id="{FF0008B8-8639-40E4-36FF-B9E262261B6F}"/>
+              </a:ext>
+            </a:extLst>
+          </p:cNvPr>
+          <p:cNvPicPr>
+            <a:picLocks noChangeAspect="1"/>
+          </p:cNvPicPr>
+          <p:nvPr/>
+        </p:nvPicPr>
+        <p:blipFill>
+          <a:blip r:embed="rId20">
+            <a:extLst>
+              <a:ext uri="{96DAC541-7B7A-43D3-8B79-37D633B846F1}">
+                <asvg:svgBlip xmlns:asvg="http://schemas.microsoft.com/office/drawing/2016/SVG/main" r:embed="rId22"/>
+              </a:ext>
+            </a:extLst>
+          </a:blip>
+          <a:stretch>
+            <a:fillRect/>
+          </a:stretch>
+        </p:blipFill>
+        <p:spPr>
+          <a:xfrm rot="3524770">
+            <a:off x="9151513" y="903250"/>
+            <a:ext cx="609601" cy="609601"/>
+          </a:xfrm>
+          <a:prstGeom prst="rect">
+            <a:avLst/>
+          </a:prstGeom>
+        </p:spPr>
+      </p:pic>
+      <p:pic>
+        <p:nvPicPr>
+          <p:cNvPr id="57" name="Graphic 56" descr="High voltage with solid fill">
+            <a:extLst>
+              <a:ext uri="{FF2B5EF4-FFF2-40B4-BE49-F238E27FC236}">
+                <a16:creationId xmlns:a16="http://schemas.microsoft.com/office/drawing/2014/main" id="{7C26F499-89B0-6D44-F8D8-BE1A6CCDBEAD}"/>
+              </a:ext>
+            </a:extLst>
+          </p:cNvPr>
+          <p:cNvPicPr>
+            <a:picLocks noChangeAspect="1"/>
+          </p:cNvPicPr>
+          <p:nvPr/>
+        </p:nvPicPr>
+        <p:blipFill>
+          <a:blip r:embed="rId15">
+            <a:extLst>
+              <a:ext uri="{96DAC541-7B7A-43D3-8B79-37D633B846F1}">
+                <asvg:svgBlip xmlns:asvg="http://schemas.microsoft.com/office/drawing/2016/SVG/main" r:embed="rId16"/>
+              </a:ext>
+            </a:extLst>
+          </a:blip>
+          <a:stretch>
+            <a:fillRect/>
+          </a:stretch>
+        </p:blipFill>
+        <p:spPr>
+          <a:xfrm>
+            <a:off x="8299202" y="1357045"/>
+            <a:ext cx="176490" cy="176490"/>
+          </a:xfrm>
+          <a:prstGeom prst="rect">
+            <a:avLst/>
+          </a:prstGeom>
+        </p:spPr>
+      </p:pic>
+      <p:pic>
+        <p:nvPicPr>
+          <p:cNvPr id="58" name="Graphic 57" descr="High voltage with solid fill">
+            <a:extLst>
+              <a:ext uri="{FF2B5EF4-FFF2-40B4-BE49-F238E27FC236}">
+                <a16:creationId xmlns:a16="http://schemas.microsoft.com/office/drawing/2014/main" id="{3B0D2384-4AF5-8F49-F23D-4AB5850141DE}"/>
+              </a:ext>
+            </a:extLst>
+          </p:cNvPr>
+          <p:cNvPicPr>
+            <a:picLocks noChangeAspect="1"/>
+          </p:cNvPicPr>
+          <p:nvPr/>
+        </p:nvPicPr>
+        <p:blipFill>
+          <a:blip r:embed="rId23">
+            <a:extLst>
+              <a:ext uri="{96DAC541-7B7A-43D3-8B79-37D633B846F1}">
+                <asvg:svgBlip xmlns:asvg="http://schemas.microsoft.com/office/drawing/2016/SVG/main" r:embed="rId24"/>
+              </a:ext>
+            </a:extLst>
+          </a:blip>
+          <a:stretch>
+            <a:fillRect/>
+          </a:stretch>
+        </p:blipFill>
+        <p:spPr>
+          <a:xfrm>
+            <a:off x="9593771" y="1331627"/>
+            <a:ext cx="176490" cy="176490"/>
+          </a:xfrm>
+          <a:prstGeom prst="rect">
+            <a:avLst/>
+          </a:prstGeom>
+        </p:spPr>
+      </p:pic>
+      <p:cxnSp>
+        <p:nvCxnSpPr>
+          <p:cNvPr id="60" name="Straight Arrow Connector 59">
+            <a:extLst>
+              <a:ext uri="{FF2B5EF4-FFF2-40B4-BE49-F238E27FC236}">
+                <a16:creationId xmlns:a16="http://schemas.microsoft.com/office/drawing/2014/main" id="{E6EC85AC-A229-2638-23AA-A5321AABDB40}"/>
+              </a:ext>
+            </a:extLst>
+          </p:cNvPr>
+          <p:cNvCxnSpPr>
+            <a:cxnSpLocks/>
+          </p:cNvCxnSpPr>
+          <p:nvPr/>
+        </p:nvCxnSpPr>
+        <p:spPr>
+          <a:xfrm>
+            <a:off x="8063561" y="1224796"/>
+            <a:ext cx="226201" cy="0"/>
+          </a:xfrm>
+          <a:prstGeom prst="straightConnector1">
+            <a:avLst/>
+          </a:prstGeom>
+          <a:ln>
+            <a:solidFill>
+              <a:srgbClr val="FFC000"/>
+            </a:solidFill>
+            <a:tailEnd type="triangle"/>
+          </a:ln>
+        </p:spPr>
+        <p:style>
+          <a:lnRef idx="2">
+            <a:schemeClr val="accent1"/>
+          </a:lnRef>
+          <a:fillRef idx="0">
+            <a:schemeClr val="accent1"/>
+          </a:fillRef>
+          <a:effectRef idx="1">
+            <a:schemeClr val="accent1"/>
+          </a:effectRef>
+          <a:fontRef idx="minor">
+            <a:schemeClr val="tx1"/>
+          </a:fontRef>
+        </p:style>
+      </p:cxnSp>
+      <p:cxnSp>
+        <p:nvCxnSpPr>
+          <p:cNvPr id="62" name="Straight Arrow Connector 61">
+            <a:extLst>
+              <a:ext uri="{FF2B5EF4-FFF2-40B4-BE49-F238E27FC236}">
+                <a16:creationId xmlns:a16="http://schemas.microsoft.com/office/drawing/2014/main" id="{CF4AAAF5-5D5E-518E-5819-D7874916956C}"/>
+              </a:ext>
+            </a:extLst>
+          </p:cNvPr>
+          <p:cNvCxnSpPr>
+            <a:cxnSpLocks/>
+          </p:cNvCxnSpPr>
+          <p:nvPr/>
+        </p:nvCxnSpPr>
+        <p:spPr>
+          <a:xfrm>
+            <a:off x="9367570" y="1202960"/>
+            <a:ext cx="226201" cy="0"/>
+          </a:xfrm>
+          <a:prstGeom prst="straightConnector1">
+            <a:avLst/>
+          </a:prstGeom>
+          <a:ln>
+            <a:solidFill>
+              <a:srgbClr val="00B050"/>
+            </a:solidFill>
+            <a:tailEnd type="triangle"/>
+          </a:ln>
+        </p:spPr>
+        <p:style>
+          <a:lnRef idx="2">
+            <a:schemeClr val="accent1"/>
+          </a:lnRef>
+          <a:fillRef idx="0">
+            <a:schemeClr val="accent1"/>
+          </a:fillRef>
+          <a:effectRef idx="1">
+            <a:schemeClr val="accent1"/>
+          </a:effectRef>
+          <a:fontRef idx="minor">
+            <a:schemeClr val="tx1"/>
+          </a:fontRef>
+        </p:style>
+      </p:cxnSp>
+      <p:pic>
+        <p:nvPicPr>
+          <p:cNvPr id="66" name="Graphic 65" descr="Chevron arrows with solid fill">
+            <a:extLst>
+              <a:ext uri="{FF2B5EF4-FFF2-40B4-BE49-F238E27FC236}">
+                <a16:creationId xmlns:a16="http://schemas.microsoft.com/office/drawing/2014/main" id="{80CD8186-C079-EDA5-36E7-6FD911E58CAD}"/>
+              </a:ext>
+            </a:extLst>
+          </p:cNvPr>
+          <p:cNvPicPr>
+            <a:picLocks noChangeAspect="1"/>
+          </p:cNvPicPr>
+          <p:nvPr/>
+        </p:nvPicPr>
+        <p:blipFill>
+          <a:blip r:embed="rId25">
+            <a:extLst>
+              <a:ext uri="{96DAC541-7B7A-43D3-8B79-37D633B846F1}">
+                <asvg:svgBlip xmlns:asvg="http://schemas.microsoft.com/office/drawing/2016/SVG/main" r:embed="rId26"/>
+              </a:ext>
+            </a:extLst>
+          </a:blip>
+          <a:stretch>
+            <a:fillRect/>
+          </a:stretch>
+        </p:blipFill>
+        <p:spPr>
+          <a:xfrm rot="5400000">
+            <a:off x="8499918" y="3427908"/>
+            <a:ext cx="250824" cy="253008"/>
+          </a:xfrm>
+          <a:prstGeom prst="rect">
+            <a:avLst/>
+          </a:prstGeom>
+        </p:spPr>
+      </p:pic>
+      <p:pic>
+        <p:nvPicPr>
+          <p:cNvPr id="74" name="Graphic 73" descr="Speedometer Middle with solid fill">
+            <a:extLst>
+              <a:ext uri="{FF2B5EF4-FFF2-40B4-BE49-F238E27FC236}">
+                <a16:creationId xmlns:a16="http://schemas.microsoft.com/office/drawing/2014/main" id="{074B8C5E-5506-E76C-3C61-C0513E5DF613}"/>
+              </a:ext>
+            </a:extLst>
+          </p:cNvPr>
+          <p:cNvPicPr>
+            <a:picLocks noChangeAspect="1"/>
+          </p:cNvPicPr>
+          <p:nvPr/>
+        </p:nvPicPr>
+        <p:blipFill>
+          <a:blip r:embed="rId27">
+            <a:extLst>
+              <a:ext uri="{96DAC541-7B7A-43D3-8B79-37D633B846F1}">
+                <asvg:svgBlip xmlns:asvg="http://schemas.microsoft.com/office/drawing/2016/SVG/main" r:embed="rId28"/>
+              </a:ext>
+            </a:extLst>
+          </a:blip>
+          <a:stretch>
+            <a:fillRect/>
+          </a:stretch>
+        </p:blipFill>
+        <p:spPr>
+          <a:xfrm>
+            <a:off x="8089425" y="3099434"/>
+            <a:ext cx="356998" cy="356998"/>
+          </a:xfrm>
+          <a:prstGeom prst="rect">
+            <a:avLst/>
+          </a:prstGeom>
+        </p:spPr>
+      </p:pic>
+      <p:sp>
+        <p:nvSpPr>
+          <p:cNvPr id="79" name="Arrow: Left 78">
+            <a:extLst>
+              <a:ext uri="{FF2B5EF4-FFF2-40B4-BE49-F238E27FC236}">
+                <a16:creationId xmlns:a16="http://schemas.microsoft.com/office/drawing/2014/main" id="{09C04160-C173-16C4-B3AA-0E1D6AFF7BBE}"/>
+              </a:ext>
+            </a:extLst>
+          </p:cNvPr>
+          <p:cNvSpPr/>
+          <p:nvPr/>
+        </p:nvSpPr>
+        <p:spPr>
+          <a:xfrm rot="10800000">
+            <a:off x="8161259" y="3672339"/>
+            <a:ext cx="257005" cy="130929"/>
+          </a:xfrm>
+          <a:prstGeom prst="leftArrow">
+            <a:avLst/>
+          </a:prstGeom>
+        </p:spPr>
+        <p:style>
+          <a:lnRef idx="2">
+            <a:schemeClr val="accent6">
+              <a:shade val="15000"/>
+            </a:schemeClr>
+          </a:lnRef>
+          <a:fillRef idx="1">
+            <a:schemeClr val="accent6"/>
+          </a:fillRef>
+          <a:effectRef idx="0">
+            <a:schemeClr val="accent6"/>
+          </a:effectRef>
+          <a:fontRef idx="minor">
+            <a:schemeClr val="lt1"/>
+          </a:fontRef>
+        </p:style>
+        <p:txBody>
+          <a:bodyPr rtlCol="0" anchor="ctr"/>
+          <a:lstStyle/>
+          <a:p>
+            <a:pPr algn="ctr"/>
+            <a:endParaRPr lang="en-SG"/>
+          </a:p>
+        </p:txBody>
+      </p:sp>
+      <p:pic>
+        <p:nvPicPr>
+          <p:cNvPr id="80" name="Picture 79" descr="A black and white drawing of a water pump&#10;&#10;Description automatically generated">
+            <a:extLst>
+              <a:ext uri="{FF2B5EF4-FFF2-40B4-BE49-F238E27FC236}">
+                <a16:creationId xmlns:a16="http://schemas.microsoft.com/office/drawing/2014/main" id="{DBFA781A-3CA7-BB66-4F6C-8D60E391FBC2}"/>
+              </a:ext>
+            </a:extLst>
+          </p:cNvPr>
+          <p:cNvPicPr>
+            <a:picLocks noChangeAspect="1"/>
+          </p:cNvPicPr>
+          <p:nvPr/>
+        </p:nvPicPr>
+        <p:blipFill>
+          <a:blip r:embed="rId2">
+            <a:extLst>
+              <a:ext uri="{28A0092B-C50C-407E-A947-70E740481C1C}">
+                <a14:useLocalDpi xmlns:a14="http://schemas.microsoft.com/office/drawing/2010/main" val="0"/>
+              </a:ext>
+            </a:extLst>
+          </a:blip>
+          <a:stretch>
+            <a:fillRect/>
+          </a:stretch>
+        </p:blipFill>
+        <p:spPr>
+          <a:xfrm>
+            <a:off x="9078538" y="3207587"/>
+            <a:ext cx="628845" cy="628845"/>
+          </a:xfrm>
+          <a:prstGeom prst="rect">
+            <a:avLst/>
+          </a:prstGeom>
+          <a:ln w="3175">
+            <a:solidFill>
+              <a:schemeClr val="tx1"/>
+            </a:solidFill>
+          </a:ln>
+        </p:spPr>
+      </p:pic>
+      <p:pic>
+        <p:nvPicPr>
+          <p:cNvPr id="81" name="Graphic 80" descr="Chevron arrows with solid fill">
+            <a:extLst>
+              <a:ext uri="{FF2B5EF4-FFF2-40B4-BE49-F238E27FC236}">
+                <a16:creationId xmlns:a16="http://schemas.microsoft.com/office/drawing/2014/main" id="{53DA9A49-3197-9114-ABA4-5F3A8E35CF07}"/>
+              </a:ext>
+            </a:extLst>
+          </p:cNvPr>
+          <p:cNvPicPr>
+            <a:picLocks noChangeAspect="1"/>
+          </p:cNvPicPr>
+          <p:nvPr/>
+        </p:nvPicPr>
+        <p:blipFill>
+          <a:blip r:embed="rId25">
+            <a:extLst>
+              <a:ext uri="{96DAC541-7B7A-43D3-8B79-37D633B846F1}">
+                <asvg:svgBlip xmlns:asvg="http://schemas.microsoft.com/office/drawing/2016/SVG/main" r:embed="rId26"/>
+              </a:ext>
+            </a:extLst>
+          </a:blip>
+          <a:stretch>
+            <a:fillRect/>
+          </a:stretch>
+        </p:blipFill>
+        <p:spPr>
+          <a:xfrm rot="5400000">
+            <a:off x="9484300" y="3337161"/>
+            <a:ext cx="250824" cy="253008"/>
+          </a:xfrm>
+          <a:prstGeom prst="rect">
+            <a:avLst/>
+          </a:prstGeom>
+        </p:spPr>
+      </p:pic>
+      <p:sp>
+        <p:nvSpPr>
+          <p:cNvPr id="83" name="Arrow: Left 82">
+            <a:extLst>
+              <a:ext uri="{FF2B5EF4-FFF2-40B4-BE49-F238E27FC236}">
+                <a16:creationId xmlns:a16="http://schemas.microsoft.com/office/drawing/2014/main" id="{1BC12BE6-9959-00D0-C925-11186F2CF69D}"/>
+              </a:ext>
+            </a:extLst>
+          </p:cNvPr>
+          <p:cNvSpPr/>
+          <p:nvPr/>
+        </p:nvSpPr>
+        <p:spPr>
+          <a:xfrm rot="10800000">
+            <a:off x="9145641" y="3691320"/>
+            <a:ext cx="257005" cy="130929"/>
+          </a:xfrm>
+          <a:prstGeom prst="leftArrow">
+            <a:avLst/>
+          </a:prstGeom>
+          <a:solidFill>
+            <a:srgbClr val="FFC000"/>
+          </a:solidFill>
+        </p:spPr>
+        <p:style>
+          <a:lnRef idx="2">
+            <a:schemeClr val="accent6">
+              <a:shade val="15000"/>
+            </a:schemeClr>
+          </a:lnRef>
+          <a:fillRef idx="1">
+            <a:schemeClr val="accent6"/>
+          </a:fillRef>
+          <a:effectRef idx="0">
+            <a:schemeClr val="accent6"/>
+          </a:effectRef>
+          <a:fontRef idx="minor">
+            <a:schemeClr val="lt1"/>
+          </a:fontRef>
+        </p:style>
+        <p:txBody>
+          <a:bodyPr rtlCol="0" anchor="ctr"/>
+          <a:lstStyle/>
+          <a:p>
+            <a:pPr algn="ctr"/>
+            <a:endParaRPr lang="en-SG"/>
+          </a:p>
+        </p:txBody>
+      </p:sp>
+      <p:pic>
+        <p:nvPicPr>
+          <p:cNvPr id="85" name="Graphic 84" descr="Gauge with solid fill">
+            <a:extLst>
+              <a:ext uri="{FF2B5EF4-FFF2-40B4-BE49-F238E27FC236}">
+                <a16:creationId xmlns:a16="http://schemas.microsoft.com/office/drawing/2014/main" id="{EAFF1611-7CDF-F621-866D-6F1511484250}"/>
+              </a:ext>
+            </a:extLst>
+          </p:cNvPr>
+          <p:cNvPicPr>
+            <a:picLocks noChangeAspect="1"/>
+          </p:cNvPicPr>
+          <p:nvPr/>
+        </p:nvPicPr>
+        <p:blipFill>
+          <a:blip r:embed="rId29">
+            <a:extLst>
+              <a:ext uri="{96DAC541-7B7A-43D3-8B79-37D633B846F1}">
+                <asvg:svgBlip xmlns:asvg="http://schemas.microsoft.com/office/drawing/2016/SVG/main" r:embed="rId30"/>
+              </a:ext>
+            </a:extLst>
+          </a:blip>
+          <a:stretch>
+            <a:fillRect/>
+          </a:stretch>
+        </p:blipFill>
+        <p:spPr>
+          <a:xfrm>
+            <a:off x="9069394" y="3111400"/>
+            <a:ext cx="375837" cy="375837"/>
+          </a:xfrm>
+          <a:prstGeom prst="rect">
+            <a:avLst/>
+          </a:prstGeom>
+        </p:spPr>
+      </p:pic>
+      <p:sp>
+        <p:nvSpPr>
+          <p:cNvPr id="89" name="Rectangle 88">
+            <a:extLst>
+              <a:ext uri="{FF2B5EF4-FFF2-40B4-BE49-F238E27FC236}">
+                <a16:creationId xmlns:a16="http://schemas.microsoft.com/office/drawing/2014/main" id="{6DA4CA93-A237-0C45-8010-63301A2460A3}"/>
+              </a:ext>
+            </a:extLst>
+          </p:cNvPr>
+          <p:cNvSpPr/>
+          <p:nvPr/>
+        </p:nvSpPr>
+        <p:spPr>
+          <a:xfrm>
+            <a:off x="8420827" y="3418633"/>
+            <a:ext cx="45720" cy="144645"/>
+          </a:xfrm>
+          <a:prstGeom prst="rect">
+            <a:avLst/>
+          </a:prstGeom>
+          <a:solidFill>
+            <a:srgbClr val="FFC000"/>
+          </a:solidFill>
+          <a:ln>
+            <a:solidFill>
+              <a:srgbClr val="FF0000"/>
+            </a:solidFill>
+          </a:ln>
+        </p:spPr>
+        <p:style>
+          <a:lnRef idx="2">
+            <a:schemeClr val="accent1">
+              <a:shade val="15000"/>
+            </a:schemeClr>
+          </a:lnRef>
+          <a:fillRef idx="1">
+            <a:schemeClr val="accent1"/>
+          </a:fillRef>
+          <a:effectRef idx="0">
+            <a:schemeClr val="accent1"/>
+          </a:effectRef>
+          <a:fontRef idx="minor">
+            <a:schemeClr val="lt1"/>
+          </a:fontRef>
+        </p:style>
+        <p:txBody>
+          <a:bodyPr rtlCol="0" anchor="ctr"/>
+          <a:lstStyle/>
+          <a:p>
+            <a:pPr algn="ctr"/>
+            <a:endParaRPr lang="en-SG"/>
+          </a:p>
+        </p:txBody>
+      </p:sp>
+      <p:sp>
+        <p:nvSpPr>
+          <p:cNvPr id="90" name="Rectangle 89">
+            <a:extLst>
+              <a:ext uri="{FF2B5EF4-FFF2-40B4-BE49-F238E27FC236}">
+                <a16:creationId xmlns:a16="http://schemas.microsoft.com/office/drawing/2014/main" id="{215BA950-52DA-BA85-4142-B7A9510BBCFA}"/>
+              </a:ext>
+            </a:extLst>
+          </p:cNvPr>
+          <p:cNvSpPr/>
+          <p:nvPr/>
+        </p:nvSpPr>
+        <p:spPr>
+          <a:xfrm>
+            <a:off x="9412517" y="3442187"/>
+            <a:ext cx="45720" cy="144645"/>
+          </a:xfrm>
+          <a:prstGeom prst="rect">
+            <a:avLst/>
+          </a:prstGeom>
+          <a:solidFill>
+            <a:srgbClr val="C00000"/>
+          </a:solidFill>
+          <a:ln>
+            <a:solidFill>
+              <a:srgbClr val="FF0000"/>
+            </a:solidFill>
+          </a:ln>
+        </p:spPr>
+        <p:style>
+          <a:lnRef idx="2">
+            <a:schemeClr val="accent1">
+              <a:shade val="15000"/>
+            </a:schemeClr>
+          </a:lnRef>
+          <a:fillRef idx="1">
+            <a:schemeClr val="accent1"/>
+          </a:fillRef>
+          <a:effectRef idx="0">
+            <a:schemeClr val="accent1"/>
+          </a:effectRef>
+          <a:fontRef idx="minor">
+            <a:schemeClr val="lt1"/>
+          </a:fontRef>
+        </p:style>
+        <p:txBody>
+          <a:bodyPr rtlCol="0" anchor="ctr"/>
+          <a:lstStyle/>
+          <a:p>
+            <a:pPr algn="ctr"/>
+            <a:endParaRPr lang="en-SG"/>
+          </a:p>
+        </p:txBody>
+      </p:sp>
+    </p:spTree>
+    <p:extLst>
+      <p:ext uri="{BB962C8B-B14F-4D97-AF65-F5344CB8AC3E}">
+        <p14:creationId xmlns:p14="http://schemas.microsoft.com/office/powerpoint/2010/main" val="674754394"/>
       </p:ext>
     </p:extLst>
   </p:cSld>

</xml_diff>

<commit_message>
update the system introduction and the read me file.
</commit_message>
<xml_diff>
--- a/designDoc/designDoc.pptx
+++ b/designDoc/designDoc.pptx
@@ -5,7 +5,7 @@
     <p:sldMasterId id="2147483648" r:id="rId1"/>
   </p:sldMasterIdLst>
   <p:notesMasterIdLst>
-    <p:notesMasterId r:id="rId7"/>
+    <p:notesMasterId r:id="rId8"/>
   </p:notesMasterIdLst>
   <p:sldIdLst>
     <p:sldId id="256" r:id="rId2"/>
@@ -13,6 +13,7 @@
     <p:sldId id="259" r:id="rId4"/>
     <p:sldId id="258" r:id="rId5"/>
     <p:sldId id="260" r:id="rId6"/>
+    <p:sldId id="261" r:id="rId7"/>
   </p:sldIdLst>
   <p:sldSz cx="12192000" cy="6858000"/>
   <p:notesSz cx="6858000" cy="9144000"/>
@@ -201,7 +202,7 @@
           <a:p>
             <a:fld id="{60A58DA9-13FF-4A44-80CD-EC4A25FA80B4}" type="datetimeFigureOut">
               <a:rPr lang="en-SG" smtClean="0"/>
-              <a:t>10/10/2024</a:t>
+              <a:t>11/10/2024</a:t>
             </a:fld>
             <a:endParaRPr lang="en-SG"/>
           </a:p>
@@ -702,7 +703,7 @@
           <a:p>
             <a:fld id="{DAB0784D-3A10-485A-BA3A-AF2134252110}" type="datetimeFigureOut">
               <a:rPr lang="en-SG" smtClean="0"/>
-              <a:t>10/10/2024</a:t>
+              <a:t>11/10/2024</a:t>
             </a:fld>
             <a:endParaRPr lang="en-SG"/>
           </a:p>
@@ -902,7 +903,7 @@
           <a:p>
             <a:fld id="{DAB0784D-3A10-485A-BA3A-AF2134252110}" type="datetimeFigureOut">
               <a:rPr lang="en-SG" smtClean="0"/>
-              <a:t>10/10/2024</a:t>
+              <a:t>11/10/2024</a:t>
             </a:fld>
             <a:endParaRPr lang="en-SG"/>
           </a:p>
@@ -1112,7 +1113,7 @@
           <a:p>
             <a:fld id="{DAB0784D-3A10-485A-BA3A-AF2134252110}" type="datetimeFigureOut">
               <a:rPr lang="en-SG" smtClean="0"/>
-              <a:t>10/10/2024</a:t>
+              <a:t>11/10/2024</a:t>
             </a:fld>
             <a:endParaRPr lang="en-SG"/>
           </a:p>
@@ -1312,7 +1313,7 @@
           <a:p>
             <a:fld id="{DAB0784D-3A10-485A-BA3A-AF2134252110}" type="datetimeFigureOut">
               <a:rPr lang="en-SG" smtClean="0"/>
-              <a:t>10/10/2024</a:t>
+              <a:t>11/10/2024</a:t>
             </a:fld>
             <a:endParaRPr lang="en-SG"/>
           </a:p>
@@ -1588,7 +1589,7 @@
           <a:p>
             <a:fld id="{DAB0784D-3A10-485A-BA3A-AF2134252110}" type="datetimeFigureOut">
               <a:rPr lang="en-SG" smtClean="0"/>
-              <a:t>10/10/2024</a:t>
+              <a:t>11/10/2024</a:t>
             </a:fld>
             <a:endParaRPr lang="en-SG"/>
           </a:p>
@@ -1856,7 +1857,7 @@
           <a:p>
             <a:fld id="{DAB0784D-3A10-485A-BA3A-AF2134252110}" type="datetimeFigureOut">
               <a:rPr lang="en-SG" smtClean="0"/>
-              <a:t>10/10/2024</a:t>
+              <a:t>11/10/2024</a:t>
             </a:fld>
             <a:endParaRPr lang="en-SG"/>
           </a:p>
@@ -2271,7 +2272,7 @@
           <a:p>
             <a:fld id="{DAB0784D-3A10-485A-BA3A-AF2134252110}" type="datetimeFigureOut">
               <a:rPr lang="en-SG" smtClean="0"/>
-              <a:t>10/10/2024</a:t>
+              <a:t>11/10/2024</a:t>
             </a:fld>
             <a:endParaRPr lang="en-SG"/>
           </a:p>
@@ -2413,7 +2414,7 @@
           <a:p>
             <a:fld id="{DAB0784D-3A10-485A-BA3A-AF2134252110}" type="datetimeFigureOut">
               <a:rPr lang="en-SG" smtClean="0"/>
-              <a:t>10/10/2024</a:t>
+              <a:t>11/10/2024</a:t>
             </a:fld>
             <a:endParaRPr lang="en-SG"/>
           </a:p>
@@ -2526,7 +2527,7 @@
           <a:p>
             <a:fld id="{DAB0784D-3A10-485A-BA3A-AF2134252110}" type="datetimeFigureOut">
               <a:rPr lang="en-SG" smtClean="0"/>
-              <a:t>10/10/2024</a:t>
+              <a:t>11/10/2024</a:t>
             </a:fld>
             <a:endParaRPr lang="en-SG"/>
           </a:p>
@@ -2839,7 +2840,7 @@
           <a:p>
             <a:fld id="{DAB0784D-3A10-485A-BA3A-AF2134252110}" type="datetimeFigureOut">
               <a:rPr lang="en-SG" smtClean="0"/>
-              <a:t>10/10/2024</a:t>
+              <a:t>11/10/2024</a:t>
             </a:fld>
             <a:endParaRPr lang="en-SG"/>
           </a:p>
@@ -3128,7 +3129,7 @@
           <a:p>
             <a:fld id="{DAB0784D-3A10-485A-BA3A-AF2134252110}" type="datetimeFigureOut">
               <a:rPr lang="en-SG" smtClean="0"/>
-              <a:t>10/10/2024</a:t>
+              <a:t>11/10/2024</a:t>
             </a:fld>
             <a:endParaRPr lang="en-SG"/>
           </a:p>
@@ -3371,7 +3372,7 @@
           <a:p>
             <a:fld id="{DAB0784D-3A10-485A-BA3A-AF2134252110}" type="datetimeFigureOut">
               <a:rPr lang="en-SG" smtClean="0"/>
-              <a:t>10/10/2024</a:t>
+              <a:t>11/10/2024</a:t>
             </a:fld>
             <a:endParaRPr lang="en-SG"/>
           </a:p>
@@ -20750,7 +20751,7 @@
         </p:blipFill>
         <p:spPr>
           <a:xfrm>
-            <a:off x="2340486" y="4168259"/>
+            <a:off x="648846" y="4012811"/>
             <a:ext cx="1904762" cy="1904762"/>
           </a:xfrm>
           <a:prstGeom prst="rect">
@@ -20791,7 +20792,7 @@
         </p:blipFill>
         <p:spPr>
           <a:xfrm>
-            <a:off x="2512184" y="4168258"/>
+            <a:off x="820544" y="4012810"/>
             <a:ext cx="458606" cy="458606"/>
           </a:xfrm>
           <a:prstGeom prst="rect">
@@ -20813,7 +20814,7 @@
         </p:nvSpPr>
         <p:spPr>
           <a:xfrm>
-            <a:off x="2709453" y="4739738"/>
+            <a:off x="1017813" y="4584290"/>
             <a:ext cx="158676" cy="292608"/>
           </a:xfrm>
           <a:prstGeom prst="downArrow">
@@ -20862,7 +20863,7 @@
         </p:nvSpPr>
         <p:spPr>
           <a:xfrm>
-            <a:off x="3237095" y="5032346"/>
+            <a:off x="1545455" y="4876898"/>
             <a:ext cx="158676" cy="292608"/>
           </a:xfrm>
           <a:prstGeom prst="downArrow">
@@ -20925,7 +20926,7 @@
         </p:blipFill>
         <p:spPr>
           <a:xfrm>
-            <a:off x="4751454" y="4168259"/>
+            <a:off x="3059814" y="4012811"/>
             <a:ext cx="1904762" cy="1904762"/>
           </a:xfrm>
           <a:prstGeom prst="rect">
@@ -20966,7 +20967,7 @@
         </p:blipFill>
         <p:spPr>
           <a:xfrm>
-            <a:off x="4923152" y="4168258"/>
+            <a:off x="3231512" y="4012810"/>
             <a:ext cx="458606" cy="458606"/>
           </a:xfrm>
           <a:prstGeom prst="rect">
@@ -20988,7 +20989,7 @@
         </p:nvSpPr>
         <p:spPr>
           <a:xfrm>
-            <a:off x="5396853" y="4911030"/>
+            <a:off x="3705213" y="4755582"/>
             <a:ext cx="158676" cy="292608"/>
           </a:xfrm>
           <a:prstGeom prst="downArrow">
@@ -21037,7 +21038,7 @@
         </p:nvSpPr>
         <p:spPr>
           <a:xfrm>
-            <a:off x="5937324" y="5148072"/>
+            <a:off x="4245684" y="4992624"/>
             <a:ext cx="158676" cy="292608"/>
           </a:xfrm>
           <a:prstGeom prst="downArrow">
@@ -21100,7 +21101,7 @@
         </p:blipFill>
         <p:spPr>
           <a:xfrm>
-            <a:off x="3828907" y="4195691"/>
+            <a:off x="2137267" y="4040243"/>
             <a:ext cx="363145" cy="363145"/>
           </a:xfrm>
           <a:prstGeom prst="rect">
@@ -21136,7 +21137,477 @@
         </p:blipFill>
         <p:spPr>
           <a:xfrm>
-            <a:off x="6293071" y="4168258"/>
+            <a:off x="4601431" y="4012810"/>
+            <a:ext cx="363145" cy="363145"/>
+          </a:xfrm>
+          <a:prstGeom prst="rect">
+            <a:avLst/>
+          </a:prstGeom>
+        </p:spPr>
+      </p:pic>
+      <p:pic>
+        <p:nvPicPr>
+          <p:cNvPr id="29" name="Picture 28" descr="A isometric view of a factory&#10;&#10;Description automatically generated">
+            <a:extLst>
+              <a:ext uri="{FF2B5EF4-FFF2-40B4-BE49-F238E27FC236}">
+                <a16:creationId xmlns:a16="http://schemas.microsoft.com/office/drawing/2014/main" id="{0BA8BAE0-A7DA-211E-8DB9-5C877F312787}"/>
+              </a:ext>
+            </a:extLst>
+          </p:cNvPr>
+          <p:cNvPicPr>
+            <a:picLocks noChangeAspect="1"/>
+          </p:cNvPicPr>
+          <p:nvPr/>
+        </p:nvPicPr>
+        <p:blipFill>
+          <a:blip r:embed="rId10">
+            <a:extLst>
+              <a:ext uri="{28A0092B-C50C-407E-A947-70E740481C1C}">
+                <a14:useLocalDpi xmlns:a14="http://schemas.microsoft.com/office/drawing/2010/main" val="0"/>
+              </a:ext>
+            </a:extLst>
+          </a:blip>
+          <a:stretch>
+            <a:fillRect/>
+          </a:stretch>
+        </p:blipFill>
+        <p:spPr>
+          <a:xfrm>
+            <a:off x="5611701" y="3777229"/>
+            <a:ext cx="2540000" cy="1905000"/>
+          </a:xfrm>
+          <a:prstGeom prst="rect">
+            <a:avLst/>
+          </a:prstGeom>
+          <a:ln w="3175">
+            <a:solidFill>
+              <a:schemeClr val="tx1"/>
+            </a:solidFill>
+          </a:ln>
+        </p:spPr>
+      </p:pic>
+      <p:pic>
+        <p:nvPicPr>
+          <p:cNvPr id="35" name="Graphic 34" descr="Battery with solid fill">
+            <a:extLst>
+              <a:ext uri="{FF2B5EF4-FFF2-40B4-BE49-F238E27FC236}">
+                <a16:creationId xmlns:a16="http://schemas.microsoft.com/office/drawing/2014/main" id="{FBEC7983-B130-1C61-B60B-1D47CB6C12F8}"/>
+              </a:ext>
+            </a:extLst>
+          </p:cNvPr>
+          <p:cNvPicPr>
+            <a:picLocks noChangeAspect="1"/>
+          </p:cNvPicPr>
+          <p:nvPr/>
+        </p:nvPicPr>
+        <p:blipFill>
+          <a:blip r:embed="rId11">
+            <a:extLst>
+              <a:ext uri="{96DAC541-7B7A-43D3-8B79-37D633B846F1}">
+                <asvg:svgBlip xmlns:asvg="http://schemas.microsoft.com/office/drawing/2016/SVG/main" r:embed="rId12"/>
+              </a:ext>
+            </a:extLst>
+          </a:blip>
+          <a:stretch>
+            <a:fillRect/>
+          </a:stretch>
+        </p:blipFill>
+        <p:spPr>
+          <a:xfrm>
+            <a:off x="7658571" y="5078066"/>
+            <a:ext cx="422143" cy="422143"/>
+          </a:xfrm>
+          <a:prstGeom prst="rect">
+            <a:avLst/>
+          </a:prstGeom>
+        </p:spPr>
+      </p:pic>
+      <p:sp>
+        <p:nvSpPr>
+          <p:cNvPr id="36" name="Arrow: Down 35">
+            <a:extLst>
+              <a:ext uri="{FF2B5EF4-FFF2-40B4-BE49-F238E27FC236}">
+                <a16:creationId xmlns:a16="http://schemas.microsoft.com/office/drawing/2014/main" id="{9B9FB3AC-A0B7-CEE2-042F-07A513E2535D}"/>
+              </a:ext>
+            </a:extLst>
+          </p:cNvPr>
+          <p:cNvSpPr/>
+          <p:nvPr/>
+        </p:nvSpPr>
+        <p:spPr>
+          <a:xfrm>
+            <a:off x="7762703" y="5427815"/>
+            <a:ext cx="177301" cy="199645"/>
+          </a:xfrm>
+          <a:prstGeom prst="downArrow">
+            <a:avLst/>
+          </a:prstGeom>
+          <a:solidFill>
+            <a:schemeClr val="accent2"/>
+          </a:solidFill>
+        </p:spPr>
+        <p:style>
+          <a:lnRef idx="2">
+            <a:schemeClr val="accent1">
+              <a:shade val="15000"/>
+            </a:schemeClr>
+          </a:lnRef>
+          <a:fillRef idx="1">
+            <a:schemeClr val="accent1"/>
+          </a:fillRef>
+          <a:effectRef idx="0">
+            <a:schemeClr val="accent1"/>
+          </a:effectRef>
+          <a:fontRef idx="minor">
+            <a:schemeClr val="lt1"/>
+          </a:fontRef>
+        </p:style>
+        <p:txBody>
+          <a:bodyPr rtlCol="0" anchor="ctr"/>
+          <a:lstStyle/>
+          <a:p>
+            <a:pPr algn="ctr"/>
+            <a:endParaRPr lang="en-SG"/>
+          </a:p>
+        </p:txBody>
+      </p:sp>
+      <p:pic>
+        <p:nvPicPr>
+          <p:cNvPr id="38" name="Graphic 37" descr="Circles with arrows with solid fill">
+            <a:extLst>
+              <a:ext uri="{FF2B5EF4-FFF2-40B4-BE49-F238E27FC236}">
+                <a16:creationId xmlns:a16="http://schemas.microsoft.com/office/drawing/2014/main" id="{0B933EB7-FE40-B357-E77E-443587811D31}"/>
+              </a:ext>
+            </a:extLst>
+          </p:cNvPr>
+          <p:cNvPicPr>
+            <a:picLocks noChangeAspect="1"/>
+          </p:cNvPicPr>
+          <p:nvPr/>
+        </p:nvPicPr>
+        <p:blipFill>
+          <a:blip r:embed="rId13">
+            <a:extLst>
+              <a:ext uri="{96DAC541-7B7A-43D3-8B79-37D633B846F1}">
+                <asvg:svgBlip xmlns:asvg="http://schemas.microsoft.com/office/drawing/2016/SVG/main" r:embed="rId14"/>
+              </a:ext>
+            </a:extLst>
+          </a:blip>
+          <a:stretch>
+            <a:fillRect/>
+          </a:stretch>
+        </p:blipFill>
+        <p:spPr>
+          <a:xfrm>
+            <a:off x="7458244" y="3766546"/>
+            <a:ext cx="718112" cy="718112"/>
+          </a:xfrm>
+          <a:prstGeom prst="rect">
+            <a:avLst/>
+          </a:prstGeom>
+        </p:spPr>
+      </p:pic>
+      <p:pic>
+        <p:nvPicPr>
+          <p:cNvPr id="40" name="Graphic 39" descr="Shuffle with solid fill">
+            <a:extLst>
+              <a:ext uri="{FF2B5EF4-FFF2-40B4-BE49-F238E27FC236}">
+                <a16:creationId xmlns:a16="http://schemas.microsoft.com/office/drawing/2014/main" id="{41E86C32-6A78-A115-3C3C-FE9B664B8824}"/>
+              </a:ext>
+            </a:extLst>
+          </p:cNvPr>
+          <p:cNvPicPr>
+            <a:picLocks noChangeAspect="1"/>
+          </p:cNvPicPr>
+          <p:nvPr/>
+        </p:nvPicPr>
+        <p:blipFill>
+          <a:blip r:embed="rId15">
+            <a:extLst>
+              <a:ext uri="{96DAC541-7B7A-43D3-8B79-37D633B846F1}">
+                <asvg:svgBlip xmlns:asvg="http://schemas.microsoft.com/office/drawing/2016/SVG/main" r:embed="rId16"/>
+              </a:ext>
+            </a:extLst>
+          </a:blip>
+          <a:stretch>
+            <a:fillRect/>
+          </a:stretch>
+        </p:blipFill>
+        <p:spPr>
+          <a:xfrm>
+            <a:off x="7680681" y="3988983"/>
+            <a:ext cx="273237" cy="273237"/>
+          </a:xfrm>
+          <a:prstGeom prst="rect">
+            <a:avLst/>
+          </a:prstGeom>
+        </p:spPr>
+      </p:pic>
+      <p:pic>
+        <p:nvPicPr>
+          <p:cNvPr id="43" name="Picture 42" descr="A isometric view of a factory&#10;&#10;Description automatically generated">
+            <a:extLst>
+              <a:ext uri="{FF2B5EF4-FFF2-40B4-BE49-F238E27FC236}">
+                <a16:creationId xmlns:a16="http://schemas.microsoft.com/office/drawing/2014/main" id="{FAE42E47-1990-B4E8-0E80-BA1555CD5585}"/>
+              </a:ext>
+            </a:extLst>
+          </p:cNvPr>
+          <p:cNvPicPr>
+            <a:picLocks noChangeAspect="1"/>
+          </p:cNvPicPr>
+          <p:nvPr/>
+        </p:nvPicPr>
+        <p:blipFill>
+          <a:blip r:embed="rId10">
+            <a:extLst>
+              <a:ext uri="{28A0092B-C50C-407E-A947-70E740481C1C}">
+                <a14:useLocalDpi xmlns:a14="http://schemas.microsoft.com/office/drawing/2010/main" val="0"/>
+              </a:ext>
+            </a:extLst>
+          </a:blip>
+          <a:stretch>
+            <a:fillRect/>
+          </a:stretch>
+        </p:blipFill>
+        <p:spPr>
+          <a:xfrm>
+            <a:off x="8634187" y="3800640"/>
+            <a:ext cx="2540000" cy="1905000"/>
+          </a:xfrm>
+          <a:prstGeom prst="rect">
+            <a:avLst/>
+          </a:prstGeom>
+          <a:ln w="3175">
+            <a:solidFill>
+              <a:schemeClr val="tx1"/>
+            </a:solidFill>
+          </a:ln>
+        </p:spPr>
+      </p:pic>
+      <p:sp>
+        <p:nvSpPr>
+          <p:cNvPr id="45" name="Arrow: Down 44">
+            <a:extLst>
+              <a:ext uri="{FF2B5EF4-FFF2-40B4-BE49-F238E27FC236}">
+                <a16:creationId xmlns:a16="http://schemas.microsoft.com/office/drawing/2014/main" id="{7B5A362B-840C-54E2-032C-F66B74C5A26C}"/>
+              </a:ext>
+            </a:extLst>
+          </p:cNvPr>
+          <p:cNvSpPr/>
+          <p:nvPr/>
+        </p:nvSpPr>
+        <p:spPr>
+          <a:xfrm>
+            <a:off x="10785189" y="5451226"/>
+            <a:ext cx="177301" cy="199645"/>
+          </a:xfrm>
+          <a:prstGeom prst="downArrow">
+            <a:avLst/>
+          </a:prstGeom>
+          <a:solidFill>
+            <a:schemeClr val="accent6">
+              <a:lumMod val="75000"/>
+            </a:schemeClr>
+          </a:solidFill>
+        </p:spPr>
+        <p:style>
+          <a:lnRef idx="2">
+            <a:schemeClr val="accent1">
+              <a:shade val="15000"/>
+            </a:schemeClr>
+          </a:lnRef>
+          <a:fillRef idx="1">
+            <a:schemeClr val="accent1"/>
+          </a:fillRef>
+          <a:effectRef idx="0">
+            <a:schemeClr val="accent1"/>
+          </a:effectRef>
+          <a:fontRef idx="minor">
+            <a:schemeClr val="lt1"/>
+          </a:fontRef>
+        </p:style>
+        <p:txBody>
+          <a:bodyPr rtlCol="0" anchor="ctr"/>
+          <a:lstStyle/>
+          <a:p>
+            <a:pPr algn="ctr"/>
+            <a:endParaRPr lang="en-SG"/>
+          </a:p>
+        </p:txBody>
+      </p:sp>
+      <p:pic>
+        <p:nvPicPr>
+          <p:cNvPr id="46" name="Graphic 45" descr="Circles with arrows with solid fill">
+            <a:extLst>
+              <a:ext uri="{FF2B5EF4-FFF2-40B4-BE49-F238E27FC236}">
+                <a16:creationId xmlns:a16="http://schemas.microsoft.com/office/drawing/2014/main" id="{DABA6462-4E76-4C90-90DE-5A47CF26D5B2}"/>
+              </a:ext>
+            </a:extLst>
+          </p:cNvPr>
+          <p:cNvPicPr>
+            <a:picLocks noChangeAspect="1"/>
+          </p:cNvPicPr>
+          <p:nvPr/>
+        </p:nvPicPr>
+        <p:blipFill>
+          <a:blip r:embed="rId13">
+            <a:extLst>
+              <a:ext uri="{96DAC541-7B7A-43D3-8B79-37D633B846F1}">
+                <asvg:svgBlip xmlns:asvg="http://schemas.microsoft.com/office/drawing/2016/SVG/main" r:embed="rId14"/>
+              </a:ext>
+            </a:extLst>
+          </a:blip>
+          <a:stretch>
+            <a:fillRect/>
+          </a:stretch>
+        </p:blipFill>
+        <p:spPr>
+          <a:xfrm rot="2797008">
+            <a:off x="10480730" y="3789957"/>
+            <a:ext cx="718112" cy="718112"/>
+          </a:xfrm>
+          <a:prstGeom prst="rect">
+            <a:avLst/>
+          </a:prstGeom>
+        </p:spPr>
+      </p:pic>
+      <p:pic>
+        <p:nvPicPr>
+          <p:cNvPr id="42" name="Graphic 41" descr="Transfer with solid fill">
+            <a:extLst>
+              <a:ext uri="{FF2B5EF4-FFF2-40B4-BE49-F238E27FC236}">
+                <a16:creationId xmlns:a16="http://schemas.microsoft.com/office/drawing/2014/main" id="{DB96531A-F7DA-A5B8-5D9F-7FC537C0E67B}"/>
+              </a:ext>
+            </a:extLst>
+          </p:cNvPr>
+          <p:cNvPicPr>
+            <a:picLocks noChangeAspect="1"/>
+          </p:cNvPicPr>
+          <p:nvPr/>
+        </p:nvPicPr>
+        <p:blipFill>
+          <a:blip r:embed="rId17">
+            <a:extLst>
+              <a:ext uri="{96DAC541-7B7A-43D3-8B79-37D633B846F1}">
+                <asvg:svgBlip xmlns:asvg="http://schemas.microsoft.com/office/drawing/2016/SVG/main" r:embed="rId18"/>
+              </a:ext>
+            </a:extLst>
+          </a:blip>
+          <a:stretch>
+            <a:fillRect/>
+          </a:stretch>
+        </p:blipFill>
+        <p:spPr>
+          <a:xfrm>
+            <a:off x="10685259" y="4012402"/>
+            <a:ext cx="301501" cy="301501"/>
+          </a:xfrm>
+          <a:prstGeom prst="rect">
+            <a:avLst/>
+          </a:prstGeom>
+        </p:spPr>
+      </p:pic>
+      <p:pic>
+        <p:nvPicPr>
+          <p:cNvPr id="49" name="Graphic 48" descr="Battery charging with solid fill">
+            <a:extLst>
+              <a:ext uri="{FF2B5EF4-FFF2-40B4-BE49-F238E27FC236}">
+                <a16:creationId xmlns:a16="http://schemas.microsoft.com/office/drawing/2014/main" id="{C9C1793E-6238-2712-6E7D-CB63B9053D63}"/>
+              </a:ext>
+            </a:extLst>
+          </p:cNvPr>
+          <p:cNvPicPr>
+            <a:picLocks noChangeAspect="1"/>
+          </p:cNvPicPr>
+          <p:nvPr/>
+        </p:nvPicPr>
+        <p:blipFill>
+          <a:blip r:embed="rId19">
+            <a:extLst>
+              <a:ext uri="{96DAC541-7B7A-43D3-8B79-37D633B846F1}">
+                <asvg:svgBlip xmlns:asvg="http://schemas.microsoft.com/office/drawing/2016/SVG/main" r:embed="rId20"/>
+              </a:ext>
+            </a:extLst>
+          </a:blip>
+          <a:stretch>
+            <a:fillRect/>
+          </a:stretch>
+        </p:blipFill>
+        <p:spPr>
+          <a:xfrm>
+            <a:off x="10685259" y="5078066"/>
+            <a:ext cx="452922" cy="452922"/>
+          </a:xfrm>
+          <a:prstGeom prst="rect">
+            <a:avLst/>
+          </a:prstGeom>
+        </p:spPr>
+      </p:pic>
+      <p:pic>
+        <p:nvPicPr>
+          <p:cNvPr id="50" name="Graphic 49" descr="High voltage with solid fill">
+            <a:extLst>
+              <a:ext uri="{FF2B5EF4-FFF2-40B4-BE49-F238E27FC236}">
+                <a16:creationId xmlns:a16="http://schemas.microsoft.com/office/drawing/2014/main" id="{71D1A71B-2A5E-F053-E559-6E6081BDBED3}"/>
+              </a:ext>
+            </a:extLst>
+          </p:cNvPr>
+          <p:cNvPicPr>
+            <a:picLocks noChangeAspect="1"/>
+          </p:cNvPicPr>
+          <p:nvPr/>
+        </p:nvPicPr>
+        <p:blipFill>
+          <a:blip r:embed="rId8">
+            <a:extLst>
+              <a:ext uri="{96DAC541-7B7A-43D3-8B79-37D633B846F1}">
+                <asvg:svgBlip xmlns:asvg="http://schemas.microsoft.com/office/drawing/2016/SVG/main" r:embed="rId9"/>
+              </a:ext>
+            </a:extLst>
+          </a:blip>
+          <a:stretch>
+            <a:fillRect/>
+          </a:stretch>
+        </p:blipFill>
+        <p:spPr>
+          <a:xfrm>
+            <a:off x="5708282" y="5246242"/>
+            <a:ext cx="363145" cy="363145"/>
+          </a:xfrm>
+          <a:prstGeom prst="rect">
+            <a:avLst/>
+          </a:prstGeom>
+        </p:spPr>
+      </p:pic>
+      <p:pic>
+        <p:nvPicPr>
+          <p:cNvPr id="51" name="Graphic 50" descr="High voltage with solid fill">
+            <a:extLst>
+              <a:ext uri="{FF2B5EF4-FFF2-40B4-BE49-F238E27FC236}">
+                <a16:creationId xmlns:a16="http://schemas.microsoft.com/office/drawing/2014/main" id="{E5FB553E-9ED7-65FC-1C54-E712E86AF9C4}"/>
+              </a:ext>
+            </a:extLst>
+          </p:cNvPr>
+          <p:cNvPicPr>
+            <a:picLocks noChangeAspect="1"/>
+          </p:cNvPicPr>
+          <p:nvPr/>
+        </p:nvPicPr>
+        <p:blipFill>
+          <a:blip r:embed="rId21">
+            <a:extLst>
+              <a:ext uri="{96DAC541-7B7A-43D3-8B79-37D633B846F1}">
+                <asvg:svgBlip xmlns:asvg="http://schemas.microsoft.com/office/drawing/2016/SVG/main" r:embed="rId22"/>
+              </a:ext>
+            </a:extLst>
+          </a:blip>
+          <a:stretch>
+            <a:fillRect/>
+          </a:stretch>
+        </p:blipFill>
+        <p:spPr>
+          <a:xfrm>
+            <a:off x="8736911" y="5246241"/>
             <a:ext cx="363145" cy="363145"/>
           </a:xfrm>
           <a:prstGeom prst="rect">
@@ -21202,7 +21673,7 @@
         </p:blipFill>
         <p:spPr>
           <a:xfrm>
-            <a:off x="8094156" y="3188606"/>
+            <a:off x="8174277" y="1845965"/>
             <a:ext cx="628845" cy="628845"/>
           </a:xfrm>
           <a:prstGeom prst="rect">
@@ -22558,7 +23029,7 @@
         </p:blipFill>
         <p:spPr>
           <a:xfrm rot="5400000">
-            <a:off x="8499918" y="3427908"/>
+            <a:off x="8580039" y="2085267"/>
             <a:ext cx="250824" cy="253008"/>
           </a:xfrm>
           <a:prstGeom prst="rect">
@@ -22594,7 +23065,7 @@
         </p:blipFill>
         <p:spPr>
           <a:xfrm>
-            <a:off x="8089425" y="3099434"/>
+            <a:off x="8169546" y="1756793"/>
             <a:ext cx="356998" cy="356998"/>
           </a:xfrm>
           <a:prstGeom prst="rect">
@@ -22616,7 +23087,7 @@
         </p:nvSpPr>
         <p:spPr>
           <a:xfrm rot="10800000">
-            <a:off x="8161259" y="3672339"/>
+            <a:off x="8241380" y="2329698"/>
             <a:ext cx="257005" cy="130929"/>
           </a:xfrm>
           <a:prstGeom prst="leftArrow">
@@ -22676,7 +23147,7 @@
         </p:blipFill>
         <p:spPr>
           <a:xfrm>
-            <a:off x="9078538" y="3207587"/>
+            <a:off x="9158659" y="1864946"/>
             <a:ext cx="628845" cy="628845"/>
           </a:xfrm>
           <a:prstGeom prst="rect">
@@ -22717,7 +23188,7 @@
         </p:blipFill>
         <p:spPr>
           <a:xfrm rot="5400000">
-            <a:off x="9484300" y="3337161"/>
+            <a:off x="9564421" y="1994520"/>
             <a:ext cx="250824" cy="253008"/>
           </a:xfrm>
           <a:prstGeom prst="rect">
@@ -22739,7 +23210,7 @@
         </p:nvSpPr>
         <p:spPr>
           <a:xfrm rot="10800000">
-            <a:off x="9145641" y="3691320"/>
+            <a:off x="9225762" y="2348679"/>
             <a:ext cx="257005" cy="130929"/>
           </a:xfrm>
           <a:prstGeom prst="leftArrow">
@@ -22802,7 +23273,7 @@
         </p:blipFill>
         <p:spPr>
           <a:xfrm>
-            <a:off x="9069394" y="3111400"/>
+            <a:off x="9149515" y="1768759"/>
             <a:ext cx="375837" cy="375837"/>
           </a:xfrm>
           <a:prstGeom prst="rect">
@@ -22824,7 +23295,7 @@
         </p:nvSpPr>
         <p:spPr>
           <a:xfrm>
-            <a:off x="8420827" y="3418633"/>
+            <a:off x="8500948" y="2075992"/>
             <a:ext cx="45720" cy="144645"/>
           </a:xfrm>
           <a:prstGeom prst="rect">
@@ -22878,7 +23349,7 @@
         </p:nvSpPr>
         <p:spPr>
           <a:xfrm>
-            <a:off x="9412517" y="3442187"/>
+            <a:off x="9492638" y="2099546"/>
             <a:ext cx="45720" cy="144645"/>
           </a:xfrm>
           <a:prstGeom prst="rect">
@@ -22922,6 +23393,2014 @@
     <p:extLst>
       <p:ext uri="{BB962C8B-B14F-4D97-AF65-F5344CB8AC3E}">
         <p14:creationId xmlns:p14="http://schemas.microsoft.com/office/powerpoint/2010/main" val="674754394"/>
+      </p:ext>
+    </p:extLst>
+  </p:cSld>
+  <p:clrMapOvr>
+    <a:masterClrMapping/>
+  </p:clrMapOvr>
+</p:sld>
+</file>
+
+<file path=ppt/slides/slide6.xml><?xml version="1.0" encoding="utf-8"?>
+<p:sld xmlns:a="http://schemas.openxmlformats.org/drawingml/2006/main" xmlns:r="http://schemas.openxmlformats.org/officeDocument/2006/relationships" xmlns:p="http://schemas.openxmlformats.org/presentationml/2006/main">
+  <p:cSld>
+    <p:spTree>
+      <p:nvGrpSpPr>
+        <p:cNvPr id="1" name=""/>
+        <p:cNvGrpSpPr/>
+        <p:nvPr/>
+      </p:nvGrpSpPr>
+      <p:grpSpPr>
+        <a:xfrm>
+          <a:off x="0" y="0"/>
+          <a:ext cx="0" cy="0"/>
+          <a:chOff x="0" y="0"/>
+          <a:chExt cx="0" cy="0"/>
+        </a:xfrm>
+      </p:grpSpPr>
+      <p:pic>
+        <p:nvPicPr>
+          <p:cNvPr id="5" name="Picture 4">
+            <a:extLst>
+              <a:ext uri="{FF2B5EF4-FFF2-40B4-BE49-F238E27FC236}">
+                <a16:creationId xmlns:a16="http://schemas.microsoft.com/office/drawing/2014/main" id="{B7EAE7C0-5958-AB8D-F4A4-E351E9E4913B}"/>
+              </a:ext>
+            </a:extLst>
+          </p:cNvPr>
+          <p:cNvPicPr>
+            <a:picLocks noChangeAspect="1"/>
+          </p:cNvPicPr>
+          <p:nvPr/>
+        </p:nvPicPr>
+        <p:blipFill>
+          <a:blip r:embed="rId2"/>
+          <a:stretch>
+            <a:fillRect/>
+          </a:stretch>
+        </p:blipFill>
+        <p:spPr>
+          <a:xfrm>
+            <a:off x="392068" y="1209964"/>
+            <a:ext cx="5181414" cy="2938602"/>
+          </a:xfrm>
+          <a:prstGeom prst="rect">
+            <a:avLst/>
+          </a:prstGeom>
+        </p:spPr>
+      </p:pic>
+      <p:sp>
+        <p:nvSpPr>
+          <p:cNvPr id="6" name="TextBox 5">
+            <a:extLst>
+              <a:ext uri="{FF2B5EF4-FFF2-40B4-BE49-F238E27FC236}">
+                <a16:creationId xmlns:a16="http://schemas.microsoft.com/office/drawing/2014/main" id="{2E6DDD57-FF9C-0498-2B58-65BA28B12A23}"/>
+              </a:ext>
+            </a:extLst>
+          </p:cNvPr>
+          <p:cNvSpPr txBox="1"/>
+          <p:nvPr/>
+        </p:nvSpPr>
+        <p:spPr>
+          <a:xfrm>
+            <a:off x="333938" y="865173"/>
+            <a:ext cx="4332289" cy="276999"/>
+          </a:xfrm>
+          <a:prstGeom prst="rect">
+            <a:avLst/>
+          </a:prstGeom>
+          <a:noFill/>
+        </p:spPr>
+        <p:txBody>
+          <a:bodyPr wrap="square">
+            <a:spAutoFit/>
+          </a:bodyPr>
+          <a:lstStyle/>
+          <a:p>
+            <a:r>
+              <a:rPr lang="en-US" sz="1200" b="1" dirty="0"/>
+              <a:t>2D Power Grid Physical-world Simulation Program</a:t>
+            </a:r>
+            <a:endParaRPr lang="en-SG" sz="1200" b="1" dirty="0"/>
+          </a:p>
+        </p:txBody>
+      </p:sp>
+      <p:sp>
+        <p:nvSpPr>
+          <p:cNvPr id="8" name="Rectangle 7">
+            <a:extLst>
+              <a:ext uri="{FF2B5EF4-FFF2-40B4-BE49-F238E27FC236}">
+                <a16:creationId xmlns:a16="http://schemas.microsoft.com/office/drawing/2014/main" id="{AA5A1EF8-3030-6675-AA30-9A1BDE9251F3}"/>
+              </a:ext>
+            </a:extLst>
+          </p:cNvPr>
+          <p:cNvSpPr/>
+          <p:nvPr/>
+        </p:nvSpPr>
+        <p:spPr>
+          <a:xfrm>
+            <a:off x="450411" y="4607525"/>
+            <a:ext cx="2049672" cy="698136"/>
+          </a:xfrm>
+          <a:prstGeom prst="rect">
+            <a:avLst/>
+          </a:prstGeom>
+          <a:noFill/>
+          <a:ln>
+            <a:prstDash val="sysDash"/>
+          </a:ln>
+        </p:spPr>
+        <p:style>
+          <a:lnRef idx="2">
+            <a:schemeClr val="accent1">
+              <a:shade val="15000"/>
+            </a:schemeClr>
+          </a:lnRef>
+          <a:fillRef idx="1">
+            <a:schemeClr val="accent1"/>
+          </a:fillRef>
+          <a:effectRef idx="0">
+            <a:schemeClr val="accent1"/>
+          </a:effectRef>
+          <a:fontRef idx="minor">
+            <a:schemeClr val="lt1"/>
+          </a:fontRef>
+        </p:style>
+        <p:txBody>
+          <a:bodyPr rtlCol="0" anchor="ctr"/>
+          <a:lstStyle/>
+          <a:p>
+            <a:pPr algn="ctr"/>
+            <a:endParaRPr lang="en-SG" dirty="0"/>
+          </a:p>
+        </p:txBody>
+      </p:sp>
+      <p:pic>
+        <p:nvPicPr>
+          <p:cNvPr id="9" name="Picture 8" descr="TM221CE16R Schneider Electric Modicon M221 PLC CPU Mini USB Interface –  Ralakde Automation">
+            <a:extLst>
+              <a:ext uri="{FF2B5EF4-FFF2-40B4-BE49-F238E27FC236}">
+                <a16:creationId xmlns:a16="http://schemas.microsoft.com/office/drawing/2014/main" id="{76EC452D-2C9B-DE9D-97D6-7578F1E08B79}"/>
+              </a:ext>
+            </a:extLst>
+          </p:cNvPr>
+          <p:cNvPicPr>
+            <a:picLocks noChangeAspect="1" noChangeArrowheads="1"/>
+          </p:cNvPicPr>
+          <p:nvPr/>
+        </p:nvPicPr>
+        <p:blipFill>
+          <a:blip r:embed="rId3">
+            <a:extLst>
+              <a:ext uri="{28A0092B-C50C-407E-A947-70E740481C1C}">
+                <a14:useLocalDpi xmlns:a14="http://schemas.microsoft.com/office/drawing/2010/main" val="0"/>
+              </a:ext>
+            </a:extLst>
+          </a:blip>
+          <a:srcRect/>
+          <a:stretch>
+            <a:fillRect/>
+          </a:stretch>
+        </p:blipFill>
+        <p:spPr bwMode="auto">
+          <a:xfrm>
+            <a:off x="545265" y="4677523"/>
+            <a:ext cx="520526" cy="570651"/>
+          </a:xfrm>
+          <a:prstGeom prst="rect">
+            <a:avLst/>
+          </a:prstGeom>
+          <a:noFill/>
+          <a:extLst>
+            <a:ext uri="{909E8E84-426E-40DD-AFC4-6F175D3DCCD1}">
+              <a14:hiddenFill xmlns:a14="http://schemas.microsoft.com/office/drawing/2010/main">
+                <a:solidFill>
+                  <a:srgbClr val="FFFFFF"/>
+                </a:solidFill>
+              </a14:hiddenFill>
+            </a:ext>
+          </a:extLst>
+        </p:spPr>
+      </p:pic>
+      <p:pic>
+        <p:nvPicPr>
+          <p:cNvPr id="10" name="Picture 9" descr="TM221CE16R Schneider Electric Modicon M221 PLC CPU Mini USB Interface –  Ralakde Automation">
+            <a:extLst>
+              <a:ext uri="{FF2B5EF4-FFF2-40B4-BE49-F238E27FC236}">
+                <a16:creationId xmlns:a16="http://schemas.microsoft.com/office/drawing/2014/main" id="{6EF44F95-D1D3-1EEB-53CA-93E60D8C1B99}"/>
+              </a:ext>
+            </a:extLst>
+          </p:cNvPr>
+          <p:cNvPicPr>
+            <a:picLocks noChangeAspect="1" noChangeArrowheads="1"/>
+          </p:cNvPicPr>
+          <p:nvPr/>
+        </p:nvPicPr>
+        <p:blipFill>
+          <a:blip r:embed="rId3">
+            <a:extLst>
+              <a:ext uri="{28A0092B-C50C-407E-A947-70E740481C1C}">
+                <a14:useLocalDpi xmlns:a14="http://schemas.microsoft.com/office/drawing/2010/main" val="0"/>
+              </a:ext>
+            </a:extLst>
+          </a:blip>
+          <a:srcRect/>
+          <a:stretch>
+            <a:fillRect/>
+          </a:stretch>
+        </p:blipFill>
+        <p:spPr bwMode="auto">
+          <a:xfrm>
+            <a:off x="1218238" y="4677523"/>
+            <a:ext cx="520526" cy="570651"/>
+          </a:xfrm>
+          <a:prstGeom prst="rect">
+            <a:avLst/>
+          </a:prstGeom>
+          <a:noFill/>
+          <a:extLst>
+            <a:ext uri="{909E8E84-426E-40DD-AFC4-6F175D3DCCD1}">
+              <a14:hiddenFill xmlns:a14="http://schemas.microsoft.com/office/drawing/2010/main">
+                <a:solidFill>
+                  <a:srgbClr val="FFFFFF"/>
+                </a:solidFill>
+              </a14:hiddenFill>
+            </a:ext>
+          </a:extLst>
+        </p:spPr>
+      </p:pic>
+      <p:pic>
+        <p:nvPicPr>
+          <p:cNvPr id="11" name="Picture 10" descr="TM221CE16R Schneider Electric Modicon M221 PLC CPU Mini USB Interface –  Ralakde Automation">
+            <a:extLst>
+              <a:ext uri="{FF2B5EF4-FFF2-40B4-BE49-F238E27FC236}">
+                <a16:creationId xmlns:a16="http://schemas.microsoft.com/office/drawing/2014/main" id="{E8BF81DE-778E-F671-F7B6-93FBDAB6431D}"/>
+              </a:ext>
+            </a:extLst>
+          </p:cNvPr>
+          <p:cNvPicPr>
+            <a:picLocks noChangeAspect="1" noChangeArrowheads="1"/>
+          </p:cNvPicPr>
+          <p:nvPr/>
+        </p:nvPicPr>
+        <p:blipFill>
+          <a:blip r:embed="rId3">
+            <a:extLst>
+              <a:ext uri="{28A0092B-C50C-407E-A947-70E740481C1C}">
+                <a14:useLocalDpi xmlns:a14="http://schemas.microsoft.com/office/drawing/2010/main" val="0"/>
+              </a:ext>
+            </a:extLst>
+          </a:blip>
+          <a:srcRect/>
+          <a:stretch>
+            <a:fillRect/>
+          </a:stretch>
+        </p:blipFill>
+        <p:spPr bwMode="auto">
+          <a:xfrm>
+            <a:off x="1891211" y="4677523"/>
+            <a:ext cx="520526" cy="570651"/>
+          </a:xfrm>
+          <a:prstGeom prst="rect">
+            <a:avLst/>
+          </a:prstGeom>
+          <a:noFill/>
+          <a:extLst>
+            <a:ext uri="{909E8E84-426E-40DD-AFC4-6F175D3DCCD1}">
+              <a14:hiddenFill xmlns:a14="http://schemas.microsoft.com/office/drawing/2010/main">
+                <a:solidFill>
+                  <a:srgbClr val="FFFFFF"/>
+                </a:solidFill>
+              </a14:hiddenFill>
+            </a:ext>
+          </a:extLst>
+        </p:spPr>
+      </p:pic>
+      <p:cxnSp>
+        <p:nvCxnSpPr>
+          <p:cNvPr id="13" name="Straight Connector 12">
+            <a:extLst>
+              <a:ext uri="{FF2B5EF4-FFF2-40B4-BE49-F238E27FC236}">
+                <a16:creationId xmlns:a16="http://schemas.microsoft.com/office/drawing/2014/main" id="{BBCE97F5-054E-54C3-C520-97C51B629167}"/>
+              </a:ext>
+            </a:extLst>
+          </p:cNvPr>
+          <p:cNvCxnSpPr>
+            <a:cxnSpLocks/>
+            <a:stCxn id="9" idx="2"/>
+          </p:cNvCxnSpPr>
+          <p:nvPr/>
+        </p:nvCxnSpPr>
+        <p:spPr>
+          <a:xfrm>
+            <a:off x="805528" y="5248174"/>
+            <a:ext cx="0" cy="560444"/>
+          </a:xfrm>
+          <a:prstGeom prst="line">
+            <a:avLst/>
+          </a:prstGeom>
+          <a:ln>
+            <a:solidFill>
+              <a:schemeClr val="accent6">
+                <a:lumMod val="75000"/>
+              </a:schemeClr>
+            </a:solidFill>
+          </a:ln>
+        </p:spPr>
+        <p:style>
+          <a:lnRef idx="2">
+            <a:schemeClr val="accent1"/>
+          </a:lnRef>
+          <a:fillRef idx="0">
+            <a:schemeClr val="accent1"/>
+          </a:fillRef>
+          <a:effectRef idx="1">
+            <a:schemeClr val="accent1"/>
+          </a:effectRef>
+          <a:fontRef idx="minor">
+            <a:schemeClr val="tx1"/>
+          </a:fontRef>
+        </p:style>
+      </p:cxnSp>
+      <p:cxnSp>
+        <p:nvCxnSpPr>
+          <p:cNvPr id="14" name="Straight Connector 13">
+            <a:extLst>
+              <a:ext uri="{FF2B5EF4-FFF2-40B4-BE49-F238E27FC236}">
+                <a16:creationId xmlns:a16="http://schemas.microsoft.com/office/drawing/2014/main" id="{317BA909-32D2-96C8-CFB2-BC0055B3F9E6}"/>
+              </a:ext>
+            </a:extLst>
+          </p:cNvPr>
+          <p:cNvCxnSpPr>
+            <a:cxnSpLocks/>
+            <a:stCxn id="10" idx="2"/>
+          </p:cNvCxnSpPr>
+          <p:nvPr/>
+        </p:nvCxnSpPr>
+        <p:spPr>
+          <a:xfrm>
+            <a:off x="1478501" y="5248174"/>
+            <a:ext cx="0" cy="574069"/>
+          </a:xfrm>
+          <a:prstGeom prst="line">
+            <a:avLst/>
+          </a:prstGeom>
+          <a:ln>
+            <a:solidFill>
+              <a:schemeClr val="accent6">
+                <a:lumMod val="75000"/>
+              </a:schemeClr>
+            </a:solidFill>
+          </a:ln>
+        </p:spPr>
+        <p:style>
+          <a:lnRef idx="2">
+            <a:schemeClr val="accent1"/>
+          </a:lnRef>
+          <a:fillRef idx="0">
+            <a:schemeClr val="accent1"/>
+          </a:fillRef>
+          <a:effectRef idx="1">
+            <a:schemeClr val="accent1"/>
+          </a:effectRef>
+          <a:fontRef idx="minor">
+            <a:schemeClr val="tx1"/>
+          </a:fontRef>
+        </p:style>
+      </p:cxnSp>
+      <p:cxnSp>
+        <p:nvCxnSpPr>
+          <p:cNvPr id="15" name="Straight Connector 14">
+            <a:extLst>
+              <a:ext uri="{FF2B5EF4-FFF2-40B4-BE49-F238E27FC236}">
+                <a16:creationId xmlns:a16="http://schemas.microsoft.com/office/drawing/2014/main" id="{04B45E2F-B301-F34F-C5D2-1E4FFD10858C}"/>
+              </a:ext>
+            </a:extLst>
+          </p:cNvPr>
+          <p:cNvCxnSpPr>
+            <a:cxnSpLocks/>
+            <a:stCxn id="11" idx="2"/>
+          </p:cNvCxnSpPr>
+          <p:nvPr/>
+        </p:nvCxnSpPr>
+        <p:spPr>
+          <a:xfrm>
+            <a:off x="2151474" y="5248174"/>
+            <a:ext cx="0" cy="560444"/>
+          </a:xfrm>
+          <a:prstGeom prst="line">
+            <a:avLst/>
+          </a:prstGeom>
+          <a:ln>
+            <a:solidFill>
+              <a:schemeClr val="accent6">
+                <a:lumMod val="75000"/>
+              </a:schemeClr>
+            </a:solidFill>
+          </a:ln>
+        </p:spPr>
+        <p:style>
+          <a:lnRef idx="2">
+            <a:schemeClr val="accent1"/>
+          </a:lnRef>
+          <a:fillRef idx="0">
+            <a:schemeClr val="accent1"/>
+          </a:fillRef>
+          <a:effectRef idx="1">
+            <a:schemeClr val="accent1"/>
+          </a:effectRef>
+          <a:fontRef idx="minor">
+            <a:schemeClr val="tx1"/>
+          </a:fontRef>
+        </p:style>
+      </p:cxnSp>
+      <p:cxnSp>
+        <p:nvCxnSpPr>
+          <p:cNvPr id="18" name="Straight Connector 17">
+            <a:extLst>
+              <a:ext uri="{FF2B5EF4-FFF2-40B4-BE49-F238E27FC236}">
+                <a16:creationId xmlns:a16="http://schemas.microsoft.com/office/drawing/2014/main" id="{F494B594-3FFD-B1CA-EC0E-5D8E13DA8076}"/>
+              </a:ext>
+            </a:extLst>
+          </p:cNvPr>
+          <p:cNvCxnSpPr>
+            <a:cxnSpLocks/>
+            <a:endCxn id="9" idx="0"/>
+          </p:cNvCxnSpPr>
+          <p:nvPr/>
+        </p:nvCxnSpPr>
+        <p:spPr>
+          <a:xfrm>
+            <a:off x="805528" y="4233494"/>
+            <a:ext cx="0" cy="444029"/>
+          </a:xfrm>
+          <a:prstGeom prst="line">
+            <a:avLst/>
+          </a:prstGeom>
+          <a:ln>
+            <a:solidFill>
+              <a:schemeClr val="bg1">
+                <a:lumMod val="65000"/>
+              </a:schemeClr>
+            </a:solidFill>
+          </a:ln>
+        </p:spPr>
+        <p:style>
+          <a:lnRef idx="2">
+            <a:schemeClr val="accent1"/>
+          </a:lnRef>
+          <a:fillRef idx="0">
+            <a:schemeClr val="accent1"/>
+          </a:fillRef>
+          <a:effectRef idx="1">
+            <a:schemeClr val="accent1"/>
+          </a:effectRef>
+          <a:fontRef idx="minor">
+            <a:schemeClr val="tx1"/>
+          </a:fontRef>
+        </p:style>
+      </p:cxnSp>
+      <p:cxnSp>
+        <p:nvCxnSpPr>
+          <p:cNvPr id="20" name="Straight Connector 19">
+            <a:extLst>
+              <a:ext uri="{FF2B5EF4-FFF2-40B4-BE49-F238E27FC236}">
+                <a16:creationId xmlns:a16="http://schemas.microsoft.com/office/drawing/2014/main" id="{BFA816D2-E446-A74A-9682-38897C502E11}"/>
+              </a:ext>
+            </a:extLst>
+          </p:cNvPr>
+          <p:cNvCxnSpPr>
+            <a:cxnSpLocks/>
+          </p:cNvCxnSpPr>
+          <p:nvPr/>
+        </p:nvCxnSpPr>
+        <p:spPr>
+          <a:xfrm>
+            <a:off x="1462329" y="4218564"/>
+            <a:ext cx="0" cy="458959"/>
+          </a:xfrm>
+          <a:prstGeom prst="line">
+            <a:avLst/>
+          </a:prstGeom>
+          <a:ln>
+            <a:solidFill>
+              <a:schemeClr val="bg1">
+                <a:lumMod val="65000"/>
+              </a:schemeClr>
+            </a:solidFill>
+          </a:ln>
+        </p:spPr>
+        <p:style>
+          <a:lnRef idx="2">
+            <a:schemeClr val="accent1"/>
+          </a:lnRef>
+          <a:fillRef idx="0">
+            <a:schemeClr val="accent1"/>
+          </a:fillRef>
+          <a:effectRef idx="1">
+            <a:schemeClr val="accent1"/>
+          </a:effectRef>
+          <a:fontRef idx="minor">
+            <a:schemeClr val="tx1"/>
+          </a:fontRef>
+        </p:style>
+      </p:cxnSp>
+      <p:cxnSp>
+        <p:nvCxnSpPr>
+          <p:cNvPr id="22" name="Straight Connector 21">
+            <a:extLst>
+              <a:ext uri="{FF2B5EF4-FFF2-40B4-BE49-F238E27FC236}">
+                <a16:creationId xmlns:a16="http://schemas.microsoft.com/office/drawing/2014/main" id="{24713D87-424F-29B0-F00D-CA1E4A5FA7BD}"/>
+              </a:ext>
+            </a:extLst>
+          </p:cNvPr>
+          <p:cNvCxnSpPr>
+            <a:cxnSpLocks/>
+          </p:cNvCxnSpPr>
+          <p:nvPr/>
+        </p:nvCxnSpPr>
+        <p:spPr>
+          <a:xfrm>
+            <a:off x="2137878" y="4204122"/>
+            <a:ext cx="0" cy="480807"/>
+          </a:xfrm>
+          <a:prstGeom prst="line">
+            <a:avLst/>
+          </a:prstGeom>
+          <a:ln>
+            <a:solidFill>
+              <a:schemeClr val="bg1">
+                <a:lumMod val="65000"/>
+              </a:schemeClr>
+            </a:solidFill>
+          </a:ln>
+        </p:spPr>
+        <p:style>
+          <a:lnRef idx="2">
+            <a:schemeClr val="accent1"/>
+          </a:lnRef>
+          <a:fillRef idx="0">
+            <a:schemeClr val="accent1"/>
+          </a:fillRef>
+          <a:effectRef idx="1">
+            <a:schemeClr val="accent1"/>
+          </a:effectRef>
+          <a:fontRef idx="minor">
+            <a:schemeClr val="tx1"/>
+          </a:fontRef>
+        </p:style>
+      </p:cxnSp>
+      <p:pic>
+        <p:nvPicPr>
+          <p:cNvPr id="25" name="Picture 24">
+            <a:extLst>
+              <a:ext uri="{FF2B5EF4-FFF2-40B4-BE49-F238E27FC236}">
+                <a16:creationId xmlns:a16="http://schemas.microsoft.com/office/drawing/2014/main" id="{D7D8A35E-20C3-D7EA-F120-F068A4022B06}"/>
+              </a:ext>
+            </a:extLst>
+          </p:cNvPr>
+          <p:cNvPicPr>
+            <a:picLocks noChangeAspect="1"/>
+          </p:cNvPicPr>
+          <p:nvPr/>
+        </p:nvPicPr>
+        <p:blipFill>
+          <a:blip r:embed="rId4"/>
+          <a:stretch>
+            <a:fillRect/>
+          </a:stretch>
+        </p:blipFill>
+        <p:spPr>
+          <a:xfrm>
+            <a:off x="3190255" y="4642111"/>
+            <a:ext cx="485714" cy="466667"/>
+          </a:xfrm>
+          <a:prstGeom prst="rect">
+            <a:avLst/>
+          </a:prstGeom>
+        </p:spPr>
+      </p:pic>
+      <p:sp>
+        <p:nvSpPr>
+          <p:cNvPr id="26" name="TextBox 25">
+            <a:extLst>
+              <a:ext uri="{FF2B5EF4-FFF2-40B4-BE49-F238E27FC236}">
+                <a16:creationId xmlns:a16="http://schemas.microsoft.com/office/drawing/2014/main" id="{6C0EF5E4-28B9-CA9D-14E8-D62DFA151D82}"/>
+              </a:ext>
+            </a:extLst>
+          </p:cNvPr>
+          <p:cNvSpPr txBox="1"/>
+          <p:nvPr/>
+        </p:nvSpPr>
+        <p:spPr>
+          <a:xfrm>
+            <a:off x="545265" y="4701238"/>
+            <a:ext cx="549146" cy="261610"/>
+          </a:xfrm>
+          <a:prstGeom prst="rect">
+            <a:avLst/>
+          </a:prstGeom>
+          <a:noFill/>
+        </p:spPr>
+        <p:txBody>
+          <a:bodyPr wrap="square">
+            <a:spAutoFit/>
+          </a:bodyPr>
+          <a:lstStyle/>
+          <a:p>
+            <a:r>
+              <a:rPr lang="en-SG" sz="1100" b="1" dirty="0">
+                <a:solidFill>
+                  <a:schemeClr val="bg1"/>
+                </a:solidFill>
+              </a:rPr>
+              <a:t>PLC0</a:t>
+            </a:r>
+          </a:p>
+        </p:txBody>
+      </p:sp>
+      <p:sp>
+        <p:nvSpPr>
+          <p:cNvPr id="27" name="TextBox 26">
+            <a:extLst>
+              <a:ext uri="{FF2B5EF4-FFF2-40B4-BE49-F238E27FC236}">
+                <a16:creationId xmlns:a16="http://schemas.microsoft.com/office/drawing/2014/main" id="{2DC9A73B-4E66-2745-3CEC-B0A1B4BE92AA}"/>
+              </a:ext>
+            </a:extLst>
+          </p:cNvPr>
+          <p:cNvSpPr txBox="1"/>
+          <p:nvPr/>
+        </p:nvSpPr>
+        <p:spPr>
+          <a:xfrm>
+            <a:off x="1233791" y="4701238"/>
+            <a:ext cx="549146" cy="261610"/>
+          </a:xfrm>
+          <a:prstGeom prst="rect">
+            <a:avLst/>
+          </a:prstGeom>
+          <a:noFill/>
+        </p:spPr>
+        <p:txBody>
+          <a:bodyPr wrap="square">
+            <a:spAutoFit/>
+          </a:bodyPr>
+          <a:lstStyle/>
+          <a:p>
+            <a:r>
+              <a:rPr lang="en-SG" sz="1100" b="1" dirty="0">
+                <a:solidFill>
+                  <a:schemeClr val="bg1"/>
+                </a:solidFill>
+              </a:rPr>
+              <a:t>PLC1</a:t>
+            </a:r>
+          </a:p>
+        </p:txBody>
+      </p:sp>
+      <p:sp>
+        <p:nvSpPr>
+          <p:cNvPr id="28" name="TextBox 27">
+            <a:extLst>
+              <a:ext uri="{FF2B5EF4-FFF2-40B4-BE49-F238E27FC236}">
+                <a16:creationId xmlns:a16="http://schemas.microsoft.com/office/drawing/2014/main" id="{AEE32C37-9800-F537-43D7-FF7E4B43B648}"/>
+              </a:ext>
+            </a:extLst>
+          </p:cNvPr>
+          <p:cNvSpPr txBox="1"/>
+          <p:nvPr/>
+        </p:nvSpPr>
+        <p:spPr>
+          <a:xfrm>
+            <a:off x="1933476" y="4691703"/>
+            <a:ext cx="549146" cy="261610"/>
+          </a:xfrm>
+          <a:prstGeom prst="rect">
+            <a:avLst/>
+          </a:prstGeom>
+          <a:noFill/>
+        </p:spPr>
+        <p:txBody>
+          <a:bodyPr wrap="square">
+            <a:spAutoFit/>
+          </a:bodyPr>
+          <a:lstStyle/>
+          <a:p>
+            <a:r>
+              <a:rPr lang="en-SG" sz="1100" b="1" dirty="0">
+                <a:solidFill>
+                  <a:schemeClr val="bg1"/>
+                </a:solidFill>
+              </a:rPr>
+              <a:t>PLC2</a:t>
+            </a:r>
+          </a:p>
+        </p:txBody>
+      </p:sp>
+      <p:sp>
+        <p:nvSpPr>
+          <p:cNvPr id="12" name="TextBox 11">
+            <a:extLst>
+              <a:ext uri="{FF2B5EF4-FFF2-40B4-BE49-F238E27FC236}">
+                <a16:creationId xmlns:a16="http://schemas.microsoft.com/office/drawing/2014/main" id="{BC940150-B89C-1AE6-2CD8-7AF6829EB1AE}"/>
+              </a:ext>
+            </a:extLst>
+          </p:cNvPr>
+          <p:cNvSpPr txBox="1"/>
+          <p:nvPr/>
+        </p:nvSpPr>
+        <p:spPr>
+          <a:xfrm>
+            <a:off x="686030" y="3899946"/>
+            <a:ext cx="1644668" cy="430887"/>
+          </a:xfrm>
+          <a:prstGeom prst="rect">
+            <a:avLst/>
+          </a:prstGeom>
+          <a:solidFill>
+            <a:schemeClr val="bg2">
+              <a:lumMod val="90000"/>
+            </a:schemeClr>
+          </a:solidFill>
+          <a:ln w="19050">
+            <a:solidFill>
+              <a:schemeClr val="tx1"/>
+            </a:solidFill>
+          </a:ln>
+        </p:spPr>
+        <p:txBody>
+          <a:bodyPr wrap="square">
+            <a:spAutoFit/>
+          </a:bodyPr>
+          <a:lstStyle/>
+          <a:p>
+            <a:r>
+              <a:rPr lang="en-SG" sz="1100" b="1" dirty="0"/>
+              <a:t>Circuit breaker logistic signal interface </a:t>
+            </a:r>
+          </a:p>
+        </p:txBody>
+      </p:sp>
+      <p:sp>
+        <p:nvSpPr>
+          <p:cNvPr id="29" name="TextBox 28">
+            <a:extLst>
+              <a:ext uri="{FF2B5EF4-FFF2-40B4-BE49-F238E27FC236}">
+                <a16:creationId xmlns:a16="http://schemas.microsoft.com/office/drawing/2014/main" id="{11336F49-18FF-0870-BA89-EAC36FF72D5D}"/>
+              </a:ext>
+            </a:extLst>
+          </p:cNvPr>
+          <p:cNvSpPr txBox="1"/>
+          <p:nvPr/>
+        </p:nvSpPr>
+        <p:spPr>
+          <a:xfrm>
+            <a:off x="3284107" y="3900333"/>
+            <a:ext cx="1873107" cy="430887"/>
+          </a:xfrm>
+          <a:prstGeom prst="rect">
+            <a:avLst/>
+          </a:prstGeom>
+          <a:solidFill>
+            <a:schemeClr val="bg2">
+              <a:lumMod val="90000"/>
+            </a:schemeClr>
+          </a:solidFill>
+          <a:ln w="19050">
+            <a:solidFill>
+              <a:schemeClr val="tx1"/>
+            </a:solidFill>
+          </a:ln>
+        </p:spPr>
+        <p:txBody>
+          <a:bodyPr wrap="square">
+            <a:spAutoFit/>
+          </a:bodyPr>
+          <a:lstStyle/>
+          <a:p>
+            <a:r>
+              <a:rPr lang="en-SG" sz="1100" b="1" dirty="0"/>
+              <a:t>SV sensors </a:t>
+            </a:r>
+            <a:r>
+              <a:rPr lang="en-SG" sz="1100" b="1" dirty="0" err="1"/>
+              <a:t>analog</a:t>
+            </a:r>
+            <a:r>
+              <a:rPr lang="en-SG" sz="1100" b="1" dirty="0"/>
+              <a:t> / linear signal interface </a:t>
+            </a:r>
+          </a:p>
+        </p:txBody>
+      </p:sp>
+      <p:sp>
+        <p:nvSpPr>
+          <p:cNvPr id="30" name="Rectangle 29">
+            <a:extLst>
+              <a:ext uri="{FF2B5EF4-FFF2-40B4-BE49-F238E27FC236}">
+                <a16:creationId xmlns:a16="http://schemas.microsoft.com/office/drawing/2014/main" id="{9FC6F123-A5F9-6198-07E8-C4EA66C8E110}"/>
+              </a:ext>
+            </a:extLst>
+          </p:cNvPr>
+          <p:cNvSpPr/>
+          <p:nvPr/>
+        </p:nvSpPr>
+        <p:spPr>
+          <a:xfrm>
+            <a:off x="3186110" y="4589174"/>
+            <a:ext cx="2049668" cy="698136"/>
+          </a:xfrm>
+          <a:prstGeom prst="rect">
+            <a:avLst/>
+          </a:prstGeom>
+          <a:noFill/>
+          <a:ln>
+            <a:prstDash val="sysDash"/>
+          </a:ln>
+        </p:spPr>
+        <p:style>
+          <a:lnRef idx="2">
+            <a:schemeClr val="accent1">
+              <a:shade val="15000"/>
+            </a:schemeClr>
+          </a:lnRef>
+          <a:fillRef idx="1">
+            <a:schemeClr val="accent1"/>
+          </a:fillRef>
+          <a:effectRef idx="0">
+            <a:schemeClr val="accent1"/>
+          </a:effectRef>
+          <a:fontRef idx="minor">
+            <a:schemeClr val="lt1"/>
+          </a:fontRef>
+        </p:style>
+        <p:txBody>
+          <a:bodyPr rtlCol="0" anchor="ctr"/>
+          <a:lstStyle/>
+          <a:p>
+            <a:pPr algn="ctr"/>
+            <a:endParaRPr lang="en-SG" dirty="0"/>
+          </a:p>
+        </p:txBody>
+      </p:sp>
+      <p:pic>
+        <p:nvPicPr>
+          <p:cNvPr id="31" name="Picture 30">
+            <a:extLst>
+              <a:ext uri="{FF2B5EF4-FFF2-40B4-BE49-F238E27FC236}">
+                <a16:creationId xmlns:a16="http://schemas.microsoft.com/office/drawing/2014/main" id="{7FA03EDA-33D5-6416-1F7F-8AF6AE8FA534}"/>
+              </a:ext>
+            </a:extLst>
+          </p:cNvPr>
+          <p:cNvPicPr>
+            <a:picLocks noChangeAspect="1"/>
+          </p:cNvPicPr>
+          <p:nvPr/>
+        </p:nvPicPr>
+        <p:blipFill>
+          <a:blip r:embed="rId4"/>
+          <a:stretch>
+            <a:fillRect/>
+          </a:stretch>
+        </p:blipFill>
+        <p:spPr>
+          <a:xfrm>
+            <a:off x="3796075" y="4642111"/>
+            <a:ext cx="485714" cy="466667"/>
+          </a:xfrm>
+          <a:prstGeom prst="rect">
+            <a:avLst/>
+          </a:prstGeom>
+        </p:spPr>
+      </p:pic>
+      <p:pic>
+        <p:nvPicPr>
+          <p:cNvPr id="32" name="Picture 31">
+            <a:extLst>
+              <a:ext uri="{FF2B5EF4-FFF2-40B4-BE49-F238E27FC236}">
+                <a16:creationId xmlns:a16="http://schemas.microsoft.com/office/drawing/2014/main" id="{60E8D7D3-080E-AC19-708F-405F032D9D58}"/>
+              </a:ext>
+            </a:extLst>
+          </p:cNvPr>
+          <p:cNvPicPr>
+            <a:picLocks noChangeAspect="1"/>
+          </p:cNvPicPr>
+          <p:nvPr/>
+        </p:nvPicPr>
+        <p:blipFill>
+          <a:blip r:embed="rId4"/>
+          <a:stretch>
+            <a:fillRect/>
+          </a:stretch>
+        </p:blipFill>
+        <p:spPr>
+          <a:xfrm>
+            <a:off x="4571757" y="4642111"/>
+            <a:ext cx="485714" cy="466667"/>
+          </a:xfrm>
+          <a:prstGeom prst="rect">
+            <a:avLst/>
+          </a:prstGeom>
+        </p:spPr>
+      </p:pic>
+      <p:sp>
+        <p:nvSpPr>
+          <p:cNvPr id="33" name="TextBox 32">
+            <a:extLst>
+              <a:ext uri="{FF2B5EF4-FFF2-40B4-BE49-F238E27FC236}">
+                <a16:creationId xmlns:a16="http://schemas.microsoft.com/office/drawing/2014/main" id="{6DDB67C0-27E9-0F74-EDD8-EDAD7275FF35}"/>
+              </a:ext>
+            </a:extLst>
+          </p:cNvPr>
+          <p:cNvSpPr txBox="1"/>
+          <p:nvPr/>
+        </p:nvSpPr>
+        <p:spPr>
+          <a:xfrm>
+            <a:off x="4326803" y="4763888"/>
+            <a:ext cx="419604" cy="276999"/>
+          </a:xfrm>
+          <a:prstGeom prst="rect">
+            <a:avLst/>
+          </a:prstGeom>
+          <a:noFill/>
+        </p:spPr>
+        <p:txBody>
+          <a:bodyPr wrap="square">
+            <a:spAutoFit/>
+          </a:bodyPr>
+          <a:lstStyle/>
+          <a:p>
+            <a:r>
+              <a:rPr lang="en-SG" sz="1200" b="1" dirty="0"/>
+              <a:t>…</a:t>
+            </a:r>
+          </a:p>
+        </p:txBody>
+      </p:sp>
+      <p:sp>
+        <p:nvSpPr>
+          <p:cNvPr id="34" name="TextBox 33">
+            <a:extLst>
+              <a:ext uri="{FF2B5EF4-FFF2-40B4-BE49-F238E27FC236}">
+                <a16:creationId xmlns:a16="http://schemas.microsoft.com/office/drawing/2014/main" id="{C011EC24-C159-BA1C-F1BD-B81DCB29D5CF}"/>
+              </a:ext>
+            </a:extLst>
+          </p:cNvPr>
+          <p:cNvSpPr txBox="1"/>
+          <p:nvPr/>
+        </p:nvSpPr>
+        <p:spPr>
+          <a:xfrm>
+            <a:off x="3203069" y="5043959"/>
+            <a:ext cx="549146" cy="261610"/>
+          </a:xfrm>
+          <a:prstGeom prst="rect">
+            <a:avLst/>
+          </a:prstGeom>
+          <a:noFill/>
+        </p:spPr>
+        <p:txBody>
+          <a:bodyPr wrap="square">
+            <a:spAutoFit/>
+          </a:bodyPr>
+          <a:lstStyle/>
+          <a:p>
+            <a:r>
+              <a:rPr lang="en-SG" sz="1100" b="1" dirty="0"/>
+              <a:t>MU00</a:t>
+            </a:r>
+          </a:p>
+        </p:txBody>
+      </p:sp>
+      <p:sp>
+        <p:nvSpPr>
+          <p:cNvPr id="35" name="TextBox 34">
+            <a:extLst>
+              <a:ext uri="{FF2B5EF4-FFF2-40B4-BE49-F238E27FC236}">
+                <a16:creationId xmlns:a16="http://schemas.microsoft.com/office/drawing/2014/main" id="{A507C40E-CDBE-09FF-492D-D051581EA3C4}"/>
+              </a:ext>
+            </a:extLst>
+          </p:cNvPr>
+          <p:cNvSpPr txBox="1"/>
+          <p:nvPr/>
+        </p:nvSpPr>
+        <p:spPr>
+          <a:xfrm>
+            <a:off x="3769174" y="5043959"/>
+            <a:ext cx="549146" cy="261610"/>
+          </a:xfrm>
+          <a:prstGeom prst="rect">
+            <a:avLst/>
+          </a:prstGeom>
+          <a:noFill/>
+        </p:spPr>
+        <p:txBody>
+          <a:bodyPr wrap="square">
+            <a:spAutoFit/>
+          </a:bodyPr>
+          <a:lstStyle/>
+          <a:p>
+            <a:r>
+              <a:rPr lang="en-SG" sz="1100" b="1" dirty="0"/>
+              <a:t>MU01</a:t>
+            </a:r>
+          </a:p>
+        </p:txBody>
+      </p:sp>
+      <p:sp>
+        <p:nvSpPr>
+          <p:cNvPr id="36" name="TextBox 35">
+            <a:extLst>
+              <a:ext uri="{FF2B5EF4-FFF2-40B4-BE49-F238E27FC236}">
+                <a16:creationId xmlns:a16="http://schemas.microsoft.com/office/drawing/2014/main" id="{489BA76D-C7B8-BC63-BFBD-60B7E8962C96}"/>
+              </a:ext>
+            </a:extLst>
+          </p:cNvPr>
+          <p:cNvSpPr txBox="1"/>
+          <p:nvPr/>
+        </p:nvSpPr>
+        <p:spPr>
+          <a:xfrm>
+            <a:off x="4538782" y="5058756"/>
+            <a:ext cx="549146" cy="261610"/>
+          </a:xfrm>
+          <a:prstGeom prst="rect">
+            <a:avLst/>
+          </a:prstGeom>
+          <a:noFill/>
+        </p:spPr>
+        <p:txBody>
+          <a:bodyPr wrap="square">
+            <a:spAutoFit/>
+          </a:bodyPr>
+          <a:lstStyle/>
+          <a:p>
+            <a:r>
+              <a:rPr lang="en-SG" sz="1100" b="1" dirty="0"/>
+              <a:t>MU08</a:t>
+            </a:r>
+          </a:p>
+        </p:txBody>
+      </p:sp>
+      <p:cxnSp>
+        <p:nvCxnSpPr>
+          <p:cNvPr id="37" name="Straight Connector 36">
+            <a:extLst>
+              <a:ext uri="{FF2B5EF4-FFF2-40B4-BE49-F238E27FC236}">
+                <a16:creationId xmlns:a16="http://schemas.microsoft.com/office/drawing/2014/main" id="{A5CF627B-B333-D9A8-A9B9-FA79E82921A6}"/>
+              </a:ext>
+            </a:extLst>
+          </p:cNvPr>
+          <p:cNvCxnSpPr>
+            <a:cxnSpLocks/>
+            <a:endCxn id="25" idx="0"/>
+          </p:cNvCxnSpPr>
+          <p:nvPr/>
+        </p:nvCxnSpPr>
+        <p:spPr>
+          <a:xfrm>
+            <a:off x="3433112" y="4330833"/>
+            <a:ext cx="0" cy="311278"/>
+          </a:xfrm>
+          <a:prstGeom prst="line">
+            <a:avLst/>
+          </a:prstGeom>
+          <a:ln>
+            <a:solidFill>
+              <a:schemeClr val="bg1">
+                <a:lumMod val="65000"/>
+              </a:schemeClr>
+            </a:solidFill>
+          </a:ln>
+        </p:spPr>
+        <p:style>
+          <a:lnRef idx="2">
+            <a:schemeClr val="accent1"/>
+          </a:lnRef>
+          <a:fillRef idx="0">
+            <a:schemeClr val="accent1"/>
+          </a:fillRef>
+          <a:effectRef idx="1">
+            <a:schemeClr val="accent1"/>
+          </a:effectRef>
+          <a:fontRef idx="minor">
+            <a:schemeClr val="tx1"/>
+          </a:fontRef>
+        </p:style>
+      </p:cxnSp>
+      <p:cxnSp>
+        <p:nvCxnSpPr>
+          <p:cNvPr id="43" name="Straight Connector 42">
+            <a:extLst>
+              <a:ext uri="{FF2B5EF4-FFF2-40B4-BE49-F238E27FC236}">
+                <a16:creationId xmlns:a16="http://schemas.microsoft.com/office/drawing/2014/main" id="{A3E62D5D-62C7-DE52-3444-7B6E783915F4}"/>
+              </a:ext>
+            </a:extLst>
+          </p:cNvPr>
+          <p:cNvCxnSpPr>
+            <a:cxnSpLocks/>
+          </p:cNvCxnSpPr>
+          <p:nvPr/>
+        </p:nvCxnSpPr>
+        <p:spPr>
+          <a:xfrm>
+            <a:off x="4038932" y="4330833"/>
+            <a:ext cx="0" cy="311278"/>
+          </a:xfrm>
+          <a:prstGeom prst="line">
+            <a:avLst/>
+          </a:prstGeom>
+          <a:ln>
+            <a:solidFill>
+              <a:schemeClr val="bg1">
+                <a:lumMod val="65000"/>
+              </a:schemeClr>
+            </a:solidFill>
+          </a:ln>
+        </p:spPr>
+        <p:style>
+          <a:lnRef idx="2">
+            <a:schemeClr val="accent1"/>
+          </a:lnRef>
+          <a:fillRef idx="0">
+            <a:schemeClr val="accent1"/>
+          </a:fillRef>
+          <a:effectRef idx="1">
+            <a:schemeClr val="accent1"/>
+          </a:effectRef>
+          <a:fontRef idx="minor">
+            <a:schemeClr val="tx1"/>
+          </a:fontRef>
+        </p:style>
+      </p:cxnSp>
+      <p:cxnSp>
+        <p:nvCxnSpPr>
+          <p:cNvPr id="44" name="Straight Connector 43">
+            <a:extLst>
+              <a:ext uri="{FF2B5EF4-FFF2-40B4-BE49-F238E27FC236}">
+                <a16:creationId xmlns:a16="http://schemas.microsoft.com/office/drawing/2014/main" id="{389FE7C1-21F3-15DD-D62C-DF00166A0ADF}"/>
+              </a:ext>
+            </a:extLst>
+          </p:cNvPr>
+          <p:cNvCxnSpPr>
+            <a:cxnSpLocks/>
+          </p:cNvCxnSpPr>
+          <p:nvPr/>
+        </p:nvCxnSpPr>
+        <p:spPr>
+          <a:xfrm>
+            <a:off x="4807591" y="4366245"/>
+            <a:ext cx="0" cy="311278"/>
+          </a:xfrm>
+          <a:prstGeom prst="line">
+            <a:avLst/>
+          </a:prstGeom>
+          <a:ln>
+            <a:solidFill>
+              <a:schemeClr val="bg1">
+                <a:lumMod val="65000"/>
+              </a:schemeClr>
+            </a:solidFill>
+          </a:ln>
+        </p:spPr>
+        <p:style>
+          <a:lnRef idx="2">
+            <a:schemeClr val="accent1"/>
+          </a:lnRef>
+          <a:fillRef idx="0">
+            <a:schemeClr val="accent1"/>
+          </a:fillRef>
+          <a:effectRef idx="1">
+            <a:schemeClr val="accent1"/>
+          </a:effectRef>
+          <a:fontRef idx="minor">
+            <a:schemeClr val="tx1"/>
+          </a:fontRef>
+        </p:style>
+      </p:cxnSp>
+      <p:pic>
+        <p:nvPicPr>
+          <p:cNvPr id="48" name="Picture 47">
+            <a:extLst>
+              <a:ext uri="{FF2B5EF4-FFF2-40B4-BE49-F238E27FC236}">
+                <a16:creationId xmlns:a16="http://schemas.microsoft.com/office/drawing/2014/main" id="{EDAF28ED-31CE-73F3-D451-7F3C147864F9}"/>
+              </a:ext>
+            </a:extLst>
+          </p:cNvPr>
+          <p:cNvPicPr>
+            <a:picLocks noChangeAspect="1"/>
+          </p:cNvPicPr>
+          <p:nvPr/>
+        </p:nvPicPr>
+        <p:blipFill>
+          <a:blip r:embed="rId5"/>
+          <a:stretch>
+            <a:fillRect/>
+          </a:stretch>
+        </p:blipFill>
+        <p:spPr>
+          <a:xfrm>
+            <a:off x="5303533" y="5156864"/>
+            <a:ext cx="895236" cy="489183"/>
+          </a:xfrm>
+          <a:prstGeom prst="rect">
+            <a:avLst/>
+          </a:prstGeom>
+          <a:ln w="12700">
+            <a:solidFill>
+              <a:schemeClr val="tx1"/>
+            </a:solidFill>
+          </a:ln>
+        </p:spPr>
+      </p:pic>
+      <p:sp>
+        <p:nvSpPr>
+          <p:cNvPr id="49" name="TextBox 48">
+            <a:extLst>
+              <a:ext uri="{FF2B5EF4-FFF2-40B4-BE49-F238E27FC236}">
+                <a16:creationId xmlns:a16="http://schemas.microsoft.com/office/drawing/2014/main" id="{F04BF05F-8701-872B-9F57-77E09563EEB2}"/>
+              </a:ext>
+            </a:extLst>
+          </p:cNvPr>
+          <p:cNvSpPr txBox="1"/>
+          <p:nvPr/>
+        </p:nvSpPr>
+        <p:spPr>
+          <a:xfrm>
+            <a:off x="5271098" y="4910082"/>
+            <a:ext cx="1188485" cy="261610"/>
+          </a:xfrm>
+          <a:prstGeom prst="rect">
+            <a:avLst/>
+          </a:prstGeom>
+          <a:noFill/>
+        </p:spPr>
+        <p:txBody>
+          <a:bodyPr wrap="square">
+            <a:spAutoFit/>
+          </a:bodyPr>
+          <a:lstStyle/>
+          <a:p>
+            <a:r>
+              <a:rPr lang="en-SG" sz="1100" b="1" dirty="0"/>
+              <a:t>RTU simulation</a:t>
+            </a:r>
+          </a:p>
+        </p:txBody>
+      </p:sp>
+      <p:cxnSp>
+        <p:nvCxnSpPr>
+          <p:cNvPr id="51" name="Straight Connector 50">
+            <a:extLst>
+              <a:ext uri="{FF2B5EF4-FFF2-40B4-BE49-F238E27FC236}">
+                <a16:creationId xmlns:a16="http://schemas.microsoft.com/office/drawing/2014/main" id="{4215E0B4-ABEE-69B3-6788-F27FAB8458B5}"/>
+              </a:ext>
+            </a:extLst>
+          </p:cNvPr>
+          <p:cNvCxnSpPr>
+            <a:cxnSpLocks/>
+          </p:cNvCxnSpPr>
+          <p:nvPr/>
+        </p:nvCxnSpPr>
+        <p:spPr>
+          <a:xfrm>
+            <a:off x="3751586" y="5422894"/>
+            <a:ext cx="1598506" cy="0"/>
+          </a:xfrm>
+          <a:prstGeom prst="line">
+            <a:avLst/>
+          </a:prstGeom>
+          <a:ln>
+            <a:solidFill>
+              <a:schemeClr val="accent2"/>
+            </a:solidFill>
+          </a:ln>
+        </p:spPr>
+        <p:style>
+          <a:lnRef idx="2">
+            <a:schemeClr val="accent1"/>
+          </a:lnRef>
+          <a:fillRef idx="0">
+            <a:schemeClr val="accent1"/>
+          </a:fillRef>
+          <a:effectRef idx="1">
+            <a:schemeClr val="accent1"/>
+          </a:effectRef>
+          <a:fontRef idx="minor">
+            <a:schemeClr val="tx1"/>
+          </a:fontRef>
+        </p:style>
+      </p:cxnSp>
+      <p:cxnSp>
+        <p:nvCxnSpPr>
+          <p:cNvPr id="56" name="Connector: Elbow 55">
+            <a:extLst>
+              <a:ext uri="{FF2B5EF4-FFF2-40B4-BE49-F238E27FC236}">
+                <a16:creationId xmlns:a16="http://schemas.microsoft.com/office/drawing/2014/main" id="{B5A1839C-8438-93A4-2D66-B31587DFEA8B}"/>
+              </a:ext>
+            </a:extLst>
+          </p:cNvPr>
+          <p:cNvCxnSpPr>
+            <a:cxnSpLocks/>
+            <a:stCxn id="25" idx="3"/>
+          </p:cNvCxnSpPr>
+          <p:nvPr/>
+        </p:nvCxnSpPr>
+        <p:spPr>
+          <a:xfrm>
+            <a:off x="3675969" y="4875445"/>
+            <a:ext cx="75617" cy="562480"/>
+          </a:xfrm>
+          <a:prstGeom prst="bentConnector2">
+            <a:avLst/>
+          </a:prstGeom>
+          <a:ln>
+            <a:solidFill>
+              <a:schemeClr val="accent2"/>
+            </a:solidFill>
+          </a:ln>
+        </p:spPr>
+        <p:style>
+          <a:lnRef idx="2">
+            <a:schemeClr val="accent1"/>
+          </a:lnRef>
+          <a:fillRef idx="0">
+            <a:schemeClr val="accent1"/>
+          </a:fillRef>
+          <a:effectRef idx="1">
+            <a:schemeClr val="accent1"/>
+          </a:effectRef>
+          <a:fontRef idx="minor">
+            <a:schemeClr val="tx1"/>
+          </a:fontRef>
+        </p:style>
+      </p:cxnSp>
+      <p:cxnSp>
+        <p:nvCxnSpPr>
+          <p:cNvPr id="59" name="Connector: Elbow 58">
+            <a:extLst>
+              <a:ext uri="{FF2B5EF4-FFF2-40B4-BE49-F238E27FC236}">
+                <a16:creationId xmlns:a16="http://schemas.microsoft.com/office/drawing/2014/main" id="{072FF6FF-0AB1-3CF3-3D07-5A562B7E52FA}"/>
+              </a:ext>
+            </a:extLst>
+          </p:cNvPr>
+          <p:cNvCxnSpPr>
+            <a:cxnSpLocks/>
+            <a:stCxn id="31" idx="3"/>
+          </p:cNvCxnSpPr>
+          <p:nvPr/>
+        </p:nvCxnSpPr>
+        <p:spPr>
+          <a:xfrm>
+            <a:off x="4281789" y="4875445"/>
+            <a:ext cx="63259" cy="547449"/>
+          </a:xfrm>
+          <a:prstGeom prst="bentConnector2">
+            <a:avLst/>
+          </a:prstGeom>
+          <a:ln>
+            <a:solidFill>
+              <a:schemeClr val="accent2"/>
+            </a:solidFill>
+          </a:ln>
+        </p:spPr>
+        <p:style>
+          <a:lnRef idx="2">
+            <a:schemeClr val="accent1"/>
+          </a:lnRef>
+          <a:fillRef idx="0">
+            <a:schemeClr val="accent1"/>
+          </a:fillRef>
+          <a:effectRef idx="1">
+            <a:schemeClr val="accent1"/>
+          </a:effectRef>
+          <a:fontRef idx="minor">
+            <a:schemeClr val="tx1"/>
+          </a:fontRef>
+        </p:style>
+      </p:cxnSp>
+      <p:cxnSp>
+        <p:nvCxnSpPr>
+          <p:cNvPr id="63" name="Connector: Elbow 62">
+            <a:extLst>
+              <a:ext uri="{FF2B5EF4-FFF2-40B4-BE49-F238E27FC236}">
+                <a16:creationId xmlns:a16="http://schemas.microsoft.com/office/drawing/2014/main" id="{BA81921A-5B61-7BA5-49F6-9386FA1329D1}"/>
+              </a:ext>
+            </a:extLst>
+          </p:cNvPr>
+          <p:cNvCxnSpPr>
+            <a:cxnSpLocks/>
+            <a:stCxn id="32" idx="3"/>
+          </p:cNvCxnSpPr>
+          <p:nvPr/>
+        </p:nvCxnSpPr>
+        <p:spPr>
+          <a:xfrm>
+            <a:off x="5057471" y="4875445"/>
+            <a:ext cx="44239" cy="547449"/>
+          </a:xfrm>
+          <a:prstGeom prst="bentConnector2">
+            <a:avLst/>
+          </a:prstGeom>
+          <a:ln>
+            <a:solidFill>
+              <a:schemeClr val="accent2"/>
+            </a:solidFill>
+          </a:ln>
+        </p:spPr>
+        <p:style>
+          <a:lnRef idx="2">
+            <a:schemeClr val="accent1"/>
+          </a:lnRef>
+          <a:fillRef idx="0">
+            <a:schemeClr val="accent1"/>
+          </a:fillRef>
+          <a:effectRef idx="1">
+            <a:schemeClr val="accent1"/>
+          </a:effectRef>
+          <a:fontRef idx="minor">
+            <a:schemeClr val="tx1"/>
+          </a:fontRef>
+        </p:style>
+      </p:cxnSp>
+      <p:sp>
+        <p:nvSpPr>
+          <p:cNvPr id="66" name="TextBox 65">
+            <a:extLst>
+              <a:ext uri="{FF2B5EF4-FFF2-40B4-BE49-F238E27FC236}">
+                <a16:creationId xmlns:a16="http://schemas.microsoft.com/office/drawing/2014/main" id="{31DB01C4-C275-6FF9-762B-0A21162F8547}"/>
+              </a:ext>
+            </a:extLst>
+          </p:cNvPr>
+          <p:cNvSpPr txBox="1"/>
+          <p:nvPr/>
+        </p:nvSpPr>
+        <p:spPr>
+          <a:xfrm>
+            <a:off x="3672592" y="5462241"/>
+            <a:ext cx="1598506" cy="261610"/>
+          </a:xfrm>
+          <a:prstGeom prst="rect">
+            <a:avLst/>
+          </a:prstGeom>
+          <a:noFill/>
+        </p:spPr>
+        <p:txBody>
+          <a:bodyPr wrap="square">
+            <a:spAutoFit/>
+          </a:bodyPr>
+          <a:lstStyle/>
+          <a:p>
+            <a:r>
+              <a:rPr lang="en-SG" sz="1100" b="1" dirty="0">
+                <a:solidFill>
+                  <a:schemeClr val="bg1">
+                    <a:lumMod val="50000"/>
+                  </a:schemeClr>
+                </a:solidFill>
+              </a:rPr>
+              <a:t>Simulated MMS Bus</a:t>
+            </a:r>
+          </a:p>
+        </p:txBody>
+      </p:sp>
+      <p:cxnSp>
+        <p:nvCxnSpPr>
+          <p:cNvPr id="67" name="Straight Connector 66">
+            <a:extLst>
+              <a:ext uri="{FF2B5EF4-FFF2-40B4-BE49-F238E27FC236}">
+                <a16:creationId xmlns:a16="http://schemas.microsoft.com/office/drawing/2014/main" id="{3A490003-5B9D-95C0-C725-56A5AF5B2B0B}"/>
+              </a:ext>
+            </a:extLst>
+          </p:cNvPr>
+          <p:cNvCxnSpPr>
+            <a:cxnSpLocks/>
+          </p:cNvCxnSpPr>
+          <p:nvPr/>
+        </p:nvCxnSpPr>
+        <p:spPr>
+          <a:xfrm>
+            <a:off x="805528" y="5815430"/>
+            <a:ext cx="9860295" cy="33964"/>
+          </a:xfrm>
+          <a:prstGeom prst="line">
+            <a:avLst/>
+          </a:prstGeom>
+          <a:ln>
+            <a:solidFill>
+              <a:schemeClr val="accent6">
+                <a:lumMod val="75000"/>
+              </a:schemeClr>
+            </a:solidFill>
+          </a:ln>
+        </p:spPr>
+        <p:style>
+          <a:lnRef idx="2">
+            <a:schemeClr val="accent1"/>
+          </a:lnRef>
+          <a:fillRef idx="0">
+            <a:schemeClr val="accent1"/>
+          </a:fillRef>
+          <a:effectRef idx="1">
+            <a:schemeClr val="accent1"/>
+          </a:effectRef>
+          <a:fontRef idx="minor">
+            <a:schemeClr val="tx1"/>
+          </a:fontRef>
+        </p:style>
+      </p:cxnSp>
+      <p:sp>
+        <p:nvSpPr>
+          <p:cNvPr id="72" name="TextBox 71">
+            <a:extLst>
+              <a:ext uri="{FF2B5EF4-FFF2-40B4-BE49-F238E27FC236}">
+                <a16:creationId xmlns:a16="http://schemas.microsoft.com/office/drawing/2014/main" id="{C6C43B3D-F5BE-4C0C-3F3B-E1CB5CEF425C}"/>
+              </a:ext>
+            </a:extLst>
+          </p:cNvPr>
+          <p:cNvSpPr txBox="1"/>
+          <p:nvPr/>
+        </p:nvSpPr>
+        <p:spPr>
+          <a:xfrm>
+            <a:off x="676637" y="5849394"/>
+            <a:ext cx="2124253" cy="261610"/>
+          </a:xfrm>
+          <a:prstGeom prst="rect">
+            <a:avLst/>
+          </a:prstGeom>
+          <a:noFill/>
+        </p:spPr>
+        <p:txBody>
+          <a:bodyPr wrap="square">
+            <a:spAutoFit/>
+          </a:bodyPr>
+          <a:lstStyle/>
+          <a:p>
+            <a:r>
+              <a:rPr lang="en-SG" sz="1100" b="1" dirty="0"/>
+              <a:t>IEC 61850 Modbus-TCP Bus</a:t>
+            </a:r>
+          </a:p>
+        </p:txBody>
+      </p:sp>
+      <p:cxnSp>
+        <p:nvCxnSpPr>
+          <p:cNvPr id="81" name="Straight Connector 80">
+            <a:extLst>
+              <a:ext uri="{FF2B5EF4-FFF2-40B4-BE49-F238E27FC236}">
+                <a16:creationId xmlns:a16="http://schemas.microsoft.com/office/drawing/2014/main" id="{F0BE06AF-4036-625C-AC9F-5EFCEE6E770C}"/>
+              </a:ext>
+            </a:extLst>
+          </p:cNvPr>
+          <p:cNvCxnSpPr>
+            <a:cxnSpLocks/>
+          </p:cNvCxnSpPr>
+          <p:nvPr/>
+        </p:nvCxnSpPr>
+        <p:spPr>
+          <a:xfrm>
+            <a:off x="6198769" y="5384437"/>
+            <a:ext cx="4467054" cy="0"/>
+          </a:xfrm>
+          <a:prstGeom prst="line">
+            <a:avLst/>
+          </a:prstGeom>
+          <a:ln>
+            <a:solidFill>
+              <a:schemeClr val="tx2">
+                <a:lumMod val="50000"/>
+                <a:lumOff val="50000"/>
+              </a:schemeClr>
+            </a:solidFill>
+          </a:ln>
+        </p:spPr>
+        <p:style>
+          <a:lnRef idx="2">
+            <a:schemeClr val="accent1"/>
+          </a:lnRef>
+          <a:fillRef idx="0">
+            <a:schemeClr val="accent1"/>
+          </a:fillRef>
+          <a:effectRef idx="1">
+            <a:schemeClr val="accent1"/>
+          </a:effectRef>
+          <a:fontRef idx="minor">
+            <a:schemeClr val="tx1"/>
+          </a:fontRef>
+        </p:style>
+      </p:cxnSp>
+      <p:sp>
+        <p:nvSpPr>
+          <p:cNvPr id="84" name="TextBox 83">
+            <a:extLst>
+              <a:ext uri="{FF2B5EF4-FFF2-40B4-BE49-F238E27FC236}">
+                <a16:creationId xmlns:a16="http://schemas.microsoft.com/office/drawing/2014/main" id="{491F625F-9B2D-D9EB-DC6A-DE551F1803BF}"/>
+              </a:ext>
+            </a:extLst>
+          </p:cNvPr>
+          <p:cNvSpPr txBox="1"/>
+          <p:nvPr/>
+        </p:nvSpPr>
+        <p:spPr>
+          <a:xfrm>
+            <a:off x="2118761" y="5263408"/>
+            <a:ext cx="965888" cy="430887"/>
+          </a:xfrm>
+          <a:prstGeom prst="rect">
+            <a:avLst/>
+          </a:prstGeom>
+          <a:noFill/>
+        </p:spPr>
+        <p:txBody>
+          <a:bodyPr wrap="square">
+            <a:spAutoFit/>
+          </a:bodyPr>
+          <a:lstStyle/>
+          <a:p>
+            <a:r>
+              <a:rPr lang="en-SG" sz="1100" b="1" dirty="0"/>
+              <a:t>PLC </a:t>
+            </a:r>
+          </a:p>
+          <a:p>
+            <a:r>
+              <a:rPr lang="en-SG" sz="1100" b="1" dirty="0"/>
+              <a:t>simulation</a:t>
+            </a:r>
+          </a:p>
+        </p:txBody>
+      </p:sp>
+      <p:sp>
+        <p:nvSpPr>
+          <p:cNvPr id="85" name="TextBox 84">
+            <a:extLst>
+              <a:ext uri="{FF2B5EF4-FFF2-40B4-BE49-F238E27FC236}">
+                <a16:creationId xmlns:a16="http://schemas.microsoft.com/office/drawing/2014/main" id="{E2C5526B-D60D-4623-680E-F60150FC638D}"/>
+              </a:ext>
+            </a:extLst>
+          </p:cNvPr>
+          <p:cNvSpPr txBox="1"/>
+          <p:nvPr/>
+        </p:nvSpPr>
+        <p:spPr>
+          <a:xfrm>
+            <a:off x="5163258" y="4240097"/>
+            <a:ext cx="1218746" cy="430887"/>
+          </a:xfrm>
+          <a:prstGeom prst="rect">
+            <a:avLst/>
+          </a:prstGeom>
+          <a:noFill/>
+        </p:spPr>
+        <p:txBody>
+          <a:bodyPr wrap="square">
+            <a:spAutoFit/>
+          </a:bodyPr>
+          <a:lstStyle/>
+          <a:p>
+            <a:r>
+              <a:rPr lang="en-SG" sz="1100" b="1" dirty="0"/>
+              <a:t>Measurement Unit simulation</a:t>
+            </a:r>
+          </a:p>
+        </p:txBody>
+      </p:sp>
+      <p:sp>
+        <p:nvSpPr>
+          <p:cNvPr id="86" name="TextBox 85">
+            <a:extLst>
+              <a:ext uri="{FF2B5EF4-FFF2-40B4-BE49-F238E27FC236}">
+                <a16:creationId xmlns:a16="http://schemas.microsoft.com/office/drawing/2014/main" id="{2167346C-3433-FEFB-AAB1-EB5EE7C7DCC0}"/>
+              </a:ext>
+            </a:extLst>
+          </p:cNvPr>
+          <p:cNvSpPr txBox="1"/>
+          <p:nvPr/>
+        </p:nvSpPr>
+        <p:spPr>
+          <a:xfrm>
+            <a:off x="6173194" y="5384437"/>
+            <a:ext cx="1238042" cy="261610"/>
+          </a:xfrm>
+          <a:prstGeom prst="rect">
+            <a:avLst/>
+          </a:prstGeom>
+          <a:noFill/>
+        </p:spPr>
+        <p:txBody>
+          <a:bodyPr wrap="square">
+            <a:spAutoFit/>
+          </a:bodyPr>
+          <a:lstStyle/>
+          <a:p>
+            <a:r>
+              <a:rPr lang="en-SG" sz="1100" b="1" dirty="0">
+                <a:solidFill>
+                  <a:srgbClr val="0070C0"/>
+                </a:solidFill>
+              </a:rPr>
+              <a:t>S7Comm Bus</a:t>
+            </a:r>
+          </a:p>
+        </p:txBody>
+      </p:sp>
+      <p:pic>
+        <p:nvPicPr>
+          <p:cNvPr id="89" name="Picture 88">
+            <a:extLst>
+              <a:ext uri="{FF2B5EF4-FFF2-40B4-BE49-F238E27FC236}">
+                <a16:creationId xmlns:a16="http://schemas.microsoft.com/office/drawing/2014/main" id="{EF71F31F-C361-5264-C7F8-89CF8643A84B}"/>
+              </a:ext>
+            </a:extLst>
+          </p:cNvPr>
+          <p:cNvPicPr>
+            <a:picLocks noChangeAspect="1"/>
+          </p:cNvPicPr>
+          <p:nvPr/>
+        </p:nvPicPr>
+        <p:blipFill>
+          <a:blip r:embed="rId6"/>
+          <a:stretch>
+            <a:fillRect/>
+          </a:stretch>
+        </p:blipFill>
+        <p:spPr>
+          <a:xfrm>
+            <a:off x="5829983" y="1193864"/>
+            <a:ext cx="5097982" cy="2922842"/>
+          </a:xfrm>
+          <a:prstGeom prst="rect">
+            <a:avLst/>
+          </a:prstGeom>
+        </p:spPr>
+      </p:pic>
+      <p:cxnSp>
+        <p:nvCxnSpPr>
+          <p:cNvPr id="92" name="Straight Connector 91">
+            <a:extLst>
+              <a:ext uri="{FF2B5EF4-FFF2-40B4-BE49-F238E27FC236}">
+                <a16:creationId xmlns:a16="http://schemas.microsoft.com/office/drawing/2014/main" id="{084D60AD-4CDC-6FFB-7356-30EE227F406F}"/>
+              </a:ext>
+            </a:extLst>
+          </p:cNvPr>
+          <p:cNvCxnSpPr>
+            <a:cxnSpLocks/>
+            <a:stCxn id="102" idx="0"/>
+          </p:cNvCxnSpPr>
+          <p:nvPr/>
+        </p:nvCxnSpPr>
+        <p:spPr>
+          <a:xfrm flipH="1" flipV="1">
+            <a:off x="9461182" y="4564416"/>
+            <a:ext cx="1104" cy="555012"/>
+          </a:xfrm>
+          <a:prstGeom prst="line">
+            <a:avLst/>
+          </a:prstGeom>
+          <a:ln>
+            <a:solidFill>
+              <a:schemeClr val="tx2">
+                <a:lumMod val="50000"/>
+                <a:lumOff val="50000"/>
+              </a:schemeClr>
+            </a:solidFill>
+          </a:ln>
+        </p:spPr>
+        <p:style>
+          <a:lnRef idx="2">
+            <a:schemeClr val="accent1"/>
+          </a:lnRef>
+          <a:fillRef idx="0">
+            <a:schemeClr val="accent1"/>
+          </a:fillRef>
+          <a:effectRef idx="1">
+            <a:schemeClr val="accent1"/>
+          </a:effectRef>
+          <a:fontRef idx="minor">
+            <a:schemeClr val="tx1"/>
+          </a:fontRef>
+        </p:style>
+      </p:cxnSp>
+      <p:cxnSp>
+        <p:nvCxnSpPr>
+          <p:cNvPr id="96" name="Straight Connector 95">
+            <a:extLst>
+              <a:ext uri="{FF2B5EF4-FFF2-40B4-BE49-F238E27FC236}">
+                <a16:creationId xmlns:a16="http://schemas.microsoft.com/office/drawing/2014/main" id="{C629F537-82B0-91E7-95CD-825D63639ED5}"/>
+              </a:ext>
+            </a:extLst>
+          </p:cNvPr>
+          <p:cNvCxnSpPr>
+            <a:cxnSpLocks/>
+            <a:stCxn id="98" idx="2"/>
+          </p:cNvCxnSpPr>
+          <p:nvPr/>
+        </p:nvCxnSpPr>
+        <p:spPr>
+          <a:xfrm>
+            <a:off x="7784088" y="4409312"/>
+            <a:ext cx="0" cy="1423100"/>
+          </a:xfrm>
+          <a:prstGeom prst="line">
+            <a:avLst/>
+          </a:prstGeom>
+          <a:ln>
+            <a:solidFill>
+              <a:schemeClr val="accent6">
+                <a:lumMod val="75000"/>
+              </a:schemeClr>
+            </a:solidFill>
+          </a:ln>
+        </p:spPr>
+        <p:style>
+          <a:lnRef idx="2">
+            <a:schemeClr val="accent1"/>
+          </a:lnRef>
+          <a:fillRef idx="0">
+            <a:schemeClr val="accent1"/>
+          </a:fillRef>
+          <a:effectRef idx="1">
+            <a:schemeClr val="accent1"/>
+          </a:effectRef>
+          <a:fontRef idx="minor">
+            <a:schemeClr val="tx1"/>
+          </a:fontRef>
+        </p:style>
+      </p:cxnSp>
+      <p:sp>
+        <p:nvSpPr>
+          <p:cNvPr id="98" name="TextBox 97">
+            <a:extLst>
+              <a:ext uri="{FF2B5EF4-FFF2-40B4-BE49-F238E27FC236}">
+                <a16:creationId xmlns:a16="http://schemas.microsoft.com/office/drawing/2014/main" id="{4F8D316F-341D-C3DA-4563-891B9FDB5649}"/>
+              </a:ext>
+            </a:extLst>
+          </p:cNvPr>
+          <p:cNvSpPr txBox="1"/>
+          <p:nvPr/>
+        </p:nvSpPr>
+        <p:spPr>
+          <a:xfrm>
+            <a:off x="7189202" y="3978425"/>
+            <a:ext cx="1189772" cy="430887"/>
+          </a:xfrm>
+          <a:prstGeom prst="rect">
+            <a:avLst/>
+          </a:prstGeom>
+          <a:solidFill>
+            <a:schemeClr val="bg2">
+              <a:lumMod val="90000"/>
+            </a:schemeClr>
+          </a:solidFill>
+          <a:ln w="19050">
+            <a:solidFill>
+              <a:schemeClr val="tx1"/>
+            </a:solidFill>
+          </a:ln>
+        </p:spPr>
+        <p:txBody>
+          <a:bodyPr wrap="square">
+            <a:spAutoFit/>
+          </a:bodyPr>
+          <a:lstStyle/>
+          <a:p>
+            <a:r>
+              <a:rPr lang="en-SG" sz="1100" b="1" dirty="0"/>
+              <a:t>Modbus-TCP client interface</a:t>
+            </a:r>
+          </a:p>
+        </p:txBody>
+      </p:sp>
+      <p:sp>
+        <p:nvSpPr>
+          <p:cNvPr id="102" name="TextBox 101">
+            <a:extLst>
+              <a:ext uri="{FF2B5EF4-FFF2-40B4-BE49-F238E27FC236}">
+                <a16:creationId xmlns:a16="http://schemas.microsoft.com/office/drawing/2014/main" id="{AE8A76A1-9609-97F1-25F7-17B4DA3129B2}"/>
+              </a:ext>
+            </a:extLst>
+          </p:cNvPr>
+          <p:cNvSpPr txBox="1"/>
+          <p:nvPr/>
+        </p:nvSpPr>
+        <p:spPr>
+          <a:xfrm>
+            <a:off x="8867400" y="5119428"/>
+            <a:ext cx="1189772" cy="430887"/>
+          </a:xfrm>
+          <a:prstGeom prst="rect">
+            <a:avLst/>
+          </a:prstGeom>
+          <a:solidFill>
+            <a:schemeClr val="bg2">
+              <a:lumMod val="90000"/>
+            </a:schemeClr>
+          </a:solidFill>
+          <a:ln w="19050">
+            <a:solidFill>
+              <a:schemeClr val="tx1"/>
+            </a:solidFill>
+          </a:ln>
+        </p:spPr>
+        <p:txBody>
+          <a:bodyPr wrap="square">
+            <a:spAutoFit/>
+          </a:bodyPr>
+          <a:lstStyle/>
+          <a:p>
+            <a:r>
+              <a:rPr lang="en-SG" sz="1100" b="1" dirty="0"/>
+              <a:t>S7Comm client Interface</a:t>
+            </a:r>
+          </a:p>
+        </p:txBody>
+      </p:sp>
+      <p:sp>
+        <p:nvSpPr>
+          <p:cNvPr id="103" name="TextBox 102">
+            <a:extLst>
+              <a:ext uri="{FF2B5EF4-FFF2-40B4-BE49-F238E27FC236}">
+                <a16:creationId xmlns:a16="http://schemas.microsoft.com/office/drawing/2014/main" id="{2EDBF6F6-5F7A-4AF5-6E09-71D45A136423}"/>
+              </a:ext>
+            </a:extLst>
+          </p:cNvPr>
+          <p:cNvSpPr txBox="1"/>
+          <p:nvPr/>
+        </p:nvSpPr>
+        <p:spPr>
+          <a:xfrm>
+            <a:off x="8608615" y="3964252"/>
+            <a:ext cx="2121055" cy="600164"/>
+          </a:xfrm>
+          <a:prstGeom prst="rect">
+            <a:avLst/>
+          </a:prstGeom>
+          <a:solidFill>
+            <a:schemeClr val="bg2">
+              <a:lumMod val="90000"/>
+            </a:schemeClr>
+          </a:solidFill>
+          <a:ln w="19050">
+            <a:solidFill>
+              <a:schemeClr val="tx1"/>
+            </a:solidFill>
+          </a:ln>
+        </p:spPr>
+        <p:txBody>
+          <a:bodyPr wrap="square">
+            <a:spAutoFit/>
+          </a:bodyPr>
+          <a:lstStyle/>
+          <a:p>
+            <a:r>
+              <a:rPr lang="en-SG" sz="1100" b="1" dirty="0"/>
+              <a:t>S7Comm to Manufacturing Message Specification (MMS) IEC61850 Converter Interface </a:t>
+            </a:r>
+          </a:p>
+        </p:txBody>
+      </p:sp>
+      <p:sp>
+        <p:nvSpPr>
+          <p:cNvPr id="107" name="TextBox 106">
+            <a:extLst>
+              <a:ext uri="{FF2B5EF4-FFF2-40B4-BE49-F238E27FC236}">
+                <a16:creationId xmlns:a16="http://schemas.microsoft.com/office/drawing/2014/main" id="{26C290E1-F23A-2753-D404-C49E144860EC}"/>
+              </a:ext>
+            </a:extLst>
+          </p:cNvPr>
+          <p:cNvSpPr txBox="1"/>
+          <p:nvPr/>
+        </p:nvSpPr>
+        <p:spPr>
+          <a:xfrm>
+            <a:off x="5751151" y="896108"/>
+            <a:ext cx="4332289" cy="276999"/>
+          </a:xfrm>
+          <a:prstGeom prst="rect">
+            <a:avLst/>
+          </a:prstGeom>
+          <a:noFill/>
+        </p:spPr>
+        <p:txBody>
+          <a:bodyPr wrap="square">
+            <a:spAutoFit/>
+          </a:bodyPr>
+          <a:lstStyle/>
+          <a:p>
+            <a:r>
+              <a:rPr lang="en-US" sz="1200" b="1" dirty="0"/>
+              <a:t>Power Grid Supervisory Human Machine Interface</a:t>
+            </a:r>
+            <a:endParaRPr lang="en-SG" sz="1200" b="1" dirty="0"/>
+          </a:p>
+        </p:txBody>
+      </p:sp>
+    </p:spTree>
+    <p:extLst>
+      <p:ext uri="{BB962C8B-B14F-4D97-AF65-F5344CB8AC3E}">
+        <p14:creationId xmlns:p14="http://schemas.microsoft.com/office/powerpoint/2010/main" val="3956027493"/>
       </p:ext>
     </p:extLst>
   </p:cSld>

</xml_diff>

<commit_message>
update the introduction section.
</commit_message>
<xml_diff>
--- a/designDoc/designDoc.pptx
+++ b/designDoc/designDoc.pptx
@@ -471,6 +471,90 @@
 </file>
 
 <file path=ppt/notesSlides/notesSlide1.xml><?xml version="1.0" encoding="utf-8"?>
+<p:notes xmlns:a="http://schemas.openxmlformats.org/drawingml/2006/main" xmlns:r="http://schemas.openxmlformats.org/officeDocument/2006/relationships" xmlns:p="http://schemas.openxmlformats.org/presentationml/2006/main">
+  <p:cSld>
+    <p:spTree>
+      <p:nvGrpSpPr>
+        <p:cNvPr id="1" name=""/>
+        <p:cNvGrpSpPr/>
+        <p:nvPr/>
+      </p:nvGrpSpPr>
+      <p:grpSpPr>
+        <a:xfrm>
+          <a:off x="0" y="0"/>
+          <a:ext cx="0" cy="0"/>
+          <a:chOff x="0" y="0"/>
+          <a:chExt cx="0" cy="0"/>
+        </a:xfrm>
+      </p:grpSpPr>
+      <p:sp>
+        <p:nvSpPr>
+          <p:cNvPr id="2" name="Slide Image Placeholder 1"/>
+          <p:cNvSpPr>
+            <a:spLocks noGrp="1" noRot="1" noChangeAspect="1"/>
+          </p:cNvSpPr>
+          <p:nvPr>
+            <p:ph type="sldImg"/>
+          </p:nvPr>
+        </p:nvSpPr>
+        <p:spPr/>
+      </p:sp>
+      <p:sp>
+        <p:nvSpPr>
+          <p:cNvPr id="3" name="Notes Placeholder 2"/>
+          <p:cNvSpPr>
+            <a:spLocks noGrp="1"/>
+          </p:cNvSpPr>
+          <p:nvPr>
+            <p:ph type="body" idx="1"/>
+          </p:nvPr>
+        </p:nvSpPr>
+        <p:spPr/>
+        <p:txBody>
+          <a:bodyPr/>
+          <a:lstStyle/>
+          <a:p>
+            <a:endParaRPr lang="en-SG" dirty="0"/>
+          </a:p>
+        </p:txBody>
+      </p:sp>
+      <p:sp>
+        <p:nvSpPr>
+          <p:cNvPr id="4" name="Slide Number Placeholder 3"/>
+          <p:cNvSpPr>
+            <a:spLocks noGrp="1"/>
+          </p:cNvSpPr>
+          <p:nvPr>
+            <p:ph type="sldNum" sz="quarter" idx="5"/>
+          </p:nvPr>
+        </p:nvSpPr>
+        <p:spPr/>
+        <p:txBody>
+          <a:bodyPr/>
+          <a:lstStyle/>
+          <a:p>
+            <a:fld id="{2F8A4C87-30FF-4E0D-9FFA-CCB73B1DE919}" type="slidenum">
+              <a:rPr lang="en-SG" smtClean="0"/>
+              <a:t>2</a:t>
+            </a:fld>
+            <a:endParaRPr lang="en-SG"/>
+          </a:p>
+        </p:txBody>
+      </p:sp>
+    </p:spTree>
+    <p:extLst>
+      <p:ext uri="{BB962C8B-B14F-4D97-AF65-F5344CB8AC3E}">
+        <p14:creationId xmlns:p14="http://schemas.microsoft.com/office/powerpoint/2010/main" val="673519253"/>
+      </p:ext>
+    </p:extLst>
+  </p:cSld>
+  <p:clrMapOvr>
+    <a:masterClrMapping/>
+  </p:clrMapOvr>
+</p:notes>
+</file>
+
+<file path=ppt/notesSlides/notesSlide2.xml><?xml version="1.0" encoding="utf-8"?>
 <p:notes xmlns:a="http://schemas.openxmlformats.org/drawingml/2006/main" xmlns:r="http://schemas.openxmlformats.org/officeDocument/2006/relationships" xmlns:p="http://schemas.openxmlformats.org/presentationml/2006/main">
   <p:cSld>
     <p:spTree>
@@ -7871,6 +7955,105 @@
       </p:grpSpPr>
       <p:sp>
         <p:nvSpPr>
+          <p:cNvPr id="165" name="Rectangle 164">
+            <a:extLst>
+              <a:ext uri="{FF2B5EF4-FFF2-40B4-BE49-F238E27FC236}">
+                <a16:creationId xmlns:a16="http://schemas.microsoft.com/office/drawing/2014/main" id="{4CEDB4EA-A0B6-7C05-64D7-EA80D866C229}"/>
+              </a:ext>
+            </a:extLst>
+          </p:cNvPr>
+          <p:cNvSpPr/>
+          <p:nvPr/>
+        </p:nvSpPr>
+        <p:spPr>
+          <a:xfrm>
+            <a:off x="482891" y="480818"/>
+            <a:ext cx="11301568" cy="5208357"/>
+          </a:xfrm>
+          <a:prstGeom prst="rect">
+            <a:avLst/>
+          </a:prstGeom>
+          <a:solidFill>
+            <a:schemeClr val="tx2">
+              <a:lumMod val="10000"/>
+              <a:lumOff val="90000"/>
+            </a:schemeClr>
+          </a:solidFill>
+        </p:spPr>
+        <p:style>
+          <a:lnRef idx="2">
+            <a:schemeClr val="accent1">
+              <a:shade val="15000"/>
+            </a:schemeClr>
+          </a:lnRef>
+          <a:fillRef idx="1">
+            <a:schemeClr val="accent1"/>
+          </a:fillRef>
+          <a:effectRef idx="0">
+            <a:schemeClr val="accent1"/>
+          </a:effectRef>
+          <a:fontRef idx="minor">
+            <a:schemeClr val="lt1"/>
+          </a:fontRef>
+        </p:style>
+        <p:txBody>
+          <a:bodyPr rtlCol="0" anchor="ctr"/>
+          <a:lstStyle/>
+          <a:p>
+            <a:pPr algn="ctr"/>
+            <a:endParaRPr lang="en-SG"/>
+          </a:p>
+        </p:txBody>
+      </p:sp>
+      <p:cxnSp>
+        <p:nvCxnSpPr>
+          <p:cNvPr id="135" name="Straight Arrow Connector 134">
+            <a:extLst>
+              <a:ext uri="{FF2B5EF4-FFF2-40B4-BE49-F238E27FC236}">
+                <a16:creationId xmlns:a16="http://schemas.microsoft.com/office/drawing/2014/main" id="{7635B3B5-8B78-5990-7773-A67BF170530F}"/>
+              </a:ext>
+            </a:extLst>
+          </p:cNvPr>
+          <p:cNvCxnSpPr>
+            <a:cxnSpLocks/>
+          </p:cNvCxnSpPr>
+          <p:nvPr/>
+        </p:nvCxnSpPr>
+        <p:spPr>
+          <a:xfrm>
+            <a:off x="700112" y="1250718"/>
+            <a:ext cx="1276265" cy="8627"/>
+          </a:xfrm>
+          <a:prstGeom prst="straightConnector1">
+            <a:avLst/>
+          </a:prstGeom>
+          <a:ln>
+            <a:solidFill>
+              <a:schemeClr val="accent2">
+                <a:lumMod val="75000"/>
+              </a:schemeClr>
+            </a:solidFill>
+            <a:prstDash val="sysDash"/>
+            <a:tailEnd type="triangle"/>
+          </a:ln>
+        </p:spPr>
+        <p:style>
+          <a:lnRef idx="2">
+            <a:schemeClr val="accent1"/>
+          </a:lnRef>
+          <a:fillRef idx="0">
+            <a:schemeClr val="accent1"/>
+          </a:fillRef>
+          <a:effectRef idx="1">
+            <a:schemeClr val="accent1"/>
+          </a:effectRef>
+          <a:fontRef idx="minor">
+            <a:schemeClr val="tx1"/>
+          </a:fontRef>
+        </p:style>
+      </p:cxnSp>
+      <p:sp>
+        <p:nvSpPr>
           <p:cNvPr id="42" name="Rectangle 41">
             <a:extLst>
               <a:ext uri="{FF2B5EF4-FFF2-40B4-BE49-F238E27FC236}">
@@ -7883,8 +8066,8 @@
         </p:nvSpPr>
         <p:spPr>
           <a:xfrm>
-            <a:off x="3253163" y="775435"/>
-            <a:ext cx="3043559" cy="1850629"/>
+            <a:off x="3551083" y="857848"/>
+            <a:ext cx="2901556" cy="1850629"/>
           </a:xfrm>
           <a:prstGeom prst="rect">
             <a:avLst/>
@@ -7936,14 +8119,14 @@
           <p:nvPr/>
         </p:nvPicPr>
         <p:blipFill>
-          <a:blip r:embed="rId2"/>
+          <a:blip r:embed="rId3"/>
           <a:stretch>
             <a:fillRect/>
           </a:stretch>
         </p:blipFill>
         <p:spPr>
           <a:xfrm>
-            <a:off x="3423872" y="1655645"/>
+            <a:off x="3721791" y="1738058"/>
             <a:ext cx="474159" cy="468580"/>
           </a:xfrm>
           <a:prstGeom prst="rect">
@@ -7971,14 +8154,14 @@
           <p:nvPr/>
         </p:nvPicPr>
         <p:blipFill>
-          <a:blip r:embed="rId3"/>
+          <a:blip r:embed="rId4"/>
           <a:stretch>
             <a:fillRect/>
           </a:stretch>
         </p:blipFill>
         <p:spPr>
           <a:xfrm>
-            <a:off x="3423872" y="918335"/>
+            <a:off x="3721791" y="1000748"/>
             <a:ext cx="485517" cy="468580"/>
           </a:xfrm>
           <a:prstGeom prst="rect">
@@ -8008,7 +8191,7 @@
         </p:nvCxnSpPr>
         <p:spPr>
           <a:xfrm flipH="1">
-            <a:off x="3660952" y="1386915"/>
+            <a:off x="3958871" y="1469328"/>
             <a:ext cx="5679" cy="268730"/>
           </a:xfrm>
           <a:prstGeom prst="line">
@@ -8044,7 +8227,7 @@
         </p:nvSpPr>
         <p:spPr>
           <a:xfrm>
-            <a:off x="3909388" y="1641320"/>
+            <a:off x="4207307" y="1723733"/>
             <a:ext cx="975769" cy="461665"/>
           </a:xfrm>
           <a:prstGeom prst="rect">
@@ -8092,7 +8275,7 @@
         </p:nvSpPr>
         <p:spPr>
           <a:xfrm>
-            <a:off x="3898031" y="925250"/>
+            <a:off x="4195950" y="1007663"/>
             <a:ext cx="975769" cy="461665"/>
           </a:xfrm>
           <a:prstGeom prst="rect">
@@ -8143,7 +8326,7 @@
         </p:nvCxnSpPr>
         <p:spPr>
           <a:xfrm flipH="1">
-            <a:off x="3660951" y="2124225"/>
+            <a:off x="3958870" y="2206638"/>
             <a:ext cx="1" cy="360070"/>
           </a:xfrm>
           <a:prstGeom prst="line">
@@ -8179,7 +8362,7 @@
         </p:nvSpPr>
         <p:spPr>
           <a:xfrm>
-            <a:off x="3628186" y="2165760"/>
+            <a:off x="3926105" y="2248173"/>
             <a:ext cx="646956" cy="276999"/>
           </a:xfrm>
           <a:prstGeom prst="rect">
@@ -8227,7 +8410,7 @@
         </p:nvSpPr>
         <p:spPr>
           <a:xfrm>
-            <a:off x="999405" y="452170"/>
+            <a:off x="676467" y="573284"/>
             <a:ext cx="1126879" cy="461665"/>
           </a:xfrm>
           <a:prstGeom prst="rect">
@@ -8249,7 +8432,7 @@
                   </a:schemeClr>
                 </a:solidFill>
               </a:rPr>
-              <a:t>Solar panel power plant  </a:t>
+              <a:t>Solar panel power farm</a:t>
             </a:r>
             <a:endParaRPr lang="en-SG" sz="1200" b="1" dirty="0">
               <a:solidFill>
@@ -8261,41 +8444,6 @@
           </a:p>
         </p:txBody>
       </p:sp>
-      <p:pic>
-        <p:nvPicPr>
-          <p:cNvPr id="21" name="Picture 20">
-            <a:extLst>
-              <a:ext uri="{FF2B5EF4-FFF2-40B4-BE49-F238E27FC236}">
-                <a16:creationId xmlns:a16="http://schemas.microsoft.com/office/drawing/2014/main" id="{4D321C95-F56D-3CF9-1935-98B3C3CFB44F}"/>
-              </a:ext>
-            </a:extLst>
-          </p:cNvPr>
-          <p:cNvPicPr>
-            <a:picLocks noChangeAspect="1"/>
-          </p:cNvPicPr>
-          <p:nvPr/>
-        </p:nvPicPr>
-        <p:blipFill>
-          <a:blip r:embed="rId4"/>
-          <a:stretch>
-            <a:fillRect/>
-          </a:stretch>
-        </p:blipFill>
-        <p:spPr>
-          <a:xfrm>
-            <a:off x="2243969" y="918335"/>
-            <a:ext cx="759113" cy="737310"/>
-          </a:xfrm>
-          <a:prstGeom prst="rect">
-            <a:avLst/>
-          </a:prstGeom>
-          <a:ln w="9525">
-            <a:solidFill>
-              <a:schemeClr val="tx1"/>
-            </a:solidFill>
-          </a:ln>
-        </p:spPr>
-      </p:pic>
       <p:sp>
         <p:nvSpPr>
           <p:cNvPr id="22" name="TextBox 21">
@@ -8310,7 +8458,7 @@
         </p:nvSpPr>
         <p:spPr>
           <a:xfrm>
-            <a:off x="2126284" y="463585"/>
+            <a:off x="1909356" y="579162"/>
             <a:ext cx="1087193" cy="461665"/>
           </a:xfrm>
           <a:prstGeom prst="rect">
@@ -8332,19 +8480,7 @@
                   </a:schemeClr>
                 </a:solidFill>
               </a:rPr>
-              <a:t>Wind turbine</a:t>
-            </a:r>
-          </a:p>
-          <a:p>
-            <a:r>
-              <a:rPr lang="en-US" sz="1200" b="1" dirty="0">
-                <a:solidFill>
-                  <a:schemeClr val="accent1">
-                    <a:lumMod val="75000"/>
-                  </a:schemeClr>
-                </a:solidFill>
-              </a:rPr>
-              <a:t>Power plant </a:t>
+              <a:t>Wind turbine power farm</a:t>
             </a:r>
           </a:p>
         </p:txBody>
@@ -8366,7 +8502,7 @@
         </p:nvCxnSpPr>
         <p:spPr>
           <a:xfrm>
-            <a:off x="1429444" y="1663489"/>
+            <a:off x="1141772" y="1663489"/>
             <a:ext cx="438" cy="818454"/>
           </a:xfrm>
           <a:prstGeom prst="line">
@@ -8402,7 +8538,7 @@
         </p:nvSpPr>
         <p:spPr>
           <a:xfrm>
-            <a:off x="1410425" y="1708133"/>
+            <a:off x="1092447" y="1790817"/>
             <a:ext cx="646956" cy="276999"/>
           </a:xfrm>
           <a:prstGeom prst="rect">
@@ -8450,7 +8586,7 @@
         </p:nvSpPr>
         <p:spPr>
           <a:xfrm>
-            <a:off x="2605788" y="1691720"/>
+            <a:off x="2338231" y="1836449"/>
             <a:ext cx="646956" cy="276999"/>
           </a:xfrm>
           <a:prstGeom prst="rect">
@@ -8500,7 +8636,7 @@
         </p:nvCxnSpPr>
         <p:spPr>
           <a:xfrm flipH="1">
-            <a:off x="2625534" y="1661434"/>
+            <a:off x="2337862" y="1661434"/>
             <a:ext cx="0" cy="820509"/>
           </a:xfrm>
           <a:prstGeom prst="line">
@@ -8544,7 +8680,7 @@
         </p:blipFill>
         <p:spPr>
           <a:xfrm>
-            <a:off x="2438363" y="2470326"/>
+            <a:off x="2150691" y="2470326"/>
             <a:ext cx="464174" cy="495720"/>
           </a:xfrm>
           <a:prstGeom prst="rect">
@@ -8563,41 +8699,6 @@
             <a:extLst>
               <a:ext uri="{FF2B5EF4-FFF2-40B4-BE49-F238E27FC236}">
                 <a16:creationId xmlns:a16="http://schemas.microsoft.com/office/drawing/2014/main" id="{84407D8A-A0CE-9C38-3CE5-34B66F4945FD}"/>
-              </a:ext>
-            </a:extLst>
-          </p:cNvPr>
-          <p:cNvPicPr>
-            <a:picLocks noChangeAspect="1"/>
-          </p:cNvPicPr>
-          <p:nvPr/>
-        </p:nvPicPr>
-        <p:blipFill>
-          <a:blip r:embed="rId2"/>
-          <a:stretch>
-            <a:fillRect/>
-          </a:stretch>
-        </p:blipFill>
-        <p:spPr>
-          <a:xfrm>
-            <a:off x="4810669" y="1655645"/>
-            <a:ext cx="474159" cy="468580"/>
-          </a:xfrm>
-          <a:prstGeom prst="rect">
-            <a:avLst/>
-          </a:prstGeom>
-          <a:ln w="12700">
-            <a:solidFill>
-              <a:schemeClr val="tx1"/>
-            </a:solidFill>
-          </a:ln>
-        </p:spPr>
-      </p:pic>
-      <p:pic>
-        <p:nvPicPr>
-          <p:cNvPr id="33" name="Picture 32">
-            <a:extLst>
-              <a:ext uri="{FF2B5EF4-FFF2-40B4-BE49-F238E27FC236}">
-                <a16:creationId xmlns:a16="http://schemas.microsoft.com/office/drawing/2014/main" id="{7F4E5320-5B35-BB2A-6066-20F69AF84836}"/>
               </a:ext>
             </a:extLst>
           </p:cNvPr>
@@ -8614,7 +8715,42 @@
         </p:blipFill>
         <p:spPr>
           <a:xfrm>
-            <a:off x="4810669" y="918335"/>
+            <a:off x="5108588" y="1738058"/>
+            <a:ext cx="474159" cy="468580"/>
+          </a:xfrm>
+          <a:prstGeom prst="rect">
+            <a:avLst/>
+          </a:prstGeom>
+          <a:ln w="12700">
+            <a:solidFill>
+              <a:schemeClr val="tx1"/>
+            </a:solidFill>
+          </a:ln>
+        </p:spPr>
+      </p:pic>
+      <p:pic>
+        <p:nvPicPr>
+          <p:cNvPr id="33" name="Picture 32">
+            <a:extLst>
+              <a:ext uri="{FF2B5EF4-FFF2-40B4-BE49-F238E27FC236}">
+                <a16:creationId xmlns:a16="http://schemas.microsoft.com/office/drawing/2014/main" id="{7F4E5320-5B35-BB2A-6066-20F69AF84836}"/>
+              </a:ext>
+            </a:extLst>
+          </p:cNvPr>
+          <p:cNvPicPr>
+            <a:picLocks noChangeAspect="1"/>
+          </p:cNvPicPr>
+          <p:nvPr/>
+        </p:nvPicPr>
+        <p:blipFill>
+          <a:blip r:embed="rId4"/>
+          <a:stretch>
+            <a:fillRect/>
+          </a:stretch>
+        </p:blipFill>
+        <p:spPr>
+          <a:xfrm>
+            <a:off x="5108588" y="1000748"/>
             <a:ext cx="485517" cy="468580"/>
           </a:xfrm>
           <a:prstGeom prst="rect">
@@ -8645,7 +8781,7 @@
         </p:nvCxnSpPr>
         <p:spPr>
           <a:xfrm flipH="1">
-            <a:off x="5047749" y="1386915"/>
+            <a:off x="5345668" y="1469328"/>
             <a:ext cx="5679" cy="268730"/>
           </a:xfrm>
           <a:prstGeom prst="line">
@@ -8684,7 +8820,7 @@
         </p:nvCxnSpPr>
         <p:spPr>
           <a:xfrm flipH="1">
-            <a:off x="5047748" y="2124225"/>
+            <a:off x="5345667" y="2206638"/>
             <a:ext cx="1" cy="360070"/>
           </a:xfrm>
           <a:prstGeom prst="line">
@@ -8721,14 +8857,14 @@
           <p:nvPr/>
         </p:nvPicPr>
         <p:blipFill>
-          <a:blip r:embed="rId2"/>
+          <a:blip r:embed="rId3"/>
           <a:stretch>
             <a:fillRect/>
           </a:stretch>
         </p:blipFill>
         <p:spPr>
           <a:xfrm>
-            <a:off x="5445372" y="1655645"/>
+            <a:off x="5743291" y="1738058"/>
             <a:ext cx="474159" cy="468580"/>
           </a:xfrm>
           <a:prstGeom prst="rect">
@@ -8756,14 +8892,14 @@
           <p:nvPr/>
         </p:nvPicPr>
         <p:blipFill>
-          <a:blip r:embed="rId3"/>
+          <a:blip r:embed="rId4"/>
           <a:stretch>
             <a:fillRect/>
           </a:stretch>
         </p:blipFill>
         <p:spPr>
           <a:xfrm>
-            <a:off x="5445372" y="918335"/>
+            <a:off x="5743291" y="1000748"/>
             <a:ext cx="485517" cy="468580"/>
           </a:xfrm>
           <a:prstGeom prst="rect">
@@ -8793,7 +8929,7 @@
         </p:nvCxnSpPr>
         <p:spPr>
           <a:xfrm flipH="1">
-            <a:off x="5682452" y="1386915"/>
+            <a:off x="5980371" y="1469328"/>
             <a:ext cx="5679" cy="268730"/>
           </a:xfrm>
           <a:prstGeom prst="line">
@@ -8832,7 +8968,7 @@
         </p:nvCxnSpPr>
         <p:spPr>
           <a:xfrm flipH="1">
-            <a:off x="5682451" y="2124225"/>
+            <a:off x="5980370" y="2206638"/>
             <a:ext cx="1" cy="360070"/>
           </a:xfrm>
           <a:prstGeom prst="line">
@@ -8876,7 +9012,7 @@
         </p:blipFill>
         <p:spPr>
           <a:xfrm>
-            <a:off x="1197795" y="2481943"/>
+            <a:off x="910123" y="2481943"/>
             <a:ext cx="464174" cy="495720"/>
           </a:xfrm>
           <a:prstGeom prst="rect">
@@ -8911,7 +9047,7 @@
         </p:blipFill>
         <p:spPr>
           <a:xfrm>
-            <a:off x="4232948" y="2398972"/>
+            <a:off x="4530867" y="2481385"/>
             <a:ext cx="464174" cy="495720"/>
           </a:xfrm>
           <a:prstGeom prst="rect">
@@ -8940,7 +9076,7 @@
         </p:nvCxnSpPr>
         <p:spPr>
           <a:xfrm>
-            <a:off x="4705530" y="2481943"/>
+            <a:off x="5003449" y="2564356"/>
             <a:ext cx="976921" cy="0"/>
           </a:xfrm>
           <a:prstGeom prst="line">
@@ -8978,7 +9114,7 @@
         </p:nvCxnSpPr>
         <p:spPr>
           <a:xfrm flipH="1">
-            <a:off x="3660951" y="2503064"/>
+            <a:off x="3958870" y="2585477"/>
             <a:ext cx="571997" cy="0"/>
           </a:xfrm>
           <a:prstGeom prst="line">
@@ -9014,7 +9150,7 @@
         </p:nvSpPr>
         <p:spPr>
           <a:xfrm>
-            <a:off x="1620518" y="2425514"/>
+            <a:off x="1302437" y="2415611"/>
             <a:ext cx="812286" cy="553998"/>
           </a:xfrm>
           <a:prstGeom prst="rect">
@@ -9062,7 +9198,7 @@
         </p:nvSpPr>
         <p:spPr>
           <a:xfrm>
-            <a:off x="2860432" y="2578903"/>
+            <a:off x="2572760" y="2578903"/>
             <a:ext cx="1126879" cy="553998"/>
           </a:xfrm>
           <a:prstGeom prst="rect">
@@ -9110,8 +9246,8 @@
         </p:nvSpPr>
         <p:spPr>
           <a:xfrm>
-            <a:off x="4697122" y="2692432"/>
-            <a:ext cx="1851065" cy="246221"/>
+            <a:off x="3808431" y="2725038"/>
+            <a:ext cx="908742" cy="553998"/>
           </a:xfrm>
           <a:prstGeom prst="rect">
             <a:avLst/>
@@ -9132,7 +9268,7 @@
                   </a:schemeClr>
                 </a:solidFill>
               </a:rPr>
-              <a:t>AC generating substation </a:t>
+              <a:t>AC-AC generating substation </a:t>
             </a:r>
             <a:endParaRPr lang="en-SG" sz="1000" b="1" dirty="0">
               <a:solidFill>
@@ -9166,7 +9302,7 @@
         </p:blipFill>
         <p:spPr>
           <a:xfrm>
-            <a:off x="2801878" y="3387276"/>
+            <a:off x="2514206" y="3387276"/>
             <a:ext cx="621994" cy="580179"/>
           </a:xfrm>
           <a:prstGeom prst="rect">
@@ -9193,8 +9329,8 @@
         </p:nvSpPr>
         <p:spPr>
           <a:xfrm>
-            <a:off x="3231681" y="443076"/>
-            <a:ext cx="1087193" cy="276999"/>
+            <a:off x="3529600" y="525489"/>
+            <a:ext cx="1971528" cy="276999"/>
           </a:xfrm>
           <a:prstGeom prst="rect">
             <a:avLst/>
@@ -9215,7 +9351,7 @@
                   </a:schemeClr>
                 </a:solidFill>
               </a:rPr>
-              <a:t>Power plant </a:t>
+              <a:t>Natural gas power plant</a:t>
             </a:r>
           </a:p>
         </p:txBody>
@@ -9237,7 +9373,7 @@
         </p:nvCxnSpPr>
         <p:spPr>
           <a:xfrm rot="16200000" flipH="1">
-            <a:off x="1766029" y="2641516"/>
+            <a:off x="1478357" y="2641516"/>
             <a:ext cx="699703" cy="1371996"/>
           </a:xfrm>
           <a:prstGeom prst="bentConnector2">
@@ -9277,7 +9413,7 @@
         </p:nvCxnSpPr>
         <p:spPr>
           <a:xfrm rot="16200000" flipH="1">
-            <a:off x="2681047" y="2955448"/>
+            <a:off x="2393375" y="2955448"/>
             <a:ext cx="421230" cy="442425"/>
           </a:xfrm>
           <a:prstGeom prst="bentConnector3">
@@ -9319,8 +9455,8 @@
         </p:nvCxnSpPr>
         <p:spPr>
           <a:xfrm rot="5400000">
-            <a:off x="3553117" y="2765448"/>
-            <a:ext cx="782674" cy="1041163"/>
+            <a:off x="3599447" y="2513858"/>
+            <a:ext cx="700261" cy="1626754"/>
           </a:xfrm>
           <a:prstGeom prst="bentConnector2">
             <a:avLst/>
@@ -9355,7 +9491,7 @@
         </p:nvSpPr>
         <p:spPr>
           <a:xfrm>
-            <a:off x="1805613" y="3202791"/>
+            <a:off x="1517941" y="3202791"/>
             <a:ext cx="1391472" cy="400110"/>
           </a:xfrm>
           <a:prstGeom prst="rect">
@@ -9377,7 +9513,7 @@
                   </a:schemeClr>
                 </a:solidFill>
               </a:rPr>
-              <a:t>Generating step up transformer  </a:t>
+              <a:t>Generating step-up transformer  </a:t>
             </a:r>
             <a:endParaRPr lang="en-SG" sz="1000" b="1" dirty="0">
               <a:solidFill>
@@ -9424,7 +9560,7 @@
         </p:blipFill>
         <p:spPr>
           <a:xfrm>
-            <a:off x="3763921" y="4068918"/>
+            <a:off x="3476249" y="4068918"/>
             <a:ext cx="621994" cy="1301403"/>
           </a:xfrm>
           <a:prstGeom prst="rect">
@@ -9449,7 +9585,7 @@
         </p:nvCxnSpPr>
         <p:spPr>
           <a:xfrm>
-            <a:off x="3112875" y="3967455"/>
+            <a:off x="2825203" y="3967455"/>
             <a:ext cx="662403" cy="462077"/>
           </a:xfrm>
           <a:prstGeom prst="line">
@@ -9511,7 +9647,7 @@
         </p:blipFill>
         <p:spPr>
           <a:xfrm>
-            <a:off x="6113303" y="4068918"/>
+            <a:off x="5825631" y="4068918"/>
             <a:ext cx="621994" cy="1301403"/>
           </a:xfrm>
           <a:prstGeom prst="rect">
@@ -9536,7 +9672,7 @@
         </p:nvCxnSpPr>
         <p:spPr>
           <a:xfrm>
-            <a:off x="3112875" y="3967455"/>
+            <a:off x="2825203" y="3967455"/>
             <a:ext cx="683884" cy="357434"/>
           </a:xfrm>
           <a:prstGeom prst="line">
@@ -9580,7 +9716,7 @@
         </p:nvCxnSpPr>
         <p:spPr>
           <a:xfrm>
-            <a:off x="3112875" y="3967455"/>
+            <a:off x="2825203" y="3967455"/>
             <a:ext cx="662403" cy="231038"/>
           </a:xfrm>
           <a:prstGeom prst="line">
@@ -9621,7 +9757,7 @@
         </p:nvSpPr>
         <p:spPr>
           <a:xfrm>
-            <a:off x="1401500" y="3007583"/>
+            <a:off x="1113828" y="3007583"/>
             <a:ext cx="646956" cy="276999"/>
           </a:xfrm>
           <a:prstGeom prst="rect">
@@ -9669,7 +9805,7 @@
         </p:nvSpPr>
         <p:spPr>
           <a:xfrm>
-            <a:off x="2197028" y="2950510"/>
+            <a:off x="1909356" y="2950510"/>
             <a:ext cx="646956" cy="276999"/>
           </a:xfrm>
           <a:prstGeom prst="rect">
@@ -9717,7 +9853,7 @@
         </p:nvSpPr>
         <p:spPr>
           <a:xfrm>
-            <a:off x="4409380" y="2950510"/>
+            <a:off x="4737992" y="3021524"/>
             <a:ext cx="646956" cy="276999"/>
           </a:xfrm>
           <a:prstGeom prst="rect">
@@ -9765,8 +9901,8 @@
         </p:nvSpPr>
         <p:spPr>
           <a:xfrm>
-            <a:off x="3415614" y="3846193"/>
-            <a:ext cx="1141491" cy="276999"/>
+            <a:off x="3127942" y="3846193"/>
+            <a:ext cx="3362812" cy="276999"/>
           </a:xfrm>
           <a:prstGeom prst="rect">
             <a:avLst/>
@@ -9785,7 +9921,7 @@
                   <a:srgbClr val="FF0000"/>
                 </a:solidFill>
               </a:rPr>
-              <a:t>138k-400k V</a:t>
+              <a:t>138k-400k V High voltage transmission </a:t>
             </a:r>
             <a:endParaRPr lang="en-SG" sz="1200" b="1" dirty="0">
               <a:solidFill>
@@ -9811,7 +9947,7 @@
         </p:nvCxnSpPr>
         <p:spPr>
           <a:xfrm>
-            <a:off x="4379310" y="4192136"/>
+            <a:off x="4091638" y="4192136"/>
             <a:ext cx="1733993" cy="0"/>
           </a:xfrm>
           <a:prstGeom prst="line">
@@ -9854,7 +9990,7 @@
         </p:nvCxnSpPr>
         <p:spPr>
           <a:xfrm>
-            <a:off x="4388563" y="4307471"/>
+            <a:off x="4100891" y="4307471"/>
             <a:ext cx="1733993" cy="0"/>
           </a:xfrm>
           <a:prstGeom prst="line">
@@ -9897,7 +10033,7 @@
         </p:nvCxnSpPr>
         <p:spPr>
           <a:xfrm>
-            <a:off x="4372070" y="4429532"/>
+            <a:off x="4084398" y="4429532"/>
             <a:ext cx="1733993" cy="0"/>
           </a:xfrm>
           <a:prstGeom prst="line">
@@ -9940,7 +10076,7 @@
         </p:nvCxnSpPr>
         <p:spPr>
           <a:xfrm>
-            <a:off x="6714212" y="4190793"/>
+            <a:off x="6426540" y="4190793"/>
             <a:ext cx="1216983" cy="755249"/>
           </a:xfrm>
           <a:prstGeom prst="line">
@@ -9983,7 +10119,7 @@
         </p:nvCxnSpPr>
         <p:spPr>
           <a:xfrm>
-            <a:off x="6730517" y="4307471"/>
+            <a:off x="6442845" y="4307471"/>
             <a:ext cx="1200678" cy="638571"/>
           </a:xfrm>
           <a:prstGeom prst="line">
@@ -10026,7 +10162,7 @@
         </p:nvCxnSpPr>
         <p:spPr>
           <a:xfrm>
-            <a:off x="6714212" y="4429532"/>
+            <a:off x="6426540" y="4429532"/>
             <a:ext cx="1216983" cy="516510"/>
           </a:xfrm>
           <a:prstGeom prst="line">
@@ -10075,7 +10211,7 @@
         </p:blipFill>
         <p:spPr>
           <a:xfrm>
-            <a:off x="4774942" y="4925755"/>
+            <a:off x="4250968" y="4925755"/>
             <a:ext cx="748250" cy="661610"/>
           </a:xfrm>
           <a:prstGeom prst="rect">
@@ -10104,7 +10240,7 @@
         </p:nvCxnSpPr>
         <p:spPr>
           <a:xfrm>
-            <a:off x="4920042" y="4198493"/>
+            <a:off x="4396068" y="4198493"/>
             <a:ext cx="0" cy="730619"/>
           </a:xfrm>
           <a:prstGeom prst="line">
@@ -10147,7 +10283,7 @@
         </p:nvCxnSpPr>
         <p:spPr>
           <a:xfrm>
-            <a:off x="5043207" y="4324889"/>
+            <a:off x="4519233" y="4324889"/>
             <a:ext cx="0" cy="604223"/>
           </a:xfrm>
           <a:prstGeom prst="line">
@@ -10191,7 +10327,7 @@
         </p:nvCxnSpPr>
         <p:spPr>
           <a:xfrm>
-            <a:off x="5149067" y="4413053"/>
+            <a:off x="4625093" y="4413053"/>
             <a:ext cx="0" cy="512702"/>
           </a:xfrm>
           <a:prstGeom prst="line">
@@ -10240,7 +10376,7 @@
         </p:blipFill>
         <p:spPr>
           <a:xfrm>
-            <a:off x="2072462" y="4915583"/>
+            <a:off x="1784790" y="4915583"/>
             <a:ext cx="748250" cy="661610"/>
           </a:xfrm>
           <a:prstGeom prst="rect">
@@ -10270,7 +10406,7 @@
         </p:nvCxnSpPr>
         <p:spPr>
           <a:xfrm flipV="1">
-            <a:off x="2243969" y="3967455"/>
+            <a:off x="1956297" y="3967455"/>
             <a:ext cx="868906" cy="937613"/>
           </a:xfrm>
           <a:prstGeom prst="line">
@@ -10314,7 +10450,7 @@
         </p:nvCxnSpPr>
         <p:spPr>
           <a:xfrm flipH="1">
-            <a:off x="2321894" y="3967455"/>
+            <a:off x="2034222" y="3967455"/>
             <a:ext cx="790981" cy="948128"/>
           </a:xfrm>
           <a:prstGeom prst="line">
@@ -10359,7 +10495,7 @@
         </p:nvCxnSpPr>
         <p:spPr>
           <a:xfrm flipH="1">
-            <a:off x="2446587" y="3967455"/>
+            <a:off x="2158915" y="3967455"/>
             <a:ext cx="666288" cy="948128"/>
           </a:xfrm>
           <a:prstGeom prst="line">
@@ -10400,8 +10536,8 @@
         </p:nvSpPr>
         <p:spPr>
           <a:xfrm>
-            <a:off x="1921017" y="5564693"/>
-            <a:ext cx="2065342" cy="430887"/>
+            <a:off x="2558585" y="4884901"/>
+            <a:ext cx="1159007" cy="769441"/>
           </a:xfrm>
           <a:prstGeom prst="rect">
             <a:avLst/>
@@ -10422,7 +10558,7 @@
           <a:p>
             <a:r>
               <a:rPr lang="en-US" sz="1100" b="1" dirty="0"/>
-              <a:t>direct customer </a:t>
+              <a:t>direct customer (optional ) </a:t>
             </a:r>
             <a:endParaRPr lang="en-SG" sz="1100" b="1" dirty="0"/>
           </a:p>
@@ -10442,8 +10578,8 @@
         </p:nvSpPr>
         <p:spPr>
           <a:xfrm>
-            <a:off x="4589983" y="5587365"/>
-            <a:ext cx="2065342" cy="430887"/>
+            <a:off x="4979560" y="4849562"/>
+            <a:ext cx="1157197" cy="769441"/>
           </a:xfrm>
           <a:prstGeom prst="rect">
             <a:avLst/>
@@ -10458,7 +10594,7 @@
           <a:p>
             <a:r>
               <a:rPr lang="en-US" sz="1100" b="1" dirty="0"/>
-              <a:t>138k-230k transmission customer </a:t>
+              <a:t>138k-230k transmission customer (optional)</a:t>
             </a:r>
             <a:endParaRPr lang="en-SG" sz="1100" b="1" dirty="0"/>
           </a:p>
@@ -10486,7 +10622,7 @@
         </p:blipFill>
         <p:spPr>
           <a:xfrm>
-            <a:off x="7945594" y="4790142"/>
+            <a:off x="7657922" y="4790142"/>
             <a:ext cx="621994" cy="580179"/>
           </a:xfrm>
           <a:prstGeom prst="rect">
@@ -10513,8 +10649,8 @@
         </p:nvSpPr>
         <p:spPr>
           <a:xfrm>
-            <a:off x="7871852" y="5387310"/>
-            <a:ext cx="1391472" cy="400110"/>
+            <a:off x="6935223" y="5400885"/>
+            <a:ext cx="2471015" cy="246221"/>
           </a:xfrm>
           <a:prstGeom prst="rect">
             <a:avLst/>
@@ -10563,7 +10699,7 @@
         </p:nvCxnSpPr>
         <p:spPr>
           <a:xfrm>
-            <a:off x="8230697" y="3995436"/>
+            <a:off x="7943025" y="3995436"/>
             <a:ext cx="9816" cy="786212"/>
           </a:xfrm>
           <a:prstGeom prst="line">
@@ -10614,7 +10750,7 @@
         </p:blipFill>
         <p:spPr>
           <a:xfrm>
-            <a:off x="7919700" y="3418383"/>
+            <a:off x="7632028" y="3418383"/>
             <a:ext cx="621994" cy="580179"/>
           </a:xfrm>
           <a:prstGeom prst="rect">
@@ -10649,7 +10785,7 @@
         </p:blipFill>
         <p:spPr>
           <a:xfrm>
-            <a:off x="7919700" y="1998724"/>
+            <a:off x="7632028" y="1998724"/>
             <a:ext cx="621994" cy="580179"/>
           </a:xfrm>
           <a:prstGeom prst="rect">
@@ -10682,7 +10818,7 @@
         </p:nvCxnSpPr>
         <p:spPr>
           <a:xfrm>
-            <a:off x="8230697" y="2578903"/>
+            <a:off x="7943025" y="2578903"/>
             <a:ext cx="0" cy="839480"/>
           </a:xfrm>
           <a:prstGeom prst="line">
@@ -10725,7 +10861,7 @@
         </p:nvSpPr>
         <p:spPr>
           <a:xfrm>
-            <a:off x="7757468" y="4496154"/>
+            <a:off x="7469796" y="4496154"/>
             <a:ext cx="646956" cy="276999"/>
           </a:xfrm>
           <a:prstGeom prst="rect">
@@ -10773,7 +10909,7 @@
         </p:nvSpPr>
         <p:spPr>
           <a:xfrm>
-            <a:off x="7692913" y="3128403"/>
+            <a:off x="7405241" y="3128403"/>
             <a:ext cx="646956" cy="276999"/>
           </a:xfrm>
           <a:prstGeom prst="rect">
@@ -10821,7 +10957,7 @@
         </p:nvSpPr>
         <p:spPr>
           <a:xfrm>
-            <a:off x="7707728" y="1722288"/>
+            <a:off x="7420056" y="1722288"/>
             <a:ext cx="646956" cy="276999"/>
           </a:xfrm>
           <a:prstGeom prst="rect">
@@ -10869,7 +11005,7 @@
         </p:nvSpPr>
         <p:spPr>
           <a:xfrm>
-            <a:off x="9218260" y="4319936"/>
+            <a:off x="8930588" y="4319936"/>
             <a:ext cx="1190629" cy="400110"/>
           </a:xfrm>
           <a:prstGeom prst="rect">
@@ -10919,7 +11055,7 @@
         </p:blipFill>
         <p:spPr>
           <a:xfrm>
-            <a:off x="10077055" y="4529403"/>
+            <a:off x="9789383" y="4529403"/>
             <a:ext cx="1757663" cy="977245"/>
           </a:xfrm>
           <a:prstGeom prst="rect">
@@ -10950,7 +11086,7 @@
         </p:nvCxnSpPr>
         <p:spPr>
           <a:xfrm flipH="1">
-            <a:off x="8567588" y="5071738"/>
+            <a:off x="8279916" y="5071738"/>
             <a:ext cx="770589" cy="0"/>
           </a:xfrm>
           <a:prstGeom prst="line">
@@ -10993,7 +11129,7 @@
         </p:nvSpPr>
         <p:spPr>
           <a:xfrm>
-            <a:off x="8522851" y="4706629"/>
+            <a:off x="8235179" y="4706629"/>
             <a:ext cx="883655" cy="276999"/>
           </a:xfrm>
           <a:prstGeom prst="rect">
@@ -11043,7 +11179,7 @@
         </p:nvCxnSpPr>
         <p:spPr>
           <a:xfrm flipH="1">
-            <a:off x="8541694" y="3658697"/>
+            <a:off x="8254022" y="3658697"/>
             <a:ext cx="1046329" cy="0"/>
           </a:xfrm>
           <a:prstGeom prst="line">
@@ -11086,7 +11222,7 @@
         </p:nvSpPr>
         <p:spPr>
           <a:xfrm>
-            <a:off x="8291495" y="4009290"/>
+            <a:off x="8003823" y="4009290"/>
             <a:ext cx="1391472" cy="400110"/>
           </a:xfrm>
           <a:prstGeom prst="rect">
@@ -11134,7 +11270,7 @@
         </p:nvSpPr>
         <p:spPr>
           <a:xfrm>
-            <a:off x="9296872" y="2948789"/>
+            <a:off x="9009200" y="2948789"/>
             <a:ext cx="995055" cy="400110"/>
           </a:xfrm>
           <a:prstGeom prst="rect">
@@ -11170,7 +11306,7 @@
         </p:nvSpPr>
         <p:spPr>
           <a:xfrm>
-            <a:off x="8230697" y="2565935"/>
+            <a:off x="7943025" y="2565935"/>
             <a:ext cx="1391472" cy="400110"/>
           </a:xfrm>
           <a:prstGeom prst="rect">
@@ -11220,13 +11356,13 @@
         </p:nvPicPr>
         <p:blipFill rotWithShape="1">
           <a:blip r:embed="rId10"/>
-          <a:srcRect r="35693"/>
+          <a:srcRect t="43625" r="35693"/>
           <a:stretch/>
         </p:blipFill>
         <p:spPr>
           <a:xfrm>
-            <a:off x="10433048" y="1369568"/>
-            <a:ext cx="1180868" cy="1258311"/>
+            <a:off x="10145376" y="1918510"/>
+            <a:ext cx="1180868" cy="709369"/>
           </a:xfrm>
           <a:prstGeom prst="rect">
             <a:avLst/>
@@ -11252,7 +11388,7 @@
         </p:nvSpPr>
         <p:spPr>
           <a:xfrm>
-            <a:off x="8582758" y="3342191"/>
+            <a:off x="8295086" y="3342191"/>
             <a:ext cx="883655" cy="276999"/>
           </a:xfrm>
           <a:prstGeom prst="rect">
@@ -11304,7 +11440,7 @@
         </p:nvCxnSpPr>
         <p:spPr>
           <a:xfrm flipH="1">
-            <a:off x="8541694" y="2288814"/>
+            <a:off x="8254022" y="2288814"/>
             <a:ext cx="810879" cy="0"/>
           </a:xfrm>
           <a:prstGeom prst="line">
@@ -11347,7 +11483,7 @@
         </p:nvSpPr>
         <p:spPr>
           <a:xfrm>
-            <a:off x="8505305" y="1828792"/>
+            <a:off x="8217633" y="1828792"/>
             <a:ext cx="883655" cy="276999"/>
           </a:xfrm>
           <a:prstGeom prst="rect">
@@ -11395,7 +11531,7 @@
         </p:nvSpPr>
         <p:spPr>
           <a:xfrm>
-            <a:off x="10024472" y="4249467"/>
+            <a:off x="9736800" y="4249467"/>
             <a:ext cx="1767478" cy="246221"/>
           </a:xfrm>
           <a:prstGeom prst="rect">
@@ -11431,8 +11567,8 @@
         </p:nvSpPr>
         <p:spPr>
           <a:xfrm>
-            <a:off x="10044894" y="2749495"/>
-            <a:ext cx="2147105" cy="246221"/>
+            <a:off x="9571859" y="2740342"/>
+            <a:ext cx="2126168" cy="246221"/>
           </a:xfrm>
           <a:prstGeom prst="rect">
             <a:avLst/>
@@ -11467,8 +11603,8 @@
         </p:nvSpPr>
         <p:spPr>
           <a:xfrm>
-            <a:off x="10124679" y="1147324"/>
-            <a:ext cx="2147105" cy="246221"/>
+            <a:off x="10055195" y="1517862"/>
+            <a:ext cx="1361229" cy="400110"/>
           </a:xfrm>
           <a:prstGeom prst="rect">
             <a:avLst/>
@@ -11503,7 +11639,7 @@
         </p:nvSpPr>
         <p:spPr>
           <a:xfrm>
-            <a:off x="9276621" y="1586126"/>
+            <a:off x="8988949" y="1586126"/>
             <a:ext cx="1134274" cy="400110"/>
           </a:xfrm>
           <a:prstGeom prst="rect">
@@ -11547,7 +11683,7 @@
         </p:blipFill>
         <p:spPr>
           <a:xfrm>
-            <a:off x="10132980" y="2996694"/>
+            <a:off x="9845308" y="2996694"/>
             <a:ext cx="1722449" cy="1016245"/>
           </a:xfrm>
           <a:prstGeom prst="rect">
@@ -11576,7 +11712,7 @@
         </p:nvCxnSpPr>
         <p:spPr>
           <a:xfrm flipH="1">
-            <a:off x="8541694" y="2398972"/>
+            <a:off x="8264296" y="2429794"/>
             <a:ext cx="1867195" cy="8501"/>
           </a:xfrm>
           <a:prstGeom prst="line">
@@ -11628,7 +11764,7 @@
         </p:blipFill>
         <p:spPr>
           <a:xfrm>
-            <a:off x="9352573" y="2014000"/>
+            <a:off x="9064901" y="2014000"/>
             <a:ext cx="883655" cy="549627"/>
           </a:xfrm>
           <a:prstGeom prst="rect">
@@ -11657,7 +11793,7 @@
         </p:nvCxnSpPr>
         <p:spPr>
           <a:xfrm flipH="1">
-            <a:off x="8549279" y="3829743"/>
+            <a:off x="8261607" y="3829743"/>
             <a:ext cx="1575400" cy="6142"/>
           </a:xfrm>
           <a:prstGeom prst="line">
@@ -11709,7 +11845,7 @@
         </p:blipFill>
         <p:spPr>
           <a:xfrm>
-            <a:off x="9372323" y="3353393"/>
+            <a:off x="9084651" y="3353393"/>
             <a:ext cx="499692" cy="580179"/>
           </a:xfrm>
           <a:prstGeom prst="rect">
@@ -11738,7 +11874,7 @@
         </p:nvCxnSpPr>
         <p:spPr>
           <a:xfrm flipH="1">
-            <a:off x="8549279" y="5226453"/>
+            <a:off x="8261607" y="5226453"/>
             <a:ext cx="1495615" cy="19935"/>
           </a:xfrm>
           <a:prstGeom prst="line">
@@ -11790,7 +11926,7 @@
         </p:blipFill>
         <p:spPr>
           <a:xfrm>
-            <a:off x="9338177" y="4781648"/>
+            <a:off x="9050505" y="4781648"/>
             <a:ext cx="499692" cy="580179"/>
           </a:xfrm>
           <a:prstGeom prst="rect">
@@ -11817,8 +11953,8 @@
         </p:nvSpPr>
         <p:spPr>
           <a:xfrm>
-            <a:off x="7243793" y="489403"/>
-            <a:ext cx="1473991" cy="1107996"/>
+            <a:off x="5674543" y="2821009"/>
+            <a:ext cx="1637721" cy="1107996"/>
           </a:xfrm>
           <a:prstGeom prst="rect">
             <a:avLst/>
@@ -11837,6 +11973,10 @@
             </a:r>
           </a:p>
           <a:p>
+            <a:pPr marL="171450" indent="-171450">
+              <a:buFont typeface="Arial" panose="020B0604020202020204" pitchFamily="34" charset="0"/>
+              <a:buChar char="•"/>
+            </a:pPr>
             <a:r>
               <a:rPr lang="en-US" sz="1100" b="1" dirty="0">
                 <a:solidFill>
@@ -11849,6 +11989,10 @@
             </a:r>
           </a:p>
           <a:p>
+            <a:pPr marL="171450" indent="-171450">
+              <a:buFont typeface="Arial" panose="020B0604020202020204" pitchFamily="34" charset="0"/>
+              <a:buChar char="•"/>
+            </a:pPr>
             <a:r>
               <a:rPr lang="en-US" sz="1100" b="1" dirty="0">
                 <a:solidFill>
@@ -11859,6 +12003,10 @@
             </a:r>
           </a:p>
           <a:p>
+            <a:pPr marL="171450" indent="-171450">
+              <a:buFont typeface="Arial" panose="020B0604020202020204" pitchFamily="34" charset="0"/>
+              <a:buChar char="•"/>
+            </a:pPr>
             <a:r>
               <a:rPr lang="en-US" sz="1100" b="1" dirty="0">
                 <a:solidFill>
@@ -11875,6 +12023,10 @@
             </a:r>
           </a:p>
           <a:p>
+            <a:pPr marL="171450" indent="-171450">
+              <a:buFont typeface="Arial" panose="020B0604020202020204" pitchFamily="34" charset="0"/>
+              <a:buChar char="•"/>
+            </a:pPr>
             <a:r>
               <a:rPr lang="en-US" sz="1100" b="1" dirty="0"/>
               <a:t>Black: Customer  </a:t>
@@ -11899,7 +12051,7 @@
         </p:nvSpPr>
         <p:spPr>
           <a:xfrm>
-            <a:off x="3808277" y="2027236"/>
+            <a:off x="4106196" y="2109649"/>
             <a:ext cx="136177" cy="157109"/>
           </a:xfrm>
           <a:prstGeom prst="ellipse">
@@ -11949,7 +12101,7 @@
         </p:nvSpPr>
         <p:spPr>
           <a:xfrm>
-            <a:off x="3838823" y="1306121"/>
+            <a:off x="4136742" y="1388534"/>
             <a:ext cx="136177" cy="157109"/>
           </a:xfrm>
           <a:prstGeom prst="ellipse">
@@ -12004,7 +12156,7 @@
         </p:nvSpPr>
         <p:spPr>
           <a:xfrm>
-            <a:off x="3594212" y="2380179"/>
+            <a:off x="3892131" y="2462592"/>
             <a:ext cx="136177" cy="157109"/>
           </a:xfrm>
           <a:prstGeom prst="ellipse">
@@ -12059,7 +12211,7 @@
         </p:nvSpPr>
         <p:spPr>
           <a:xfrm>
-            <a:off x="4975118" y="2204847"/>
+            <a:off x="5273037" y="2287260"/>
             <a:ext cx="136177" cy="157109"/>
           </a:xfrm>
           <a:prstGeom prst="ellipse">
@@ -12114,7 +12266,7 @@
         </p:nvSpPr>
         <p:spPr>
           <a:xfrm>
-            <a:off x="5614362" y="2213315"/>
+            <a:off x="5912281" y="2295728"/>
             <a:ext cx="136177" cy="157109"/>
           </a:xfrm>
           <a:prstGeom prst="ellipse">
@@ -12169,7 +12321,7 @@
         </p:nvSpPr>
         <p:spPr>
           <a:xfrm>
-            <a:off x="5203209" y="2034962"/>
+            <a:off x="5501128" y="2117375"/>
             <a:ext cx="136177" cy="157109"/>
           </a:xfrm>
           <a:prstGeom prst="ellipse">
@@ -12219,7 +12371,7 @@
         </p:nvSpPr>
         <p:spPr>
           <a:xfrm>
-            <a:off x="5855984" y="2022875"/>
+            <a:off x="6153903" y="2105288"/>
             <a:ext cx="136177" cy="157109"/>
           </a:xfrm>
           <a:prstGeom prst="ellipse">
@@ -12269,7 +12421,7 @@
         </p:nvSpPr>
         <p:spPr>
           <a:xfrm>
-            <a:off x="5216262" y="1306121"/>
+            <a:off x="5514181" y="1388534"/>
             <a:ext cx="136177" cy="157109"/>
           </a:xfrm>
           <a:prstGeom prst="ellipse">
@@ -12324,7 +12476,7 @@
         </p:nvSpPr>
         <p:spPr>
           <a:xfrm>
-            <a:off x="5864307" y="1306120"/>
+            <a:off x="6162226" y="1388533"/>
             <a:ext cx="136177" cy="157109"/>
           </a:xfrm>
           <a:prstGeom prst="ellipse">
@@ -12379,7 +12531,7 @@
         </p:nvSpPr>
         <p:spPr>
           <a:xfrm>
-            <a:off x="4615530" y="2796185"/>
+            <a:off x="4913449" y="2878598"/>
             <a:ext cx="136177" cy="157109"/>
           </a:xfrm>
           <a:prstGeom prst="ellipse">
@@ -12429,7 +12581,7 @@
         </p:nvSpPr>
         <p:spPr>
           <a:xfrm>
-            <a:off x="4404105" y="3286383"/>
+            <a:off x="4693174" y="3296453"/>
             <a:ext cx="136177" cy="157109"/>
           </a:xfrm>
           <a:prstGeom prst="ellipse">
@@ -12484,7 +12636,7 @@
         </p:nvSpPr>
         <p:spPr>
           <a:xfrm>
-            <a:off x="3027027" y="3102979"/>
+            <a:off x="2739355" y="3102979"/>
             <a:ext cx="136177" cy="157109"/>
           </a:xfrm>
           <a:prstGeom prst="ellipse">
@@ -12539,7 +12691,7 @@
         </p:nvSpPr>
         <p:spPr>
           <a:xfrm>
-            <a:off x="1361356" y="3333949"/>
+            <a:off x="1073684" y="3333949"/>
             <a:ext cx="136177" cy="157109"/>
           </a:xfrm>
           <a:prstGeom prst="ellipse">
@@ -12582,10 +12734,10 @@
       </p:sp>
       <p:sp>
         <p:nvSpPr>
-          <p:cNvPr id="50" name="Oval 49">
-            <a:extLst>
-              <a:ext uri="{FF2B5EF4-FFF2-40B4-BE49-F238E27FC236}">
-                <a16:creationId xmlns:a16="http://schemas.microsoft.com/office/drawing/2014/main" id="{44744BBB-B00A-A25D-7A01-BFA5281C4023}"/>
+          <p:cNvPr id="52" name="Oval 51">
+            <a:extLst>
+              <a:ext uri="{FF2B5EF4-FFF2-40B4-BE49-F238E27FC236}">
+                <a16:creationId xmlns:a16="http://schemas.microsoft.com/office/drawing/2014/main" id="{7ED54845-70BF-9A42-D4E9-481E106401E7}"/>
               </a:ext>
             </a:extLst>
           </p:cNvPr>
@@ -12594,7 +12746,7 @@
         </p:nvSpPr>
         <p:spPr>
           <a:xfrm>
-            <a:off x="2923732" y="1556685"/>
+            <a:off x="3803570" y="4450848"/>
             <a:ext cx="136177" cy="157109"/>
           </a:xfrm>
           <a:prstGeom prst="ellipse">
@@ -12632,10 +12784,10 @@
       </p:sp>
       <p:sp>
         <p:nvSpPr>
-          <p:cNvPr id="52" name="Oval 51">
-            <a:extLst>
-              <a:ext uri="{FF2B5EF4-FFF2-40B4-BE49-F238E27FC236}">
-                <a16:creationId xmlns:a16="http://schemas.microsoft.com/office/drawing/2014/main" id="{7ED54845-70BF-9A42-D4E9-481E106401E7}"/>
+          <p:cNvPr id="56" name="Oval 55">
+            <a:extLst>
+              <a:ext uri="{FF2B5EF4-FFF2-40B4-BE49-F238E27FC236}">
+                <a16:creationId xmlns:a16="http://schemas.microsoft.com/office/drawing/2014/main" id="{53FB92A0-583D-EAAB-DBCD-F4D60BF22A03}"/>
               </a:ext>
             </a:extLst>
           </p:cNvPr>
@@ -12644,12 +12796,17 @@
         </p:nvSpPr>
         <p:spPr>
           <a:xfrm>
-            <a:off x="4091242" y="4450848"/>
+            <a:off x="8541477" y="2275217"/>
             <a:ext cx="136177" cy="157109"/>
           </a:xfrm>
           <a:prstGeom prst="ellipse">
             <a:avLst/>
           </a:prstGeom>
+          <a:solidFill>
+            <a:schemeClr val="accent6">
+              <a:lumMod val="75000"/>
+            </a:schemeClr>
+          </a:solidFill>
         </p:spPr>
         <p:style>
           <a:lnRef idx="2">
@@ -12674,7 +12831,7 @@
             <a:pPr algn="ctr"/>
             <a:r>
               <a:rPr lang="en-US" sz="900" dirty="0"/>
-              <a:t>R</a:t>
+              <a:t>P</a:t>
             </a:r>
             <a:endParaRPr lang="en-SG" sz="900" dirty="0"/>
           </a:p>
@@ -12682,10 +12839,10 @@
       </p:sp>
       <p:sp>
         <p:nvSpPr>
-          <p:cNvPr id="56" name="Oval 55">
-            <a:extLst>
-              <a:ext uri="{FF2B5EF4-FFF2-40B4-BE49-F238E27FC236}">
-                <a16:creationId xmlns:a16="http://schemas.microsoft.com/office/drawing/2014/main" id="{53FB92A0-583D-EAAB-DBCD-F4D60BF22A03}"/>
+          <p:cNvPr id="67" name="Oval 66">
+            <a:extLst>
+              <a:ext uri="{FF2B5EF4-FFF2-40B4-BE49-F238E27FC236}">
+                <a16:creationId xmlns:a16="http://schemas.microsoft.com/office/drawing/2014/main" id="{A9C1A488-4AA0-1853-CB83-B00DFF15F353}"/>
               </a:ext>
             </a:extLst>
           </p:cNvPr>
@@ -12694,17 +12851,12 @@
         </p:nvSpPr>
         <p:spPr>
           <a:xfrm>
-            <a:off x="8829149" y="2275217"/>
+            <a:off x="3075474" y="3721350"/>
             <a:ext cx="136177" cy="157109"/>
           </a:xfrm>
           <a:prstGeom prst="ellipse">
             <a:avLst/>
           </a:prstGeom>
-          <a:solidFill>
-            <a:schemeClr val="accent6">
-              <a:lumMod val="75000"/>
-            </a:schemeClr>
-          </a:solidFill>
         </p:spPr>
         <p:style>
           <a:lnRef idx="2">
@@ -12729,7 +12881,7 @@
             <a:pPr algn="ctr"/>
             <a:r>
               <a:rPr lang="en-US" sz="900" dirty="0"/>
-              <a:t>P</a:t>
+              <a:t>R</a:t>
             </a:r>
             <a:endParaRPr lang="en-SG" sz="900" dirty="0"/>
           </a:p>
@@ -12737,10 +12889,10 @@
       </p:sp>
       <p:sp>
         <p:nvSpPr>
-          <p:cNvPr id="67" name="Oval 66">
-            <a:extLst>
-              <a:ext uri="{FF2B5EF4-FFF2-40B4-BE49-F238E27FC236}">
-                <a16:creationId xmlns:a16="http://schemas.microsoft.com/office/drawing/2014/main" id="{A9C1A488-4AA0-1853-CB83-B00DFF15F353}"/>
+          <p:cNvPr id="68" name="Oval 67">
+            <a:extLst>
+              <a:ext uri="{FF2B5EF4-FFF2-40B4-BE49-F238E27FC236}">
+                <a16:creationId xmlns:a16="http://schemas.microsoft.com/office/drawing/2014/main" id="{AF664026-F9A2-714E-61CD-DDB631DA98D9}"/>
               </a:ext>
             </a:extLst>
           </p:cNvPr>
@@ -12749,12 +12901,17 @@
         </p:nvSpPr>
         <p:spPr>
           <a:xfrm>
-            <a:off x="3363146" y="3721350"/>
+            <a:off x="3080874" y="3437845"/>
             <a:ext cx="136177" cy="157109"/>
           </a:xfrm>
           <a:prstGeom prst="ellipse">
             <a:avLst/>
           </a:prstGeom>
+          <a:solidFill>
+            <a:schemeClr val="accent6">
+              <a:lumMod val="75000"/>
+            </a:schemeClr>
+          </a:solidFill>
         </p:spPr>
         <p:style>
           <a:lnRef idx="2">
@@ -12779,7 +12936,7 @@
             <a:pPr algn="ctr"/>
             <a:r>
               <a:rPr lang="en-US" sz="900" dirty="0"/>
-              <a:t>R</a:t>
+              <a:t>P</a:t>
             </a:r>
             <a:endParaRPr lang="en-SG" sz="900" dirty="0"/>
           </a:p>
@@ -12787,10 +12944,10 @@
       </p:sp>
       <p:sp>
         <p:nvSpPr>
-          <p:cNvPr id="68" name="Oval 67">
-            <a:extLst>
-              <a:ext uri="{FF2B5EF4-FFF2-40B4-BE49-F238E27FC236}">
-                <a16:creationId xmlns:a16="http://schemas.microsoft.com/office/drawing/2014/main" id="{AF664026-F9A2-714E-61CD-DDB631DA98D9}"/>
+          <p:cNvPr id="74" name="Oval 73">
+            <a:extLst>
+              <a:ext uri="{FF2B5EF4-FFF2-40B4-BE49-F238E27FC236}">
+                <a16:creationId xmlns:a16="http://schemas.microsoft.com/office/drawing/2014/main" id="{B2AD32F2-8FDA-0CFA-5343-C0F8E2CFDBBF}"/>
               </a:ext>
             </a:extLst>
           </p:cNvPr>
@@ -12799,7 +12956,7 @@
         </p:nvSpPr>
         <p:spPr>
           <a:xfrm>
-            <a:off x="3368546" y="3437845"/>
+            <a:off x="7857696" y="2867138"/>
             <a:ext cx="136177" cy="157109"/>
           </a:xfrm>
           <a:prstGeom prst="ellipse">
@@ -12842,10 +12999,10 @@
       </p:sp>
       <p:sp>
         <p:nvSpPr>
-          <p:cNvPr id="74" name="Oval 73">
-            <a:extLst>
-              <a:ext uri="{FF2B5EF4-FFF2-40B4-BE49-F238E27FC236}">
-                <a16:creationId xmlns:a16="http://schemas.microsoft.com/office/drawing/2014/main" id="{B2AD32F2-8FDA-0CFA-5343-C0F8E2CFDBBF}"/>
+          <p:cNvPr id="75" name="Oval 74">
+            <a:extLst>
+              <a:ext uri="{FF2B5EF4-FFF2-40B4-BE49-F238E27FC236}">
+                <a16:creationId xmlns:a16="http://schemas.microsoft.com/office/drawing/2014/main" id="{E99C3F48-A6BA-B14F-C688-E1AF6697448B}"/>
               </a:ext>
             </a:extLst>
           </p:cNvPr>
@@ -12854,7 +13011,7 @@
         </p:nvSpPr>
         <p:spPr>
           <a:xfrm>
-            <a:off x="8145368" y="2867138"/>
+            <a:off x="1065379" y="2061837"/>
             <a:ext cx="136177" cy="157109"/>
           </a:xfrm>
           <a:prstGeom prst="ellipse">
@@ -12897,10 +13054,10 @@
       </p:sp>
       <p:sp>
         <p:nvSpPr>
-          <p:cNvPr id="75" name="Oval 74">
-            <a:extLst>
-              <a:ext uri="{FF2B5EF4-FFF2-40B4-BE49-F238E27FC236}">
-                <a16:creationId xmlns:a16="http://schemas.microsoft.com/office/drawing/2014/main" id="{E99C3F48-A6BA-B14F-C688-E1AF6697448B}"/>
+          <p:cNvPr id="78" name="Oval 77">
+            <a:extLst>
+              <a:ext uri="{FF2B5EF4-FFF2-40B4-BE49-F238E27FC236}">
+                <a16:creationId xmlns:a16="http://schemas.microsoft.com/office/drawing/2014/main" id="{905F879A-EEF9-6DBE-01FB-E869F5708380}"/>
               </a:ext>
             </a:extLst>
           </p:cNvPr>
@@ -12909,7 +13066,7 @@
         </p:nvSpPr>
         <p:spPr>
           <a:xfrm>
-            <a:off x="1353051" y="2061837"/>
+            <a:off x="2267764" y="2028333"/>
             <a:ext cx="136177" cy="157109"/>
           </a:xfrm>
           <a:prstGeom prst="ellipse">
@@ -12952,10 +13109,10 @@
       </p:sp>
       <p:sp>
         <p:nvSpPr>
-          <p:cNvPr id="78" name="Oval 77">
-            <a:extLst>
-              <a:ext uri="{FF2B5EF4-FFF2-40B4-BE49-F238E27FC236}">
-                <a16:creationId xmlns:a16="http://schemas.microsoft.com/office/drawing/2014/main" id="{905F879A-EEF9-6DBE-01FB-E869F5708380}"/>
+          <p:cNvPr id="79" name="Oval 78">
+            <a:extLst>
+              <a:ext uri="{FF2B5EF4-FFF2-40B4-BE49-F238E27FC236}">
+                <a16:creationId xmlns:a16="http://schemas.microsoft.com/office/drawing/2014/main" id="{008C6A46-706E-F85F-77C3-3D79C546C6CC}"/>
               </a:ext>
             </a:extLst>
           </p:cNvPr>
@@ -12964,17 +13121,12 @@
         </p:nvSpPr>
         <p:spPr>
           <a:xfrm>
-            <a:off x="2555436" y="2028333"/>
+            <a:off x="2525070" y="2860098"/>
             <a:ext cx="136177" cy="157109"/>
           </a:xfrm>
           <a:prstGeom prst="ellipse">
             <a:avLst/>
           </a:prstGeom>
-          <a:solidFill>
-            <a:schemeClr val="accent6">
-              <a:lumMod val="75000"/>
-            </a:schemeClr>
-          </a:solidFill>
         </p:spPr>
         <p:style>
           <a:lnRef idx="2">
@@ -12999,7 +13151,7 @@
             <a:pPr algn="ctr"/>
             <a:r>
               <a:rPr lang="en-US" sz="900" dirty="0"/>
-              <a:t>P</a:t>
+              <a:t>R</a:t>
             </a:r>
             <a:endParaRPr lang="en-SG" sz="900" dirty="0"/>
           </a:p>
@@ -13007,10 +13159,10 @@
       </p:sp>
       <p:sp>
         <p:nvSpPr>
-          <p:cNvPr id="79" name="Oval 78">
-            <a:extLst>
-              <a:ext uri="{FF2B5EF4-FFF2-40B4-BE49-F238E27FC236}">
-                <a16:creationId xmlns:a16="http://schemas.microsoft.com/office/drawing/2014/main" id="{008C6A46-706E-F85F-77C3-3D79C546C6CC}"/>
+          <p:cNvPr id="80" name="Oval 79">
+            <a:extLst>
+              <a:ext uri="{FF2B5EF4-FFF2-40B4-BE49-F238E27FC236}">
+                <a16:creationId xmlns:a16="http://schemas.microsoft.com/office/drawing/2014/main" id="{20913FDF-799E-639D-5226-7776A30E6AD3}"/>
               </a:ext>
             </a:extLst>
           </p:cNvPr>
@@ -13019,7 +13171,7 @@
         </p:nvSpPr>
         <p:spPr>
           <a:xfrm>
-            <a:off x="2812742" y="2860098"/>
+            <a:off x="837581" y="2860098"/>
             <a:ext cx="136177" cy="157109"/>
           </a:xfrm>
           <a:prstGeom prst="ellipse">
@@ -13057,10 +13209,10 @@
       </p:sp>
       <p:sp>
         <p:nvSpPr>
-          <p:cNvPr id="80" name="Oval 79">
-            <a:extLst>
-              <a:ext uri="{FF2B5EF4-FFF2-40B4-BE49-F238E27FC236}">
-                <a16:creationId xmlns:a16="http://schemas.microsoft.com/office/drawing/2014/main" id="{20913FDF-799E-639D-5226-7776A30E6AD3}"/>
+          <p:cNvPr id="82" name="Oval 81">
+            <a:extLst>
+              <a:ext uri="{FF2B5EF4-FFF2-40B4-BE49-F238E27FC236}">
+                <a16:creationId xmlns:a16="http://schemas.microsoft.com/office/drawing/2014/main" id="{D9FF1C60-4006-5257-82FD-02D862BE200F}"/>
               </a:ext>
             </a:extLst>
           </p:cNvPr>
@@ -13069,7 +13221,7 @@
         </p:nvSpPr>
         <p:spPr>
           <a:xfrm>
-            <a:off x="1125253" y="2860098"/>
+            <a:off x="6142757" y="4429532"/>
             <a:ext cx="136177" cy="157109"/>
           </a:xfrm>
           <a:prstGeom prst="ellipse">
@@ -13107,10 +13259,10 @@
       </p:sp>
       <p:sp>
         <p:nvSpPr>
-          <p:cNvPr id="82" name="Oval 81">
-            <a:extLst>
-              <a:ext uri="{FF2B5EF4-FFF2-40B4-BE49-F238E27FC236}">
-                <a16:creationId xmlns:a16="http://schemas.microsoft.com/office/drawing/2014/main" id="{D9FF1C60-4006-5257-82FD-02D862BE200F}"/>
+          <p:cNvPr id="83" name="Oval 82">
+            <a:extLst>
+              <a:ext uri="{FF2B5EF4-FFF2-40B4-BE49-F238E27FC236}">
+                <a16:creationId xmlns:a16="http://schemas.microsoft.com/office/drawing/2014/main" id="{BE7073E5-1B33-5A1C-4779-D78741D03806}"/>
               </a:ext>
             </a:extLst>
           </p:cNvPr>
@@ -13119,12 +13271,17 @@
         </p:nvSpPr>
         <p:spPr>
           <a:xfrm>
-            <a:off x="6430429" y="4429532"/>
+            <a:off x="7396936" y="4788933"/>
             <a:ext cx="136177" cy="157109"/>
           </a:xfrm>
           <a:prstGeom prst="ellipse">
             <a:avLst/>
           </a:prstGeom>
+          <a:solidFill>
+            <a:schemeClr val="accent6">
+              <a:lumMod val="75000"/>
+            </a:schemeClr>
+          </a:solidFill>
         </p:spPr>
         <p:style>
           <a:lnRef idx="2">
@@ -13149,7 +13306,7 @@
             <a:pPr algn="ctr"/>
             <a:r>
               <a:rPr lang="en-US" sz="900" dirty="0"/>
-              <a:t>R</a:t>
+              <a:t>P</a:t>
             </a:r>
             <a:endParaRPr lang="en-SG" sz="900" dirty="0"/>
           </a:p>
@@ -13157,10 +13314,10 @@
       </p:sp>
       <p:sp>
         <p:nvSpPr>
-          <p:cNvPr id="83" name="Oval 82">
-            <a:extLst>
-              <a:ext uri="{FF2B5EF4-FFF2-40B4-BE49-F238E27FC236}">
-                <a16:creationId xmlns:a16="http://schemas.microsoft.com/office/drawing/2014/main" id="{BE7073E5-1B33-5A1C-4779-D78741D03806}"/>
+          <p:cNvPr id="89" name="Oval 88">
+            <a:extLst>
+              <a:ext uri="{FF2B5EF4-FFF2-40B4-BE49-F238E27FC236}">
+                <a16:creationId xmlns:a16="http://schemas.microsoft.com/office/drawing/2014/main" id="{93AC0122-1B2F-F0F9-B349-27BC0EF4D76E}"/>
               </a:ext>
             </a:extLst>
           </p:cNvPr>
@@ -13169,7 +13326,7 @@
         </p:nvSpPr>
         <p:spPr>
           <a:xfrm>
-            <a:off x="7684608" y="4788933"/>
+            <a:off x="3012785" y="4040698"/>
             <a:ext cx="136177" cy="157109"/>
           </a:xfrm>
           <a:prstGeom prst="ellipse">
@@ -13212,10 +13369,10 @@
       </p:sp>
       <p:sp>
         <p:nvSpPr>
-          <p:cNvPr id="89" name="Oval 88">
-            <a:extLst>
-              <a:ext uri="{FF2B5EF4-FFF2-40B4-BE49-F238E27FC236}">
-                <a16:creationId xmlns:a16="http://schemas.microsoft.com/office/drawing/2014/main" id="{93AC0122-1B2F-F0F9-B349-27BC0EF4D76E}"/>
+          <p:cNvPr id="90" name="Oval 89">
+            <a:extLst>
+              <a:ext uri="{FF2B5EF4-FFF2-40B4-BE49-F238E27FC236}">
+                <a16:creationId xmlns:a16="http://schemas.microsoft.com/office/drawing/2014/main" id="{3176BB73-5E35-C55B-B2B6-D0BE84614BF2}"/>
               </a:ext>
             </a:extLst>
           </p:cNvPr>
@@ -13224,7 +13381,7 @@
         </p:nvSpPr>
         <p:spPr>
           <a:xfrm>
-            <a:off x="3300457" y="4040698"/>
+            <a:off x="2567746" y="4127222"/>
             <a:ext cx="136177" cy="157109"/>
           </a:xfrm>
           <a:prstGeom prst="ellipse">
@@ -13267,10 +13424,10 @@
       </p:sp>
       <p:sp>
         <p:nvSpPr>
-          <p:cNvPr id="90" name="Oval 89">
-            <a:extLst>
-              <a:ext uri="{FF2B5EF4-FFF2-40B4-BE49-F238E27FC236}">
-                <a16:creationId xmlns:a16="http://schemas.microsoft.com/office/drawing/2014/main" id="{3176BB73-5E35-C55B-B2B6-D0BE84614BF2}"/>
+          <p:cNvPr id="94" name="Oval 93">
+            <a:extLst>
+              <a:ext uri="{FF2B5EF4-FFF2-40B4-BE49-F238E27FC236}">
+                <a16:creationId xmlns:a16="http://schemas.microsoft.com/office/drawing/2014/main" id="{16B7C5DE-381A-2D9D-85D0-701426358530}"/>
               </a:ext>
             </a:extLst>
           </p:cNvPr>
@@ -13279,7 +13436,7 @@
         </p:nvSpPr>
         <p:spPr>
           <a:xfrm>
-            <a:off x="2855418" y="4127222"/>
+            <a:off x="7874936" y="4206873"/>
             <a:ext cx="136177" cy="157109"/>
           </a:xfrm>
           <a:prstGeom prst="ellipse">
@@ -13322,10 +13479,10 @@
       </p:sp>
       <p:sp>
         <p:nvSpPr>
-          <p:cNvPr id="94" name="Oval 93">
-            <a:extLst>
-              <a:ext uri="{FF2B5EF4-FFF2-40B4-BE49-F238E27FC236}">
-                <a16:creationId xmlns:a16="http://schemas.microsoft.com/office/drawing/2014/main" id="{16B7C5DE-381A-2D9D-85D0-701426358530}"/>
+          <p:cNvPr id="96" name="Oval 95">
+            <a:extLst>
+              <a:ext uri="{FF2B5EF4-FFF2-40B4-BE49-F238E27FC236}">
+                <a16:creationId xmlns:a16="http://schemas.microsoft.com/office/drawing/2014/main" id="{17A5F347-53B3-5BD8-3480-41FCDECFA73A}"/>
               </a:ext>
             </a:extLst>
           </p:cNvPr>
@@ -13334,7 +13491,7 @@
         </p:nvSpPr>
         <p:spPr>
           <a:xfrm>
-            <a:off x="8162608" y="4206873"/>
+            <a:off x="8570672" y="3664557"/>
             <a:ext cx="136177" cy="157109"/>
           </a:xfrm>
           <a:prstGeom prst="ellipse">
@@ -13377,10 +13534,10 @@
       </p:sp>
       <p:sp>
         <p:nvSpPr>
-          <p:cNvPr id="96" name="Oval 95">
-            <a:extLst>
-              <a:ext uri="{FF2B5EF4-FFF2-40B4-BE49-F238E27FC236}">
-                <a16:creationId xmlns:a16="http://schemas.microsoft.com/office/drawing/2014/main" id="{17A5F347-53B3-5BD8-3480-41FCDECFA73A}"/>
+          <p:cNvPr id="98" name="Oval 97">
+            <a:extLst>
+              <a:ext uri="{FF2B5EF4-FFF2-40B4-BE49-F238E27FC236}">
+                <a16:creationId xmlns:a16="http://schemas.microsoft.com/office/drawing/2014/main" id="{9A416CAA-B40F-987C-2334-54EC67DD0D73}"/>
               </a:ext>
             </a:extLst>
           </p:cNvPr>
@@ -13389,7 +13546,7 @@
         </p:nvSpPr>
         <p:spPr>
           <a:xfrm>
-            <a:off x="8858344" y="3664557"/>
+            <a:off x="8552308" y="5063458"/>
             <a:ext cx="136177" cy="157109"/>
           </a:xfrm>
           <a:prstGeom prst="ellipse">
@@ -13432,10 +13589,10 @@
       </p:sp>
       <p:sp>
         <p:nvSpPr>
-          <p:cNvPr id="98" name="Oval 97">
-            <a:extLst>
-              <a:ext uri="{FF2B5EF4-FFF2-40B4-BE49-F238E27FC236}">
-                <a16:creationId xmlns:a16="http://schemas.microsoft.com/office/drawing/2014/main" id="{9A416CAA-B40F-987C-2334-54EC67DD0D73}"/>
+          <p:cNvPr id="99" name="Oval 98">
+            <a:extLst>
+              <a:ext uri="{FF2B5EF4-FFF2-40B4-BE49-F238E27FC236}">
+                <a16:creationId xmlns:a16="http://schemas.microsoft.com/office/drawing/2014/main" id="{F211D308-5E06-2B47-FF07-F3EA1020B435}"/>
               </a:ext>
             </a:extLst>
           </p:cNvPr>
@@ -13444,17 +13601,12 @@
         </p:nvSpPr>
         <p:spPr>
           <a:xfrm>
-            <a:off x="8839980" y="5063458"/>
+            <a:off x="7533113" y="2487357"/>
             <a:ext cx="136177" cy="157109"/>
           </a:xfrm>
           <a:prstGeom prst="ellipse">
             <a:avLst/>
           </a:prstGeom>
-          <a:solidFill>
-            <a:schemeClr val="accent6">
-              <a:lumMod val="75000"/>
-            </a:schemeClr>
-          </a:solidFill>
         </p:spPr>
         <p:style>
           <a:lnRef idx="2">
@@ -13479,7 +13631,7 @@
             <a:pPr algn="ctr"/>
             <a:r>
               <a:rPr lang="en-US" sz="900" dirty="0"/>
-              <a:t>P</a:t>
+              <a:t>R</a:t>
             </a:r>
             <a:endParaRPr lang="en-SG" sz="900" dirty="0"/>
           </a:p>
@@ -13487,10 +13639,10 @@
       </p:sp>
       <p:sp>
         <p:nvSpPr>
-          <p:cNvPr id="99" name="Oval 98">
-            <a:extLst>
-              <a:ext uri="{FF2B5EF4-FFF2-40B4-BE49-F238E27FC236}">
-                <a16:creationId xmlns:a16="http://schemas.microsoft.com/office/drawing/2014/main" id="{F211D308-5E06-2B47-FF07-F3EA1020B435}"/>
+          <p:cNvPr id="100" name="Oval 99">
+            <a:extLst>
+              <a:ext uri="{FF2B5EF4-FFF2-40B4-BE49-F238E27FC236}">
+                <a16:creationId xmlns:a16="http://schemas.microsoft.com/office/drawing/2014/main" id="{1BB340DE-3CD7-BD3C-6DB1-FC9678A8B066}"/>
               </a:ext>
             </a:extLst>
           </p:cNvPr>
@@ -13499,7 +13651,7 @@
         </p:nvSpPr>
         <p:spPr>
           <a:xfrm>
-            <a:off x="7820785" y="2487357"/>
+            <a:off x="7540988" y="3902994"/>
             <a:ext cx="136177" cy="157109"/>
           </a:xfrm>
           <a:prstGeom prst="ellipse">
@@ -13537,10 +13689,10 @@
       </p:sp>
       <p:sp>
         <p:nvSpPr>
-          <p:cNvPr id="100" name="Oval 99">
-            <a:extLst>
-              <a:ext uri="{FF2B5EF4-FFF2-40B4-BE49-F238E27FC236}">
-                <a16:creationId xmlns:a16="http://schemas.microsoft.com/office/drawing/2014/main" id="{1BB340DE-3CD7-BD3C-6DB1-FC9678A8B066}"/>
+          <p:cNvPr id="103" name="Oval 102">
+            <a:extLst>
+              <a:ext uri="{FF2B5EF4-FFF2-40B4-BE49-F238E27FC236}">
+                <a16:creationId xmlns:a16="http://schemas.microsoft.com/office/drawing/2014/main" id="{4C43D2B5-F9E4-007E-2E7D-EE5C13DBDC0E}"/>
               </a:ext>
             </a:extLst>
           </p:cNvPr>
@@ -13549,7 +13701,7 @@
         </p:nvSpPr>
         <p:spPr>
           <a:xfrm>
-            <a:off x="7828660" y="3902994"/>
+            <a:off x="7573753" y="5254506"/>
             <a:ext cx="136177" cy="157109"/>
           </a:xfrm>
           <a:prstGeom prst="ellipse">
@@ -13587,10 +13739,10 @@
       </p:sp>
       <p:sp>
         <p:nvSpPr>
-          <p:cNvPr id="103" name="Oval 102">
-            <a:extLst>
-              <a:ext uri="{FF2B5EF4-FFF2-40B4-BE49-F238E27FC236}">
-                <a16:creationId xmlns:a16="http://schemas.microsoft.com/office/drawing/2014/main" id="{4C43D2B5-F9E4-007E-2E7D-EE5C13DBDC0E}"/>
+          <p:cNvPr id="105" name="Oval 104">
+            <a:extLst>
+              <a:ext uri="{FF2B5EF4-FFF2-40B4-BE49-F238E27FC236}">
+                <a16:creationId xmlns:a16="http://schemas.microsoft.com/office/drawing/2014/main" id="{65E697B1-BA54-7CBC-AF05-A9D03D5E3B86}"/>
               </a:ext>
             </a:extLst>
           </p:cNvPr>
@@ -13599,7 +13751,7 @@
         </p:nvSpPr>
         <p:spPr>
           <a:xfrm>
-            <a:off x="7861425" y="5254506"/>
+            <a:off x="8981218" y="2353771"/>
             <a:ext cx="136177" cy="157109"/>
           </a:xfrm>
           <a:prstGeom prst="ellipse">
@@ -13637,10 +13789,10 @@
       </p:sp>
       <p:sp>
         <p:nvSpPr>
-          <p:cNvPr id="105" name="Oval 104">
-            <a:extLst>
-              <a:ext uri="{FF2B5EF4-FFF2-40B4-BE49-F238E27FC236}">
-                <a16:creationId xmlns:a16="http://schemas.microsoft.com/office/drawing/2014/main" id="{65E697B1-BA54-7CBC-AF05-A9D03D5E3B86}"/>
+          <p:cNvPr id="106" name="Oval 105">
+            <a:extLst>
+              <a:ext uri="{FF2B5EF4-FFF2-40B4-BE49-F238E27FC236}">
+                <a16:creationId xmlns:a16="http://schemas.microsoft.com/office/drawing/2014/main" id="{18152FFA-90D9-0661-EE70-FD1444A80894}"/>
               </a:ext>
             </a:extLst>
           </p:cNvPr>
@@ -13649,7 +13801,7 @@
         </p:nvSpPr>
         <p:spPr>
           <a:xfrm>
-            <a:off x="9268890" y="2353771"/>
+            <a:off x="9016562" y="3870110"/>
             <a:ext cx="136177" cy="157109"/>
           </a:xfrm>
           <a:prstGeom prst="ellipse">
@@ -13687,10 +13839,10 @@
       </p:sp>
       <p:sp>
         <p:nvSpPr>
-          <p:cNvPr id="106" name="Oval 105">
-            <a:extLst>
-              <a:ext uri="{FF2B5EF4-FFF2-40B4-BE49-F238E27FC236}">
-                <a16:creationId xmlns:a16="http://schemas.microsoft.com/office/drawing/2014/main" id="{18152FFA-90D9-0661-EE70-FD1444A80894}"/>
+          <p:cNvPr id="108" name="Oval 107">
+            <a:extLst>
+              <a:ext uri="{FF2B5EF4-FFF2-40B4-BE49-F238E27FC236}">
+                <a16:creationId xmlns:a16="http://schemas.microsoft.com/office/drawing/2014/main" id="{E5501FF4-FD49-BE86-C1F0-FAA3290FDB93}"/>
               </a:ext>
             </a:extLst>
           </p:cNvPr>
@@ -13699,7 +13851,7 @@
         </p:nvSpPr>
         <p:spPr>
           <a:xfrm>
-            <a:off x="9304234" y="3870110"/>
+            <a:off x="8971898" y="5308755"/>
             <a:ext cx="136177" cy="157109"/>
           </a:xfrm>
           <a:prstGeom prst="ellipse">
@@ -13737,10 +13889,10 @@
       </p:sp>
       <p:sp>
         <p:nvSpPr>
-          <p:cNvPr id="108" name="Oval 107">
-            <a:extLst>
-              <a:ext uri="{FF2B5EF4-FFF2-40B4-BE49-F238E27FC236}">
-                <a16:creationId xmlns:a16="http://schemas.microsoft.com/office/drawing/2014/main" id="{E5501FF4-FD49-BE86-C1F0-FAA3290FDB93}"/>
+          <p:cNvPr id="111" name="Oval 110">
+            <a:extLst>
+              <a:ext uri="{FF2B5EF4-FFF2-40B4-BE49-F238E27FC236}">
+                <a16:creationId xmlns:a16="http://schemas.microsoft.com/office/drawing/2014/main" id="{A15DC1CF-B18A-DFFA-A6B5-A97F190114B5}"/>
               </a:ext>
             </a:extLst>
           </p:cNvPr>
@@ -13749,12 +13901,17 @@
         </p:nvSpPr>
         <p:spPr>
           <a:xfrm>
-            <a:off x="9259570" y="5308755"/>
-            <a:ext cx="136177" cy="157109"/>
+            <a:off x="6909564" y="783158"/>
+            <a:ext cx="166624" cy="157109"/>
           </a:xfrm>
           <a:prstGeom prst="ellipse">
             <a:avLst/>
           </a:prstGeom>
+          <a:solidFill>
+            <a:schemeClr val="accent6">
+              <a:lumMod val="75000"/>
+            </a:schemeClr>
+          </a:solidFill>
         </p:spPr>
         <p:style>
           <a:lnRef idx="2">
@@ -13779,7 +13936,7 @@
             <a:pPr algn="ctr"/>
             <a:r>
               <a:rPr lang="en-US" sz="900" dirty="0"/>
-              <a:t>R</a:t>
+              <a:t>P</a:t>
             </a:r>
             <a:endParaRPr lang="en-SG" sz="900" dirty="0"/>
           </a:p>
@@ -13787,10 +13944,46 @@
       </p:sp>
       <p:sp>
         <p:nvSpPr>
-          <p:cNvPr id="111" name="Oval 110">
-            <a:extLst>
-              <a:ext uri="{FF2B5EF4-FFF2-40B4-BE49-F238E27FC236}">
-                <a16:creationId xmlns:a16="http://schemas.microsoft.com/office/drawing/2014/main" id="{A15DC1CF-B18A-DFFA-A6B5-A97F190114B5}"/>
+          <p:cNvPr id="112" name="TextBox 111">
+            <a:extLst>
+              <a:ext uri="{FF2B5EF4-FFF2-40B4-BE49-F238E27FC236}">
+                <a16:creationId xmlns:a16="http://schemas.microsoft.com/office/drawing/2014/main" id="{B154CD43-9DF4-1112-789C-EB52EBEE064D}"/>
+              </a:ext>
+            </a:extLst>
+          </p:cNvPr>
+          <p:cNvSpPr txBox="1"/>
+          <p:nvPr/>
+        </p:nvSpPr>
+        <p:spPr>
+          <a:xfrm>
+            <a:off x="7135879" y="707696"/>
+            <a:ext cx="3672037" cy="430887"/>
+          </a:xfrm>
+          <a:prstGeom prst="rect">
+            <a:avLst/>
+          </a:prstGeom>
+          <a:noFill/>
+        </p:spPr>
+        <p:txBody>
+          <a:bodyPr wrap="square" rtlCol="0">
+            <a:spAutoFit/>
+          </a:bodyPr>
+          <a:lstStyle/>
+          <a:p>
+            <a:r>
+              <a:rPr lang="en-US" sz="1100" b="1" dirty="0"/>
+              <a:t>PLC Connection and Control Point ( remote circuit breaker + closer sensors)</a:t>
+            </a:r>
+            <a:endParaRPr lang="en-SG" sz="1100" b="1" dirty="0"/>
+          </a:p>
+        </p:txBody>
+      </p:sp>
+      <p:sp>
+        <p:nvSpPr>
+          <p:cNvPr id="114" name="Oval 113">
+            <a:extLst>
+              <a:ext uri="{FF2B5EF4-FFF2-40B4-BE49-F238E27FC236}">
+                <a16:creationId xmlns:a16="http://schemas.microsoft.com/office/drawing/2014/main" id="{03C805E0-8504-D0CA-D656-32B9AAB899E0}"/>
               </a:ext>
             </a:extLst>
           </p:cNvPr>
@@ -13799,17 +13992,12 @@
         </p:nvSpPr>
         <p:spPr>
           <a:xfrm>
-            <a:off x="9083140" y="551737"/>
-            <a:ext cx="136177" cy="157109"/>
+            <a:off x="6935223" y="1250718"/>
+            <a:ext cx="166624" cy="157109"/>
           </a:xfrm>
           <a:prstGeom prst="ellipse">
             <a:avLst/>
           </a:prstGeom>
-          <a:solidFill>
-            <a:schemeClr val="accent6">
-              <a:lumMod val="75000"/>
-            </a:schemeClr>
-          </a:solidFill>
         </p:spPr>
         <p:style>
           <a:lnRef idx="2">
@@ -13834,7 +14022,7 @@
             <a:pPr algn="ctr"/>
             <a:r>
               <a:rPr lang="en-US" sz="900" dirty="0"/>
-              <a:t>P</a:t>
+              <a:t>R</a:t>
             </a:r>
             <a:endParaRPr lang="en-SG" sz="900" dirty="0"/>
           </a:p>
@@ -13842,10 +14030,10 @@
       </p:sp>
       <p:sp>
         <p:nvSpPr>
-          <p:cNvPr id="112" name="TextBox 111">
-            <a:extLst>
-              <a:ext uri="{FF2B5EF4-FFF2-40B4-BE49-F238E27FC236}">
-                <a16:creationId xmlns:a16="http://schemas.microsoft.com/office/drawing/2014/main" id="{B154CD43-9DF4-1112-789C-EB52EBEE064D}"/>
+          <p:cNvPr id="115" name="TextBox 114">
+            <a:extLst>
+              <a:ext uri="{FF2B5EF4-FFF2-40B4-BE49-F238E27FC236}">
+                <a16:creationId xmlns:a16="http://schemas.microsoft.com/office/drawing/2014/main" id="{80B88AED-CC66-17EB-3A0C-91A8F6377CA3}"/>
               </a:ext>
             </a:extLst>
           </p:cNvPr>
@@ -13854,8 +14042,8 @@
         </p:nvSpPr>
         <p:spPr>
           <a:xfrm>
-            <a:off x="9334314" y="430751"/>
-            <a:ext cx="1784132" cy="430887"/>
+            <a:off x="7120968" y="1168825"/>
+            <a:ext cx="3171761" cy="261610"/>
           </a:xfrm>
           <a:prstGeom prst="rect">
             <a:avLst/>
@@ -13870,18 +14058,53 @@
           <a:p>
             <a:r>
               <a:rPr lang="en-US" sz="1100" b="1" dirty="0"/>
-              <a:t>PLC Connection and Control Point</a:t>
+              <a:t>RTU Monitoring Point (metering unit)</a:t>
             </a:r>
             <a:endParaRPr lang="en-SG" sz="1100" b="1" dirty="0"/>
           </a:p>
         </p:txBody>
       </p:sp>
+      <p:pic>
+        <p:nvPicPr>
+          <p:cNvPr id="18" name="Picture 17">
+            <a:extLst>
+              <a:ext uri="{FF2B5EF4-FFF2-40B4-BE49-F238E27FC236}">
+                <a16:creationId xmlns:a16="http://schemas.microsoft.com/office/drawing/2014/main" id="{C3A99BF0-6FD2-6AEC-4895-DCAAEFA7DA0E}"/>
+              </a:ext>
+            </a:extLst>
+          </p:cNvPr>
+          <p:cNvPicPr>
+            <a:picLocks noChangeAspect="1"/>
+          </p:cNvPicPr>
+          <p:nvPr/>
+        </p:nvPicPr>
+        <p:blipFill>
+          <a:blip r:embed="rId14"/>
+          <a:stretch>
+            <a:fillRect/>
+          </a:stretch>
+        </p:blipFill>
+        <p:spPr>
+          <a:xfrm>
+            <a:off x="784336" y="1029970"/>
+            <a:ext cx="747676" cy="729440"/>
+          </a:xfrm>
+          <a:prstGeom prst="rect">
+            <a:avLst/>
+          </a:prstGeom>
+          <a:ln w="6350">
+            <a:solidFill>
+              <a:schemeClr val="tx1"/>
+            </a:solidFill>
+          </a:ln>
+        </p:spPr>
+      </p:pic>
       <p:sp>
         <p:nvSpPr>
-          <p:cNvPr id="114" name="Oval 113">
-            <a:extLst>
-              <a:ext uri="{FF2B5EF4-FFF2-40B4-BE49-F238E27FC236}">
-                <a16:creationId xmlns:a16="http://schemas.microsoft.com/office/drawing/2014/main" id="{03C805E0-8504-D0CA-D656-32B9AAB899E0}"/>
+          <p:cNvPr id="60" name="Oval 59">
+            <a:extLst>
+              <a:ext uri="{FF2B5EF4-FFF2-40B4-BE49-F238E27FC236}">
+                <a16:creationId xmlns:a16="http://schemas.microsoft.com/office/drawing/2014/main" id="{0BAAAA52-C369-61AE-923F-DA30BEAB3E86}"/>
               </a:ext>
             </a:extLst>
           </p:cNvPr>
@@ -13890,7 +14113,7 @@
         </p:nvSpPr>
         <p:spPr>
           <a:xfrm>
-            <a:off x="9082083" y="992025"/>
+            <a:off x="1457277" y="1668791"/>
             <a:ext cx="136177" cy="157109"/>
           </a:xfrm>
           <a:prstGeom prst="ellipse">
@@ -13926,96 +14149,12 @@
           </a:p>
         </p:txBody>
       </p:sp>
-      <p:sp>
-        <p:nvSpPr>
-          <p:cNvPr id="115" name="TextBox 114">
-            <a:extLst>
-              <a:ext uri="{FF2B5EF4-FFF2-40B4-BE49-F238E27FC236}">
-                <a16:creationId xmlns:a16="http://schemas.microsoft.com/office/drawing/2014/main" id="{80B88AED-CC66-17EB-3A0C-91A8F6377CA3}"/>
-              </a:ext>
-            </a:extLst>
-          </p:cNvPr>
-          <p:cNvSpPr txBox="1"/>
-          <p:nvPr/>
-        </p:nvSpPr>
-        <p:spPr>
-          <a:xfrm>
-            <a:off x="9368830" y="901907"/>
-            <a:ext cx="1418461" cy="430887"/>
-          </a:xfrm>
-          <a:prstGeom prst="rect">
-            <a:avLst/>
-          </a:prstGeom>
-          <a:noFill/>
-        </p:spPr>
-        <p:txBody>
-          <a:bodyPr wrap="square" rtlCol="0">
-            <a:spAutoFit/>
-          </a:bodyPr>
-          <a:lstStyle/>
-          <a:p>
-            <a:r>
-              <a:rPr lang="en-US" sz="1100" b="1" dirty="0"/>
-              <a:t>RTU Monitoring Point</a:t>
-            </a:r>
-            <a:endParaRPr lang="en-SG" sz="1100" b="1" dirty="0"/>
-          </a:p>
-        </p:txBody>
-      </p:sp>
-      <p:sp>
-        <p:nvSpPr>
-          <p:cNvPr id="117" name="TextBox 116">
-            <a:extLst>
-              <a:ext uri="{FF2B5EF4-FFF2-40B4-BE49-F238E27FC236}">
-                <a16:creationId xmlns:a16="http://schemas.microsoft.com/office/drawing/2014/main" id="{4BA56E06-333B-213F-04A4-86B66AF1E8E6}"/>
-              </a:ext>
-            </a:extLst>
-          </p:cNvPr>
-          <p:cNvSpPr txBox="1"/>
-          <p:nvPr/>
-        </p:nvSpPr>
-        <p:spPr>
-          <a:xfrm>
-            <a:off x="42717" y="1451057"/>
-            <a:ext cx="1126879" cy="461665"/>
-          </a:xfrm>
-          <a:prstGeom prst="rect">
-            <a:avLst/>
-          </a:prstGeom>
-          <a:noFill/>
-        </p:spPr>
-        <p:txBody>
-          <a:bodyPr wrap="square" rtlCol="0">
-            <a:spAutoFit/>
-          </a:bodyPr>
-          <a:lstStyle/>
-          <a:p>
-            <a:r>
-              <a:rPr lang="en-US" sz="1200" b="1" dirty="0">
-                <a:solidFill>
-                  <a:schemeClr val="accent1">
-                    <a:lumMod val="75000"/>
-                  </a:schemeClr>
-                </a:solidFill>
-              </a:rPr>
-              <a:t>Google weather API</a:t>
-            </a:r>
-            <a:endParaRPr lang="en-SG" sz="1200" b="1" dirty="0">
-              <a:solidFill>
-                <a:schemeClr val="accent1">
-                  <a:lumMod val="75000"/>
-                </a:schemeClr>
-              </a:solidFill>
-            </a:endParaRPr>
-          </a:p>
-        </p:txBody>
-      </p:sp>
       <p:pic>
         <p:nvPicPr>
-          <p:cNvPr id="124" name="Picture 123">
-            <a:extLst>
-              <a:ext uri="{FF2B5EF4-FFF2-40B4-BE49-F238E27FC236}">
-                <a16:creationId xmlns:a16="http://schemas.microsoft.com/office/drawing/2014/main" id="{7DA38DF2-2EF8-2F26-4FE3-18E1AB28FF18}"/>
+          <p:cNvPr id="21" name="Picture 20">
+            <a:extLst>
+              <a:ext uri="{FF2B5EF4-FFF2-40B4-BE49-F238E27FC236}">
+                <a16:creationId xmlns:a16="http://schemas.microsoft.com/office/drawing/2014/main" id="{4D321C95-F56D-3CF9-1935-98B3C3CFB44F}"/>
               </a:ext>
             </a:extLst>
           </p:cNvPr>
@@ -14025,27 +14164,82 @@
           <p:nvPr/>
         </p:nvPicPr>
         <p:blipFill>
-          <a:blip r:embed="rId14"/>
+          <a:blip r:embed="rId15"/>
           <a:stretch>
             <a:fillRect/>
           </a:stretch>
         </p:blipFill>
         <p:spPr>
           <a:xfrm>
-            <a:off x="180911" y="992025"/>
-            <a:ext cx="578069" cy="460378"/>
-          </a:xfrm>
-          <a:prstGeom prst="rect">
-            <a:avLst/>
-          </a:prstGeom>
+            <a:off x="1976377" y="1034531"/>
+            <a:ext cx="759113" cy="737310"/>
+          </a:xfrm>
+          <a:prstGeom prst="rect">
+            <a:avLst/>
+          </a:prstGeom>
+          <a:ln w="9525">
+            <a:solidFill>
+              <a:schemeClr val="tx1"/>
+            </a:solidFill>
+          </a:ln>
         </p:spPr>
       </p:pic>
+      <p:sp>
+        <p:nvSpPr>
+          <p:cNvPr id="50" name="Oval 49">
+            <a:extLst>
+              <a:ext uri="{FF2B5EF4-FFF2-40B4-BE49-F238E27FC236}">
+                <a16:creationId xmlns:a16="http://schemas.microsoft.com/office/drawing/2014/main" id="{44744BBB-B00A-A25D-7A01-BFA5281C4023}"/>
+              </a:ext>
+            </a:extLst>
+          </p:cNvPr>
+          <p:cNvSpPr/>
+          <p:nvPr/>
+        </p:nvSpPr>
+        <p:spPr>
+          <a:xfrm>
+            <a:off x="2656175" y="1701414"/>
+            <a:ext cx="136177" cy="157109"/>
+          </a:xfrm>
+          <a:prstGeom prst="ellipse">
+            <a:avLst/>
+          </a:prstGeom>
+        </p:spPr>
+        <p:style>
+          <a:lnRef idx="2">
+            <a:schemeClr val="accent1">
+              <a:shade val="15000"/>
+            </a:schemeClr>
+          </a:lnRef>
+          <a:fillRef idx="1">
+            <a:schemeClr val="accent1"/>
+          </a:fillRef>
+          <a:effectRef idx="0">
+            <a:schemeClr val="accent1"/>
+          </a:effectRef>
+          <a:fontRef idx="minor">
+            <a:schemeClr val="lt1"/>
+          </a:fontRef>
+        </p:style>
+        <p:txBody>
+          <a:bodyPr rtlCol="0" anchor="ctr"/>
+          <a:lstStyle/>
+          <a:p>
+            <a:pPr algn="ctr"/>
+            <a:r>
+              <a:rPr lang="en-US" sz="900" dirty="0"/>
+              <a:t>R</a:t>
+            </a:r>
+            <a:endParaRPr lang="en-SG" sz="900" dirty="0"/>
+          </a:p>
+        </p:txBody>
+      </p:sp>
       <p:cxnSp>
         <p:nvCxnSpPr>
-          <p:cNvPr id="129" name="Straight Arrow Connector 128">
-            <a:extLst>
-              <a:ext uri="{FF2B5EF4-FFF2-40B4-BE49-F238E27FC236}">
-                <a16:creationId xmlns:a16="http://schemas.microsoft.com/office/drawing/2014/main" id="{3004F007-8538-DD54-9966-3CFD230AF15A}"/>
+          <p:cNvPr id="137" name="Straight Arrow Connector 136">
+            <a:extLst>
+              <a:ext uri="{FF2B5EF4-FFF2-40B4-BE49-F238E27FC236}">
+                <a16:creationId xmlns:a16="http://schemas.microsoft.com/office/drawing/2014/main" id="{69FC75F5-4A0F-E638-CD0D-FA1893EDFD5A}"/>
               </a:ext>
             </a:extLst>
           </p:cNvPr>
@@ -14056,13 +14250,19 @@
         </p:nvCxnSpPr>
         <p:spPr>
           <a:xfrm flipV="1">
-            <a:off x="751418" y="1105611"/>
-            <a:ext cx="335501" cy="0"/>
+            <a:off x="905669" y="1738058"/>
+            <a:ext cx="0" cy="321191"/>
           </a:xfrm>
           <a:prstGeom prst="straightConnector1">
             <a:avLst/>
           </a:prstGeom>
           <a:ln>
+            <a:solidFill>
+              <a:schemeClr val="accent2">
+                <a:lumMod val="75000"/>
+              </a:schemeClr>
+            </a:solidFill>
+            <a:prstDash val="sysDash"/>
             <a:tailEnd type="triangle"/>
           </a:ln>
         </p:spPr>
@@ -14083,29 +14283,79 @@
       </p:cxnSp>
       <p:cxnSp>
         <p:nvCxnSpPr>
-          <p:cNvPr id="130" name="Straight Arrow Connector 129">
-            <a:extLst>
-              <a:ext uri="{FF2B5EF4-FFF2-40B4-BE49-F238E27FC236}">
-                <a16:creationId xmlns:a16="http://schemas.microsoft.com/office/drawing/2014/main" id="{1766D63D-F1BE-3AE4-25D4-14CEF814BA8A}"/>
+          <p:cNvPr id="145" name="Straight Connector 144">
+            <a:extLst>
+              <a:ext uri="{FF2B5EF4-FFF2-40B4-BE49-F238E27FC236}">
+                <a16:creationId xmlns:a16="http://schemas.microsoft.com/office/drawing/2014/main" id="{28BC22A0-124C-A4F2-4A2D-FCDA9F83E484}"/>
               </a:ext>
             </a:extLst>
           </p:cNvPr>
           <p:cNvCxnSpPr>
             <a:cxnSpLocks/>
-            <a:endCxn id="21" idx="1"/>
           </p:cNvCxnSpPr>
           <p:nvPr/>
         </p:nvCxnSpPr>
         <p:spPr>
           <a:xfrm flipV="1">
-            <a:off x="751418" y="1286990"/>
-            <a:ext cx="1492551" cy="0"/>
-          </a:xfrm>
-          <a:prstGeom prst="straightConnector1">
+            <a:off x="700112" y="2067816"/>
+            <a:ext cx="205557" cy="0"/>
+          </a:xfrm>
+          <a:prstGeom prst="line">
             <a:avLst/>
           </a:prstGeom>
           <a:ln>
-            <a:tailEnd type="triangle"/>
+            <a:solidFill>
+              <a:schemeClr val="accent2">
+                <a:lumMod val="75000"/>
+              </a:schemeClr>
+            </a:solidFill>
+            <a:prstDash val="sysDash"/>
+          </a:ln>
+        </p:spPr>
+        <p:style>
+          <a:lnRef idx="2">
+            <a:schemeClr val="accent1"/>
+          </a:lnRef>
+          <a:fillRef idx="0">
+            <a:schemeClr val="accent1"/>
+          </a:fillRef>
+          <a:effectRef idx="1">
+            <a:schemeClr val="accent1"/>
+          </a:effectRef>
+          <a:fontRef idx="minor">
+            <a:schemeClr val="tx1"/>
+          </a:fontRef>
+        </p:style>
+      </p:cxnSp>
+      <p:cxnSp>
+        <p:nvCxnSpPr>
+          <p:cNvPr id="147" name="Straight Connector 146">
+            <a:extLst>
+              <a:ext uri="{FF2B5EF4-FFF2-40B4-BE49-F238E27FC236}">
+                <a16:creationId xmlns:a16="http://schemas.microsoft.com/office/drawing/2014/main" id="{989416B9-9D7D-5A6E-F05A-C2A8F3844ED7}"/>
+              </a:ext>
+            </a:extLst>
+          </p:cNvPr>
+          <p:cNvCxnSpPr>
+            <a:cxnSpLocks/>
+          </p:cNvCxnSpPr>
+          <p:nvPr/>
+        </p:nvCxnSpPr>
+        <p:spPr>
+          <a:xfrm>
+            <a:off x="698359" y="1250718"/>
+            <a:ext cx="0" cy="2940075"/>
+          </a:xfrm>
+          <a:prstGeom prst="line">
+            <a:avLst/>
+          </a:prstGeom>
+          <a:ln>
+            <a:solidFill>
+              <a:schemeClr val="accent2">
+                <a:lumMod val="75000"/>
+              </a:schemeClr>
+            </a:solidFill>
+            <a:prstDash val="sysDash"/>
           </a:ln>
         </p:spPr>
         <p:style>
@@ -14125,86 +14375,104 @@
       </p:cxnSp>
       <p:pic>
         <p:nvPicPr>
-          <p:cNvPr id="18" name="Picture 17">
-            <a:extLst>
-              <a:ext uri="{FF2B5EF4-FFF2-40B4-BE49-F238E27FC236}">
-                <a16:creationId xmlns:a16="http://schemas.microsoft.com/office/drawing/2014/main" id="{C3A99BF0-6FD2-6AEC-4895-DCAAEFA7DA0E}"/>
+          <p:cNvPr id="1026" name="Picture 2" descr="Weather - Free weather icons">
+            <a:extLst>
+              <a:ext uri="{FF2B5EF4-FFF2-40B4-BE49-F238E27FC236}">
+                <a16:creationId xmlns:a16="http://schemas.microsoft.com/office/drawing/2014/main" id="{04961E01-B314-7389-B08D-D042B35D634F}"/>
               </a:ext>
             </a:extLst>
           </p:cNvPr>
           <p:cNvPicPr>
-            <a:picLocks noChangeAspect="1"/>
+            <a:picLocks noChangeAspect="1" noChangeArrowheads="1"/>
           </p:cNvPicPr>
           <p:nvPr/>
         </p:nvPicPr>
         <p:blipFill>
-          <a:blip r:embed="rId15"/>
+          <a:blip r:embed="rId16">
+            <a:extLst>
+              <a:ext uri="{28A0092B-C50C-407E-A947-70E740481C1C}">
+                <a14:useLocalDpi xmlns:a14="http://schemas.microsoft.com/office/drawing/2010/main" val="0"/>
+              </a:ext>
+            </a:extLst>
+          </a:blip>
+          <a:srcRect/>
           <a:stretch>
             <a:fillRect/>
           </a:stretch>
         </p:blipFill>
-        <p:spPr>
-          <a:xfrm>
-            <a:off x="1094481" y="926205"/>
-            <a:ext cx="747676" cy="729440"/>
-          </a:xfrm>
-          <a:prstGeom prst="rect">
-            <a:avLst/>
-          </a:prstGeom>
-          <a:ln w="6350">
+        <p:spPr bwMode="auto">
+          <a:xfrm>
+            <a:off x="709144" y="4207730"/>
+            <a:ext cx="637398" cy="637398"/>
+          </a:xfrm>
+          <a:prstGeom prst="rect">
+            <a:avLst/>
+          </a:prstGeom>
+          <a:noFill/>
+          <a:ln w="19050">
             <a:solidFill>
-              <a:schemeClr val="tx1"/>
+              <a:schemeClr val="accent2">
+                <a:lumMod val="75000"/>
+              </a:schemeClr>
             </a:solidFill>
+            <a:prstDash val="sysDash"/>
           </a:ln>
+          <a:extLst>
+            <a:ext uri="{909E8E84-426E-40DD-AFC4-6F175D3DCCD1}">
+              <a14:hiddenFill xmlns:a14="http://schemas.microsoft.com/office/drawing/2010/main">
+                <a:solidFill>
+                  <a:srgbClr val="FFFFFF"/>
+                </a:solidFill>
+              </a14:hiddenFill>
+            </a:ext>
+          </a:extLst>
         </p:spPr>
       </p:pic>
       <p:sp>
         <p:nvSpPr>
-          <p:cNvPr id="60" name="Oval 59">
-            <a:extLst>
-              <a:ext uri="{FF2B5EF4-FFF2-40B4-BE49-F238E27FC236}">
-                <a16:creationId xmlns:a16="http://schemas.microsoft.com/office/drawing/2014/main" id="{0BAAAA52-C369-61AE-923F-DA30BEAB3E86}"/>
-              </a:ext>
-            </a:extLst>
-          </p:cNvPr>
-          <p:cNvSpPr/>
+          <p:cNvPr id="164" name="TextBox 163">
+            <a:extLst>
+              <a:ext uri="{FF2B5EF4-FFF2-40B4-BE49-F238E27FC236}">
+                <a16:creationId xmlns:a16="http://schemas.microsoft.com/office/drawing/2014/main" id="{A3BD4214-973D-764D-6D1B-05E367A381CD}"/>
+              </a:ext>
+            </a:extLst>
+          </p:cNvPr>
+          <p:cNvSpPr txBox="1"/>
           <p:nvPr/>
         </p:nvSpPr>
         <p:spPr>
           <a:xfrm>
-            <a:off x="1767422" y="1565026"/>
-            <a:ext cx="136177" cy="157109"/>
-          </a:xfrm>
-          <a:prstGeom prst="ellipse">
-            <a:avLst/>
-          </a:prstGeom>
-        </p:spPr>
-        <p:style>
-          <a:lnRef idx="2">
-            <a:schemeClr val="accent1">
-              <a:shade val="15000"/>
-            </a:schemeClr>
-          </a:lnRef>
-          <a:fillRef idx="1">
-            <a:schemeClr val="accent1"/>
-          </a:fillRef>
-          <a:effectRef idx="0">
-            <a:schemeClr val="accent1"/>
-          </a:effectRef>
-          <a:fontRef idx="minor">
-            <a:schemeClr val="lt1"/>
-          </a:fontRef>
-        </p:style>
+            <a:off x="600138" y="4898793"/>
+            <a:ext cx="1159007" cy="600164"/>
+          </a:xfrm>
+          <a:prstGeom prst="rect">
+            <a:avLst/>
+          </a:prstGeom>
+          <a:noFill/>
+        </p:spPr>
         <p:txBody>
-          <a:bodyPr rtlCol="0" anchor="ctr"/>
+          <a:bodyPr wrap="square" rtlCol="0">
+            <a:spAutoFit/>
+          </a:bodyPr>
           <a:lstStyle/>
           <a:p>
-            <a:pPr algn="ctr"/>
             <a:r>
-              <a:rPr lang="en-US" sz="900" dirty="0"/>
-              <a:t>R</a:t>
+              <a:rPr lang="en-US" sz="1100" b="1" dirty="0">
+                <a:solidFill>
+                  <a:schemeClr val="accent2">
+                    <a:lumMod val="75000"/>
+                  </a:schemeClr>
+                </a:solidFill>
+              </a:rPr>
+              <a:t>Online real time city weather data </a:t>
             </a:r>
-            <a:endParaRPr lang="en-SG" sz="900" dirty="0"/>
+            <a:endParaRPr lang="en-SG" sz="1100" b="1" dirty="0">
+              <a:solidFill>
+                <a:schemeClr val="accent2">
+                  <a:lumMod val="75000"/>
+                </a:schemeClr>
+              </a:solidFill>
+            </a:endParaRPr>
           </a:p>
         </p:txBody>
       </p:sp>
@@ -14252,8 +14520,8 @@
         </p:nvSpPr>
         <p:spPr>
           <a:xfrm>
-            <a:off x="638175" y="577378"/>
-            <a:ext cx="9763125" cy="5446843"/>
+            <a:off x="708917" y="577378"/>
+            <a:ext cx="9692383" cy="5446843"/>
           </a:xfrm>
           <a:prstGeom prst="rect">
             <a:avLst/>
@@ -19234,7 +19502,7 @@
         </p:nvSpPr>
         <p:spPr>
           <a:xfrm>
-            <a:off x="848795" y="680686"/>
+            <a:off x="848795" y="630752"/>
             <a:ext cx="5662481" cy="646331"/>
           </a:xfrm>
           <a:prstGeom prst="rect">
@@ -19368,7 +19636,7 @@
                 <a:ea typeface="+mn-ea"/>
                 <a:cs typeface="+mn-cs"/>
               </a:rPr>
-              <a:t>Mini OT</a:t>
+              <a:t>Mini </a:t>
             </a:r>
             <a:r>
               <a:rPr lang="en-US" b="1" dirty="0">
@@ -19377,7 +19645,7 @@
                 </a:solidFill>
                 <a:latin typeface="Calibri" panose="020F0502020204030204"/>
               </a:rPr>
-              <a:t>-</a:t>
+              <a:t>Energy</a:t>
             </a:r>
             <a:r>
               <a:rPr kumimoji="0" lang="en-US" sz="1800" b="1" i="0" u="none" strike="noStrike" kern="1200" cap="none" spc="0" normalizeH="0" baseline="0" noProof="0" dirty="0">
@@ -19394,48 +19662,11 @@
                 <a:ea typeface="+mn-ea"/>
                 <a:cs typeface="+mn-cs"/>
               </a:rPr>
-              <a:t>Power-System Cyber Security Test Platform</a:t>
+              <a:t>-OT-System Cyber Security Test Platform</a:t>
             </a:r>
           </a:p>
         </p:txBody>
       </p:sp>
-      <p:pic>
-        <p:nvPicPr>
-          <p:cNvPr id="183" name="Picture 182">
-            <a:extLst>
-              <a:ext uri="{FF2B5EF4-FFF2-40B4-BE49-F238E27FC236}">
-                <a16:creationId xmlns:a16="http://schemas.microsoft.com/office/drawing/2014/main" id="{2DA3CF4F-7358-09CD-0F95-450B9CDC114B}"/>
-              </a:ext>
-            </a:extLst>
-          </p:cNvPr>
-          <p:cNvPicPr>
-            <a:picLocks noChangeAspect="1"/>
-          </p:cNvPicPr>
-          <p:nvPr/>
-        </p:nvPicPr>
-        <p:blipFill>
-          <a:blip r:embed="rId13"/>
-          <a:stretch>
-            <a:fillRect/>
-          </a:stretch>
-        </p:blipFill>
-        <p:spPr>
-          <a:xfrm>
-            <a:off x="7045697" y="4088415"/>
-            <a:ext cx="3176705" cy="1802780"/>
-          </a:xfrm>
-          <a:prstGeom prst="rect">
-            <a:avLst/>
-          </a:prstGeom>
-          <a:ln>
-            <a:solidFill>
-              <a:schemeClr val="accent6">
-                <a:lumMod val="75000"/>
-              </a:schemeClr>
-            </a:solidFill>
-          </a:ln>
-        </p:spPr>
-      </p:pic>
       <p:sp>
         <p:nvSpPr>
           <p:cNvPr id="184" name="TextBox 183">
@@ -19737,7 +19968,7 @@
           <p:nvPr/>
         </p:nvPicPr>
         <p:blipFill>
-          <a:blip r:embed="rId14"/>
+          <a:blip r:embed="rId13"/>
           <a:stretch>
             <a:fillRect/>
           </a:stretch>
@@ -19745,7 +19976,7 @@
         <p:spPr>
           <a:xfrm>
             <a:off x="7040255" y="864601"/>
-            <a:ext cx="3197017" cy="1830292"/>
+            <a:ext cx="3266583" cy="1870118"/>
           </a:xfrm>
           <a:prstGeom prst="rect">
             <a:avLst/>
@@ -20277,6 +20508,36 @@
           </a:p>
         </p:txBody>
       </p:sp>
+      <p:pic>
+        <p:nvPicPr>
+          <p:cNvPr id="26" name="Picture 25">
+            <a:extLst>
+              <a:ext uri="{FF2B5EF4-FFF2-40B4-BE49-F238E27FC236}">
+                <a16:creationId xmlns:a16="http://schemas.microsoft.com/office/drawing/2014/main" id="{FD53ABCC-2C3D-5DAF-D4E4-D50A5E5661E0}"/>
+              </a:ext>
+            </a:extLst>
+          </p:cNvPr>
+          <p:cNvPicPr>
+            <a:picLocks noChangeAspect="1"/>
+          </p:cNvPicPr>
+          <p:nvPr/>
+        </p:nvPicPr>
+        <p:blipFill>
+          <a:blip r:embed="rId14"/>
+          <a:stretch>
+            <a:fillRect/>
+          </a:stretch>
+        </p:blipFill>
+        <p:spPr>
+          <a:xfrm>
+            <a:off x="7087680" y="4080461"/>
+            <a:ext cx="3266583" cy="1852619"/>
+          </a:xfrm>
+          <a:prstGeom prst="rect">
+            <a:avLst/>
+          </a:prstGeom>
+        </p:spPr>
+      </p:pic>
     </p:spTree>
     <p:extLst>
       <p:ext uri="{BB962C8B-B14F-4D97-AF65-F5344CB8AC3E}">

</xml_diff>

<commit_message>
update the network design session.
</commit_message>
<xml_diff>
--- a/designDoc/designDoc.pptx
+++ b/designDoc/designDoc.pptx
@@ -5,7 +5,7 @@
     <p:sldMasterId id="2147483648" r:id="rId1"/>
   </p:sldMasterIdLst>
   <p:notesMasterIdLst>
-    <p:notesMasterId r:id="rId8"/>
+    <p:notesMasterId r:id="rId9"/>
   </p:notesMasterIdLst>
   <p:sldIdLst>
     <p:sldId id="256" r:id="rId2"/>
@@ -13,7 +13,8 @@
     <p:sldId id="259" r:id="rId4"/>
     <p:sldId id="258" r:id="rId5"/>
     <p:sldId id="260" r:id="rId6"/>
-    <p:sldId id="261" r:id="rId7"/>
+    <p:sldId id="262" r:id="rId7"/>
+    <p:sldId id="261" r:id="rId8"/>
   </p:sldIdLst>
   <p:sldSz cx="12192000" cy="6858000"/>
   <p:notesSz cx="6858000" cy="9144000"/>
@@ -202,7 +203,7 @@
           <a:p>
             <a:fld id="{60A58DA9-13FF-4A44-80CD-EC4A25FA80B4}" type="datetimeFigureOut">
               <a:rPr lang="en-SG" smtClean="0"/>
-              <a:t>11/10/2024</a:t>
+              <a:t>12/10/2024</a:t>
             </a:fld>
             <a:endParaRPr lang="en-SG"/>
           </a:p>
@@ -787,7 +788,7 @@
           <a:p>
             <a:fld id="{DAB0784D-3A10-485A-BA3A-AF2134252110}" type="datetimeFigureOut">
               <a:rPr lang="en-SG" smtClean="0"/>
-              <a:t>11/10/2024</a:t>
+              <a:t>12/10/2024</a:t>
             </a:fld>
             <a:endParaRPr lang="en-SG"/>
           </a:p>
@@ -987,7 +988,7 @@
           <a:p>
             <a:fld id="{DAB0784D-3A10-485A-BA3A-AF2134252110}" type="datetimeFigureOut">
               <a:rPr lang="en-SG" smtClean="0"/>
-              <a:t>11/10/2024</a:t>
+              <a:t>12/10/2024</a:t>
             </a:fld>
             <a:endParaRPr lang="en-SG"/>
           </a:p>
@@ -1197,7 +1198,7 @@
           <a:p>
             <a:fld id="{DAB0784D-3A10-485A-BA3A-AF2134252110}" type="datetimeFigureOut">
               <a:rPr lang="en-SG" smtClean="0"/>
-              <a:t>11/10/2024</a:t>
+              <a:t>12/10/2024</a:t>
             </a:fld>
             <a:endParaRPr lang="en-SG"/>
           </a:p>
@@ -1397,7 +1398,7 @@
           <a:p>
             <a:fld id="{DAB0784D-3A10-485A-BA3A-AF2134252110}" type="datetimeFigureOut">
               <a:rPr lang="en-SG" smtClean="0"/>
-              <a:t>11/10/2024</a:t>
+              <a:t>12/10/2024</a:t>
             </a:fld>
             <a:endParaRPr lang="en-SG"/>
           </a:p>
@@ -1673,7 +1674,7 @@
           <a:p>
             <a:fld id="{DAB0784D-3A10-485A-BA3A-AF2134252110}" type="datetimeFigureOut">
               <a:rPr lang="en-SG" smtClean="0"/>
-              <a:t>11/10/2024</a:t>
+              <a:t>12/10/2024</a:t>
             </a:fld>
             <a:endParaRPr lang="en-SG"/>
           </a:p>
@@ -1941,7 +1942,7 @@
           <a:p>
             <a:fld id="{DAB0784D-3A10-485A-BA3A-AF2134252110}" type="datetimeFigureOut">
               <a:rPr lang="en-SG" smtClean="0"/>
-              <a:t>11/10/2024</a:t>
+              <a:t>12/10/2024</a:t>
             </a:fld>
             <a:endParaRPr lang="en-SG"/>
           </a:p>
@@ -2356,7 +2357,7 @@
           <a:p>
             <a:fld id="{DAB0784D-3A10-485A-BA3A-AF2134252110}" type="datetimeFigureOut">
               <a:rPr lang="en-SG" smtClean="0"/>
-              <a:t>11/10/2024</a:t>
+              <a:t>12/10/2024</a:t>
             </a:fld>
             <a:endParaRPr lang="en-SG"/>
           </a:p>
@@ -2498,7 +2499,7 @@
           <a:p>
             <a:fld id="{DAB0784D-3A10-485A-BA3A-AF2134252110}" type="datetimeFigureOut">
               <a:rPr lang="en-SG" smtClean="0"/>
-              <a:t>11/10/2024</a:t>
+              <a:t>12/10/2024</a:t>
             </a:fld>
             <a:endParaRPr lang="en-SG"/>
           </a:p>
@@ -2611,7 +2612,7 @@
           <a:p>
             <a:fld id="{DAB0784D-3A10-485A-BA3A-AF2134252110}" type="datetimeFigureOut">
               <a:rPr lang="en-SG" smtClean="0"/>
-              <a:t>11/10/2024</a:t>
+              <a:t>12/10/2024</a:t>
             </a:fld>
             <a:endParaRPr lang="en-SG"/>
           </a:p>
@@ -2924,7 +2925,7 @@
           <a:p>
             <a:fld id="{DAB0784D-3A10-485A-BA3A-AF2134252110}" type="datetimeFigureOut">
               <a:rPr lang="en-SG" smtClean="0"/>
-              <a:t>11/10/2024</a:t>
+              <a:t>12/10/2024</a:t>
             </a:fld>
             <a:endParaRPr lang="en-SG"/>
           </a:p>
@@ -3213,7 +3214,7 @@
           <a:p>
             <a:fld id="{DAB0784D-3A10-485A-BA3A-AF2134252110}" type="datetimeFigureOut">
               <a:rPr lang="en-SG" smtClean="0"/>
-              <a:t>11/10/2024</a:t>
+              <a:t>12/10/2024</a:t>
             </a:fld>
             <a:endParaRPr lang="en-SG"/>
           </a:p>
@@ -3456,7 +3457,7 @@
           <a:p>
             <a:fld id="{DAB0784D-3A10-485A-BA3A-AF2134252110}" type="datetimeFigureOut">
               <a:rPr lang="en-SG" smtClean="0"/>
-              <a:t>11/10/2024</a:t>
+              <a:t>12/10/2024</a:t>
             </a:fld>
             <a:endParaRPr lang="en-SG"/>
           </a:p>
@@ -23664,6 +23665,3021 @@
 </file>
 
 <file path=ppt/slides/slide6.xml><?xml version="1.0" encoding="utf-8"?>
+<p:sld xmlns:a="http://schemas.openxmlformats.org/drawingml/2006/main" xmlns:r="http://schemas.openxmlformats.org/officeDocument/2006/relationships" xmlns:p="http://schemas.openxmlformats.org/presentationml/2006/main">
+  <p:cSld>
+    <p:spTree>
+      <p:nvGrpSpPr>
+        <p:cNvPr id="1" name=""/>
+        <p:cNvGrpSpPr/>
+        <p:nvPr/>
+      </p:nvGrpSpPr>
+      <p:grpSpPr>
+        <a:xfrm>
+          <a:off x="0" y="0"/>
+          <a:ext cx="0" cy="0"/>
+          <a:chOff x="0" y="0"/>
+          <a:chExt cx="0" cy="0"/>
+        </a:xfrm>
+      </p:grpSpPr>
+      <p:sp>
+        <p:nvSpPr>
+          <p:cNvPr id="4" name="Rectangle 3">
+            <a:extLst>
+              <a:ext uri="{FF2B5EF4-FFF2-40B4-BE49-F238E27FC236}">
+                <a16:creationId xmlns:a16="http://schemas.microsoft.com/office/drawing/2014/main" id="{76B139DB-34C9-0B15-E998-E10475EADEC3}"/>
+              </a:ext>
+            </a:extLst>
+          </p:cNvPr>
+          <p:cNvSpPr/>
+          <p:nvPr/>
+        </p:nvSpPr>
+        <p:spPr>
+          <a:xfrm>
+            <a:off x="6836647" y="1867965"/>
+            <a:ext cx="3152368" cy="4200115"/>
+          </a:xfrm>
+          <a:prstGeom prst="rect">
+            <a:avLst/>
+          </a:prstGeom>
+          <a:solidFill>
+            <a:schemeClr val="accent6">
+              <a:lumMod val="20000"/>
+              <a:lumOff val="80000"/>
+            </a:schemeClr>
+          </a:solidFill>
+        </p:spPr>
+        <p:style>
+          <a:lnRef idx="2">
+            <a:schemeClr val="accent1">
+              <a:shade val="15000"/>
+            </a:schemeClr>
+          </a:lnRef>
+          <a:fillRef idx="1">
+            <a:schemeClr val="accent1"/>
+          </a:fillRef>
+          <a:effectRef idx="0">
+            <a:schemeClr val="accent1"/>
+          </a:effectRef>
+          <a:fontRef idx="minor">
+            <a:schemeClr val="lt1"/>
+          </a:fontRef>
+        </p:style>
+        <p:txBody>
+          <a:bodyPr rtlCol="0" anchor="ctr"/>
+          <a:lstStyle/>
+          <a:p>
+            <a:pPr algn="ctr"/>
+            <a:endParaRPr lang="en-SG" dirty="0"/>
+          </a:p>
+        </p:txBody>
+      </p:sp>
+      <p:sp>
+        <p:nvSpPr>
+          <p:cNvPr id="5" name="Rectangle 4">
+            <a:extLst>
+              <a:ext uri="{FF2B5EF4-FFF2-40B4-BE49-F238E27FC236}">
+                <a16:creationId xmlns:a16="http://schemas.microsoft.com/office/drawing/2014/main" id="{8CE8B016-8AFE-140A-D5AA-178EDC42CE7C}"/>
+              </a:ext>
+            </a:extLst>
+          </p:cNvPr>
+          <p:cNvSpPr/>
+          <p:nvPr/>
+        </p:nvSpPr>
+        <p:spPr>
+          <a:xfrm>
+            <a:off x="1056854" y="1819904"/>
+            <a:ext cx="2558905" cy="4248176"/>
+          </a:xfrm>
+          <a:prstGeom prst="rect">
+            <a:avLst/>
+          </a:prstGeom>
+          <a:solidFill>
+            <a:srgbClr val="7030A0"/>
+          </a:solidFill>
+        </p:spPr>
+        <p:style>
+          <a:lnRef idx="2">
+            <a:schemeClr val="accent1">
+              <a:shade val="15000"/>
+            </a:schemeClr>
+          </a:lnRef>
+          <a:fillRef idx="1">
+            <a:schemeClr val="accent1"/>
+          </a:fillRef>
+          <a:effectRef idx="0">
+            <a:schemeClr val="accent1"/>
+          </a:effectRef>
+          <a:fontRef idx="minor">
+            <a:schemeClr val="lt1"/>
+          </a:fontRef>
+        </p:style>
+        <p:txBody>
+          <a:bodyPr rtlCol="0" anchor="ctr"/>
+          <a:lstStyle/>
+          <a:p>
+            <a:pPr algn="ctr"/>
+            <a:endParaRPr lang="en-SG" dirty="0"/>
+          </a:p>
+        </p:txBody>
+      </p:sp>
+      <p:sp>
+        <p:nvSpPr>
+          <p:cNvPr id="6" name="Rectangle 5">
+            <a:extLst>
+              <a:ext uri="{FF2B5EF4-FFF2-40B4-BE49-F238E27FC236}">
+                <a16:creationId xmlns:a16="http://schemas.microsoft.com/office/drawing/2014/main" id="{CA705076-572E-04A1-865D-43C19057FAFF}"/>
+              </a:ext>
+            </a:extLst>
+          </p:cNvPr>
+          <p:cNvSpPr/>
+          <p:nvPr/>
+        </p:nvSpPr>
+        <p:spPr>
+          <a:xfrm>
+            <a:off x="4116865" y="1819903"/>
+            <a:ext cx="2322198" cy="4255329"/>
+          </a:xfrm>
+          <a:prstGeom prst="rect">
+            <a:avLst/>
+          </a:prstGeom>
+          <a:solidFill>
+            <a:schemeClr val="accent1">
+              <a:lumMod val="75000"/>
+            </a:schemeClr>
+          </a:solidFill>
+        </p:spPr>
+        <p:style>
+          <a:lnRef idx="2">
+            <a:schemeClr val="accent1">
+              <a:shade val="15000"/>
+            </a:schemeClr>
+          </a:lnRef>
+          <a:fillRef idx="1">
+            <a:schemeClr val="accent1"/>
+          </a:fillRef>
+          <a:effectRef idx="0">
+            <a:schemeClr val="accent1"/>
+          </a:effectRef>
+          <a:fontRef idx="minor">
+            <a:schemeClr val="lt1"/>
+          </a:fontRef>
+        </p:style>
+        <p:txBody>
+          <a:bodyPr rtlCol="0" anchor="ctr"/>
+          <a:lstStyle/>
+          <a:p>
+            <a:pPr algn="ctr"/>
+            <a:endParaRPr lang="en-SG" dirty="0"/>
+          </a:p>
+        </p:txBody>
+      </p:sp>
+      <p:sp>
+        <p:nvSpPr>
+          <p:cNvPr id="7" name="TextBox 6">
+            <a:extLst>
+              <a:ext uri="{FF2B5EF4-FFF2-40B4-BE49-F238E27FC236}">
+                <a16:creationId xmlns:a16="http://schemas.microsoft.com/office/drawing/2014/main" id="{829AC490-BC0C-93A7-63AE-E1A13196A501}"/>
+              </a:ext>
+            </a:extLst>
+          </p:cNvPr>
+          <p:cNvSpPr txBox="1"/>
+          <p:nvPr/>
+        </p:nvSpPr>
+        <p:spPr>
+          <a:xfrm>
+            <a:off x="1148190" y="1880119"/>
+            <a:ext cx="2255147" cy="276999"/>
+          </a:xfrm>
+          <a:prstGeom prst="rect">
+            <a:avLst/>
+          </a:prstGeom>
+          <a:solidFill>
+            <a:schemeClr val="bg1"/>
+          </a:solidFill>
+        </p:spPr>
+        <p:txBody>
+          <a:bodyPr wrap="square" rtlCol="0">
+            <a:spAutoFit/>
+          </a:bodyPr>
+          <a:lstStyle/>
+          <a:p>
+            <a:r>
+              <a:rPr lang="en-SG" sz="1200" b="1" dirty="0"/>
+              <a:t>Supervision network  SCADA</a:t>
+            </a:r>
+          </a:p>
+        </p:txBody>
+      </p:sp>
+      <p:sp>
+        <p:nvSpPr>
+          <p:cNvPr id="8" name="TextBox 7">
+            <a:extLst>
+              <a:ext uri="{FF2B5EF4-FFF2-40B4-BE49-F238E27FC236}">
+                <a16:creationId xmlns:a16="http://schemas.microsoft.com/office/drawing/2014/main" id="{6A7778A5-BBAE-B0B4-F788-B3A7BAB00018}"/>
+              </a:ext>
+            </a:extLst>
+          </p:cNvPr>
+          <p:cNvSpPr txBox="1"/>
+          <p:nvPr/>
+        </p:nvSpPr>
+        <p:spPr>
+          <a:xfrm>
+            <a:off x="4208949" y="1898517"/>
+            <a:ext cx="2082919" cy="307777"/>
+          </a:xfrm>
+          <a:prstGeom prst="rect">
+            <a:avLst/>
+          </a:prstGeom>
+          <a:solidFill>
+            <a:schemeClr val="bg1"/>
+          </a:solidFill>
+        </p:spPr>
+        <p:txBody>
+          <a:bodyPr wrap="square" rtlCol="0">
+            <a:spAutoFit/>
+          </a:bodyPr>
+          <a:lstStyle/>
+          <a:p>
+            <a:pPr algn="ctr"/>
+            <a:r>
+              <a:rPr lang="en-SG" sz="1400" b="1" dirty="0"/>
+              <a:t>Production network</a:t>
+            </a:r>
+          </a:p>
+        </p:txBody>
+      </p:sp>
+      <p:sp>
+        <p:nvSpPr>
+          <p:cNvPr id="10" name="TextBox 9">
+            <a:extLst>
+              <a:ext uri="{FF2B5EF4-FFF2-40B4-BE49-F238E27FC236}">
+                <a16:creationId xmlns:a16="http://schemas.microsoft.com/office/drawing/2014/main" id="{A550D1DC-BD8A-3C08-98FD-62A7F2CC42C7}"/>
+              </a:ext>
+            </a:extLst>
+          </p:cNvPr>
+          <p:cNvSpPr txBox="1"/>
+          <p:nvPr/>
+        </p:nvSpPr>
+        <p:spPr>
+          <a:xfrm>
+            <a:off x="6768306" y="1362694"/>
+            <a:ext cx="3277976" cy="523220"/>
+          </a:xfrm>
+          <a:prstGeom prst="rect">
+            <a:avLst/>
+          </a:prstGeom>
+          <a:noFill/>
+        </p:spPr>
+        <p:txBody>
+          <a:bodyPr wrap="square" rtlCol="0">
+            <a:spAutoFit/>
+          </a:bodyPr>
+          <a:lstStyle/>
+          <a:p>
+            <a:r>
+              <a:rPr lang="en-SG" sz="1400" b="1" dirty="0"/>
+              <a:t>Power Grid Physical Real World Simulation Network</a:t>
+            </a:r>
+          </a:p>
+        </p:txBody>
+      </p:sp>
+      <p:sp>
+        <p:nvSpPr>
+          <p:cNvPr id="11" name="TextBox 10">
+            <a:extLst>
+              <a:ext uri="{FF2B5EF4-FFF2-40B4-BE49-F238E27FC236}">
+                <a16:creationId xmlns:a16="http://schemas.microsoft.com/office/drawing/2014/main" id="{378AF143-13EB-2817-168F-2FAD51F9AD58}"/>
+              </a:ext>
+            </a:extLst>
+          </p:cNvPr>
+          <p:cNvSpPr txBox="1"/>
+          <p:nvPr/>
+        </p:nvSpPr>
+        <p:spPr>
+          <a:xfrm>
+            <a:off x="6865098" y="1924833"/>
+            <a:ext cx="2505105" cy="307777"/>
+          </a:xfrm>
+          <a:prstGeom prst="rect">
+            <a:avLst/>
+          </a:prstGeom>
+          <a:noFill/>
+        </p:spPr>
+        <p:txBody>
+          <a:bodyPr wrap="square" rtlCol="0">
+            <a:spAutoFit/>
+          </a:bodyPr>
+          <a:lstStyle/>
+          <a:p>
+            <a:r>
+              <a:rPr lang="en-US" sz="1400" b="1" dirty="0"/>
+              <a:t>Physical world simulator</a:t>
+            </a:r>
+            <a:endParaRPr lang="en-SG" sz="1400" b="1" dirty="0"/>
+          </a:p>
+        </p:txBody>
+      </p:sp>
+      <p:sp>
+        <p:nvSpPr>
+          <p:cNvPr id="13" name="TextBox 12">
+            <a:extLst>
+              <a:ext uri="{FF2B5EF4-FFF2-40B4-BE49-F238E27FC236}">
+                <a16:creationId xmlns:a16="http://schemas.microsoft.com/office/drawing/2014/main" id="{3D94EEC9-ABC6-62B8-6386-4A5284A025F5}"/>
+              </a:ext>
+            </a:extLst>
+          </p:cNvPr>
+          <p:cNvSpPr txBox="1"/>
+          <p:nvPr/>
+        </p:nvSpPr>
+        <p:spPr>
+          <a:xfrm>
+            <a:off x="6981084" y="3938925"/>
+            <a:ext cx="1739781" cy="430887"/>
+          </a:xfrm>
+          <a:prstGeom prst="rect">
+            <a:avLst/>
+          </a:prstGeom>
+          <a:noFill/>
+        </p:spPr>
+        <p:txBody>
+          <a:bodyPr wrap="square" rtlCol="0">
+            <a:spAutoFit/>
+          </a:bodyPr>
+          <a:lstStyle/>
+          <a:p>
+            <a:r>
+              <a:rPr lang="en-US" sz="1100" b="1" dirty="0"/>
+              <a:t>Remote controllable circuits breakers</a:t>
+            </a:r>
+            <a:endParaRPr lang="en-SG" sz="1100" b="1" dirty="0"/>
+          </a:p>
+        </p:txBody>
+      </p:sp>
+      <p:sp>
+        <p:nvSpPr>
+          <p:cNvPr id="14" name="TextBox 13">
+            <a:extLst>
+              <a:ext uri="{FF2B5EF4-FFF2-40B4-BE49-F238E27FC236}">
+                <a16:creationId xmlns:a16="http://schemas.microsoft.com/office/drawing/2014/main" id="{37E08E55-09B3-D1A4-955B-C4106E2BD186}"/>
+              </a:ext>
+            </a:extLst>
+          </p:cNvPr>
+          <p:cNvSpPr txBox="1"/>
+          <p:nvPr/>
+        </p:nvSpPr>
+        <p:spPr>
+          <a:xfrm>
+            <a:off x="6931488" y="4858354"/>
+            <a:ext cx="1876546" cy="430887"/>
+          </a:xfrm>
+          <a:prstGeom prst="rect">
+            <a:avLst/>
+          </a:prstGeom>
+          <a:noFill/>
+        </p:spPr>
+        <p:txBody>
+          <a:bodyPr wrap="square" rtlCol="0">
+            <a:spAutoFit/>
+          </a:bodyPr>
+          <a:lstStyle/>
+          <a:p>
+            <a:r>
+              <a:rPr lang="en-US" sz="1100" b="1" dirty="0"/>
+              <a:t>Components with MU integrated </a:t>
+            </a:r>
+            <a:endParaRPr lang="en-SG" sz="1100" b="1" dirty="0"/>
+          </a:p>
+        </p:txBody>
+      </p:sp>
+      <p:pic>
+        <p:nvPicPr>
+          <p:cNvPr id="16" name="Picture 15" descr="A close up of a computer&#10;&#10;Description automatically generated">
+            <a:extLst>
+              <a:ext uri="{FF2B5EF4-FFF2-40B4-BE49-F238E27FC236}">
+                <a16:creationId xmlns:a16="http://schemas.microsoft.com/office/drawing/2014/main" id="{17A0F934-9952-376D-7AF5-4A712C8B3CAE}"/>
+              </a:ext>
+            </a:extLst>
+          </p:cNvPr>
+          <p:cNvPicPr>
+            <a:picLocks noChangeAspect="1"/>
+          </p:cNvPicPr>
+          <p:nvPr/>
+        </p:nvPicPr>
+        <p:blipFill>
+          <a:blip r:embed="rId2">
+            <a:extLst>
+              <a:ext uri="{28A0092B-C50C-407E-A947-70E740481C1C}">
+                <a14:useLocalDpi xmlns:a14="http://schemas.microsoft.com/office/drawing/2010/main" val="0"/>
+              </a:ext>
+            </a:extLst>
+          </a:blip>
+          <a:stretch>
+            <a:fillRect/>
+          </a:stretch>
+        </p:blipFill>
+        <p:spPr>
+          <a:xfrm>
+            <a:off x="4907595" y="4499019"/>
+            <a:ext cx="476190" cy="476190"/>
+          </a:xfrm>
+          <a:prstGeom prst="rect">
+            <a:avLst/>
+          </a:prstGeom>
+          <a:ln w="12700">
+            <a:solidFill>
+              <a:schemeClr val="tx1"/>
+            </a:solidFill>
+          </a:ln>
+        </p:spPr>
+      </p:pic>
+      <p:sp>
+        <p:nvSpPr>
+          <p:cNvPr id="17" name="TextBox 16">
+            <a:extLst>
+              <a:ext uri="{FF2B5EF4-FFF2-40B4-BE49-F238E27FC236}">
+                <a16:creationId xmlns:a16="http://schemas.microsoft.com/office/drawing/2014/main" id="{A5A3929D-C902-D981-6452-E66B61DC3F66}"/>
+              </a:ext>
+            </a:extLst>
+          </p:cNvPr>
+          <p:cNvSpPr txBox="1"/>
+          <p:nvPr/>
+        </p:nvSpPr>
+        <p:spPr>
+          <a:xfrm>
+            <a:off x="4615749" y="3214322"/>
+            <a:ext cx="1858745" cy="261610"/>
+          </a:xfrm>
+          <a:prstGeom prst="rect">
+            <a:avLst/>
+          </a:prstGeom>
+          <a:noFill/>
+        </p:spPr>
+        <p:txBody>
+          <a:bodyPr wrap="square" rtlCol="0">
+            <a:spAutoFit/>
+          </a:bodyPr>
+          <a:lstStyle/>
+          <a:p>
+            <a:r>
+              <a:rPr lang="en-SG" sz="1100" dirty="0">
+                <a:solidFill>
+                  <a:schemeClr val="bg1"/>
+                </a:solidFill>
+              </a:rPr>
+              <a:t>Circuit Control PLC set</a:t>
+            </a:r>
+          </a:p>
+        </p:txBody>
+      </p:sp>
+      <p:sp>
+        <p:nvSpPr>
+          <p:cNvPr id="19" name="TextBox 18">
+            <a:extLst>
+              <a:ext uri="{FF2B5EF4-FFF2-40B4-BE49-F238E27FC236}">
+                <a16:creationId xmlns:a16="http://schemas.microsoft.com/office/drawing/2014/main" id="{DB5700BC-AB94-91E6-92A4-4EBC8A07A845}"/>
+              </a:ext>
+            </a:extLst>
+          </p:cNvPr>
+          <p:cNvSpPr txBox="1"/>
+          <p:nvPr/>
+        </p:nvSpPr>
+        <p:spPr>
+          <a:xfrm>
+            <a:off x="4882612" y="3995387"/>
+            <a:ext cx="1210725" cy="430887"/>
+          </a:xfrm>
+          <a:prstGeom prst="rect">
+            <a:avLst/>
+          </a:prstGeom>
+          <a:noFill/>
+        </p:spPr>
+        <p:txBody>
+          <a:bodyPr wrap="square" rtlCol="0">
+            <a:spAutoFit/>
+          </a:bodyPr>
+          <a:lstStyle/>
+          <a:p>
+            <a:r>
+              <a:rPr lang="en-US" sz="1100" dirty="0">
+                <a:solidFill>
+                  <a:schemeClr val="bg1"/>
+                </a:solidFill>
+              </a:rPr>
+              <a:t>R</a:t>
+            </a:r>
+            <a:r>
+              <a:rPr lang="en-SG" sz="1100" dirty="0" err="1">
+                <a:solidFill>
+                  <a:schemeClr val="bg1"/>
+                </a:solidFill>
+              </a:rPr>
+              <a:t>eal</a:t>
+            </a:r>
+            <a:r>
+              <a:rPr lang="en-SG" sz="1100" dirty="0">
+                <a:solidFill>
+                  <a:schemeClr val="bg1"/>
+                </a:solidFill>
+              </a:rPr>
+              <a:t> time monitor PLC set</a:t>
+            </a:r>
+          </a:p>
+        </p:txBody>
+      </p:sp>
+      <p:cxnSp>
+        <p:nvCxnSpPr>
+          <p:cNvPr id="20" name="Straight Connector 19">
+            <a:extLst>
+              <a:ext uri="{FF2B5EF4-FFF2-40B4-BE49-F238E27FC236}">
+                <a16:creationId xmlns:a16="http://schemas.microsoft.com/office/drawing/2014/main" id="{E32B1653-99C9-65BD-02AD-D43F8A990E96}"/>
+              </a:ext>
+            </a:extLst>
+          </p:cNvPr>
+          <p:cNvCxnSpPr>
+            <a:cxnSpLocks/>
+          </p:cNvCxnSpPr>
+          <p:nvPr/>
+        </p:nvCxnSpPr>
+        <p:spPr>
+          <a:xfrm>
+            <a:off x="4418287" y="2794475"/>
+            <a:ext cx="0" cy="2755677"/>
+          </a:xfrm>
+          <a:prstGeom prst="line">
+            <a:avLst/>
+          </a:prstGeom>
+          <a:ln w="19050">
+            <a:solidFill>
+              <a:schemeClr val="bg1"/>
+            </a:solidFill>
+          </a:ln>
+        </p:spPr>
+        <p:style>
+          <a:lnRef idx="1">
+            <a:schemeClr val="dk1"/>
+          </a:lnRef>
+          <a:fillRef idx="0">
+            <a:schemeClr val="dk1"/>
+          </a:fillRef>
+          <a:effectRef idx="0">
+            <a:schemeClr val="dk1"/>
+          </a:effectRef>
+          <a:fontRef idx="minor">
+            <a:schemeClr val="tx1"/>
+          </a:fontRef>
+        </p:style>
+      </p:cxnSp>
+      <p:cxnSp>
+        <p:nvCxnSpPr>
+          <p:cNvPr id="22" name="Straight Connector 21">
+            <a:extLst>
+              <a:ext uri="{FF2B5EF4-FFF2-40B4-BE49-F238E27FC236}">
+                <a16:creationId xmlns:a16="http://schemas.microsoft.com/office/drawing/2014/main" id="{0E958FC1-5B35-52CD-BBCF-93870C61C10B}"/>
+              </a:ext>
+            </a:extLst>
+          </p:cNvPr>
+          <p:cNvCxnSpPr>
+            <a:cxnSpLocks/>
+          </p:cNvCxnSpPr>
+          <p:nvPr/>
+        </p:nvCxnSpPr>
+        <p:spPr>
+          <a:xfrm>
+            <a:off x="4428225" y="3681236"/>
+            <a:ext cx="375947" cy="0"/>
+          </a:xfrm>
+          <a:prstGeom prst="line">
+            <a:avLst/>
+          </a:prstGeom>
+          <a:ln w="19050">
+            <a:solidFill>
+              <a:schemeClr val="bg1"/>
+            </a:solidFill>
+          </a:ln>
+        </p:spPr>
+        <p:style>
+          <a:lnRef idx="1">
+            <a:schemeClr val="dk1"/>
+          </a:lnRef>
+          <a:fillRef idx="0">
+            <a:schemeClr val="dk1"/>
+          </a:fillRef>
+          <a:effectRef idx="0">
+            <a:schemeClr val="dk1"/>
+          </a:effectRef>
+          <a:fontRef idx="minor">
+            <a:schemeClr val="tx1"/>
+          </a:fontRef>
+        </p:style>
+      </p:cxnSp>
+      <p:pic>
+        <p:nvPicPr>
+          <p:cNvPr id="25" name="Picture 24">
+            <a:extLst>
+              <a:ext uri="{FF2B5EF4-FFF2-40B4-BE49-F238E27FC236}">
+                <a16:creationId xmlns:a16="http://schemas.microsoft.com/office/drawing/2014/main" id="{D0976D29-23E8-129E-BA0E-7CB86FC2761F}"/>
+              </a:ext>
+            </a:extLst>
+          </p:cNvPr>
+          <p:cNvPicPr>
+            <a:picLocks noChangeAspect="1"/>
+          </p:cNvPicPr>
+          <p:nvPr/>
+        </p:nvPicPr>
+        <p:blipFill>
+          <a:blip r:embed="rId3"/>
+          <a:stretch>
+            <a:fillRect/>
+          </a:stretch>
+        </p:blipFill>
+        <p:spPr>
+          <a:xfrm>
+            <a:off x="2742759" y="3753715"/>
+            <a:ext cx="533672" cy="665262"/>
+          </a:xfrm>
+          <a:prstGeom prst="rect">
+            <a:avLst/>
+          </a:prstGeom>
+          <a:ln w="12700">
+            <a:solidFill>
+              <a:schemeClr val="tx1"/>
+            </a:solidFill>
+          </a:ln>
+        </p:spPr>
+      </p:pic>
+      <p:cxnSp>
+        <p:nvCxnSpPr>
+          <p:cNvPr id="30" name="Straight Connector 29">
+            <a:extLst>
+              <a:ext uri="{FF2B5EF4-FFF2-40B4-BE49-F238E27FC236}">
+                <a16:creationId xmlns:a16="http://schemas.microsoft.com/office/drawing/2014/main" id="{75A252A9-BF05-2651-F125-09B075AA901D}"/>
+              </a:ext>
+            </a:extLst>
+          </p:cNvPr>
+          <p:cNvCxnSpPr>
+            <a:cxnSpLocks/>
+          </p:cNvCxnSpPr>
+          <p:nvPr/>
+        </p:nvCxnSpPr>
+        <p:spPr>
+          <a:xfrm>
+            <a:off x="3040726" y="3391465"/>
+            <a:ext cx="0" cy="356697"/>
+          </a:xfrm>
+          <a:prstGeom prst="line">
+            <a:avLst/>
+          </a:prstGeom>
+          <a:ln w="19050"/>
+        </p:spPr>
+        <p:style>
+          <a:lnRef idx="1">
+            <a:schemeClr val="dk1"/>
+          </a:lnRef>
+          <a:fillRef idx="0">
+            <a:schemeClr val="dk1"/>
+          </a:fillRef>
+          <a:effectRef idx="0">
+            <a:schemeClr val="dk1"/>
+          </a:effectRef>
+          <a:fontRef idx="minor">
+            <a:schemeClr val="tx1"/>
+          </a:fontRef>
+        </p:style>
+      </p:cxnSp>
+      <p:cxnSp>
+        <p:nvCxnSpPr>
+          <p:cNvPr id="33" name="Straight Connector 32">
+            <a:extLst>
+              <a:ext uri="{FF2B5EF4-FFF2-40B4-BE49-F238E27FC236}">
+                <a16:creationId xmlns:a16="http://schemas.microsoft.com/office/drawing/2014/main" id="{0E5A7719-E2E2-FCE9-1E68-FACBF797B27E}"/>
+              </a:ext>
+            </a:extLst>
+          </p:cNvPr>
+          <p:cNvCxnSpPr>
+            <a:cxnSpLocks/>
+            <a:stCxn id="25" idx="2"/>
+          </p:cNvCxnSpPr>
+          <p:nvPr/>
+        </p:nvCxnSpPr>
+        <p:spPr>
+          <a:xfrm>
+            <a:off x="3009595" y="4418977"/>
+            <a:ext cx="0" cy="179066"/>
+          </a:xfrm>
+          <a:prstGeom prst="line">
+            <a:avLst/>
+          </a:prstGeom>
+          <a:ln w="19050">
+            <a:solidFill>
+              <a:schemeClr val="tx2">
+                <a:lumMod val="10000"/>
+                <a:lumOff val="90000"/>
+              </a:schemeClr>
+            </a:solidFill>
+            <a:prstDash val="sysDash"/>
+          </a:ln>
+        </p:spPr>
+        <p:style>
+          <a:lnRef idx="1">
+            <a:schemeClr val="dk1"/>
+          </a:lnRef>
+          <a:fillRef idx="0">
+            <a:schemeClr val="dk1"/>
+          </a:fillRef>
+          <a:effectRef idx="0">
+            <a:schemeClr val="dk1"/>
+          </a:effectRef>
+          <a:fontRef idx="minor">
+            <a:schemeClr val="tx1"/>
+          </a:fontRef>
+        </p:style>
+      </p:cxnSp>
+      <p:sp>
+        <p:nvSpPr>
+          <p:cNvPr id="36" name="TextBox 35">
+            <a:extLst>
+              <a:ext uri="{FF2B5EF4-FFF2-40B4-BE49-F238E27FC236}">
+                <a16:creationId xmlns:a16="http://schemas.microsoft.com/office/drawing/2014/main" id="{9EEFFC3C-151F-EE91-5707-95E74A60A64C}"/>
+              </a:ext>
+            </a:extLst>
+          </p:cNvPr>
+          <p:cNvSpPr txBox="1"/>
+          <p:nvPr/>
+        </p:nvSpPr>
+        <p:spPr>
+          <a:xfrm>
+            <a:off x="1842069" y="3794521"/>
+            <a:ext cx="1183689" cy="600164"/>
+          </a:xfrm>
+          <a:prstGeom prst="rect">
+            <a:avLst/>
+          </a:prstGeom>
+          <a:noFill/>
+        </p:spPr>
+        <p:txBody>
+          <a:bodyPr wrap="square" rtlCol="0">
+            <a:spAutoFit/>
+          </a:bodyPr>
+          <a:lstStyle/>
+          <a:p>
+            <a:r>
+              <a:rPr lang="en-SG" sz="1100" dirty="0">
+                <a:solidFill>
+                  <a:schemeClr val="bg1"/>
+                </a:solidFill>
+              </a:rPr>
+              <a:t>Power Grid monitor &amp; control HMI</a:t>
+            </a:r>
+          </a:p>
+        </p:txBody>
+      </p:sp>
+      <p:pic>
+        <p:nvPicPr>
+          <p:cNvPr id="37" name="Picture 36">
+            <a:extLst>
+              <a:ext uri="{FF2B5EF4-FFF2-40B4-BE49-F238E27FC236}">
+                <a16:creationId xmlns:a16="http://schemas.microsoft.com/office/drawing/2014/main" id="{B149C8D1-5FF3-0FC9-76EA-5B913860185D}"/>
+              </a:ext>
+            </a:extLst>
+          </p:cNvPr>
+          <p:cNvPicPr>
+            <a:picLocks noChangeAspect="1"/>
+          </p:cNvPicPr>
+          <p:nvPr/>
+        </p:nvPicPr>
+        <p:blipFill>
+          <a:blip r:embed="rId4"/>
+          <a:stretch>
+            <a:fillRect/>
+          </a:stretch>
+        </p:blipFill>
+        <p:spPr>
+          <a:xfrm>
+            <a:off x="2034546" y="2361698"/>
+            <a:ext cx="635942" cy="533213"/>
+          </a:xfrm>
+          <a:prstGeom prst="rect">
+            <a:avLst/>
+          </a:prstGeom>
+          <a:ln w="9525">
+            <a:solidFill>
+              <a:schemeClr val="tx1"/>
+            </a:solidFill>
+          </a:ln>
+        </p:spPr>
+      </p:pic>
+      <p:sp>
+        <p:nvSpPr>
+          <p:cNvPr id="38" name="TextBox 37">
+            <a:extLst>
+              <a:ext uri="{FF2B5EF4-FFF2-40B4-BE49-F238E27FC236}">
+                <a16:creationId xmlns:a16="http://schemas.microsoft.com/office/drawing/2014/main" id="{ABB1B380-1824-70ED-85C3-462290CF732A}"/>
+              </a:ext>
+            </a:extLst>
+          </p:cNvPr>
+          <p:cNvSpPr txBox="1"/>
+          <p:nvPr/>
+        </p:nvSpPr>
+        <p:spPr>
+          <a:xfrm>
+            <a:off x="1107599" y="2295175"/>
+            <a:ext cx="1101709" cy="430887"/>
+          </a:xfrm>
+          <a:prstGeom prst="rect">
+            <a:avLst/>
+          </a:prstGeom>
+          <a:noFill/>
+        </p:spPr>
+        <p:txBody>
+          <a:bodyPr wrap="square" rtlCol="0">
+            <a:spAutoFit/>
+          </a:bodyPr>
+          <a:lstStyle/>
+          <a:p>
+            <a:r>
+              <a:rPr lang="en-SG" sz="1100" dirty="0">
+                <a:solidFill>
+                  <a:schemeClr val="bg1"/>
+                </a:solidFill>
+              </a:rPr>
+              <a:t>Maintenance laptops </a:t>
+            </a:r>
+          </a:p>
+        </p:txBody>
+      </p:sp>
+      <p:cxnSp>
+        <p:nvCxnSpPr>
+          <p:cNvPr id="39" name="Straight Connector 38">
+            <a:extLst>
+              <a:ext uri="{FF2B5EF4-FFF2-40B4-BE49-F238E27FC236}">
+                <a16:creationId xmlns:a16="http://schemas.microsoft.com/office/drawing/2014/main" id="{B189A855-1153-A93B-8D5E-87B9A3787EA4}"/>
+              </a:ext>
+            </a:extLst>
+          </p:cNvPr>
+          <p:cNvCxnSpPr>
+            <a:cxnSpLocks/>
+          </p:cNvCxnSpPr>
+          <p:nvPr/>
+        </p:nvCxnSpPr>
+        <p:spPr>
+          <a:xfrm>
+            <a:off x="2331879" y="2916524"/>
+            <a:ext cx="0" cy="462557"/>
+          </a:xfrm>
+          <a:prstGeom prst="line">
+            <a:avLst/>
+          </a:prstGeom>
+          <a:ln w="19050"/>
+        </p:spPr>
+        <p:style>
+          <a:lnRef idx="1">
+            <a:schemeClr val="dk1"/>
+          </a:lnRef>
+          <a:fillRef idx="0">
+            <a:schemeClr val="dk1"/>
+          </a:fillRef>
+          <a:effectRef idx="0">
+            <a:schemeClr val="dk1"/>
+          </a:effectRef>
+          <a:fontRef idx="minor">
+            <a:schemeClr val="tx1"/>
+          </a:fontRef>
+        </p:style>
+      </p:cxnSp>
+      <p:pic>
+        <p:nvPicPr>
+          <p:cNvPr id="40" name="Picture 4">
+            <a:extLst>
+              <a:ext uri="{FF2B5EF4-FFF2-40B4-BE49-F238E27FC236}">
+                <a16:creationId xmlns:a16="http://schemas.microsoft.com/office/drawing/2014/main" id="{08758400-F525-780B-D975-D037BF020272}"/>
+              </a:ext>
+            </a:extLst>
+          </p:cNvPr>
+          <p:cNvPicPr>
+            <a:picLocks noChangeAspect="1" noChangeArrowheads="1"/>
+          </p:cNvPicPr>
+          <p:nvPr/>
+        </p:nvPicPr>
+        <p:blipFill>
+          <a:blip r:embed="rId5">
+            <a:extLst>
+              <a:ext uri="{28A0092B-C50C-407E-A947-70E740481C1C}">
+                <a14:useLocalDpi xmlns:a14="http://schemas.microsoft.com/office/drawing/2010/main" val="0"/>
+              </a:ext>
+            </a:extLst>
+          </a:blip>
+          <a:srcRect/>
+          <a:stretch>
+            <a:fillRect/>
+          </a:stretch>
+        </p:blipFill>
+        <p:spPr bwMode="auto">
+          <a:xfrm>
+            <a:off x="1319151" y="3794521"/>
+            <a:ext cx="379932" cy="379932"/>
+          </a:xfrm>
+          <a:prstGeom prst="rect">
+            <a:avLst/>
+          </a:prstGeom>
+          <a:noFill/>
+          <a:extLst>
+            <a:ext uri="{909E8E84-426E-40DD-AFC4-6F175D3DCCD1}">
+              <a14:hiddenFill xmlns:a14="http://schemas.microsoft.com/office/drawing/2010/main">
+                <a:solidFill>
+                  <a:srgbClr val="FFFFFF"/>
+                </a:solidFill>
+              </a14:hiddenFill>
+            </a:ext>
+          </a:extLst>
+        </p:spPr>
+      </p:pic>
+      <p:sp>
+        <p:nvSpPr>
+          <p:cNvPr id="44" name="Right Brace 43">
+            <a:extLst>
+              <a:ext uri="{FF2B5EF4-FFF2-40B4-BE49-F238E27FC236}">
+                <a16:creationId xmlns:a16="http://schemas.microsoft.com/office/drawing/2014/main" id="{43C4A8B2-8966-63D5-79CE-059B6B82A305}"/>
+              </a:ext>
+            </a:extLst>
+          </p:cNvPr>
+          <p:cNvSpPr/>
+          <p:nvPr/>
+        </p:nvSpPr>
+        <p:spPr>
+          <a:xfrm rot="16200000">
+            <a:off x="3637837" y="-1138899"/>
+            <a:ext cx="313530" cy="5568509"/>
+          </a:xfrm>
+          <a:prstGeom prst="rightBrace">
+            <a:avLst>
+              <a:gd name="adj1" fmla="val 8333"/>
+              <a:gd name="adj2" fmla="val 51147"/>
+            </a:avLst>
+          </a:prstGeom>
+          <a:ln w="19050"/>
+        </p:spPr>
+        <p:style>
+          <a:lnRef idx="1">
+            <a:schemeClr val="accent1"/>
+          </a:lnRef>
+          <a:fillRef idx="0">
+            <a:schemeClr val="accent1"/>
+          </a:fillRef>
+          <a:effectRef idx="0">
+            <a:schemeClr val="accent1"/>
+          </a:effectRef>
+          <a:fontRef idx="minor">
+            <a:schemeClr val="tx1"/>
+          </a:fontRef>
+        </p:style>
+        <p:txBody>
+          <a:bodyPr rtlCol="0" anchor="ctr"/>
+          <a:lstStyle/>
+          <a:p>
+            <a:pPr algn="ctr"/>
+            <a:endParaRPr lang="en-SG" dirty="0"/>
+          </a:p>
+        </p:txBody>
+      </p:sp>
+      <p:sp>
+        <p:nvSpPr>
+          <p:cNvPr id="45" name="TextBox 44">
+            <a:extLst>
+              <a:ext uri="{FF2B5EF4-FFF2-40B4-BE49-F238E27FC236}">
+                <a16:creationId xmlns:a16="http://schemas.microsoft.com/office/drawing/2014/main" id="{080DD60D-B6E0-BA75-F578-3A9F17774DBD}"/>
+              </a:ext>
+            </a:extLst>
+          </p:cNvPr>
+          <p:cNvSpPr txBox="1"/>
+          <p:nvPr/>
+        </p:nvSpPr>
+        <p:spPr>
+          <a:xfrm>
+            <a:off x="3009595" y="1207101"/>
+            <a:ext cx="1602777" cy="307777"/>
+          </a:xfrm>
+          <a:prstGeom prst="rect">
+            <a:avLst/>
+          </a:prstGeom>
+          <a:noFill/>
+        </p:spPr>
+        <p:txBody>
+          <a:bodyPr wrap="square" rtlCol="0">
+            <a:spAutoFit/>
+          </a:bodyPr>
+          <a:lstStyle/>
+          <a:p>
+            <a:r>
+              <a:rPr lang="en-SG" sz="1400" b="1" dirty="0"/>
+              <a:t>ICS [OT network ]</a:t>
+            </a:r>
+          </a:p>
+        </p:txBody>
+      </p:sp>
+      <p:sp>
+        <p:nvSpPr>
+          <p:cNvPr id="46" name="TextBox 45">
+            <a:extLst>
+              <a:ext uri="{FF2B5EF4-FFF2-40B4-BE49-F238E27FC236}">
+                <a16:creationId xmlns:a16="http://schemas.microsoft.com/office/drawing/2014/main" id="{A6270ECF-993B-0E2A-EE78-CD3E66CAFE93}"/>
+              </a:ext>
+            </a:extLst>
+          </p:cNvPr>
+          <p:cNvSpPr txBox="1"/>
+          <p:nvPr/>
+        </p:nvSpPr>
+        <p:spPr>
+          <a:xfrm>
+            <a:off x="1010348" y="3562266"/>
+            <a:ext cx="1539924" cy="261610"/>
+          </a:xfrm>
+          <a:prstGeom prst="rect">
+            <a:avLst/>
+          </a:prstGeom>
+          <a:noFill/>
+        </p:spPr>
+        <p:txBody>
+          <a:bodyPr wrap="square" rtlCol="0">
+            <a:spAutoFit/>
+          </a:bodyPr>
+          <a:lstStyle/>
+          <a:p>
+            <a:r>
+              <a:rPr lang="en-SG" sz="1100" b="1" dirty="0">
+                <a:solidFill>
+                  <a:schemeClr val="bg1"/>
+                </a:solidFill>
+              </a:rPr>
+              <a:t>Power Grid operator </a:t>
+            </a:r>
+          </a:p>
+        </p:txBody>
+      </p:sp>
+      <p:pic>
+        <p:nvPicPr>
+          <p:cNvPr id="48" name="Picture 47">
+            <a:extLst>
+              <a:ext uri="{FF2B5EF4-FFF2-40B4-BE49-F238E27FC236}">
+                <a16:creationId xmlns:a16="http://schemas.microsoft.com/office/drawing/2014/main" id="{7859F148-2602-1C62-68FC-4636475EEEBF}"/>
+              </a:ext>
+            </a:extLst>
+          </p:cNvPr>
+          <p:cNvPicPr>
+            <a:picLocks noChangeAspect="1"/>
+          </p:cNvPicPr>
+          <p:nvPr/>
+        </p:nvPicPr>
+        <p:blipFill>
+          <a:blip r:embed="rId6"/>
+          <a:stretch>
+            <a:fillRect/>
+          </a:stretch>
+        </p:blipFill>
+        <p:spPr>
+          <a:xfrm>
+            <a:off x="877130" y="3225413"/>
+            <a:ext cx="389582" cy="307336"/>
+          </a:xfrm>
+          <a:prstGeom prst="rect">
+            <a:avLst/>
+          </a:prstGeom>
+          <a:ln w="9525">
+            <a:solidFill>
+              <a:schemeClr val="tx1"/>
+            </a:solidFill>
+          </a:ln>
+        </p:spPr>
+      </p:pic>
+      <p:pic>
+        <p:nvPicPr>
+          <p:cNvPr id="49" name="Picture 4">
+            <a:extLst>
+              <a:ext uri="{FF2B5EF4-FFF2-40B4-BE49-F238E27FC236}">
+                <a16:creationId xmlns:a16="http://schemas.microsoft.com/office/drawing/2014/main" id="{1DDB67C5-17C7-C5D7-86F3-5AAA6DA5D896}"/>
+              </a:ext>
+            </a:extLst>
+          </p:cNvPr>
+          <p:cNvPicPr>
+            <a:picLocks noChangeAspect="1" noChangeArrowheads="1"/>
+          </p:cNvPicPr>
+          <p:nvPr/>
+        </p:nvPicPr>
+        <p:blipFill>
+          <a:blip r:embed="rId5">
+            <a:extLst>
+              <a:ext uri="{28A0092B-C50C-407E-A947-70E740481C1C}">
+                <a14:useLocalDpi xmlns:a14="http://schemas.microsoft.com/office/drawing/2010/main" val="0"/>
+              </a:ext>
+            </a:extLst>
+          </a:blip>
+          <a:srcRect/>
+          <a:stretch>
+            <a:fillRect/>
+          </a:stretch>
+        </p:blipFill>
+        <p:spPr bwMode="auto">
+          <a:xfrm>
+            <a:off x="3061326" y="2457955"/>
+            <a:ext cx="379932" cy="379932"/>
+          </a:xfrm>
+          <a:prstGeom prst="rect">
+            <a:avLst/>
+          </a:prstGeom>
+          <a:noFill/>
+          <a:extLst>
+            <a:ext uri="{909E8E84-426E-40DD-AFC4-6F175D3DCCD1}">
+              <a14:hiddenFill xmlns:a14="http://schemas.microsoft.com/office/drawing/2010/main">
+                <a:solidFill>
+                  <a:srgbClr val="FFFFFF"/>
+                </a:solidFill>
+              </a14:hiddenFill>
+            </a:ext>
+          </a:extLst>
+        </p:spPr>
+      </p:pic>
+      <p:cxnSp>
+        <p:nvCxnSpPr>
+          <p:cNvPr id="50" name="Straight Arrow Connector 49">
+            <a:extLst>
+              <a:ext uri="{FF2B5EF4-FFF2-40B4-BE49-F238E27FC236}">
+                <a16:creationId xmlns:a16="http://schemas.microsoft.com/office/drawing/2014/main" id="{CC47CB80-858B-2265-4A56-6BB7AE2598D0}"/>
+              </a:ext>
+            </a:extLst>
+          </p:cNvPr>
+          <p:cNvCxnSpPr>
+            <a:cxnSpLocks/>
+          </p:cNvCxnSpPr>
+          <p:nvPr/>
+        </p:nvCxnSpPr>
+        <p:spPr>
+          <a:xfrm flipH="1">
+            <a:off x="2760900" y="2661503"/>
+            <a:ext cx="254931" cy="0"/>
+          </a:xfrm>
+          <a:prstGeom prst="straightConnector1">
+            <a:avLst/>
+          </a:prstGeom>
+          <a:ln w="19050">
+            <a:solidFill>
+              <a:schemeClr val="tx2">
+                <a:lumMod val="10000"/>
+                <a:lumOff val="90000"/>
+              </a:schemeClr>
+            </a:solidFill>
+            <a:tailEnd type="triangle"/>
+          </a:ln>
+        </p:spPr>
+        <p:style>
+          <a:lnRef idx="1">
+            <a:schemeClr val="accent1"/>
+          </a:lnRef>
+          <a:fillRef idx="0">
+            <a:schemeClr val="accent1"/>
+          </a:fillRef>
+          <a:effectRef idx="0">
+            <a:schemeClr val="accent1"/>
+          </a:effectRef>
+          <a:fontRef idx="minor">
+            <a:schemeClr val="tx1"/>
+          </a:fontRef>
+        </p:style>
+      </p:cxnSp>
+      <p:sp>
+        <p:nvSpPr>
+          <p:cNvPr id="51" name="TextBox 50">
+            <a:extLst>
+              <a:ext uri="{FF2B5EF4-FFF2-40B4-BE49-F238E27FC236}">
+                <a16:creationId xmlns:a16="http://schemas.microsoft.com/office/drawing/2014/main" id="{EEBB05C4-DD88-C558-1B2F-E5A286182695}"/>
+              </a:ext>
+            </a:extLst>
+          </p:cNvPr>
+          <p:cNvSpPr txBox="1"/>
+          <p:nvPr/>
+        </p:nvSpPr>
+        <p:spPr>
+          <a:xfrm>
+            <a:off x="2643393" y="2753658"/>
+            <a:ext cx="1036212" cy="261610"/>
+          </a:xfrm>
+          <a:prstGeom prst="rect">
+            <a:avLst/>
+          </a:prstGeom>
+          <a:noFill/>
+        </p:spPr>
+        <p:txBody>
+          <a:bodyPr wrap="square" rtlCol="0">
+            <a:spAutoFit/>
+          </a:bodyPr>
+          <a:lstStyle/>
+          <a:p>
+            <a:r>
+              <a:rPr lang="en-SG" sz="1100" b="1" dirty="0">
+                <a:solidFill>
+                  <a:schemeClr val="bg1"/>
+                </a:solidFill>
+              </a:rPr>
+              <a:t>ICS engineer </a:t>
+            </a:r>
+          </a:p>
+        </p:txBody>
+      </p:sp>
+      <p:pic>
+        <p:nvPicPr>
+          <p:cNvPr id="52" name="Picture 51">
+            <a:extLst>
+              <a:ext uri="{FF2B5EF4-FFF2-40B4-BE49-F238E27FC236}">
+                <a16:creationId xmlns:a16="http://schemas.microsoft.com/office/drawing/2014/main" id="{F05C2730-2AC7-1CB0-50E8-0F83AC89A2FE}"/>
+              </a:ext>
+            </a:extLst>
+          </p:cNvPr>
+          <p:cNvPicPr>
+            <a:picLocks noChangeAspect="1"/>
+          </p:cNvPicPr>
+          <p:nvPr/>
+        </p:nvPicPr>
+        <p:blipFill>
+          <a:blip r:embed="rId4"/>
+          <a:stretch>
+            <a:fillRect/>
+          </a:stretch>
+        </p:blipFill>
+        <p:spPr>
+          <a:xfrm>
+            <a:off x="4665510" y="2642653"/>
+            <a:ext cx="406276" cy="340647"/>
+          </a:xfrm>
+          <a:prstGeom prst="rect">
+            <a:avLst/>
+          </a:prstGeom>
+          <a:ln w="9525">
+            <a:solidFill>
+              <a:schemeClr val="tx1"/>
+            </a:solidFill>
+          </a:ln>
+        </p:spPr>
+      </p:pic>
+      <p:cxnSp>
+        <p:nvCxnSpPr>
+          <p:cNvPr id="53" name="Straight Connector 52">
+            <a:extLst>
+              <a:ext uri="{FF2B5EF4-FFF2-40B4-BE49-F238E27FC236}">
+                <a16:creationId xmlns:a16="http://schemas.microsoft.com/office/drawing/2014/main" id="{DF563507-5A9D-08B9-892A-9600EA198579}"/>
+              </a:ext>
+            </a:extLst>
+          </p:cNvPr>
+          <p:cNvCxnSpPr>
+            <a:cxnSpLocks/>
+            <a:endCxn id="60" idx="1"/>
+          </p:cNvCxnSpPr>
+          <p:nvPr/>
+        </p:nvCxnSpPr>
+        <p:spPr>
+          <a:xfrm>
+            <a:off x="4418287" y="5536135"/>
+            <a:ext cx="505094" cy="0"/>
+          </a:xfrm>
+          <a:prstGeom prst="line">
+            <a:avLst/>
+          </a:prstGeom>
+          <a:ln w="19050">
+            <a:solidFill>
+              <a:schemeClr val="bg1"/>
+            </a:solidFill>
+            <a:prstDash val="sysDash"/>
+          </a:ln>
+        </p:spPr>
+        <p:style>
+          <a:lnRef idx="1">
+            <a:schemeClr val="dk1"/>
+          </a:lnRef>
+          <a:fillRef idx="0">
+            <a:schemeClr val="dk1"/>
+          </a:fillRef>
+          <a:effectRef idx="0">
+            <a:schemeClr val="dk1"/>
+          </a:effectRef>
+          <a:fontRef idx="minor">
+            <a:schemeClr val="tx1"/>
+          </a:fontRef>
+        </p:style>
+      </p:cxnSp>
+      <p:sp>
+        <p:nvSpPr>
+          <p:cNvPr id="54" name="TextBox 53">
+            <a:extLst>
+              <a:ext uri="{FF2B5EF4-FFF2-40B4-BE49-F238E27FC236}">
+                <a16:creationId xmlns:a16="http://schemas.microsoft.com/office/drawing/2014/main" id="{C994BBA5-A1A7-2AE5-3699-11AFF6E1D1EC}"/>
+              </a:ext>
+            </a:extLst>
+          </p:cNvPr>
+          <p:cNvSpPr txBox="1"/>
+          <p:nvPr/>
+        </p:nvSpPr>
+        <p:spPr>
+          <a:xfrm>
+            <a:off x="4342965" y="2238790"/>
+            <a:ext cx="1546830" cy="430887"/>
+          </a:xfrm>
+          <a:prstGeom prst="rect">
+            <a:avLst/>
+          </a:prstGeom>
+          <a:noFill/>
+        </p:spPr>
+        <p:txBody>
+          <a:bodyPr wrap="square" rtlCol="0">
+            <a:spAutoFit/>
+          </a:bodyPr>
+          <a:lstStyle/>
+          <a:p>
+            <a:r>
+              <a:rPr lang="en-SG" sz="1100" dirty="0">
+                <a:solidFill>
+                  <a:schemeClr val="bg1"/>
+                </a:solidFill>
+              </a:rPr>
+              <a:t>Local HW-Engineering admin laptop </a:t>
+            </a:r>
+          </a:p>
+        </p:txBody>
+      </p:sp>
+      <p:pic>
+        <p:nvPicPr>
+          <p:cNvPr id="55" name="Picture 4">
+            <a:extLst>
+              <a:ext uri="{FF2B5EF4-FFF2-40B4-BE49-F238E27FC236}">
+                <a16:creationId xmlns:a16="http://schemas.microsoft.com/office/drawing/2014/main" id="{0117A812-8C12-E4B7-8CEC-CE7EDA09A6A7}"/>
+              </a:ext>
+            </a:extLst>
+          </p:cNvPr>
+          <p:cNvPicPr>
+            <a:picLocks noChangeAspect="1" noChangeArrowheads="1"/>
+          </p:cNvPicPr>
+          <p:nvPr/>
+        </p:nvPicPr>
+        <p:blipFill>
+          <a:blip r:embed="rId5">
+            <a:extLst>
+              <a:ext uri="{28A0092B-C50C-407E-A947-70E740481C1C}">
+                <a14:useLocalDpi xmlns:a14="http://schemas.microsoft.com/office/drawing/2010/main" val="0"/>
+              </a:ext>
+            </a:extLst>
+          </a:blip>
+          <a:srcRect/>
+          <a:stretch>
+            <a:fillRect/>
+          </a:stretch>
+        </p:blipFill>
+        <p:spPr bwMode="auto">
+          <a:xfrm>
+            <a:off x="5289817" y="2620296"/>
+            <a:ext cx="379932" cy="379932"/>
+          </a:xfrm>
+          <a:prstGeom prst="rect">
+            <a:avLst/>
+          </a:prstGeom>
+          <a:noFill/>
+          <a:extLst>
+            <a:ext uri="{909E8E84-426E-40DD-AFC4-6F175D3DCCD1}">
+              <a14:hiddenFill xmlns:a14="http://schemas.microsoft.com/office/drawing/2010/main">
+                <a:solidFill>
+                  <a:srgbClr val="FFFFFF"/>
+                </a:solidFill>
+              </a14:hiddenFill>
+            </a:ext>
+          </a:extLst>
+        </p:spPr>
+      </p:pic>
+      <p:sp>
+        <p:nvSpPr>
+          <p:cNvPr id="57" name="TextBox 56">
+            <a:extLst>
+              <a:ext uri="{FF2B5EF4-FFF2-40B4-BE49-F238E27FC236}">
+                <a16:creationId xmlns:a16="http://schemas.microsoft.com/office/drawing/2014/main" id="{F1867F37-43B9-C76E-3731-DE3B94EA816B}"/>
+              </a:ext>
+            </a:extLst>
+          </p:cNvPr>
+          <p:cNvSpPr txBox="1"/>
+          <p:nvPr/>
+        </p:nvSpPr>
+        <p:spPr>
+          <a:xfrm>
+            <a:off x="5638280" y="2505745"/>
+            <a:ext cx="854690" cy="600164"/>
+          </a:xfrm>
+          <a:prstGeom prst="rect">
+            <a:avLst/>
+          </a:prstGeom>
+          <a:noFill/>
+        </p:spPr>
+        <p:txBody>
+          <a:bodyPr wrap="square" rtlCol="0">
+            <a:spAutoFit/>
+          </a:bodyPr>
+          <a:lstStyle/>
+          <a:p>
+            <a:r>
+              <a:rPr lang="en-SG" sz="1100" b="1" dirty="0">
+                <a:solidFill>
+                  <a:schemeClr val="bg1"/>
+                </a:solidFill>
+              </a:rPr>
+              <a:t>OT-Field device admin</a:t>
+            </a:r>
+          </a:p>
+        </p:txBody>
+      </p:sp>
+      <p:sp>
+        <p:nvSpPr>
+          <p:cNvPr id="58" name="TextBox 57">
+            <a:extLst>
+              <a:ext uri="{FF2B5EF4-FFF2-40B4-BE49-F238E27FC236}">
+                <a16:creationId xmlns:a16="http://schemas.microsoft.com/office/drawing/2014/main" id="{8A263F5F-AE91-883A-B158-4811CD375654}"/>
+              </a:ext>
+            </a:extLst>
+          </p:cNvPr>
+          <p:cNvSpPr txBox="1"/>
+          <p:nvPr/>
+        </p:nvSpPr>
+        <p:spPr>
+          <a:xfrm>
+            <a:off x="1224192" y="2995693"/>
+            <a:ext cx="2486983" cy="400110"/>
+          </a:xfrm>
+          <a:prstGeom prst="rect">
+            <a:avLst/>
+          </a:prstGeom>
+          <a:noFill/>
+        </p:spPr>
+        <p:txBody>
+          <a:bodyPr wrap="square">
+            <a:spAutoFit/>
+          </a:bodyPr>
+          <a:lstStyle/>
+          <a:p>
+            <a:r>
+              <a:rPr lang="en-US" sz="1000" b="1" dirty="0">
+                <a:solidFill>
+                  <a:schemeClr val="accent1">
+                    <a:lumMod val="20000"/>
+                    <a:lumOff val="80000"/>
+                  </a:schemeClr>
+                </a:solidFill>
+              </a:rPr>
+              <a:t>Ethernet TCP/IP, Modbus TCP, S7Comm, MMS </a:t>
+            </a:r>
+            <a:endParaRPr lang="en-SG" sz="1000" dirty="0">
+              <a:solidFill>
+                <a:schemeClr val="accent1">
+                  <a:lumMod val="20000"/>
+                  <a:lumOff val="80000"/>
+                </a:schemeClr>
+              </a:solidFill>
+            </a:endParaRPr>
+          </a:p>
+        </p:txBody>
+      </p:sp>
+      <p:sp>
+        <p:nvSpPr>
+          <p:cNvPr id="59" name="TextBox 58">
+            <a:extLst>
+              <a:ext uri="{FF2B5EF4-FFF2-40B4-BE49-F238E27FC236}">
+                <a16:creationId xmlns:a16="http://schemas.microsoft.com/office/drawing/2014/main" id="{D126852A-FA74-580B-0B8E-E142433A0D4C}"/>
+              </a:ext>
+            </a:extLst>
+          </p:cNvPr>
+          <p:cNvSpPr txBox="1"/>
+          <p:nvPr/>
+        </p:nvSpPr>
+        <p:spPr>
+          <a:xfrm>
+            <a:off x="4063734" y="4214860"/>
+            <a:ext cx="1257727" cy="553998"/>
+          </a:xfrm>
+          <a:prstGeom prst="rect">
+            <a:avLst/>
+          </a:prstGeom>
+          <a:noFill/>
+        </p:spPr>
+        <p:txBody>
+          <a:bodyPr wrap="square">
+            <a:spAutoFit/>
+          </a:bodyPr>
+          <a:lstStyle/>
+          <a:p>
+            <a:r>
+              <a:rPr lang="en-SG" sz="1000" b="1" dirty="0">
+                <a:solidFill>
+                  <a:schemeClr val="bg1"/>
+                </a:solidFill>
+              </a:rPr>
+              <a:t>Modbus TCP </a:t>
+            </a:r>
+          </a:p>
+          <a:p>
+            <a:r>
+              <a:rPr lang="en-SG" sz="1000" b="1" dirty="0">
+                <a:solidFill>
+                  <a:schemeClr val="bg1"/>
+                </a:solidFill>
+              </a:rPr>
+              <a:t>and </a:t>
+            </a:r>
+          </a:p>
+          <a:p>
+            <a:r>
+              <a:rPr lang="en-SG" sz="1000" b="1" dirty="0">
+                <a:solidFill>
+                  <a:schemeClr val="bg1"/>
+                </a:solidFill>
+              </a:rPr>
+              <a:t>S7Comm</a:t>
+            </a:r>
+          </a:p>
+        </p:txBody>
+      </p:sp>
+      <p:pic>
+        <p:nvPicPr>
+          <p:cNvPr id="60" name="Picture 59">
+            <a:extLst>
+              <a:ext uri="{FF2B5EF4-FFF2-40B4-BE49-F238E27FC236}">
+                <a16:creationId xmlns:a16="http://schemas.microsoft.com/office/drawing/2014/main" id="{B76B505D-D2E5-5651-BE76-6135D9AFDEE5}"/>
+              </a:ext>
+            </a:extLst>
+          </p:cNvPr>
+          <p:cNvPicPr>
+            <a:picLocks noChangeAspect="1"/>
+          </p:cNvPicPr>
+          <p:nvPr/>
+        </p:nvPicPr>
+        <p:blipFill>
+          <a:blip r:embed="rId7"/>
+          <a:stretch>
+            <a:fillRect/>
+          </a:stretch>
+        </p:blipFill>
+        <p:spPr>
+          <a:xfrm>
+            <a:off x="4923381" y="5363434"/>
+            <a:ext cx="525145" cy="373437"/>
+          </a:xfrm>
+          <a:prstGeom prst="rect">
+            <a:avLst/>
+          </a:prstGeom>
+          <a:ln w="9525">
+            <a:solidFill>
+              <a:schemeClr val="tx1"/>
+            </a:solidFill>
+          </a:ln>
+        </p:spPr>
+      </p:pic>
+      <p:sp>
+        <p:nvSpPr>
+          <p:cNvPr id="62" name="TextBox 61">
+            <a:extLst>
+              <a:ext uri="{FF2B5EF4-FFF2-40B4-BE49-F238E27FC236}">
+                <a16:creationId xmlns:a16="http://schemas.microsoft.com/office/drawing/2014/main" id="{C259BF4C-8C56-B00E-8119-73CEA0E84F09}"/>
+              </a:ext>
+            </a:extLst>
+          </p:cNvPr>
+          <p:cNvSpPr txBox="1"/>
+          <p:nvPr/>
+        </p:nvSpPr>
+        <p:spPr>
+          <a:xfrm>
+            <a:off x="4760424" y="5019691"/>
+            <a:ext cx="1236466" cy="261610"/>
+          </a:xfrm>
+          <a:prstGeom prst="rect">
+            <a:avLst/>
+          </a:prstGeom>
+          <a:noFill/>
+        </p:spPr>
+        <p:txBody>
+          <a:bodyPr wrap="square" rtlCol="0">
+            <a:spAutoFit/>
+          </a:bodyPr>
+          <a:lstStyle/>
+          <a:p>
+            <a:r>
+              <a:rPr lang="en-SG" sz="1100" dirty="0">
+                <a:solidFill>
+                  <a:schemeClr val="bg1"/>
+                </a:solidFill>
+              </a:rPr>
+              <a:t>Monitor RTUs</a:t>
+            </a:r>
+          </a:p>
+        </p:txBody>
+      </p:sp>
+      <p:pic>
+        <p:nvPicPr>
+          <p:cNvPr id="68" name="Picture 67" descr="A grey rectangular object with buttons and buttons&#10;&#10;Description automatically generated">
+            <a:extLst>
+              <a:ext uri="{FF2B5EF4-FFF2-40B4-BE49-F238E27FC236}">
+                <a16:creationId xmlns:a16="http://schemas.microsoft.com/office/drawing/2014/main" id="{F030B3C1-D616-CF55-DB2F-565FCAE551DE}"/>
+              </a:ext>
+            </a:extLst>
+          </p:cNvPr>
+          <p:cNvPicPr>
+            <a:picLocks noChangeAspect="1"/>
+          </p:cNvPicPr>
+          <p:nvPr/>
+        </p:nvPicPr>
+        <p:blipFill>
+          <a:blip r:embed="rId8">
+            <a:extLst>
+              <a:ext uri="{28A0092B-C50C-407E-A947-70E740481C1C}">
+                <a14:useLocalDpi xmlns:a14="http://schemas.microsoft.com/office/drawing/2010/main" val="0"/>
+              </a:ext>
+            </a:extLst>
+          </a:blip>
+          <a:stretch>
+            <a:fillRect/>
+          </a:stretch>
+        </p:blipFill>
+        <p:spPr>
+          <a:xfrm>
+            <a:off x="4842907" y="3515504"/>
+            <a:ext cx="649894" cy="428930"/>
+          </a:xfrm>
+          <a:prstGeom prst="rect">
+            <a:avLst/>
+          </a:prstGeom>
+          <a:ln w="12700">
+            <a:solidFill>
+              <a:schemeClr val="tx1"/>
+            </a:solidFill>
+          </a:ln>
+        </p:spPr>
+      </p:pic>
+      <p:cxnSp>
+        <p:nvCxnSpPr>
+          <p:cNvPr id="76" name="Straight Connector 75">
+            <a:extLst>
+              <a:ext uri="{FF2B5EF4-FFF2-40B4-BE49-F238E27FC236}">
+                <a16:creationId xmlns:a16="http://schemas.microsoft.com/office/drawing/2014/main" id="{B7F381A9-2A69-B22E-446F-7506F50D506B}"/>
+              </a:ext>
+            </a:extLst>
+          </p:cNvPr>
+          <p:cNvCxnSpPr>
+            <a:cxnSpLocks/>
+          </p:cNvCxnSpPr>
+          <p:nvPr/>
+        </p:nvCxnSpPr>
+        <p:spPr>
+          <a:xfrm>
+            <a:off x="8598173" y="3970237"/>
+            <a:ext cx="0" cy="1565665"/>
+          </a:xfrm>
+          <a:prstGeom prst="line">
+            <a:avLst/>
+          </a:prstGeom>
+          <a:ln w="12700">
+            <a:solidFill>
+              <a:srgbClr val="C00000"/>
+            </a:solidFill>
+          </a:ln>
+        </p:spPr>
+        <p:style>
+          <a:lnRef idx="1">
+            <a:schemeClr val="accent1"/>
+          </a:lnRef>
+          <a:fillRef idx="0">
+            <a:schemeClr val="accent1"/>
+          </a:fillRef>
+          <a:effectRef idx="0">
+            <a:schemeClr val="accent1"/>
+          </a:effectRef>
+          <a:fontRef idx="minor">
+            <a:schemeClr val="tx1"/>
+          </a:fontRef>
+        </p:style>
+      </p:cxnSp>
+      <p:cxnSp>
+        <p:nvCxnSpPr>
+          <p:cNvPr id="79" name="Straight Arrow Connector 78">
+            <a:extLst>
+              <a:ext uri="{FF2B5EF4-FFF2-40B4-BE49-F238E27FC236}">
+                <a16:creationId xmlns:a16="http://schemas.microsoft.com/office/drawing/2014/main" id="{1DAA85BE-4378-29D0-721C-B43798B0FC02}"/>
+              </a:ext>
+            </a:extLst>
+          </p:cNvPr>
+          <p:cNvCxnSpPr>
+            <a:cxnSpLocks/>
+          </p:cNvCxnSpPr>
+          <p:nvPr/>
+        </p:nvCxnSpPr>
+        <p:spPr>
+          <a:xfrm flipH="1">
+            <a:off x="8330678" y="5548386"/>
+            <a:ext cx="284930" cy="0"/>
+          </a:xfrm>
+          <a:prstGeom prst="straightConnector1">
+            <a:avLst/>
+          </a:prstGeom>
+          <a:ln w="12700">
+            <a:solidFill>
+              <a:srgbClr val="C00000"/>
+            </a:solidFill>
+            <a:tailEnd type="triangle"/>
+          </a:ln>
+        </p:spPr>
+        <p:style>
+          <a:lnRef idx="1">
+            <a:schemeClr val="accent1"/>
+          </a:lnRef>
+          <a:fillRef idx="0">
+            <a:schemeClr val="accent1"/>
+          </a:fillRef>
+          <a:effectRef idx="0">
+            <a:schemeClr val="accent1"/>
+          </a:effectRef>
+          <a:fontRef idx="minor">
+            <a:schemeClr val="tx1"/>
+          </a:fontRef>
+        </p:style>
+      </p:cxnSp>
+      <p:cxnSp>
+        <p:nvCxnSpPr>
+          <p:cNvPr id="80" name="Straight Arrow Connector 79">
+            <a:extLst>
+              <a:ext uri="{FF2B5EF4-FFF2-40B4-BE49-F238E27FC236}">
+                <a16:creationId xmlns:a16="http://schemas.microsoft.com/office/drawing/2014/main" id="{F9CAB881-93D8-0805-8166-16B797E8237F}"/>
+              </a:ext>
+            </a:extLst>
+          </p:cNvPr>
+          <p:cNvCxnSpPr>
+            <a:cxnSpLocks/>
+          </p:cNvCxnSpPr>
+          <p:nvPr/>
+        </p:nvCxnSpPr>
+        <p:spPr>
+          <a:xfrm flipH="1">
+            <a:off x="8021867" y="4486606"/>
+            <a:ext cx="567328" cy="0"/>
+          </a:xfrm>
+          <a:prstGeom prst="straightConnector1">
+            <a:avLst/>
+          </a:prstGeom>
+          <a:ln w="12700">
+            <a:solidFill>
+              <a:srgbClr val="C00000"/>
+            </a:solidFill>
+            <a:tailEnd type="triangle"/>
+          </a:ln>
+        </p:spPr>
+        <p:style>
+          <a:lnRef idx="1">
+            <a:schemeClr val="accent1"/>
+          </a:lnRef>
+          <a:fillRef idx="0">
+            <a:schemeClr val="accent1"/>
+          </a:fillRef>
+          <a:effectRef idx="0">
+            <a:schemeClr val="accent1"/>
+          </a:effectRef>
+          <a:fontRef idx="minor">
+            <a:schemeClr val="tx1"/>
+          </a:fontRef>
+        </p:style>
+      </p:cxnSp>
+      <p:cxnSp>
+        <p:nvCxnSpPr>
+          <p:cNvPr id="83" name="Straight Connector 82">
+            <a:extLst>
+              <a:ext uri="{FF2B5EF4-FFF2-40B4-BE49-F238E27FC236}">
+                <a16:creationId xmlns:a16="http://schemas.microsoft.com/office/drawing/2014/main" id="{ECB4A5E4-8B8E-5EE8-10EB-AA92D583FDEE}"/>
+              </a:ext>
+            </a:extLst>
+          </p:cNvPr>
+          <p:cNvCxnSpPr>
+            <a:cxnSpLocks/>
+            <a:stCxn id="48" idx="3"/>
+          </p:cNvCxnSpPr>
+          <p:nvPr/>
+        </p:nvCxnSpPr>
+        <p:spPr>
+          <a:xfrm>
+            <a:off x="1266712" y="3379081"/>
+            <a:ext cx="2803805" cy="0"/>
+          </a:xfrm>
+          <a:prstGeom prst="line">
+            <a:avLst/>
+          </a:prstGeom>
+          <a:ln w="19050"/>
+        </p:spPr>
+        <p:style>
+          <a:lnRef idx="1">
+            <a:schemeClr val="dk1"/>
+          </a:lnRef>
+          <a:fillRef idx="0">
+            <a:schemeClr val="dk1"/>
+          </a:fillRef>
+          <a:effectRef idx="0">
+            <a:schemeClr val="dk1"/>
+          </a:effectRef>
+          <a:fontRef idx="minor">
+            <a:schemeClr val="tx1"/>
+          </a:fontRef>
+        </p:style>
+      </p:cxnSp>
+      <p:pic>
+        <p:nvPicPr>
+          <p:cNvPr id="91" name="Picture 90">
+            <a:extLst>
+              <a:ext uri="{FF2B5EF4-FFF2-40B4-BE49-F238E27FC236}">
+                <a16:creationId xmlns:a16="http://schemas.microsoft.com/office/drawing/2014/main" id="{7A38121D-E65E-417A-87B9-280EDB6D2C87}"/>
+              </a:ext>
+            </a:extLst>
+          </p:cNvPr>
+          <p:cNvPicPr>
+            <a:picLocks noChangeAspect="1"/>
+          </p:cNvPicPr>
+          <p:nvPr/>
+        </p:nvPicPr>
+        <p:blipFill>
+          <a:blip r:embed="rId9"/>
+          <a:stretch>
+            <a:fillRect/>
+          </a:stretch>
+        </p:blipFill>
+        <p:spPr>
+          <a:xfrm>
+            <a:off x="1121417" y="4577918"/>
+            <a:ext cx="2398093" cy="1372908"/>
+          </a:xfrm>
+          <a:prstGeom prst="rect">
+            <a:avLst/>
+          </a:prstGeom>
+          <a:ln w="19050">
+            <a:noFill/>
+          </a:ln>
+        </p:spPr>
+      </p:pic>
+      <p:sp>
+        <p:nvSpPr>
+          <p:cNvPr id="94" name="Arrow: Up-Down 93">
+            <a:extLst>
+              <a:ext uri="{FF2B5EF4-FFF2-40B4-BE49-F238E27FC236}">
+                <a16:creationId xmlns:a16="http://schemas.microsoft.com/office/drawing/2014/main" id="{AFE22A38-498E-773B-CA82-97704FD930B8}"/>
+              </a:ext>
+            </a:extLst>
+          </p:cNvPr>
+          <p:cNvSpPr/>
+          <p:nvPr/>
+        </p:nvSpPr>
+        <p:spPr>
+          <a:xfrm>
+            <a:off x="1449306" y="4217991"/>
+            <a:ext cx="142090" cy="288967"/>
+          </a:xfrm>
+          <a:prstGeom prst="upDownArrow">
+            <a:avLst/>
+          </a:prstGeom>
+          <a:solidFill>
+            <a:schemeClr val="tx2">
+              <a:lumMod val="10000"/>
+              <a:lumOff val="90000"/>
+            </a:schemeClr>
+          </a:solidFill>
+          <a:ln>
+            <a:solidFill>
+              <a:schemeClr val="tx1"/>
+            </a:solidFill>
+          </a:ln>
+        </p:spPr>
+        <p:style>
+          <a:lnRef idx="2">
+            <a:schemeClr val="accent1">
+              <a:shade val="15000"/>
+            </a:schemeClr>
+          </a:lnRef>
+          <a:fillRef idx="1">
+            <a:schemeClr val="accent1"/>
+          </a:fillRef>
+          <a:effectRef idx="0">
+            <a:schemeClr val="accent1"/>
+          </a:effectRef>
+          <a:fontRef idx="minor">
+            <a:schemeClr val="lt1"/>
+          </a:fontRef>
+        </p:style>
+        <p:txBody>
+          <a:bodyPr rtlCol="0" anchor="ctr"/>
+          <a:lstStyle/>
+          <a:p>
+            <a:pPr algn="ctr"/>
+            <a:endParaRPr lang="en-SG"/>
+          </a:p>
+        </p:txBody>
+      </p:sp>
+      <p:cxnSp>
+        <p:nvCxnSpPr>
+          <p:cNvPr id="100" name="Straight Connector 99">
+            <a:extLst>
+              <a:ext uri="{FF2B5EF4-FFF2-40B4-BE49-F238E27FC236}">
+                <a16:creationId xmlns:a16="http://schemas.microsoft.com/office/drawing/2014/main" id="{76B43F67-0240-0F71-68B7-5768977AACF6}"/>
+              </a:ext>
+            </a:extLst>
+          </p:cNvPr>
+          <p:cNvCxnSpPr>
+            <a:cxnSpLocks/>
+            <a:endCxn id="52" idx="1"/>
+          </p:cNvCxnSpPr>
+          <p:nvPr/>
+        </p:nvCxnSpPr>
+        <p:spPr>
+          <a:xfrm>
+            <a:off x="4428225" y="2812977"/>
+            <a:ext cx="237285" cy="0"/>
+          </a:xfrm>
+          <a:prstGeom prst="line">
+            <a:avLst/>
+          </a:prstGeom>
+          <a:ln w="19050">
+            <a:solidFill>
+              <a:schemeClr val="bg1"/>
+            </a:solidFill>
+            <a:prstDash val="sysDash"/>
+          </a:ln>
+        </p:spPr>
+        <p:style>
+          <a:lnRef idx="1">
+            <a:schemeClr val="dk1"/>
+          </a:lnRef>
+          <a:fillRef idx="0">
+            <a:schemeClr val="dk1"/>
+          </a:fillRef>
+          <a:effectRef idx="0">
+            <a:schemeClr val="dk1"/>
+          </a:effectRef>
+          <a:fontRef idx="minor">
+            <a:schemeClr val="tx1"/>
+          </a:fontRef>
+        </p:style>
+      </p:cxnSp>
+      <p:cxnSp>
+        <p:nvCxnSpPr>
+          <p:cNvPr id="106" name="Straight Arrow Connector 105">
+            <a:extLst>
+              <a:ext uri="{FF2B5EF4-FFF2-40B4-BE49-F238E27FC236}">
+                <a16:creationId xmlns:a16="http://schemas.microsoft.com/office/drawing/2014/main" id="{0A671F13-D9FF-C79C-5720-2E35844BA325}"/>
+              </a:ext>
+            </a:extLst>
+          </p:cNvPr>
+          <p:cNvCxnSpPr>
+            <a:cxnSpLocks/>
+          </p:cNvCxnSpPr>
+          <p:nvPr/>
+        </p:nvCxnSpPr>
+        <p:spPr>
+          <a:xfrm flipH="1">
+            <a:off x="5090551" y="2782513"/>
+            <a:ext cx="254931" cy="0"/>
+          </a:xfrm>
+          <a:prstGeom prst="straightConnector1">
+            <a:avLst/>
+          </a:prstGeom>
+          <a:ln w="19050">
+            <a:solidFill>
+              <a:schemeClr val="tx2">
+                <a:lumMod val="10000"/>
+                <a:lumOff val="90000"/>
+              </a:schemeClr>
+            </a:solidFill>
+            <a:tailEnd type="triangle"/>
+          </a:ln>
+        </p:spPr>
+        <p:style>
+          <a:lnRef idx="1">
+            <a:schemeClr val="accent1"/>
+          </a:lnRef>
+          <a:fillRef idx="0">
+            <a:schemeClr val="accent1"/>
+          </a:fillRef>
+          <a:effectRef idx="0">
+            <a:schemeClr val="accent1"/>
+          </a:effectRef>
+          <a:fontRef idx="minor">
+            <a:schemeClr val="tx1"/>
+          </a:fontRef>
+        </p:style>
+      </p:cxnSp>
+      <p:cxnSp>
+        <p:nvCxnSpPr>
+          <p:cNvPr id="111" name="Straight Connector 110">
+            <a:extLst>
+              <a:ext uri="{FF2B5EF4-FFF2-40B4-BE49-F238E27FC236}">
+                <a16:creationId xmlns:a16="http://schemas.microsoft.com/office/drawing/2014/main" id="{721F41C3-E757-2892-1042-95C0E511D189}"/>
+              </a:ext>
+            </a:extLst>
+          </p:cNvPr>
+          <p:cNvCxnSpPr>
+            <a:cxnSpLocks/>
+          </p:cNvCxnSpPr>
+          <p:nvPr/>
+        </p:nvCxnSpPr>
+        <p:spPr>
+          <a:xfrm>
+            <a:off x="4418287" y="4745904"/>
+            <a:ext cx="450361" cy="0"/>
+          </a:xfrm>
+          <a:prstGeom prst="line">
+            <a:avLst/>
+          </a:prstGeom>
+          <a:ln w="19050">
+            <a:solidFill>
+              <a:schemeClr val="bg1"/>
+            </a:solidFill>
+          </a:ln>
+        </p:spPr>
+        <p:style>
+          <a:lnRef idx="1">
+            <a:schemeClr val="dk1"/>
+          </a:lnRef>
+          <a:fillRef idx="0">
+            <a:schemeClr val="dk1"/>
+          </a:fillRef>
+          <a:effectRef idx="0">
+            <a:schemeClr val="dk1"/>
+          </a:effectRef>
+          <a:fontRef idx="minor">
+            <a:schemeClr val="tx1"/>
+          </a:fontRef>
+        </p:style>
+      </p:cxnSp>
+      <p:pic>
+        <p:nvPicPr>
+          <p:cNvPr id="24" name="Picture 23">
+            <a:extLst>
+              <a:ext uri="{FF2B5EF4-FFF2-40B4-BE49-F238E27FC236}">
+                <a16:creationId xmlns:a16="http://schemas.microsoft.com/office/drawing/2014/main" id="{7E4A1D03-AAF8-9D86-4D55-F4B2E0F08888}"/>
+              </a:ext>
+            </a:extLst>
+          </p:cNvPr>
+          <p:cNvPicPr>
+            <a:picLocks noChangeAspect="1"/>
+          </p:cNvPicPr>
+          <p:nvPr/>
+        </p:nvPicPr>
+        <p:blipFill>
+          <a:blip r:embed="rId6"/>
+          <a:stretch>
+            <a:fillRect/>
+          </a:stretch>
+        </p:blipFill>
+        <p:spPr>
+          <a:xfrm>
+            <a:off x="3857365" y="3225413"/>
+            <a:ext cx="389582" cy="307336"/>
+          </a:xfrm>
+          <a:prstGeom prst="rect">
+            <a:avLst/>
+          </a:prstGeom>
+          <a:ln w="9525">
+            <a:solidFill>
+              <a:schemeClr val="tx1"/>
+            </a:solidFill>
+          </a:ln>
+        </p:spPr>
+      </p:pic>
+      <p:pic>
+        <p:nvPicPr>
+          <p:cNvPr id="115" name="Picture 114">
+            <a:extLst>
+              <a:ext uri="{FF2B5EF4-FFF2-40B4-BE49-F238E27FC236}">
+                <a16:creationId xmlns:a16="http://schemas.microsoft.com/office/drawing/2014/main" id="{14FBBD94-5EDB-76AC-9754-12BD0639FE53}"/>
+              </a:ext>
+            </a:extLst>
+          </p:cNvPr>
+          <p:cNvPicPr>
+            <a:picLocks noChangeAspect="1"/>
+          </p:cNvPicPr>
+          <p:nvPr/>
+        </p:nvPicPr>
+        <p:blipFill>
+          <a:blip r:embed="rId10"/>
+          <a:stretch>
+            <a:fillRect/>
+          </a:stretch>
+        </p:blipFill>
+        <p:spPr>
+          <a:xfrm>
+            <a:off x="6901883" y="2223240"/>
+            <a:ext cx="3037805" cy="1722869"/>
+          </a:xfrm>
+          <a:prstGeom prst="rect">
+            <a:avLst/>
+          </a:prstGeom>
+        </p:spPr>
+      </p:pic>
+      <p:pic>
+        <p:nvPicPr>
+          <p:cNvPr id="117" name="Picture 116">
+            <a:extLst>
+              <a:ext uri="{FF2B5EF4-FFF2-40B4-BE49-F238E27FC236}">
+                <a16:creationId xmlns:a16="http://schemas.microsoft.com/office/drawing/2014/main" id="{A00C93CE-4ECF-61DC-6537-24C401928CA0}"/>
+              </a:ext>
+            </a:extLst>
+          </p:cNvPr>
+          <p:cNvPicPr>
+            <a:picLocks noChangeAspect="1"/>
+          </p:cNvPicPr>
+          <p:nvPr/>
+        </p:nvPicPr>
+        <p:blipFill>
+          <a:blip r:embed="rId11"/>
+          <a:stretch>
+            <a:fillRect/>
+          </a:stretch>
+        </p:blipFill>
+        <p:spPr>
+          <a:xfrm>
+            <a:off x="7043689" y="4312775"/>
+            <a:ext cx="1008626" cy="570536"/>
+          </a:xfrm>
+          <a:prstGeom prst="rect">
+            <a:avLst/>
+          </a:prstGeom>
+        </p:spPr>
+      </p:pic>
+      <p:pic>
+        <p:nvPicPr>
+          <p:cNvPr id="119" name="Picture 118">
+            <a:extLst>
+              <a:ext uri="{FF2B5EF4-FFF2-40B4-BE49-F238E27FC236}">
+                <a16:creationId xmlns:a16="http://schemas.microsoft.com/office/drawing/2014/main" id="{3875102D-A9DF-6A26-580D-60B68295B481}"/>
+              </a:ext>
+            </a:extLst>
+          </p:cNvPr>
+          <p:cNvPicPr>
+            <a:picLocks noChangeAspect="1"/>
+          </p:cNvPicPr>
+          <p:nvPr/>
+        </p:nvPicPr>
+        <p:blipFill>
+          <a:blip r:embed="rId12"/>
+          <a:stretch>
+            <a:fillRect/>
+          </a:stretch>
+        </p:blipFill>
+        <p:spPr>
+          <a:xfrm>
+            <a:off x="6976982" y="5212352"/>
+            <a:ext cx="1323810" cy="733333"/>
+          </a:xfrm>
+          <a:prstGeom prst="rect">
+            <a:avLst/>
+          </a:prstGeom>
+        </p:spPr>
+      </p:pic>
+      <p:cxnSp>
+        <p:nvCxnSpPr>
+          <p:cNvPr id="123" name="Connector: Elbow 122">
+            <a:extLst>
+              <a:ext uri="{FF2B5EF4-FFF2-40B4-BE49-F238E27FC236}">
+                <a16:creationId xmlns:a16="http://schemas.microsoft.com/office/drawing/2014/main" id="{2BDF90D1-BA5D-E7FD-8F39-41CE4095EE8E}"/>
+              </a:ext>
+            </a:extLst>
+          </p:cNvPr>
+          <p:cNvCxnSpPr>
+            <a:cxnSpLocks/>
+            <a:endCxn id="117" idx="1"/>
+          </p:cNvCxnSpPr>
+          <p:nvPr/>
+        </p:nvCxnSpPr>
+        <p:spPr>
+          <a:xfrm>
+            <a:off x="5489428" y="3725304"/>
+            <a:ext cx="1554261" cy="872739"/>
+          </a:xfrm>
+          <a:prstGeom prst="bentConnector3">
+            <a:avLst>
+              <a:gd name="adj1" fmla="val 71814"/>
+            </a:avLst>
+          </a:prstGeom>
+          <a:ln w="19050">
+            <a:solidFill>
+              <a:srgbClr val="C00000"/>
+            </a:solidFill>
+            <a:prstDash val="sysDash"/>
+            <a:headEnd type="triangle"/>
+            <a:tailEnd type="triangle"/>
+          </a:ln>
+        </p:spPr>
+        <p:style>
+          <a:lnRef idx="1">
+            <a:schemeClr val="accent1"/>
+          </a:lnRef>
+          <a:fillRef idx="0">
+            <a:schemeClr val="accent1"/>
+          </a:fillRef>
+          <a:effectRef idx="0">
+            <a:schemeClr val="accent1"/>
+          </a:effectRef>
+          <a:fontRef idx="minor">
+            <a:schemeClr val="tx1"/>
+          </a:fontRef>
+        </p:style>
+      </p:cxnSp>
+      <p:sp>
+        <p:nvSpPr>
+          <p:cNvPr id="124" name="TextBox 123">
+            <a:extLst>
+              <a:ext uri="{FF2B5EF4-FFF2-40B4-BE49-F238E27FC236}">
+                <a16:creationId xmlns:a16="http://schemas.microsoft.com/office/drawing/2014/main" id="{6373DE3E-5F52-3004-EFCE-5683D11F186D}"/>
+              </a:ext>
+            </a:extLst>
+          </p:cNvPr>
+          <p:cNvSpPr txBox="1"/>
+          <p:nvPr/>
+        </p:nvSpPr>
+        <p:spPr>
+          <a:xfrm>
+            <a:off x="5527112" y="3507253"/>
+            <a:ext cx="935982" cy="400110"/>
+          </a:xfrm>
+          <a:prstGeom prst="rect">
+            <a:avLst/>
+          </a:prstGeom>
+          <a:noFill/>
+        </p:spPr>
+        <p:txBody>
+          <a:bodyPr wrap="square">
+            <a:spAutoFit/>
+          </a:bodyPr>
+          <a:lstStyle/>
+          <a:p>
+            <a:r>
+              <a:rPr lang="en-SG" sz="1000" b="1" i="0" dirty="0">
+                <a:solidFill>
+                  <a:schemeClr val="accent6">
+                    <a:lumMod val="40000"/>
+                    <a:lumOff val="60000"/>
+                  </a:schemeClr>
+                </a:solidFill>
+                <a:effectLst/>
+              </a:rPr>
+              <a:t>Electrical </a:t>
+            </a:r>
+            <a:r>
+              <a:rPr lang="en-US" sz="1000" b="1" dirty="0">
+                <a:solidFill>
+                  <a:schemeClr val="accent6">
+                    <a:lumMod val="40000"/>
+                    <a:lumOff val="60000"/>
+                  </a:schemeClr>
+                </a:solidFill>
+              </a:rPr>
+              <a:t>signal I/O </a:t>
+            </a:r>
+            <a:endParaRPr lang="en-SG" sz="1000" b="1" dirty="0">
+              <a:solidFill>
+                <a:schemeClr val="accent6">
+                  <a:lumMod val="40000"/>
+                  <a:lumOff val="60000"/>
+                </a:schemeClr>
+              </a:solidFill>
+            </a:endParaRPr>
+          </a:p>
+        </p:txBody>
+      </p:sp>
+      <p:cxnSp>
+        <p:nvCxnSpPr>
+          <p:cNvPr id="128" name="Connector: Elbow 127">
+            <a:extLst>
+              <a:ext uri="{FF2B5EF4-FFF2-40B4-BE49-F238E27FC236}">
+                <a16:creationId xmlns:a16="http://schemas.microsoft.com/office/drawing/2014/main" id="{48522C2D-FE8C-69B7-509E-1FA5936EB8F6}"/>
+              </a:ext>
+            </a:extLst>
+          </p:cNvPr>
+          <p:cNvCxnSpPr>
+            <a:cxnSpLocks/>
+            <a:stCxn id="16" idx="3"/>
+          </p:cNvCxnSpPr>
+          <p:nvPr/>
+        </p:nvCxnSpPr>
+        <p:spPr>
+          <a:xfrm>
+            <a:off x="5383785" y="4737114"/>
+            <a:ext cx="1597299" cy="552567"/>
+          </a:xfrm>
+          <a:prstGeom prst="bentConnector3">
+            <a:avLst>
+              <a:gd name="adj1" fmla="val 50000"/>
+            </a:avLst>
+          </a:prstGeom>
+          <a:ln w="19050">
+            <a:solidFill>
+              <a:srgbClr val="C00000"/>
+            </a:solidFill>
+            <a:prstDash val="sysDash"/>
+            <a:headEnd type="triangle"/>
+            <a:tailEnd type="triangle"/>
+          </a:ln>
+        </p:spPr>
+        <p:style>
+          <a:lnRef idx="1">
+            <a:schemeClr val="accent1"/>
+          </a:lnRef>
+          <a:fillRef idx="0">
+            <a:schemeClr val="accent1"/>
+          </a:fillRef>
+          <a:effectRef idx="0">
+            <a:schemeClr val="accent1"/>
+          </a:effectRef>
+          <a:fontRef idx="minor">
+            <a:schemeClr val="tx1"/>
+          </a:fontRef>
+        </p:style>
+      </p:cxnSp>
+      <p:cxnSp>
+        <p:nvCxnSpPr>
+          <p:cNvPr id="134" name="Straight Arrow Connector 133">
+            <a:extLst>
+              <a:ext uri="{FF2B5EF4-FFF2-40B4-BE49-F238E27FC236}">
+                <a16:creationId xmlns:a16="http://schemas.microsoft.com/office/drawing/2014/main" id="{C4C8946A-F39E-E3D0-36C0-9B04524EE234}"/>
+              </a:ext>
+            </a:extLst>
+          </p:cNvPr>
+          <p:cNvCxnSpPr>
+            <a:cxnSpLocks/>
+          </p:cNvCxnSpPr>
+          <p:nvPr/>
+        </p:nvCxnSpPr>
+        <p:spPr>
+          <a:xfrm flipH="1" flipV="1">
+            <a:off x="5489428" y="5548386"/>
+            <a:ext cx="1491656" cy="0"/>
+          </a:xfrm>
+          <a:prstGeom prst="straightConnector1">
+            <a:avLst/>
+          </a:prstGeom>
+          <a:ln>
+            <a:solidFill>
+              <a:srgbClr val="C00000"/>
+            </a:solidFill>
+            <a:prstDash val="sysDash"/>
+            <a:tailEnd type="triangle"/>
+          </a:ln>
+        </p:spPr>
+        <p:style>
+          <a:lnRef idx="2">
+            <a:schemeClr val="accent1"/>
+          </a:lnRef>
+          <a:fillRef idx="0">
+            <a:schemeClr val="accent1"/>
+          </a:fillRef>
+          <a:effectRef idx="1">
+            <a:schemeClr val="accent1"/>
+          </a:effectRef>
+          <a:fontRef idx="minor">
+            <a:schemeClr val="tx1"/>
+          </a:fontRef>
+        </p:style>
+      </p:cxnSp>
+      <p:sp>
+        <p:nvSpPr>
+          <p:cNvPr id="136" name="TextBox 135">
+            <a:extLst>
+              <a:ext uri="{FF2B5EF4-FFF2-40B4-BE49-F238E27FC236}">
+                <a16:creationId xmlns:a16="http://schemas.microsoft.com/office/drawing/2014/main" id="{12B4C71B-2FA5-FA32-7D2C-86ECB77BFA38}"/>
+              </a:ext>
+            </a:extLst>
+          </p:cNvPr>
+          <p:cNvSpPr txBox="1"/>
+          <p:nvPr/>
+        </p:nvSpPr>
+        <p:spPr>
+          <a:xfrm>
+            <a:off x="5572117" y="5289681"/>
+            <a:ext cx="935982" cy="246221"/>
+          </a:xfrm>
+          <a:prstGeom prst="rect">
+            <a:avLst/>
+          </a:prstGeom>
+          <a:noFill/>
+        </p:spPr>
+        <p:txBody>
+          <a:bodyPr wrap="square">
+            <a:spAutoFit/>
+          </a:bodyPr>
+          <a:lstStyle/>
+          <a:p>
+            <a:r>
+              <a:rPr lang="en-US" sz="1000" b="1" dirty="0">
+                <a:solidFill>
+                  <a:schemeClr val="accent6">
+                    <a:lumMod val="40000"/>
+                    <a:lumOff val="60000"/>
+                  </a:schemeClr>
+                </a:solidFill>
+              </a:rPr>
+              <a:t>SV value </a:t>
+            </a:r>
+            <a:endParaRPr lang="en-SG" sz="1000" b="1" dirty="0">
+              <a:solidFill>
+                <a:schemeClr val="accent6">
+                  <a:lumMod val="40000"/>
+                  <a:lumOff val="60000"/>
+                </a:schemeClr>
+              </a:solidFill>
+            </a:endParaRPr>
+          </a:p>
+        </p:txBody>
+      </p:sp>
+      <p:pic>
+        <p:nvPicPr>
+          <p:cNvPr id="137" name="Picture 2" descr="Weather - Free weather icons">
+            <a:extLst>
+              <a:ext uri="{FF2B5EF4-FFF2-40B4-BE49-F238E27FC236}">
+                <a16:creationId xmlns:a16="http://schemas.microsoft.com/office/drawing/2014/main" id="{E718220F-06AB-FB3A-14B9-E90C01CA6D16}"/>
+              </a:ext>
+            </a:extLst>
+          </p:cNvPr>
+          <p:cNvPicPr>
+            <a:picLocks noChangeAspect="1" noChangeArrowheads="1"/>
+          </p:cNvPicPr>
+          <p:nvPr/>
+        </p:nvPicPr>
+        <p:blipFill>
+          <a:blip r:embed="rId13">
+            <a:extLst>
+              <a:ext uri="{28A0092B-C50C-407E-A947-70E740481C1C}">
+                <a14:useLocalDpi xmlns:a14="http://schemas.microsoft.com/office/drawing/2010/main" val="0"/>
+              </a:ext>
+            </a:extLst>
+          </a:blip>
+          <a:srcRect/>
+          <a:stretch>
+            <a:fillRect/>
+          </a:stretch>
+        </p:blipFill>
+        <p:spPr bwMode="auto">
+          <a:xfrm>
+            <a:off x="10269772" y="1880119"/>
+            <a:ext cx="753707" cy="753707"/>
+          </a:xfrm>
+          <a:prstGeom prst="rect">
+            <a:avLst/>
+          </a:prstGeom>
+          <a:noFill/>
+          <a:ln w="19050">
+            <a:solidFill>
+              <a:schemeClr val="accent3">
+                <a:lumMod val="75000"/>
+              </a:schemeClr>
+            </a:solidFill>
+            <a:prstDash val="sysDash"/>
+          </a:ln>
+          <a:extLst>
+            <a:ext uri="{909E8E84-426E-40DD-AFC4-6F175D3DCCD1}">
+              <a14:hiddenFill xmlns:a14="http://schemas.microsoft.com/office/drawing/2010/main">
+                <a:solidFill>
+                  <a:srgbClr val="FFFFFF"/>
+                </a:solidFill>
+              </a14:hiddenFill>
+            </a:ext>
+          </a:extLst>
+        </p:spPr>
+      </p:pic>
+      <p:pic>
+        <p:nvPicPr>
+          <p:cNvPr id="138" name="Picture 137">
+            <a:extLst>
+              <a:ext uri="{FF2B5EF4-FFF2-40B4-BE49-F238E27FC236}">
+                <a16:creationId xmlns:a16="http://schemas.microsoft.com/office/drawing/2014/main" id="{3D73C4F6-1676-89C4-FA22-D50FD7C71594}"/>
+              </a:ext>
+            </a:extLst>
+          </p:cNvPr>
+          <p:cNvPicPr>
+            <a:picLocks noChangeAspect="1"/>
+          </p:cNvPicPr>
+          <p:nvPr/>
+        </p:nvPicPr>
+        <p:blipFill>
+          <a:blip r:embed="rId6"/>
+          <a:stretch>
+            <a:fillRect/>
+          </a:stretch>
+        </p:blipFill>
+        <p:spPr>
+          <a:xfrm>
+            <a:off x="9794224" y="4086346"/>
+            <a:ext cx="389582" cy="307336"/>
+          </a:xfrm>
+          <a:prstGeom prst="rect">
+            <a:avLst/>
+          </a:prstGeom>
+          <a:ln w="9525">
+            <a:solidFill>
+              <a:schemeClr val="tx1"/>
+            </a:solidFill>
+          </a:ln>
+        </p:spPr>
+      </p:pic>
+      <p:cxnSp>
+        <p:nvCxnSpPr>
+          <p:cNvPr id="139" name="Straight Arrow Connector 138">
+            <a:extLst>
+              <a:ext uri="{FF2B5EF4-FFF2-40B4-BE49-F238E27FC236}">
+                <a16:creationId xmlns:a16="http://schemas.microsoft.com/office/drawing/2014/main" id="{4EBDFC44-AEFE-36C3-EA2B-A76212388521}"/>
+              </a:ext>
+            </a:extLst>
+          </p:cNvPr>
+          <p:cNvCxnSpPr>
+            <a:cxnSpLocks/>
+          </p:cNvCxnSpPr>
+          <p:nvPr/>
+        </p:nvCxnSpPr>
+        <p:spPr>
+          <a:xfrm flipH="1">
+            <a:off x="10183806" y="4217991"/>
+            <a:ext cx="462819" cy="0"/>
+          </a:xfrm>
+          <a:prstGeom prst="straightConnector1">
+            <a:avLst/>
+          </a:prstGeom>
+          <a:ln>
+            <a:solidFill>
+              <a:schemeClr val="accent3">
+                <a:lumMod val="75000"/>
+              </a:schemeClr>
+            </a:solidFill>
+            <a:prstDash val="sysDash"/>
+            <a:tailEnd type="triangle"/>
+          </a:ln>
+        </p:spPr>
+        <p:style>
+          <a:lnRef idx="2">
+            <a:schemeClr val="accent1"/>
+          </a:lnRef>
+          <a:fillRef idx="0">
+            <a:schemeClr val="accent1"/>
+          </a:fillRef>
+          <a:effectRef idx="1">
+            <a:schemeClr val="accent1"/>
+          </a:effectRef>
+          <a:fontRef idx="minor">
+            <a:schemeClr val="tx1"/>
+          </a:fontRef>
+        </p:style>
+      </p:cxnSp>
+      <p:cxnSp>
+        <p:nvCxnSpPr>
+          <p:cNvPr id="140" name="Straight Connector 139">
+            <a:extLst>
+              <a:ext uri="{FF2B5EF4-FFF2-40B4-BE49-F238E27FC236}">
+                <a16:creationId xmlns:a16="http://schemas.microsoft.com/office/drawing/2014/main" id="{9D4ACDD4-9070-0A3D-E27C-953ACA483673}"/>
+              </a:ext>
+            </a:extLst>
+          </p:cNvPr>
+          <p:cNvCxnSpPr>
+            <a:cxnSpLocks/>
+            <a:stCxn id="137" idx="2"/>
+          </p:cNvCxnSpPr>
+          <p:nvPr/>
+        </p:nvCxnSpPr>
+        <p:spPr>
+          <a:xfrm>
+            <a:off x="10646626" y="2633826"/>
+            <a:ext cx="0" cy="1577004"/>
+          </a:xfrm>
+          <a:prstGeom prst="line">
+            <a:avLst/>
+          </a:prstGeom>
+          <a:ln>
+            <a:solidFill>
+              <a:schemeClr val="accent3">
+                <a:lumMod val="75000"/>
+              </a:schemeClr>
+            </a:solidFill>
+            <a:prstDash val="sysDash"/>
+          </a:ln>
+        </p:spPr>
+        <p:style>
+          <a:lnRef idx="2">
+            <a:schemeClr val="accent1"/>
+          </a:lnRef>
+          <a:fillRef idx="0">
+            <a:schemeClr val="accent1"/>
+          </a:fillRef>
+          <a:effectRef idx="1">
+            <a:schemeClr val="accent1"/>
+          </a:effectRef>
+          <a:fontRef idx="minor">
+            <a:schemeClr val="tx1"/>
+          </a:fontRef>
+        </p:style>
+      </p:cxnSp>
+      <p:cxnSp>
+        <p:nvCxnSpPr>
+          <p:cNvPr id="147" name="Straight Connector 146">
+            <a:extLst>
+              <a:ext uri="{FF2B5EF4-FFF2-40B4-BE49-F238E27FC236}">
+                <a16:creationId xmlns:a16="http://schemas.microsoft.com/office/drawing/2014/main" id="{02284D82-2D05-F94B-18C8-ECEE27E71F7B}"/>
+              </a:ext>
+            </a:extLst>
+          </p:cNvPr>
+          <p:cNvCxnSpPr>
+            <a:cxnSpLocks/>
+          </p:cNvCxnSpPr>
+          <p:nvPr/>
+        </p:nvCxnSpPr>
+        <p:spPr>
+          <a:xfrm flipH="1">
+            <a:off x="9370203" y="4244516"/>
+            <a:ext cx="424021" cy="0"/>
+          </a:xfrm>
+          <a:prstGeom prst="line">
+            <a:avLst/>
+          </a:prstGeom>
+          <a:ln>
+            <a:solidFill>
+              <a:schemeClr val="accent3">
+                <a:lumMod val="75000"/>
+              </a:schemeClr>
+            </a:solidFill>
+            <a:prstDash val="sysDash"/>
+          </a:ln>
+        </p:spPr>
+        <p:style>
+          <a:lnRef idx="2">
+            <a:schemeClr val="accent1"/>
+          </a:lnRef>
+          <a:fillRef idx="0">
+            <a:schemeClr val="accent1"/>
+          </a:fillRef>
+          <a:effectRef idx="1">
+            <a:schemeClr val="accent1"/>
+          </a:effectRef>
+          <a:fontRef idx="minor">
+            <a:schemeClr val="tx1"/>
+          </a:fontRef>
+        </p:style>
+      </p:cxnSp>
+      <p:cxnSp>
+        <p:nvCxnSpPr>
+          <p:cNvPr id="149" name="Straight Arrow Connector 148">
+            <a:extLst>
+              <a:ext uri="{FF2B5EF4-FFF2-40B4-BE49-F238E27FC236}">
+                <a16:creationId xmlns:a16="http://schemas.microsoft.com/office/drawing/2014/main" id="{D1FA3F1A-5547-CA3D-F772-A509A67F9BB1}"/>
+              </a:ext>
+            </a:extLst>
+          </p:cNvPr>
+          <p:cNvCxnSpPr>
+            <a:cxnSpLocks/>
+          </p:cNvCxnSpPr>
+          <p:nvPr/>
+        </p:nvCxnSpPr>
+        <p:spPr>
+          <a:xfrm flipV="1">
+            <a:off x="9370203" y="3938925"/>
+            <a:ext cx="0" cy="299647"/>
+          </a:xfrm>
+          <a:prstGeom prst="straightConnector1">
+            <a:avLst/>
+          </a:prstGeom>
+          <a:ln>
+            <a:solidFill>
+              <a:schemeClr val="accent3">
+                <a:lumMod val="75000"/>
+              </a:schemeClr>
+            </a:solidFill>
+            <a:prstDash val="sysDash"/>
+            <a:tailEnd type="triangle"/>
+          </a:ln>
+        </p:spPr>
+        <p:style>
+          <a:lnRef idx="2">
+            <a:schemeClr val="accent1"/>
+          </a:lnRef>
+          <a:fillRef idx="0">
+            <a:schemeClr val="accent1"/>
+          </a:fillRef>
+          <a:effectRef idx="1">
+            <a:schemeClr val="accent1"/>
+          </a:effectRef>
+          <a:fontRef idx="minor">
+            <a:schemeClr val="tx1"/>
+          </a:fontRef>
+        </p:style>
+      </p:cxnSp>
+      <p:sp>
+        <p:nvSpPr>
+          <p:cNvPr id="152" name="Cloud 151">
+            <a:extLst>
+              <a:ext uri="{FF2B5EF4-FFF2-40B4-BE49-F238E27FC236}">
+                <a16:creationId xmlns:a16="http://schemas.microsoft.com/office/drawing/2014/main" id="{E2E54F92-9A84-92C5-2B64-038789348A67}"/>
+              </a:ext>
+            </a:extLst>
+          </p:cNvPr>
+          <p:cNvSpPr/>
+          <p:nvPr/>
+        </p:nvSpPr>
+        <p:spPr>
+          <a:xfrm>
+            <a:off x="10046282" y="3020803"/>
+            <a:ext cx="1046735" cy="660431"/>
+          </a:xfrm>
+          <a:prstGeom prst="cloud">
+            <a:avLst/>
+          </a:prstGeom>
+        </p:spPr>
+        <p:style>
+          <a:lnRef idx="2">
+            <a:schemeClr val="accent1">
+              <a:shade val="15000"/>
+            </a:schemeClr>
+          </a:lnRef>
+          <a:fillRef idx="1">
+            <a:schemeClr val="accent1"/>
+          </a:fillRef>
+          <a:effectRef idx="0">
+            <a:schemeClr val="accent1"/>
+          </a:effectRef>
+          <a:fontRef idx="minor">
+            <a:schemeClr val="lt1"/>
+          </a:fontRef>
+        </p:style>
+        <p:txBody>
+          <a:bodyPr rtlCol="0" anchor="ctr"/>
+          <a:lstStyle/>
+          <a:p>
+            <a:pPr algn="ctr"/>
+            <a:r>
+              <a:rPr lang="en-US" sz="1000" b="1" dirty="0"/>
+              <a:t>internet</a:t>
+            </a:r>
+            <a:endParaRPr lang="en-SG" sz="1000" b="1" dirty="0"/>
+          </a:p>
+        </p:txBody>
+      </p:sp>
+      <p:sp>
+        <p:nvSpPr>
+          <p:cNvPr id="153" name="TextBox 152">
+            <a:extLst>
+              <a:ext uri="{FF2B5EF4-FFF2-40B4-BE49-F238E27FC236}">
+                <a16:creationId xmlns:a16="http://schemas.microsoft.com/office/drawing/2014/main" id="{5799505C-DCD0-4279-20B0-100536A7DE70}"/>
+              </a:ext>
+            </a:extLst>
+          </p:cNvPr>
+          <p:cNvSpPr txBox="1"/>
+          <p:nvPr/>
+        </p:nvSpPr>
+        <p:spPr>
+          <a:xfrm>
+            <a:off x="10183806" y="1298353"/>
+            <a:ext cx="1159007" cy="600164"/>
+          </a:xfrm>
+          <a:prstGeom prst="rect">
+            <a:avLst/>
+          </a:prstGeom>
+          <a:noFill/>
+        </p:spPr>
+        <p:txBody>
+          <a:bodyPr wrap="square" rtlCol="0">
+            <a:spAutoFit/>
+          </a:bodyPr>
+          <a:lstStyle/>
+          <a:p>
+            <a:r>
+              <a:rPr lang="en-US" sz="1100" b="1" dirty="0">
+                <a:solidFill>
+                  <a:schemeClr val="accent2">
+                    <a:lumMod val="75000"/>
+                  </a:schemeClr>
+                </a:solidFill>
+              </a:rPr>
+              <a:t>Online real time city weather data </a:t>
+            </a:r>
+            <a:endParaRPr lang="en-SG" sz="1100" b="1" dirty="0">
+              <a:solidFill>
+                <a:schemeClr val="accent2">
+                  <a:lumMod val="75000"/>
+                </a:schemeClr>
+              </a:solidFill>
+            </a:endParaRPr>
+          </a:p>
+        </p:txBody>
+      </p:sp>
+      <p:cxnSp>
+        <p:nvCxnSpPr>
+          <p:cNvPr id="154" name="Connector: Elbow 153">
+            <a:extLst>
+              <a:ext uri="{FF2B5EF4-FFF2-40B4-BE49-F238E27FC236}">
+                <a16:creationId xmlns:a16="http://schemas.microsoft.com/office/drawing/2014/main" id="{4C478292-4E93-1E74-0608-9C31E99A8092}"/>
+              </a:ext>
+            </a:extLst>
+          </p:cNvPr>
+          <p:cNvCxnSpPr>
+            <a:cxnSpLocks/>
+            <a:endCxn id="157" idx="1"/>
+          </p:cNvCxnSpPr>
+          <p:nvPr/>
+        </p:nvCxnSpPr>
+        <p:spPr>
+          <a:xfrm rot="16200000" flipH="1">
+            <a:off x="8319441" y="4513016"/>
+            <a:ext cx="1514402" cy="393154"/>
+          </a:xfrm>
+          <a:prstGeom prst="bentConnector2">
+            <a:avLst/>
+          </a:prstGeom>
+          <a:ln w="19050">
+            <a:solidFill>
+              <a:srgbClr val="C00000"/>
+            </a:solidFill>
+            <a:prstDash val="sysDash"/>
+            <a:headEnd type="triangle"/>
+            <a:tailEnd type="triangle"/>
+          </a:ln>
+        </p:spPr>
+        <p:style>
+          <a:lnRef idx="1">
+            <a:schemeClr val="accent1"/>
+          </a:lnRef>
+          <a:fillRef idx="0">
+            <a:schemeClr val="accent1"/>
+          </a:fillRef>
+          <a:effectRef idx="0">
+            <a:schemeClr val="accent1"/>
+          </a:effectRef>
+          <a:fontRef idx="minor">
+            <a:schemeClr val="tx1"/>
+          </a:fontRef>
+        </p:style>
+      </p:cxnSp>
+      <p:pic>
+        <p:nvPicPr>
+          <p:cNvPr id="157" name="Picture 156">
+            <a:extLst>
+              <a:ext uri="{FF2B5EF4-FFF2-40B4-BE49-F238E27FC236}">
+                <a16:creationId xmlns:a16="http://schemas.microsoft.com/office/drawing/2014/main" id="{119C4FAE-F1DE-D122-582E-B837A3C10C28}"/>
+              </a:ext>
+            </a:extLst>
+          </p:cNvPr>
+          <p:cNvPicPr>
+            <a:picLocks noChangeAspect="1"/>
+          </p:cNvPicPr>
+          <p:nvPr/>
+        </p:nvPicPr>
+        <p:blipFill>
+          <a:blip r:embed="rId14"/>
+          <a:stretch>
+            <a:fillRect/>
+          </a:stretch>
+        </p:blipFill>
+        <p:spPr>
+          <a:xfrm>
+            <a:off x="9273219" y="4858354"/>
+            <a:ext cx="2122463" cy="1216879"/>
+          </a:xfrm>
+          <a:prstGeom prst="rect">
+            <a:avLst/>
+          </a:prstGeom>
+          <a:ln w="9525">
+            <a:solidFill>
+              <a:schemeClr val="tx1"/>
+            </a:solidFill>
+          </a:ln>
+        </p:spPr>
+      </p:pic>
+      <p:sp>
+        <p:nvSpPr>
+          <p:cNvPr id="167" name="TextBox 166">
+            <a:extLst>
+              <a:ext uri="{FF2B5EF4-FFF2-40B4-BE49-F238E27FC236}">
+                <a16:creationId xmlns:a16="http://schemas.microsoft.com/office/drawing/2014/main" id="{38B66B89-4D8B-D1A3-E392-4A1D6B07C5A6}"/>
+              </a:ext>
+            </a:extLst>
+          </p:cNvPr>
+          <p:cNvSpPr txBox="1"/>
+          <p:nvPr/>
+        </p:nvSpPr>
+        <p:spPr>
+          <a:xfrm>
+            <a:off x="9172571" y="4433042"/>
+            <a:ext cx="2370928" cy="461665"/>
+          </a:xfrm>
+          <a:prstGeom prst="rect">
+            <a:avLst/>
+          </a:prstGeom>
+          <a:noFill/>
+        </p:spPr>
+        <p:txBody>
+          <a:bodyPr wrap="square" rtlCol="0">
+            <a:spAutoFit/>
+          </a:bodyPr>
+          <a:lstStyle/>
+          <a:p>
+            <a:r>
+              <a:rPr lang="en-US" sz="1200" b="1" dirty="0"/>
+              <a:t>Other power customer physical world simulator/network </a:t>
+            </a:r>
+            <a:endParaRPr lang="en-SG" sz="1200" b="1" dirty="0"/>
+          </a:p>
+        </p:txBody>
+      </p:sp>
+      <p:cxnSp>
+        <p:nvCxnSpPr>
+          <p:cNvPr id="170" name="Straight Connector 169">
+            <a:extLst>
+              <a:ext uri="{FF2B5EF4-FFF2-40B4-BE49-F238E27FC236}">
+                <a16:creationId xmlns:a16="http://schemas.microsoft.com/office/drawing/2014/main" id="{1E04BDCF-5E4F-9C86-BD67-FFD6CDF5A238}"/>
+              </a:ext>
+            </a:extLst>
+          </p:cNvPr>
+          <p:cNvCxnSpPr>
+            <a:cxnSpLocks/>
+          </p:cNvCxnSpPr>
+          <p:nvPr/>
+        </p:nvCxnSpPr>
+        <p:spPr>
+          <a:xfrm>
+            <a:off x="4240251" y="3359908"/>
+            <a:ext cx="187974" cy="0"/>
+          </a:xfrm>
+          <a:prstGeom prst="line">
+            <a:avLst/>
+          </a:prstGeom>
+          <a:ln w="19050">
+            <a:solidFill>
+              <a:schemeClr val="bg1"/>
+            </a:solidFill>
+          </a:ln>
+        </p:spPr>
+        <p:style>
+          <a:lnRef idx="1">
+            <a:schemeClr val="dk1"/>
+          </a:lnRef>
+          <a:fillRef idx="0">
+            <a:schemeClr val="dk1"/>
+          </a:fillRef>
+          <a:effectRef idx="0">
+            <a:schemeClr val="dk1"/>
+          </a:effectRef>
+          <a:fontRef idx="minor">
+            <a:schemeClr val="tx1"/>
+          </a:fontRef>
+        </p:style>
+      </p:cxnSp>
+      <p:sp>
+        <p:nvSpPr>
+          <p:cNvPr id="172" name="TextBox 171">
+            <a:extLst>
+              <a:ext uri="{FF2B5EF4-FFF2-40B4-BE49-F238E27FC236}">
+                <a16:creationId xmlns:a16="http://schemas.microsoft.com/office/drawing/2014/main" id="{7E926E0C-896C-9B88-9FE8-CAEB1D083EA7}"/>
+              </a:ext>
+            </a:extLst>
+          </p:cNvPr>
+          <p:cNvSpPr txBox="1"/>
+          <p:nvPr/>
+        </p:nvSpPr>
+        <p:spPr>
+          <a:xfrm>
+            <a:off x="1027132" y="704977"/>
+            <a:ext cx="8145439" cy="369332"/>
+          </a:xfrm>
+          <a:prstGeom prst="rect">
+            <a:avLst/>
+          </a:prstGeom>
+          <a:noFill/>
+          <a:ln w="12700">
+            <a:solidFill>
+              <a:schemeClr val="tx1"/>
+            </a:solidFill>
+            <a:prstDash val="sysDash"/>
+          </a:ln>
+        </p:spPr>
+        <p:txBody>
+          <a:bodyPr wrap="square" rtlCol="0">
+            <a:spAutoFit/>
+          </a:bodyPr>
+          <a:lstStyle/>
+          <a:p>
+            <a:r>
+              <a:rPr lang="en-US" b="1" dirty="0"/>
+              <a:t>Power Grid OT Simulation System Network Diagram and Components View </a:t>
+            </a:r>
+            <a:endParaRPr lang="en-SG" b="1" dirty="0"/>
+          </a:p>
+        </p:txBody>
+      </p:sp>
+    </p:spTree>
+    <p:extLst>
+      <p:ext uri="{BB962C8B-B14F-4D97-AF65-F5344CB8AC3E}">
+        <p14:creationId xmlns:p14="http://schemas.microsoft.com/office/powerpoint/2010/main" val="1682714829"/>
+      </p:ext>
+    </p:extLst>
+  </p:cSld>
+  <p:clrMapOvr>
+    <a:masterClrMapping/>
+  </p:clrMapOvr>
+</p:sld>
+</file>
+
+<file path=ppt/slides/slide7.xml><?xml version="1.0" encoding="utf-8"?>
 <p:sld xmlns:a="http://schemas.openxmlformats.org/drawingml/2006/main" xmlns:r="http://schemas.openxmlformats.org/officeDocument/2006/relationships" xmlns:p="http://schemas.openxmlformats.org/presentationml/2006/main">
   <p:cSld>
     <p:spTree>

</xml_diff>

<commit_message>
Finished the mu-RTU design section of the read me file.
</commit_message>
<xml_diff>
--- a/designDoc/designDoc.pptx
+++ b/designDoc/designDoc.pptx
@@ -5,7 +5,7 @@
     <p:sldMasterId id="2147483648" r:id="rId1"/>
   </p:sldMasterIdLst>
   <p:notesMasterIdLst>
-    <p:notesMasterId r:id="rId9"/>
+    <p:notesMasterId r:id="rId11"/>
   </p:notesMasterIdLst>
   <p:sldIdLst>
     <p:sldId id="256" r:id="rId2"/>
@@ -15,6 +15,8 @@
     <p:sldId id="260" r:id="rId6"/>
     <p:sldId id="262" r:id="rId7"/>
     <p:sldId id="261" r:id="rId8"/>
+    <p:sldId id="263" r:id="rId9"/>
+    <p:sldId id="264" r:id="rId10"/>
   </p:sldIdLst>
   <p:sldSz cx="12192000" cy="6858000"/>
   <p:notesSz cx="6858000" cy="9144000"/>
@@ -203,7 +205,7 @@
           <a:p>
             <a:fld id="{60A58DA9-13FF-4A44-80CD-EC4A25FA80B4}" type="datetimeFigureOut">
               <a:rPr lang="en-SG" smtClean="0"/>
-              <a:t>12/10/2024</a:t>
+              <a:t>13/10/2024</a:t>
             </a:fld>
             <a:endParaRPr lang="en-SG"/>
           </a:p>
@@ -639,6 +641,90 @@
 </p:notes>
 </file>
 
+<file path=ppt/notesSlides/notesSlide3.xml><?xml version="1.0" encoding="utf-8"?>
+<p:notes xmlns:a="http://schemas.openxmlformats.org/drawingml/2006/main" xmlns:r="http://schemas.openxmlformats.org/officeDocument/2006/relationships" xmlns:p="http://schemas.openxmlformats.org/presentationml/2006/main">
+  <p:cSld>
+    <p:spTree>
+      <p:nvGrpSpPr>
+        <p:cNvPr id="1" name=""/>
+        <p:cNvGrpSpPr/>
+        <p:nvPr/>
+      </p:nvGrpSpPr>
+      <p:grpSpPr>
+        <a:xfrm>
+          <a:off x="0" y="0"/>
+          <a:ext cx="0" cy="0"/>
+          <a:chOff x="0" y="0"/>
+          <a:chExt cx="0" cy="0"/>
+        </a:xfrm>
+      </p:grpSpPr>
+      <p:sp>
+        <p:nvSpPr>
+          <p:cNvPr id="2" name="Slide Image Placeholder 1"/>
+          <p:cNvSpPr>
+            <a:spLocks noGrp="1" noRot="1" noChangeAspect="1"/>
+          </p:cNvSpPr>
+          <p:nvPr>
+            <p:ph type="sldImg"/>
+          </p:nvPr>
+        </p:nvSpPr>
+        <p:spPr/>
+      </p:sp>
+      <p:sp>
+        <p:nvSpPr>
+          <p:cNvPr id="3" name="Notes Placeholder 2"/>
+          <p:cNvSpPr>
+            <a:spLocks noGrp="1"/>
+          </p:cNvSpPr>
+          <p:nvPr>
+            <p:ph type="body" idx="1"/>
+          </p:nvPr>
+        </p:nvSpPr>
+        <p:spPr/>
+        <p:txBody>
+          <a:bodyPr/>
+          <a:lstStyle/>
+          <a:p>
+            <a:endParaRPr lang="en-SG" dirty="0"/>
+          </a:p>
+        </p:txBody>
+      </p:sp>
+      <p:sp>
+        <p:nvSpPr>
+          <p:cNvPr id="4" name="Slide Number Placeholder 3"/>
+          <p:cNvSpPr>
+            <a:spLocks noGrp="1"/>
+          </p:cNvSpPr>
+          <p:nvPr>
+            <p:ph type="sldNum" sz="quarter" idx="5"/>
+          </p:nvPr>
+        </p:nvSpPr>
+        <p:spPr/>
+        <p:txBody>
+          <a:bodyPr/>
+          <a:lstStyle/>
+          <a:p>
+            <a:fld id="{2F8A4C87-30FF-4E0D-9FFA-CCB73B1DE919}" type="slidenum">
+              <a:rPr lang="en-SG" smtClean="0"/>
+              <a:t>8</a:t>
+            </a:fld>
+            <a:endParaRPr lang="en-SG"/>
+          </a:p>
+        </p:txBody>
+      </p:sp>
+    </p:spTree>
+    <p:extLst>
+      <p:ext uri="{BB962C8B-B14F-4D97-AF65-F5344CB8AC3E}">
+        <p14:creationId xmlns:p14="http://schemas.microsoft.com/office/powerpoint/2010/main" val="2609639645"/>
+      </p:ext>
+    </p:extLst>
+  </p:cSld>
+  <p:clrMapOvr>
+    <a:masterClrMapping/>
+  </p:clrMapOvr>
+</p:notes>
+</file>
+
 <file path=ppt/slideLayouts/slideLayout1.xml><?xml version="1.0" encoding="utf-8"?>
 <p:sldLayout xmlns:a="http://schemas.openxmlformats.org/drawingml/2006/main" xmlns:r="http://schemas.openxmlformats.org/officeDocument/2006/relationships" xmlns:p="http://schemas.openxmlformats.org/presentationml/2006/main" type="title" preserve="1">
   <p:cSld name="Title Slide">
@@ -788,7 +874,7 @@
           <a:p>
             <a:fld id="{DAB0784D-3A10-485A-BA3A-AF2134252110}" type="datetimeFigureOut">
               <a:rPr lang="en-SG" smtClean="0"/>
-              <a:t>12/10/2024</a:t>
+              <a:t>13/10/2024</a:t>
             </a:fld>
             <a:endParaRPr lang="en-SG"/>
           </a:p>
@@ -988,7 +1074,7 @@
           <a:p>
             <a:fld id="{DAB0784D-3A10-485A-BA3A-AF2134252110}" type="datetimeFigureOut">
               <a:rPr lang="en-SG" smtClean="0"/>
-              <a:t>12/10/2024</a:t>
+              <a:t>13/10/2024</a:t>
             </a:fld>
             <a:endParaRPr lang="en-SG"/>
           </a:p>
@@ -1198,7 +1284,7 @@
           <a:p>
             <a:fld id="{DAB0784D-3A10-485A-BA3A-AF2134252110}" type="datetimeFigureOut">
               <a:rPr lang="en-SG" smtClean="0"/>
-              <a:t>12/10/2024</a:t>
+              <a:t>13/10/2024</a:t>
             </a:fld>
             <a:endParaRPr lang="en-SG"/>
           </a:p>
@@ -1398,7 +1484,7 @@
           <a:p>
             <a:fld id="{DAB0784D-3A10-485A-BA3A-AF2134252110}" type="datetimeFigureOut">
               <a:rPr lang="en-SG" smtClean="0"/>
-              <a:t>12/10/2024</a:t>
+              <a:t>13/10/2024</a:t>
             </a:fld>
             <a:endParaRPr lang="en-SG"/>
           </a:p>
@@ -1674,7 +1760,7 @@
           <a:p>
             <a:fld id="{DAB0784D-3A10-485A-BA3A-AF2134252110}" type="datetimeFigureOut">
               <a:rPr lang="en-SG" smtClean="0"/>
-              <a:t>12/10/2024</a:t>
+              <a:t>13/10/2024</a:t>
             </a:fld>
             <a:endParaRPr lang="en-SG"/>
           </a:p>
@@ -1942,7 +2028,7 @@
           <a:p>
             <a:fld id="{DAB0784D-3A10-485A-BA3A-AF2134252110}" type="datetimeFigureOut">
               <a:rPr lang="en-SG" smtClean="0"/>
-              <a:t>12/10/2024</a:t>
+              <a:t>13/10/2024</a:t>
             </a:fld>
             <a:endParaRPr lang="en-SG"/>
           </a:p>
@@ -2357,7 +2443,7 @@
           <a:p>
             <a:fld id="{DAB0784D-3A10-485A-BA3A-AF2134252110}" type="datetimeFigureOut">
               <a:rPr lang="en-SG" smtClean="0"/>
-              <a:t>12/10/2024</a:t>
+              <a:t>13/10/2024</a:t>
             </a:fld>
             <a:endParaRPr lang="en-SG"/>
           </a:p>
@@ -2499,7 +2585,7 @@
           <a:p>
             <a:fld id="{DAB0784D-3A10-485A-BA3A-AF2134252110}" type="datetimeFigureOut">
               <a:rPr lang="en-SG" smtClean="0"/>
-              <a:t>12/10/2024</a:t>
+              <a:t>13/10/2024</a:t>
             </a:fld>
             <a:endParaRPr lang="en-SG"/>
           </a:p>
@@ -2612,7 +2698,7 @@
           <a:p>
             <a:fld id="{DAB0784D-3A10-485A-BA3A-AF2134252110}" type="datetimeFigureOut">
               <a:rPr lang="en-SG" smtClean="0"/>
-              <a:t>12/10/2024</a:t>
+              <a:t>13/10/2024</a:t>
             </a:fld>
             <a:endParaRPr lang="en-SG"/>
           </a:p>
@@ -2925,7 +3011,7 @@
           <a:p>
             <a:fld id="{DAB0784D-3A10-485A-BA3A-AF2134252110}" type="datetimeFigureOut">
               <a:rPr lang="en-SG" smtClean="0"/>
-              <a:t>12/10/2024</a:t>
+              <a:t>13/10/2024</a:t>
             </a:fld>
             <a:endParaRPr lang="en-SG"/>
           </a:p>
@@ -3214,7 +3300,7 @@
           <a:p>
             <a:fld id="{DAB0784D-3A10-485A-BA3A-AF2134252110}" type="datetimeFigureOut">
               <a:rPr lang="en-SG" smtClean="0"/>
-              <a:t>12/10/2024</a:t>
+              <a:t>13/10/2024</a:t>
             </a:fld>
             <a:endParaRPr lang="en-SG"/>
           </a:p>
@@ -3457,7 +3543,7 @@
           <a:p>
             <a:fld id="{DAB0784D-3A10-485A-BA3A-AF2134252110}" type="datetimeFigureOut">
               <a:rPr lang="en-SG" smtClean="0"/>
-              <a:t>12/10/2024</a:t>
+              <a:t>13/10/2024</a:t>
             </a:fld>
             <a:endParaRPr lang="en-SG"/>
           </a:p>
@@ -28678,6 +28764,1341 @@
     <p:extLst>
       <p:ext uri="{BB962C8B-B14F-4D97-AF65-F5344CB8AC3E}">
         <p14:creationId xmlns:p14="http://schemas.microsoft.com/office/powerpoint/2010/main" val="3956027493"/>
+      </p:ext>
+    </p:extLst>
+  </p:cSld>
+  <p:clrMapOvr>
+    <a:masterClrMapping/>
+  </p:clrMapOvr>
+</p:sld>
+</file>
+
+<file path=ppt/slides/slide8.xml><?xml version="1.0" encoding="utf-8"?>
+<p:sld xmlns:a="http://schemas.openxmlformats.org/drawingml/2006/main" xmlns:r="http://schemas.openxmlformats.org/officeDocument/2006/relationships" xmlns:p="http://schemas.openxmlformats.org/presentationml/2006/main">
+  <p:cSld>
+    <p:spTree>
+      <p:nvGrpSpPr>
+        <p:cNvPr id="1" name=""/>
+        <p:cNvGrpSpPr/>
+        <p:nvPr/>
+      </p:nvGrpSpPr>
+      <p:grpSpPr>
+        <a:xfrm>
+          <a:off x="0" y="0"/>
+          <a:ext cx="0" cy="0"/>
+          <a:chOff x="0" y="0"/>
+          <a:chExt cx="0" cy="0"/>
+        </a:xfrm>
+      </p:grpSpPr>
+      <p:pic>
+        <p:nvPicPr>
+          <p:cNvPr id="5" name="Picture 4" descr="A diagram of a computer server&#10;&#10;Description automatically generated">
+            <a:extLst>
+              <a:ext uri="{FF2B5EF4-FFF2-40B4-BE49-F238E27FC236}">
+                <a16:creationId xmlns:a16="http://schemas.microsoft.com/office/drawing/2014/main" id="{1B8EC2D4-0D3E-81A3-128B-49A6DCAD7C39}"/>
+              </a:ext>
+            </a:extLst>
+          </p:cNvPr>
+          <p:cNvPicPr>
+            <a:picLocks noChangeAspect="1"/>
+          </p:cNvPicPr>
+          <p:nvPr/>
+        </p:nvPicPr>
+        <p:blipFill>
+          <a:blip r:embed="rId3">
+            <a:extLst>
+              <a:ext uri="{28A0092B-C50C-407E-A947-70E740481C1C}">
+                <a14:useLocalDpi xmlns:a14="http://schemas.microsoft.com/office/drawing/2010/main" val="0"/>
+              </a:ext>
+            </a:extLst>
+          </a:blip>
+          <a:srcRect l="10355" t="4040" r="14772" b="5500"/>
+          <a:stretch/>
+        </p:blipFill>
+        <p:spPr>
+          <a:xfrm>
+            <a:off x="349954" y="496711"/>
+            <a:ext cx="6694312" cy="4549422"/>
+          </a:xfrm>
+          <a:prstGeom prst="rect">
+            <a:avLst/>
+          </a:prstGeom>
+        </p:spPr>
+      </p:pic>
+      <p:pic>
+        <p:nvPicPr>
+          <p:cNvPr id="7" name="Picture 6" descr="A diagram of a computer&#10;&#10;Description automatically generated">
+            <a:extLst>
+              <a:ext uri="{FF2B5EF4-FFF2-40B4-BE49-F238E27FC236}">
+                <a16:creationId xmlns:a16="http://schemas.microsoft.com/office/drawing/2014/main" id="{363851A7-7D25-858A-6416-376727D7B8A3}"/>
+              </a:ext>
+            </a:extLst>
+          </p:cNvPr>
+          <p:cNvPicPr>
+            <a:picLocks noChangeAspect="1"/>
+          </p:cNvPicPr>
+          <p:nvPr/>
+        </p:nvPicPr>
+        <p:blipFill>
+          <a:blip r:embed="rId4">
+            <a:extLst>
+              <a:ext uri="{28A0092B-C50C-407E-A947-70E740481C1C}">
+                <a14:useLocalDpi xmlns:a14="http://schemas.microsoft.com/office/drawing/2010/main" val="0"/>
+              </a:ext>
+            </a:extLst>
+          </a:blip>
+          <a:stretch>
+            <a:fillRect/>
+          </a:stretch>
+        </p:blipFill>
+        <p:spPr>
+          <a:xfrm>
+            <a:off x="6188691" y="2850146"/>
+            <a:ext cx="5537294" cy="2231345"/>
+          </a:xfrm>
+          <a:prstGeom prst="rect">
+            <a:avLst/>
+          </a:prstGeom>
+        </p:spPr>
+      </p:pic>
+      <p:sp>
+        <p:nvSpPr>
+          <p:cNvPr id="8" name="Rectangle 7">
+            <a:extLst>
+              <a:ext uri="{FF2B5EF4-FFF2-40B4-BE49-F238E27FC236}">
+                <a16:creationId xmlns:a16="http://schemas.microsoft.com/office/drawing/2014/main" id="{AAA24A25-04C1-5578-EC9A-7668E568064F}"/>
+              </a:ext>
+            </a:extLst>
+          </p:cNvPr>
+          <p:cNvSpPr/>
+          <p:nvPr/>
+        </p:nvSpPr>
+        <p:spPr>
+          <a:xfrm>
+            <a:off x="541867" y="2024009"/>
+            <a:ext cx="5125155" cy="3101147"/>
+          </a:xfrm>
+          <a:prstGeom prst="rect">
+            <a:avLst/>
+          </a:prstGeom>
+          <a:noFill/>
+          <a:ln>
+            <a:solidFill>
+              <a:schemeClr val="accent4">
+                <a:lumMod val="50000"/>
+              </a:schemeClr>
+            </a:solidFill>
+            <a:prstDash val="sysDash"/>
+          </a:ln>
+        </p:spPr>
+        <p:style>
+          <a:lnRef idx="2">
+            <a:schemeClr val="accent1">
+              <a:shade val="15000"/>
+            </a:schemeClr>
+          </a:lnRef>
+          <a:fillRef idx="1">
+            <a:schemeClr val="accent1"/>
+          </a:fillRef>
+          <a:effectRef idx="0">
+            <a:schemeClr val="accent1"/>
+          </a:effectRef>
+          <a:fontRef idx="minor">
+            <a:schemeClr val="lt1"/>
+          </a:fontRef>
+        </p:style>
+        <p:txBody>
+          <a:bodyPr rtlCol="0" anchor="ctr"/>
+          <a:lstStyle/>
+          <a:p>
+            <a:pPr algn="ctr"/>
+            <a:endParaRPr lang="en-SG" dirty="0"/>
+          </a:p>
+        </p:txBody>
+      </p:sp>
+      <p:sp>
+        <p:nvSpPr>
+          <p:cNvPr id="9" name="Arrow: Right 8">
+            <a:extLst>
+              <a:ext uri="{FF2B5EF4-FFF2-40B4-BE49-F238E27FC236}">
+                <a16:creationId xmlns:a16="http://schemas.microsoft.com/office/drawing/2014/main" id="{FB3DFE57-6593-90F1-B122-B46922F9419C}"/>
+              </a:ext>
+            </a:extLst>
+          </p:cNvPr>
+          <p:cNvSpPr/>
+          <p:nvPr/>
+        </p:nvSpPr>
+        <p:spPr>
+          <a:xfrm>
+            <a:off x="5455578" y="3739793"/>
+            <a:ext cx="821932" cy="308225"/>
+          </a:xfrm>
+          <a:prstGeom prst="rightArrow">
+            <a:avLst/>
+          </a:prstGeom>
+        </p:spPr>
+        <p:style>
+          <a:lnRef idx="2">
+            <a:schemeClr val="accent1">
+              <a:shade val="15000"/>
+            </a:schemeClr>
+          </a:lnRef>
+          <a:fillRef idx="1">
+            <a:schemeClr val="accent1"/>
+          </a:fillRef>
+          <a:effectRef idx="0">
+            <a:schemeClr val="accent1"/>
+          </a:effectRef>
+          <a:fontRef idx="minor">
+            <a:schemeClr val="lt1"/>
+          </a:fontRef>
+        </p:style>
+        <p:txBody>
+          <a:bodyPr rtlCol="0" anchor="ctr"/>
+          <a:lstStyle/>
+          <a:p>
+            <a:pPr algn="ctr"/>
+            <a:endParaRPr lang="en-SG"/>
+          </a:p>
+        </p:txBody>
+      </p:sp>
+      <p:sp>
+        <p:nvSpPr>
+          <p:cNvPr id="10" name="TextBox 9">
+            <a:extLst>
+              <a:ext uri="{FF2B5EF4-FFF2-40B4-BE49-F238E27FC236}">
+                <a16:creationId xmlns:a16="http://schemas.microsoft.com/office/drawing/2014/main" id="{98325CB0-2584-7696-BD93-2C37D4D17EAB}"/>
+              </a:ext>
+            </a:extLst>
+          </p:cNvPr>
+          <p:cNvSpPr txBox="1"/>
+          <p:nvPr/>
+        </p:nvSpPr>
+        <p:spPr>
+          <a:xfrm>
+            <a:off x="6524980" y="642377"/>
+            <a:ext cx="4358606" cy="2062103"/>
+          </a:xfrm>
+          <a:prstGeom prst="rect">
+            <a:avLst/>
+          </a:prstGeom>
+          <a:noFill/>
+        </p:spPr>
+        <p:txBody>
+          <a:bodyPr wrap="square" rtlCol="0">
+            <a:spAutoFit/>
+          </a:bodyPr>
+          <a:lstStyle/>
+          <a:p>
+            <a:r>
+              <a:rPr lang="en-US" sz="1600" b="1" dirty="0"/>
+              <a:t>Simulate the </a:t>
+            </a:r>
+          </a:p>
+          <a:p>
+            <a:endParaRPr lang="en-US" sz="1600" b="1" dirty="0"/>
+          </a:p>
+          <a:p>
+            <a:r>
+              <a:rPr lang="en-US" sz="1600" b="1" dirty="0">
+                <a:solidFill>
+                  <a:srgbClr val="0070C0"/>
+                </a:solidFill>
+              </a:rPr>
+              <a:t>MU </a:t>
+            </a:r>
+            <a:r>
+              <a:rPr lang="en-US" sz="1600" b="1" dirty="0">
+                <a:solidFill>
+                  <a:srgbClr val="0070C0"/>
+                </a:solidFill>
+                <a:sym typeface="Wingdings" panose="05000000000000000000" pitchFamily="2" charset="2"/>
+              </a:rPr>
+              <a:t> IED &lt;=  MMS =&gt; RTU &lt;= MMS =&gt; SCADA</a:t>
+            </a:r>
+          </a:p>
+          <a:p>
+            <a:endParaRPr lang="en-US" sz="1600" b="1" dirty="0">
+              <a:sym typeface="Wingdings" panose="05000000000000000000" pitchFamily="2" charset="2"/>
+            </a:endParaRPr>
+          </a:p>
+          <a:p>
+            <a:r>
+              <a:rPr lang="en-US" sz="1600" b="1" dirty="0">
+                <a:sym typeface="Wingdings" panose="05000000000000000000" pitchFamily="2" charset="2"/>
+              </a:rPr>
+              <a:t>With </a:t>
+            </a:r>
+          </a:p>
+          <a:p>
+            <a:endParaRPr lang="en-US" sz="1600" b="1" dirty="0">
+              <a:sym typeface="Wingdings" panose="05000000000000000000" pitchFamily="2" charset="2"/>
+            </a:endParaRPr>
+          </a:p>
+          <a:p>
+            <a:r>
+              <a:rPr lang="en-US" sz="1600" b="1" dirty="0">
+                <a:solidFill>
+                  <a:schemeClr val="accent6">
+                    <a:lumMod val="75000"/>
+                  </a:schemeClr>
+                </a:solidFill>
+                <a:sym typeface="Wingdings" panose="05000000000000000000" pitchFamily="2" charset="2"/>
+              </a:rPr>
+              <a:t>MU  PLC &lt;= S7Comm =&gt; HD676220-AD Converter  SCADA</a:t>
+            </a:r>
+            <a:endParaRPr lang="en-SG" sz="1600" b="1" dirty="0">
+              <a:solidFill>
+                <a:schemeClr val="accent6">
+                  <a:lumMod val="75000"/>
+                </a:schemeClr>
+              </a:solidFill>
+            </a:endParaRPr>
+          </a:p>
+        </p:txBody>
+      </p:sp>
+    </p:spTree>
+    <p:extLst>
+      <p:ext uri="{BB962C8B-B14F-4D97-AF65-F5344CB8AC3E}">
+        <p14:creationId xmlns:p14="http://schemas.microsoft.com/office/powerpoint/2010/main" val="190804645"/>
+      </p:ext>
+    </p:extLst>
+  </p:cSld>
+  <p:clrMapOvr>
+    <a:masterClrMapping/>
+  </p:clrMapOvr>
+</p:sld>
+</file>
+
+<file path=ppt/slides/slide9.xml><?xml version="1.0" encoding="utf-8"?>
+<p:sld xmlns:a="http://schemas.openxmlformats.org/drawingml/2006/main" xmlns:r="http://schemas.openxmlformats.org/officeDocument/2006/relationships" xmlns:p="http://schemas.openxmlformats.org/presentationml/2006/main">
+  <p:cSld>
+    <p:spTree>
+      <p:nvGrpSpPr>
+        <p:cNvPr id="1" name=""/>
+        <p:cNvGrpSpPr/>
+        <p:nvPr/>
+      </p:nvGrpSpPr>
+      <p:grpSpPr>
+        <a:xfrm>
+          <a:off x="0" y="0"/>
+          <a:ext cx="0" cy="0"/>
+          <a:chOff x="0" y="0"/>
+          <a:chExt cx="0" cy="0"/>
+        </a:xfrm>
+      </p:grpSpPr>
+      <p:pic>
+        <p:nvPicPr>
+          <p:cNvPr id="12" name="Picture 11">
+            <a:extLst>
+              <a:ext uri="{FF2B5EF4-FFF2-40B4-BE49-F238E27FC236}">
+                <a16:creationId xmlns:a16="http://schemas.microsoft.com/office/drawing/2014/main" id="{2B7140F6-787C-55D2-365C-C3D0C71CDB9E}"/>
+              </a:ext>
+            </a:extLst>
+          </p:cNvPr>
+          <p:cNvPicPr>
+            <a:picLocks noChangeAspect="1"/>
+          </p:cNvPicPr>
+          <p:nvPr/>
+        </p:nvPicPr>
+        <p:blipFill>
+          <a:blip r:embed="rId2"/>
+          <a:stretch>
+            <a:fillRect/>
+          </a:stretch>
+        </p:blipFill>
+        <p:spPr>
+          <a:xfrm>
+            <a:off x="845781" y="1286201"/>
+            <a:ext cx="2619048" cy="3504762"/>
+          </a:xfrm>
+          <a:prstGeom prst="rect">
+            <a:avLst/>
+          </a:prstGeom>
+        </p:spPr>
+      </p:pic>
+      <p:pic>
+        <p:nvPicPr>
+          <p:cNvPr id="6" name="Picture 5">
+            <a:extLst>
+              <a:ext uri="{FF2B5EF4-FFF2-40B4-BE49-F238E27FC236}">
+                <a16:creationId xmlns:a16="http://schemas.microsoft.com/office/drawing/2014/main" id="{EBE51B74-57B1-669A-AA41-3C839BBF9DB4}"/>
+              </a:ext>
+            </a:extLst>
+          </p:cNvPr>
+          <p:cNvPicPr>
+            <a:picLocks noChangeAspect="1"/>
+          </p:cNvPicPr>
+          <p:nvPr/>
+        </p:nvPicPr>
+        <p:blipFill>
+          <a:blip r:embed="rId3"/>
+          <a:stretch>
+            <a:fillRect/>
+          </a:stretch>
+        </p:blipFill>
+        <p:spPr>
+          <a:xfrm>
+            <a:off x="3821987" y="2696188"/>
+            <a:ext cx="485714" cy="466667"/>
+          </a:xfrm>
+          <a:prstGeom prst="rect">
+            <a:avLst/>
+          </a:prstGeom>
+        </p:spPr>
+      </p:pic>
+      <p:sp>
+        <p:nvSpPr>
+          <p:cNvPr id="7" name="TextBox 6">
+            <a:extLst>
+              <a:ext uri="{FF2B5EF4-FFF2-40B4-BE49-F238E27FC236}">
+                <a16:creationId xmlns:a16="http://schemas.microsoft.com/office/drawing/2014/main" id="{FC2B8337-BD0F-A008-CC3E-0B95C19475D0}"/>
+              </a:ext>
+            </a:extLst>
+          </p:cNvPr>
+          <p:cNvSpPr txBox="1"/>
+          <p:nvPr/>
+        </p:nvSpPr>
+        <p:spPr>
+          <a:xfrm>
+            <a:off x="3670141" y="2475939"/>
+            <a:ext cx="1246534" cy="261610"/>
+          </a:xfrm>
+          <a:prstGeom prst="rect">
+            <a:avLst/>
+          </a:prstGeom>
+          <a:noFill/>
+        </p:spPr>
+        <p:txBody>
+          <a:bodyPr wrap="square">
+            <a:spAutoFit/>
+          </a:bodyPr>
+          <a:lstStyle/>
+          <a:p>
+            <a:r>
+              <a:rPr lang="en-SG" sz="1100" b="1" dirty="0"/>
+              <a:t>Solar farm MU</a:t>
+            </a:r>
+          </a:p>
+        </p:txBody>
+      </p:sp>
+      <p:cxnSp>
+        <p:nvCxnSpPr>
+          <p:cNvPr id="9" name="Straight Connector 8">
+            <a:extLst>
+              <a:ext uri="{FF2B5EF4-FFF2-40B4-BE49-F238E27FC236}">
+                <a16:creationId xmlns:a16="http://schemas.microsoft.com/office/drawing/2014/main" id="{1DA65730-DA85-82E1-6727-5C9D802A6292}"/>
+              </a:ext>
+            </a:extLst>
+          </p:cNvPr>
+          <p:cNvCxnSpPr>
+            <a:cxnSpLocks/>
+            <a:endCxn id="6" idx="1"/>
+          </p:cNvCxnSpPr>
+          <p:nvPr/>
+        </p:nvCxnSpPr>
+        <p:spPr>
+          <a:xfrm>
+            <a:off x="2784297" y="2929522"/>
+            <a:ext cx="1037690" cy="0"/>
+          </a:xfrm>
+          <a:prstGeom prst="line">
+            <a:avLst/>
+          </a:prstGeom>
+          <a:ln>
+            <a:solidFill>
+              <a:srgbClr val="C00000"/>
+            </a:solidFill>
+            <a:prstDash val="sysDash"/>
+          </a:ln>
+        </p:spPr>
+        <p:style>
+          <a:lnRef idx="2">
+            <a:schemeClr val="accent1"/>
+          </a:lnRef>
+          <a:fillRef idx="0">
+            <a:schemeClr val="accent1"/>
+          </a:fillRef>
+          <a:effectRef idx="1">
+            <a:schemeClr val="accent1"/>
+          </a:effectRef>
+          <a:fontRef idx="minor">
+            <a:schemeClr val="tx1"/>
+          </a:fontRef>
+        </p:style>
+      </p:cxnSp>
+      <p:cxnSp>
+        <p:nvCxnSpPr>
+          <p:cNvPr id="14" name="Straight Connector 13">
+            <a:extLst>
+              <a:ext uri="{FF2B5EF4-FFF2-40B4-BE49-F238E27FC236}">
+                <a16:creationId xmlns:a16="http://schemas.microsoft.com/office/drawing/2014/main" id="{34F52C5C-80E2-CBA2-378A-A69C2DF93657}"/>
+              </a:ext>
+            </a:extLst>
+          </p:cNvPr>
+          <p:cNvCxnSpPr>
+            <a:cxnSpLocks/>
+          </p:cNvCxnSpPr>
+          <p:nvPr/>
+        </p:nvCxnSpPr>
+        <p:spPr>
+          <a:xfrm>
+            <a:off x="1700243" y="3994282"/>
+            <a:ext cx="2121744" cy="0"/>
+          </a:xfrm>
+          <a:prstGeom prst="line">
+            <a:avLst/>
+          </a:prstGeom>
+          <a:ln>
+            <a:solidFill>
+              <a:srgbClr val="C00000"/>
+            </a:solidFill>
+            <a:prstDash val="sysDash"/>
+          </a:ln>
+        </p:spPr>
+        <p:style>
+          <a:lnRef idx="2">
+            <a:schemeClr val="accent1"/>
+          </a:lnRef>
+          <a:fillRef idx="0">
+            <a:schemeClr val="accent1"/>
+          </a:fillRef>
+          <a:effectRef idx="1">
+            <a:schemeClr val="accent1"/>
+          </a:effectRef>
+          <a:fontRef idx="minor">
+            <a:schemeClr val="tx1"/>
+          </a:fontRef>
+        </p:style>
+      </p:cxnSp>
+      <p:pic>
+        <p:nvPicPr>
+          <p:cNvPr id="16" name="Picture 15">
+            <a:extLst>
+              <a:ext uri="{FF2B5EF4-FFF2-40B4-BE49-F238E27FC236}">
+                <a16:creationId xmlns:a16="http://schemas.microsoft.com/office/drawing/2014/main" id="{D3F284DA-910F-F839-17C2-19B27B353084}"/>
+              </a:ext>
+            </a:extLst>
+          </p:cNvPr>
+          <p:cNvPicPr>
+            <a:picLocks noChangeAspect="1"/>
+          </p:cNvPicPr>
+          <p:nvPr/>
+        </p:nvPicPr>
+        <p:blipFill>
+          <a:blip r:embed="rId3"/>
+          <a:stretch>
+            <a:fillRect/>
+          </a:stretch>
+        </p:blipFill>
+        <p:spPr>
+          <a:xfrm>
+            <a:off x="3791134" y="3695145"/>
+            <a:ext cx="485714" cy="466667"/>
+          </a:xfrm>
+          <a:prstGeom prst="rect">
+            <a:avLst/>
+          </a:prstGeom>
+        </p:spPr>
+      </p:pic>
+      <p:pic>
+        <p:nvPicPr>
+          <p:cNvPr id="18" name="Picture 17">
+            <a:extLst>
+              <a:ext uri="{FF2B5EF4-FFF2-40B4-BE49-F238E27FC236}">
+                <a16:creationId xmlns:a16="http://schemas.microsoft.com/office/drawing/2014/main" id="{BC5E373F-BF0F-9416-40DB-B9837BD8CF32}"/>
+              </a:ext>
+            </a:extLst>
+          </p:cNvPr>
+          <p:cNvPicPr>
+            <a:picLocks noChangeAspect="1"/>
+          </p:cNvPicPr>
+          <p:nvPr/>
+        </p:nvPicPr>
+        <p:blipFill>
+          <a:blip r:embed="rId3"/>
+          <a:stretch>
+            <a:fillRect/>
+          </a:stretch>
+        </p:blipFill>
+        <p:spPr>
+          <a:xfrm>
+            <a:off x="3791134" y="4329341"/>
+            <a:ext cx="485714" cy="466667"/>
+          </a:xfrm>
+          <a:prstGeom prst="rect">
+            <a:avLst/>
+          </a:prstGeom>
+        </p:spPr>
+      </p:pic>
+      <p:sp>
+        <p:nvSpPr>
+          <p:cNvPr id="19" name="TextBox 18">
+            <a:extLst>
+              <a:ext uri="{FF2B5EF4-FFF2-40B4-BE49-F238E27FC236}">
+                <a16:creationId xmlns:a16="http://schemas.microsoft.com/office/drawing/2014/main" id="{DA8FBCA6-B826-133E-20F4-7412A1C82088}"/>
+              </a:ext>
+            </a:extLst>
+          </p:cNvPr>
+          <p:cNvSpPr txBox="1"/>
+          <p:nvPr/>
+        </p:nvSpPr>
+        <p:spPr>
+          <a:xfrm>
+            <a:off x="3709333" y="3325945"/>
+            <a:ext cx="917598" cy="430887"/>
+          </a:xfrm>
+          <a:prstGeom prst="rect">
+            <a:avLst/>
+          </a:prstGeom>
+          <a:noFill/>
+        </p:spPr>
+        <p:txBody>
+          <a:bodyPr wrap="square">
+            <a:spAutoFit/>
+          </a:bodyPr>
+          <a:lstStyle/>
+          <a:p>
+            <a:r>
+              <a:rPr lang="en-SG" sz="1100" b="1" dirty="0"/>
+              <a:t>Solar storage MU</a:t>
+            </a:r>
+          </a:p>
+        </p:txBody>
+      </p:sp>
+      <p:cxnSp>
+        <p:nvCxnSpPr>
+          <p:cNvPr id="20" name="Straight Connector 19">
+            <a:extLst>
+              <a:ext uri="{FF2B5EF4-FFF2-40B4-BE49-F238E27FC236}">
+                <a16:creationId xmlns:a16="http://schemas.microsoft.com/office/drawing/2014/main" id="{A3BBCD53-9E94-DA95-60B9-C307D2A37C79}"/>
+              </a:ext>
+            </a:extLst>
+          </p:cNvPr>
+          <p:cNvCxnSpPr>
+            <a:cxnSpLocks/>
+            <a:endCxn id="18" idx="1"/>
+          </p:cNvCxnSpPr>
+          <p:nvPr/>
+        </p:nvCxnSpPr>
+        <p:spPr>
+          <a:xfrm>
+            <a:off x="2242270" y="4562674"/>
+            <a:ext cx="1548864" cy="1"/>
+          </a:xfrm>
+          <a:prstGeom prst="line">
+            <a:avLst/>
+          </a:prstGeom>
+          <a:ln>
+            <a:solidFill>
+              <a:srgbClr val="C00000"/>
+            </a:solidFill>
+            <a:prstDash val="sysDash"/>
+          </a:ln>
+        </p:spPr>
+        <p:style>
+          <a:lnRef idx="2">
+            <a:schemeClr val="accent1"/>
+          </a:lnRef>
+          <a:fillRef idx="0">
+            <a:schemeClr val="accent1"/>
+          </a:fillRef>
+          <a:effectRef idx="1">
+            <a:schemeClr val="accent1"/>
+          </a:effectRef>
+          <a:fontRef idx="minor">
+            <a:schemeClr val="tx1"/>
+          </a:fontRef>
+        </p:style>
+      </p:cxnSp>
+      <p:sp>
+        <p:nvSpPr>
+          <p:cNvPr id="22" name="TextBox 21">
+            <a:extLst>
+              <a:ext uri="{FF2B5EF4-FFF2-40B4-BE49-F238E27FC236}">
+                <a16:creationId xmlns:a16="http://schemas.microsoft.com/office/drawing/2014/main" id="{5B801450-A1B9-D162-16A8-2340DB72D24F}"/>
+              </a:ext>
+            </a:extLst>
+          </p:cNvPr>
+          <p:cNvSpPr txBox="1"/>
+          <p:nvPr/>
+        </p:nvSpPr>
+        <p:spPr>
+          <a:xfrm>
+            <a:off x="3574318" y="4133535"/>
+            <a:ext cx="1537501" cy="261610"/>
+          </a:xfrm>
+          <a:prstGeom prst="rect">
+            <a:avLst/>
+          </a:prstGeom>
+          <a:noFill/>
+        </p:spPr>
+        <p:txBody>
+          <a:bodyPr wrap="square">
+            <a:spAutoFit/>
+          </a:bodyPr>
+          <a:lstStyle/>
+          <a:p>
+            <a:r>
+              <a:rPr lang="en-SG" sz="1100" b="1" dirty="0"/>
+              <a:t>Transformer-01-MU</a:t>
+            </a:r>
+          </a:p>
+        </p:txBody>
+      </p:sp>
+      <p:cxnSp>
+        <p:nvCxnSpPr>
+          <p:cNvPr id="24" name="Connector: Elbow 23">
+            <a:extLst>
+              <a:ext uri="{FF2B5EF4-FFF2-40B4-BE49-F238E27FC236}">
+                <a16:creationId xmlns:a16="http://schemas.microsoft.com/office/drawing/2014/main" id="{CF4613A2-3F61-E8A9-025E-800FECB46958}"/>
+              </a:ext>
+            </a:extLst>
+          </p:cNvPr>
+          <p:cNvCxnSpPr>
+            <a:cxnSpLocks/>
+            <a:stCxn id="6" idx="3"/>
+          </p:cNvCxnSpPr>
+          <p:nvPr/>
+        </p:nvCxnSpPr>
+        <p:spPr>
+          <a:xfrm>
+            <a:off x="4307701" y="2929522"/>
+            <a:ext cx="531427" cy="699665"/>
+          </a:xfrm>
+          <a:prstGeom prst="bentConnector2">
+            <a:avLst/>
+          </a:prstGeom>
+        </p:spPr>
+        <p:style>
+          <a:lnRef idx="2">
+            <a:schemeClr val="accent1"/>
+          </a:lnRef>
+          <a:fillRef idx="0">
+            <a:schemeClr val="accent1"/>
+          </a:fillRef>
+          <a:effectRef idx="1">
+            <a:schemeClr val="accent1"/>
+          </a:effectRef>
+          <a:fontRef idx="minor">
+            <a:schemeClr val="tx1"/>
+          </a:fontRef>
+        </p:style>
+      </p:cxnSp>
+      <p:pic>
+        <p:nvPicPr>
+          <p:cNvPr id="26" name="Picture 25">
+            <a:extLst>
+              <a:ext uri="{FF2B5EF4-FFF2-40B4-BE49-F238E27FC236}">
+                <a16:creationId xmlns:a16="http://schemas.microsoft.com/office/drawing/2014/main" id="{F4791415-6A11-FABC-A480-5A8B5FFF3A41}"/>
+              </a:ext>
+            </a:extLst>
+          </p:cNvPr>
+          <p:cNvPicPr>
+            <a:picLocks noChangeAspect="1"/>
+          </p:cNvPicPr>
+          <p:nvPr/>
+        </p:nvPicPr>
+        <p:blipFill>
+          <a:blip r:embed="rId4"/>
+          <a:stretch>
+            <a:fillRect/>
+          </a:stretch>
+        </p:blipFill>
+        <p:spPr>
+          <a:xfrm>
+            <a:off x="4603153" y="3644352"/>
+            <a:ext cx="895236" cy="489183"/>
+          </a:xfrm>
+          <a:prstGeom prst="rect">
+            <a:avLst/>
+          </a:prstGeom>
+          <a:ln w="12700">
+            <a:solidFill>
+              <a:schemeClr val="tx1"/>
+            </a:solidFill>
+          </a:ln>
+        </p:spPr>
+      </p:pic>
+      <p:cxnSp>
+        <p:nvCxnSpPr>
+          <p:cNvPr id="29" name="Straight Connector 28">
+            <a:extLst>
+              <a:ext uri="{FF2B5EF4-FFF2-40B4-BE49-F238E27FC236}">
+                <a16:creationId xmlns:a16="http://schemas.microsoft.com/office/drawing/2014/main" id="{AEAFD911-0600-C185-E97E-CAE41C2951AF}"/>
+              </a:ext>
+            </a:extLst>
+          </p:cNvPr>
+          <p:cNvCxnSpPr>
+            <a:cxnSpLocks/>
+            <a:stCxn id="16" idx="3"/>
+            <a:endCxn id="26" idx="1"/>
+          </p:cNvCxnSpPr>
+          <p:nvPr/>
+        </p:nvCxnSpPr>
+        <p:spPr>
+          <a:xfrm flipV="1">
+            <a:off x="4276848" y="3888944"/>
+            <a:ext cx="326305" cy="0"/>
+          </a:xfrm>
+          <a:prstGeom prst="line">
+            <a:avLst/>
+          </a:prstGeom>
+        </p:spPr>
+        <p:style>
+          <a:lnRef idx="2">
+            <a:schemeClr val="accent1"/>
+          </a:lnRef>
+          <a:fillRef idx="0">
+            <a:schemeClr val="accent1"/>
+          </a:fillRef>
+          <a:effectRef idx="1">
+            <a:schemeClr val="accent1"/>
+          </a:effectRef>
+          <a:fontRef idx="minor">
+            <a:schemeClr val="tx1"/>
+          </a:fontRef>
+        </p:style>
+      </p:cxnSp>
+      <p:cxnSp>
+        <p:nvCxnSpPr>
+          <p:cNvPr id="31" name="Connector: Elbow 30">
+            <a:extLst>
+              <a:ext uri="{FF2B5EF4-FFF2-40B4-BE49-F238E27FC236}">
+                <a16:creationId xmlns:a16="http://schemas.microsoft.com/office/drawing/2014/main" id="{83CA1279-EDD7-B916-190D-2F7017EE6BD9}"/>
+              </a:ext>
+            </a:extLst>
+          </p:cNvPr>
+          <p:cNvCxnSpPr>
+            <a:cxnSpLocks/>
+            <a:endCxn id="26" idx="2"/>
+          </p:cNvCxnSpPr>
+          <p:nvPr/>
+        </p:nvCxnSpPr>
+        <p:spPr>
+          <a:xfrm flipV="1">
+            <a:off x="4174287" y="4133535"/>
+            <a:ext cx="876484" cy="429139"/>
+          </a:xfrm>
+          <a:prstGeom prst="bentConnector2">
+            <a:avLst/>
+          </a:prstGeom>
+        </p:spPr>
+        <p:style>
+          <a:lnRef idx="2">
+            <a:schemeClr val="accent1"/>
+          </a:lnRef>
+          <a:fillRef idx="0">
+            <a:schemeClr val="accent1"/>
+          </a:fillRef>
+          <a:effectRef idx="1">
+            <a:schemeClr val="accent1"/>
+          </a:effectRef>
+          <a:fontRef idx="minor">
+            <a:schemeClr val="tx1"/>
+          </a:fontRef>
+        </p:style>
+      </p:cxnSp>
+      <p:cxnSp>
+        <p:nvCxnSpPr>
+          <p:cNvPr id="35" name="Straight Connector 34">
+            <a:extLst>
+              <a:ext uri="{FF2B5EF4-FFF2-40B4-BE49-F238E27FC236}">
+                <a16:creationId xmlns:a16="http://schemas.microsoft.com/office/drawing/2014/main" id="{02087A92-238E-51D3-CDAE-6C5D1F227805}"/>
+              </a:ext>
+            </a:extLst>
+          </p:cNvPr>
+          <p:cNvCxnSpPr>
+            <a:stCxn id="26" idx="3"/>
+          </p:cNvCxnSpPr>
+          <p:nvPr/>
+        </p:nvCxnSpPr>
+        <p:spPr>
+          <a:xfrm flipV="1">
+            <a:off x="5498389" y="3888943"/>
+            <a:ext cx="871589" cy="1"/>
+          </a:xfrm>
+          <a:prstGeom prst="line">
+            <a:avLst/>
+          </a:prstGeom>
+        </p:spPr>
+        <p:style>
+          <a:lnRef idx="2">
+            <a:schemeClr val="accent1"/>
+          </a:lnRef>
+          <a:fillRef idx="0">
+            <a:schemeClr val="accent1"/>
+          </a:fillRef>
+          <a:effectRef idx="1">
+            <a:schemeClr val="accent1"/>
+          </a:effectRef>
+          <a:fontRef idx="minor">
+            <a:schemeClr val="tx1"/>
+          </a:fontRef>
+        </p:style>
+      </p:cxnSp>
+      <p:sp>
+        <p:nvSpPr>
+          <p:cNvPr id="36" name="TextBox 35">
+            <a:extLst>
+              <a:ext uri="{FF2B5EF4-FFF2-40B4-BE49-F238E27FC236}">
+                <a16:creationId xmlns:a16="http://schemas.microsoft.com/office/drawing/2014/main" id="{DFBA27CA-B484-5EBC-A0A7-96888CD00718}"/>
+              </a:ext>
+            </a:extLst>
+          </p:cNvPr>
+          <p:cNvSpPr txBox="1"/>
+          <p:nvPr/>
+        </p:nvSpPr>
+        <p:spPr>
+          <a:xfrm>
+            <a:off x="4890860" y="3403424"/>
+            <a:ext cx="549146" cy="261610"/>
+          </a:xfrm>
+          <a:prstGeom prst="rect">
+            <a:avLst/>
+          </a:prstGeom>
+          <a:noFill/>
+        </p:spPr>
+        <p:txBody>
+          <a:bodyPr wrap="square">
+            <a:spAutoFit/>
+          </a:bodyPr>
+          <a:lstStyle/>
+          <a:p>
+            <a:r>
+              <a:rPr lang="en-US" sz="1100" b="1" dirty="0"/>
+              <a:t>RTU</a:t>
+            </a:r>
+            <a:endParaRPr lang="en-SG" sz="1100" b="1" dirty="0"/>
+          </a:p>
+        </p:txBody>
+      </p:sp>
+      <p:sp>
+        <p:nvSpPr>
+          <p:cNvPr id="37" name="TextBox 36">
+            <a:extLst>
+              <a:ext uri="{FF2B5EF4-FFF2-40B4-BE49-F238E27FC236}">
+                <a16:creationId xmlns:a16="http://schemas.microsoft.com/office/drawing/2014/main" id="{4D2A2767-BA1F-85EE-8665-5E2A88BE7BC9}"/>
+              </a:ext>
+            </a:extLst>
+          </p:cNvPr>
+          <p:cNvSpPr txBox="1"/>
+          <p:nvPr/>
+        </p:nvSpPr>
+        <p:spPr>
+          <a:xfrm>
+            <a:off x="5491738" y="3621492"/>
+            <a:ext cx="871588" cy="276999"/>
+          </a:xfrm>
+          <a:prstGeom prst="rect">
+            <a:avLst/>
+          </a:prstGeom>
+          <a:noFill/>
+        </p:spPr>
+        <p:txBody>
+          <a:bodyPr wrap="square">
+            <a:spAutoFit/>
+          </a:bodyPr>
+          <a:lstStyle/>
+          <a:p>
+            <a:r>
+              <a:rPr lang="en-US" sz="1200" b="1" dirty="0">
+                <a:solidFill>
+                  <a:srgbClr val="002060"/>
+                </a:solidFill>
+              </a:rPr>
+              <a:t>S7Comm</a:t>
+            </a:r>
+            <a:endParaRPr lang="en-SG" sz="1200" b="1" dirty="0">
+              <a:solidFill>
+                <a:srgbClr val="002060"/>
+              </a:solidFill>
+            </a:endParaRPr>
+          </a:p>
+        </p:txBody>
+      </p:sp>
+      <p:pic>
+        <p:nvPicPr>
+          <p:cNvPr id="40" name="Picture 39">
+            <a:extLst>
+              <a:ext uri="{FF2B5EF4-FFF2-40B4-BE49-F238E27FC236}">
+                <a16:creationId xmlns:a16="http://schemas.microsoft.com/office/drawing/2014/main" id="{92C9EC9D-38CA-E5B8-F2A7-E87647E5527B}"/>
+              </a:ext>
+            </a:extLst>
+          </p:cNvPr>
+          <p:cNvPicPr>
+            <a:picLocks noChangeAspect="1"/>
+          </p:cNvPicPr>
+          <p:nvPr/>
+        </p:nvPicPr>
+        <p:blipFill>
+          <a:blip r:embed="rId5"/>
+          <a:srcRect t="-1" b="6117"/>
+          <a:stretch/>
+        </p:blipFill>
+        <p:spPr>
+          <a:xfrm>
+            <a:off x="6376629" y="3346663"/>
+            <a:ext cx="3628571" cy="1216009"/>
+          </a:xfrm>
+          <a:prstGeom prst="rect">
+            <a:avLst/>
+          </a:prstGeom>
+          <a:ln w="12700">
+            <a:solidFill>
+              <a:schemeClr val="tx1"/>
+            </a:solidFill>
+          </a:ln>
+        </p:spPr>
+      </p:pic>
+      <p:sp>
+        <p:nvSpPr>
+          <p:cNvPr id="38" name="TextBox 37">
+            <a:extLst>
+              <a:ext uri="{FF2B5EF4-FFF2-40B4-BE49-F238E27FC236}">
+                <a16:creationId xmlns:a16="http://schemas.microsoft.com/office/drawing/2014/main" id="{16C335C5-BB8D-58E2-7CE1-C11976146DA4}"/>
+              </a:ext>
+            </a:extLst>
+          </p:cNvPr>
+          <p:cNvSpPr txBox="1"/>
+          <p:nvPr/>
+        </p:nvSpPr>
+        <p:spPr>
+          <a:xfrm>
+            <a:off x="6376629" y="4136625"/>
+            <a:ext cx="3628571" cy="430887"/>
+          </a:xfrm>
+          <a:prstGeom prst="rect">
+            <a:avLst/>
+          </a:prstGeom>
+          <a:solidFill>
+            <a:schemeClr val="bg2">
+              <a:lumMod val="90000"/>
+            </a:schemeClr>
+          </a:solidFill>
+          <a:ln w="19050">
+            <a:solidFill>
+              <a:schemeClr val="tx1"/>
+            </a:solidFill>
+          </a:ln>
+        </p:spPr>
+        <p:txBody>
+          <a:bodyPr wrap="square">
+            <a:spAutoFit/>
+          </a:bodyPr>
+          <a:lstStyle/>
+          <a:p>
+            <a:r>
+              <a:rPr lang="en-SG" sz="1100" b="1" dirty="0"/>
+              <a:t>S7Comm to Manufacturing Message Specification (MMS) IEC61850 Converter Interface simulator</a:t>
+            </a:r>
+          </a:p>
+        </p:txBody>
+      </p:sp>
+      <p:pic>
+        <p:nvPicPr>
+          <p:cNvPr id="42" name="Picture 41">
+            <a:extLst>
+              <a:ext uri="{FF2B5EF4-FFF2-40B4-BE49-F238E27FC236}">
+                <a16:creationId xmlns:a16="http://schemas.microsoft.com/office/drawing/2014/main" id="{3F4E732E-6B33-0B39-94C0-900765FCB86C}"/>
+              </a:ext>
+            </a:extLst>
+          </p:cNvPr>
+          <p:cNvPicPr>
+            <a:picLocks noChangeAspect="1"/>
+          </p:cNvPicPr>
+          <p:nvPr/>
+        </p:nvPicPr>
+        <p:blipFill>
+          <a:blip r:embed="rId6"/>
+          <a:stretch>
+            <a:fillRect/>
+          </a:stretch>
+        </p:blipFill>
+        <p:spPr>
+          <a:xfrm>
+            <a:off x="6363326" y="1320269"/>
+            <a:ext cx="2780952" cy="1638095"/>
+          </a:xfrm>
+          <a:prstGeom prst="rect">
+            <a:avLst/>
+          </a:prstGeom>
+          <a:ln w="9525">
+            <a:solidFill>
+              <a:schemeClr val="tx1"/>
+            </a:solidFill>
+          </a:ln>
+        </p:spPr>
+      </p:pic>
+      <p:sp>
+        <p:nvSpPr>
+          <p:cNvPr id="43" name="Arrow: Up 42">
+            <a:extLst>
+              <a:ext uri="{FF2B5EF4-FFF2-40B4-BE49-F238E27FC236}">
+                <a16:creationId xmlns:a16="http://schemas.microsoft.com/office/drawing/2014/main" id="{C9793B5C-E0BF-66FB-00F4-1E2D1FC218D2}"/>
+              </a:ext>
+            </a:extLst>
+          </p:cNvPr>
+          <p:cNvSpPr/>
+          <p:nvPr/>
+        </p:nvSpPr>
+        <p:spPr>
+          <a:xfrm>
+            <a:off x="7387119" y="3010328"/>
+            <a:ext cx="184935" cy="226032"/>
+          </a:xfrm>
+          <a:prstGeom prst="upArrow">
+            <a:avLst/>
+          </a:prstGeom>
+        </p:spPr>
+        <p:style>
+          <a:lnRef idx="2">
+            <a:schemeClr val="accent1">
+              <a:shade val="15000"/>
+            </a:schemeClr>
+          </a:lnRef>
+          <a:fillRef idx="1">
+            <a:schemeClr val="accent1"/>
+          </a:fillRef>
+          <a:effectRef idx="0">
+            <a:schemeClr val="accent1"/>
+          </a:effectRef>
+          <a:fontRef idx="minor">
+            <a:schemeClr val="lt1"/>
+          </a:fontRef>
+        </p:style>
+        <p:txBody>
+          <a:bodyPr rtlCol="0" anchor="ctr"/>
+          <a:lstStyle/>
+          <a:p>
+            <a:pPr algn="ctr"/>
+            <a:endParaRPr lang="en-SG"/>
+          </a:p>
+        </p:txBody>
+      </p:sp>
+      <p:sp>
+        <p:nvSpPr>
+          <p:cNvPr id="44" name="TextBox 43">
+            <a:extLst>
+              <a:ext uri="{FF2B5EF4-FFF2-40B4-BE49-F238E27FC236}">
+                <a16:creationId xmlns:a16="http://schemas.microsoft.com/office/drawing/2014/main" id="{DAFDA79B-3E6F-BDD3-0F41-7C1C0EB6D302}"/>
+              </a:ext>
+            </a:extLst>
+          </p:cNvPr>
+          <p:cNvSpPr txBox="1"/>
+          <p:nvPr/>
+        </p:nvSpPr>
+        <p:spPr>
+          <a:xfrm>
+            <a:off x="836360" y="969306"/>
+            <a:ext cx="2811819" cy="307777"/>
+          </a:xfrm>
+          <a:prstGeom prst="rect">
+            <a:avLst/>
+          </a:prstGeom>
+          <a:noFill/>
+        </p:spPr>
+        <p:txBody>
+          <a:bodyPr wrap="square">
+            <a:spAutoFit/>
+          </a:bodyPr>
+          <a:lstStyle/>
+          <a:p>
+            <a:r>
+              <a:rPr lang="en-US" sz="1400" b="1" dirty="0"/>
+              <a:t>Physical world data generation </a:t>
+            </a:r>
+            <a:endParaRPr lang="en-SG" sz="1400" b="1" dirty="0"/>
+          </a:p>
+        </p:txBody>
+      </p:sp>
+      <p:sp>
+        <p:nvSpPr>
+          <p:cNvPr id="45" name="TextBox 44">
+            <a:extLst>
+              <a:ext uri="{FF2B5EF4-FFF2-40B4-BE49-F238E27FC236}">
+                <a16:creationId xmlns:a16="http://schemas.microsoft.com/office/drawing/2014/main" id="{2D573FE5-E903-D0D7-3816-6C2A83D92217}"/>
+              </a:ext>
+            </a:extLst>
+          </p:cNvPr>
+          <p:cNvSpPr txBox="1"/>
+          <p:nvPr/>
+        </p:nvSpPr>
+        <p:spPr>
+          <a:xfrm>
+            <a:off x="6265220" y="1008318"/>
+            <a:ext cx="2811819" cy="307777"/>
+          </a:xfrm>
+          <a:prstGeom prst="rect">
+            <a:avLst/>
+          </a:prstGeom>
+          <a:noFill/>
+        </p:spPr>
+        <p:txBody>
+          <a:bodyPr wrap="square">
+            <a:spAutoFit/>
+          </a:bodyPr>
+          <a:lstStyle/>
+          <a:p>
+            <a:r>
+              <a:rPr lang="en-US" sz="1400" b="1" dirty="0"/>
+              <a:t>IEC61850 data visualization</a:t>
+            </a:r>
+            <a:endParaRPr lang="en-SG" sz="1400" b="1" dirty="0"/>
+          </a:p>
+        </p:txBody>
+      </p:sp>
+      <p:sp>
+        <p:nvSpPr>
+          <p:cNvPr id="46" name="TextBox 45">
+            <a:extLst>
+              <a:ext uri="{FF2B5EF4-FFF2-40B4-BE49-F238E27FC236}">
+                <a16:creationId xmlns:a16="http://schemas.microsoft.com/office/drawing/2014/main" id="{D61B94F5-D9CB-F2B0-9687-09EBFBFCA06B}"/>
+              </a:ext>
+            </a:extLst>
+          </p:cNvPr>
+          <p:cNvSpPr txBox="1"/>
+          <p:nvPr/>
+        </p:nvSpPr>
+        <p:spPr>
+          <a:xfrm>
+            <a:off x="3786832" y="1414640"/>
+            <a:ext cx="2080472" cy="900246"/>
+          </a:xfrm>
+          <a:prstGeom prst="rect">
+            <a:avLst/>
+          </a:prstGeom>
+          <a:noFill/>
+        </p:spPr>
+        <p:txBody>
+          <a:bodyPr wrap="square">
+            <a:spAutoFit/>
+          </a:bodyPr>
+          <a:lstStyle/>
+          <a:p>
+            <a:r>
+              <a:rPr lang="en-US" sz="1050" b="1" dirty="0">
+                <a:solidFill>
+                  <a:schemeClr val="bg1">
+                    <a:lumMod val="50000"/>
+                  </a:schemeClr>
+                </a:solidFill>
+              </a:rPr>
+              <a:t>Work state: </a:t>
+            </a:r>
+            <a:r>
+              <a:rPr lang="en-US" sz="1050" dirty="0">
+                <a:solidFill>
+                  <a:schemeClr val="bg1">
+                    <a:lumMod val="50000"/>
+                  </a:schemeClr>
+                </a:solidFill>
+              </a:rPr>
+              <a:t>running, Idle , error</a:t>
+            </a:r>
+          </a:p>
+          <a:p>
+            <a:r>
+              <a:rPr lang="en-US" sz="1050" b="1" dirty="0">
+                <a:solidFill>
+                  <a:schemeClr val="bg1">
+                    <a:lumMod val="50000"/>
+                  </a:schemeClr>
+                </a:solidFill>
+              </a:rPr>
+              <a:t>Power output state: </a:t>
+            </a:r>
+            <a:r>
+              <a:rPr lang="en-US" sz="1050" dirty="0">
+                <a:solidFill>
+                  <a:schemeClr val="bg1">
+                    <a:lumMod val="50000"/>
+                  </a:schemeClr>
+                </a:solidFill>
+              </a:rPr>
+              <a:t>Voltage, current </a:t>
+            </a:r>
+          </a:p>
+          <a:p>
+            <a:r>
+              <a:rPr lang="en-US" sz="1050" b="1" dirty="0">
+                <a:solidFill>
+                  <a:schemeClr val="bg1">
+                    <a:lumMod val="50000"/>
+                  </a:schemeClr>
+                </a:solidFill>
+              </a:rPr>
+              <a:t>Special State: </a:t>
+            </a:r>
+            <a:r>
+              <a:rPr lang="en-US" sz="1050" dirty="0">
+                <a:solidFill>
+                  <a:schemeClr val="bg1">
+                    <a:lumMod val="50000"/>
+                  </a:schemeClr>
+                </a:solidFill>
+              </a:rPr>
+              <a:t>such as motor RPM, battery percentage </a:t>
+            </a:r>
+            <a:endParaRPr lang="en-SG" sz="1050" dirty="0">
+              <a:solidFill>
+                <a:schemeClr val="bg1">
+                  <a:lumMod val="50000"/>
+                </a:schemeClr>
+              </a:solidFill>
+            </a:endParaRPr>
+          </a:p>
+        </p:txBody>
+      </p:sp>
+      <p:cxnSp>
+        <p:nvCxnSpPr>
+          <p:cNvPr id="48" name="Straight Arrow Connector 47">
+            <a:extLst>
+              <a:ext uri="{FF2B5EF4-FFF2-40B4-BE49-F238E27FC236}">
+                <a16:creationId xmlns:a16="http://schemas.microsoft.com/office/drawing/2014/main" id="{B86655BE-B09B-0950-D341-1F248526B344}"/>
+              </a:ext>
+            </a:extLst>
+          </p:cNvPr>
+          <p:cNvCxnSpPr/>
+          <p:nvPr/>
+        </p:nvCxnSpPr>
+        <p:spPr>
+          <a:xfrm>
+            <a:off x="3490664" y="2317655"/>
+            <a:ext cx="2800391" cy="0"/>
+          </a:xfrm>
+          <a:prstGeom prst="straightConnector1">
+            <a:avLst/>
+          </a:prstGeom>
+          <a:ln>
+            <a:solidFill>
+              <a:schemeClr val="bg1">
+                <a:lumMod val="50000"/>
+              </a:schemeClr>
+            </a:solidFill>
+            <a:prstDash val="sysDash"/>
+            <a:tailEnd type="triangle"/>
+          </a:ln>
+        </p:spPr>
+        <p:style>
+          <a:lnRef idx="2">
+            <a:schemeClr val="accent1"/>
+          </a:lnRef>
+          <a:fillRef idx="0">
+            <a:schemeClr val="accent1"/>
+          </a:fillRef>
+          <a:effectRef idx="1">
+            <a:schemeClr val="accent1"/>
+          </a:effectRef>
+          <a:fontRef idx="minor">
+            <a:schemeClr val="tx1"/>
+          </a:fontRef>
+        </p:style>
+      </p:cxnSp>
+    </p:spTree>
+    <p:extLst>
+      <p:ext uri="{BB962C8B-B14F-4D97-AF65-F5344CB8AC3E}">
+        <p14:creationId xmlns:p14="http://schemas.microsoft.com/office/powerpoint/2010/main" val="3646988712"/>
       </p:ext>
     </p:extLst>
   </p:cSld>

</xml_diff>